<commit_message>
Major updates on spec.cov
</commit_message>
<xml_diff>
--- a/bitvis_vip_spec_cov/doc/Figures.pptx
+++ b/bitvis_vip_spec_cov/doc/Figures.pptx
@@ -260,7 +260,7 @@
           <a:p>
             <a:fld id="{BCA49E38-FF81-43B3-86DC-4B20814BC221}" type="datetimeFigureOut">
               <a:rPr lang="nb-NO" smtClean="0"/>
-              <a:t>30.01.2020</a:t>
+              <a:t>31.01.2020</a:t>
             </a:fld>
             <a:endParaRPr lang="nb-NO"/>
           </a:p>
@@ -458,7 +458,7 @@
           <a:p>
             <a:fld id="{BCA49E38-FF81-43B3-86DC-4B20814BC221}" type="datetimeFigureOut">
               <a:rPr lang="nb-NO" smtClean="0"/>
-              <a:t>30.01.2020</a:t>
+              <a:t>31.01.2020</a:t>
             </a:fld>
             <a:endParaRPr lang="nb-NO"/>
           </a:p>
@@ -666,7 +666,7 @@
           <a:p>
             <a:fld id="{BCA49E38-FF81-43B3-86DC-4B20814BC221}" type="datetimeFigureOut">
               <a:rPr lang="nb-NO" smtClean="0"/>
-              <a:t>30.01.2020</a:t>
+              <a:t>31.01.2020</a:t>
             </a:fld>
             <a:endParaRPr lang="nb-NO"/>
           </a:p>
@@ -864,7 +864,7 @@
           <a:p>
             <a:fld id="{BCA49E38-FF81-43B3-86DC-4B20814BC221}" type="datetimeFigureOut">
               <a:rPr lang="nb-NO" smtClean="0"/>
-              <a:t>30.01.2020</a:t>
+              <a:t>31.01.2020</a:t>
             </a:fld>
             <a:endParaRPr lang="nb-NO"/>
           </a:p>
@@ -1139,7 +1139,7 @@
           <a:p>
             <a:fld id="{BCA49E38-FF81-43B3-86DC-4B20814BC221}" type="datetimeFigureOut">
               <a:rPr lang="nb-NO" smtClean="0"/>
-              <a:t>30.01.2020</a:t>
+              <a:t>31.01.2020</a:t>
             </a:fld>
             <a:endParaRPr lang="nb-NO"/>
           </a:p>
@@ -1404,7 +1404,7 @@
           <a:p>
             <a:fld id="{BCA49E38-FF81-43B3-86DC-4B20814BC221}" type="datetimeFigureOut">
               <a:rPr lang="nb-NO" smtClean="0"/>
-              <a:t>30.01.2020</a:t>
+              <a:t>31.01.2020</a:t>
             </a:fld>
             <a:endParaRPr lang="nb-NO"/>
           </a:p>
@@ -1816,7 +1816,7 @@
           <a:p>
             <a:fld id="{BCA49E38-FF81-43B3-86DC-4B20814BC221}" type="datetimeFigureOut">
               <a:rPr lang="nb-NO" smtClean="0"/>
-              <a:t>30.01.2020</a:t>
+              <a:t>31.01.2020</a:t>
             </a:fld>
             <a:endParaRPr lang="nb-NO"/>
           </a:p>
@@ -1957,7 +1957,7 @@
           <a:p>
             <a:fld id="{BCA49E38-FF81-43B3-86DC-4B20814BC221}" type="datetimeFigureOut">
               <a:rPr lang="nb-NO" smtClean="0"/>
-              <a:t>30.01.2020</a:t>
+              <a:t>31.01.2020</a:t>
             </a:fld>
             <a:endParaRPr lang="nb-NO"/>
           </a:p>
@@ -2070,7 +2070,7 @@
           <a:p>
             <a:fld id="{BCA49E38-FF81-43B3-86DC-4B20814BC221}" type="datetimeFigureOut">
               <a:rPr lang="nb-NO" smtClean="0"/>
-              <a:t>30.01.2020</a:t>
+              <a:t>31.01.2020</a:t>
             </a:fld>
             <a:endParaRPr lang="nb-NO"/>
           </a:p>
@@ -2381,7 +2381,7 @@
           <a:p>
             <a:fld id="{BCA49E38-FF81-43B3-86DC-4B20814BC221}" type="datetimeFigureOut">
               <a:rPr lang="nb-NO" smtClean="0"/>
-              <a:t>30.01.2020</a:t>
+              <a:t>31.01.2020</a:t>
             </a:fld>
             <a:endParaRPr lang="nb-NO"/>
           </a:p>
@@ -2669,7 +2669,7 @@
           <a:p>
             <a:fld id="{BCA49E38-FF81-43B3-86DC-4B20814BC221}" type="datetimeFigureOut">
               <a:rPr lang="nb-NO" smtClean="0"/>
-              <a:t>30.01.2020</a:t>
+              <a:t>31.01.2020</a:t>
             </a:fld>
             <a:endParaRPr lang="nb-NO"/>
           </a:p>
@@ -2910,7 +2910,7 @@
           <a:p>
             <a:fld id="{BCA49E38-FF81-43B3-86DC-4B20814BC221}" type="datetimeFigureOut">
               <a:rPr lang="nb-NO" smtClean="0"/>
-              <a:t>30.01.2020</a:t>
+              <a:t>31.01.2020</a:t>
             </a:fld>
             <a:endParaRPr lang="nb-NO"/>
           </a:p>
@@ -3510,7 +3510,7 @@
         <p:spPr>
           <a:xfrm>
             <a:off x="3605292" y="448171"/>
-            <a:ext cx="1616072" cy="539079"/>
+            <a:ext cx="2051726" cy="539079"/>
           </a:xfrm>
           <a:prstGeom prst="rect">
             <a:avLst/>
@@ -3934,8 +3934,8 @@
         </p:nvCxnSpPr>
         <p:spPr>
           <a:xfrm flipH="1">
-            <a:off x="4413327" y="987250"/>
-            <a:ext cx="1" cy="357543"/>
+            <a:off x="4631031" y="987250"/>
+            <a:ext cx="124" cy="376960"/>
           </a:xfrm>
           <a:prstGeom prst="straightConnector1">
             <a:avLst/>
@@ -3979,8 +3979,8 @@
         </p:nvCxnSpPr>
         <p:spPr>
           <a:xfrm flipH="1">
-            <a:off x="2840854" y="1364779"/>
-            <a:ext cx="1572475" cy="5685"/>
+            <a:off x="2840855" y="1364210"/>
+            <a:ext cx="1790176" cy="6255"/>
           </a:xfrm>
           <a:prstGeom prst="straightConnector1">
             <a:avLst/>
@@ -4330,8 +4330,8 @@
         </p:nvSpPr>
         <p:spPr>
           <a:xfrm>
-            <a:off x="3605291" y="2297400"/>
-            <a:ext cx="1616079" cy="539079"/>
+            <a:off x="3605292" y="2297400"/>
+            <a:ext cx="2056900" cy="539079"/>
           </a:xfrm>
           <a:prstGeom prst="rect">
             <a:avLst/>
@@ -4375,27 +4375,27 @@
                 <a:latin typeface="Arial" panose="020B0604020202020204" pitchFamily="34" charset="0"/>
                 <a:cs typeface="Arial" panose="020B0604020202020204" pitchFamily="34" charset="0"/>
               </a:rPr>
+              <a:t>Specification</a:t>
+            </a:r>
+            <a:r>
+              <a:rPr lang="nb-NO" sz="800" b="1" dirty="0">
+                <a:solidFill>
+                  <a:schemeClr val="tx1"/>
+                </a:solidFill>
+                <a:latin typeface="Arial" panose="020B0604020202020204" pitchFamily="34" charset="0"/>
+                <a:cs typeface="Arial" panose="020B0604020202020204" pitchFamily="34" charset="0"/>
+              </a:rPr>
+              <a:t> </a:t>
+            </a:r>
+            <a:r>
+              <a:rPr lang="nb-NO" sz="800" b="1" dirty="0" err="1">
+                <a:solidFill>
+                  <a:schemeClr val="tx1"/>
+                </a:solidFill>
+                <a:latin typeface="Arial" panose="020B0604020202020204" pitchFamily="34" charset="0"/>
+                <a:cs typeface="Arial" panose="020B0604020202020204" pitchFamily="34" charset="0"/>
+              </a:rPr>
               <a:t>Coverage</a:t>
-            </a:r>
-            <a:r>
-              <a:rPr lang="nb-NO" sz="800" b="1" dirty="0">
-                <a:solidFill>
-                  <a:schemeClr val="tx1"/>
-                </a:solidFill>
-                <a:latin typeface="Arial" panose="020B0604020202020204" pitchFamily="34" charset="0"/>
-                <a:cs typeface="Arial" panose="020B0604020202020204" pitchFamily="34" charset="0"/>
-              </a:rPr>
-              <a:t> </a:t>
-            </a:r>
-            <a:r>
-              <a:rPr lang="nb-NO" sz="800" b="1" dirty="0" err="1">
-                <a:solidFill>
-                  <a:schemeClr val="tx1"/>
-                </a:solidFill>
-                <a:latin typeface="Arial" panose="020B0604020202020204" pitchFamily="34" charset="0"/>
-                <a:cs typeface="Arial" panose="020B0604020202020204" pitchFamily="34" charset="0"/>
-              </a:rPr>
-              <a:t>summary</a:t>
             </a:r>
             <a:r>
               <a:rPr lang="nb-NO" sz="800" b="1" dirty="0">
@@ -4672,8 +4672,8 @@
         </p:nvSpPr>
         <p:spPr>
           <a:xfrm>
-            <a:off x="5292395" y="448171"/>
-            <a:ext cx="1811843" cy="688505"/>
+            <a:off x="5718216" y="465745"/>
+            <a:ext cx="1853220" cy="688505"/>
           </a:xfrm>
           <a:prstGeom prst="rect">
             <a:avLst/>
@@ -5507,10 +5507,10 @@
       </p:sp>
       <p:sp>
         <p:nvSpPr>
-          <p:cNvPr id="29" name="Rektangel 28">
-            <a:extLst>
-              <a:ext uri="{FF2B5EF4-FFF2-40B4-BE49-F238E27FC236}">
-                <a16:creationId xmlns:a16="http://schemas.microsoft.com/office/drawing/2014/main" id="{0A7F3243-5831-4C40-80C5-431DB208C69E}"/>
+          <p:cNvPr id="30" name="Rektangel 29">
+            <a:extLst>
+              <a:ext uri="{FF2B5EF4-FFF2-40B4-BE49-F238E27FC236}">
+                <a16:creationId xmlns:a16="http://schemas.microsoft.com/office/drawing/2014/main" id="{9A121EE4-BC04-4F90-9F50-3E8BF941E326}"/>
               </a:ext>
             </a:extLst>
           </p:cNvPr>
@@ -5519,8 +5519,8 @@
         </p:nvSpPr>
         <p:spPr>
           <a:xfrm>
-            <a:off x="5292394" y="1364775"/>
-            <a:ext cx="1811848" cy="688505"/>
+            <a:off x="5718214" y="2165552"/>
+            <a:ext cx="1853220" cy="688505"/>
           </a:xfrm>
           <a:prstGeom prst="rect">
             <a:avLst/>
@@ -5564,7 +5564,7 @@
                 <a:latin typeface="Arial" panose="020B0604020202020204" pitchFamily="34" charset="0"/>
                 <a:cs typeface="Arial" panose="020B0604020202020204" pitchFamily="34" charset="0"/>
               </a:rPr>
-              <a:t>Coverage</a:t>
+              <a:t>Specification</a:t>
             </a:r>
             <a:r>
               <a:rPr lang="nb-NO" sz="800" b="1" dirty="0">
@@ -5574,110 +5574,8 @@
                 <a:latin typeface="Arial" panose="020B0604020202020204" pitchFamily="34" charset="0"/>
                 <a:cs typeface="Arial" panose="020B0604020202020204" pitchFamily="34" charset="0"/>
               </a:rPr>
-              <a:t> file, CSV</a:t>
-            </a:r>
-          </a:p>
-          <a:p>
-            <a:r>
-              <a:rPr lang="nb-NO" sz="800" dirty="0">
-                <a:solidFill>
-                  <a:schemeClr val="tx1"/>
-                </a:solidFill>
-                <a:latin typeface="Arial" panose="020B0604020202020204" pitchFamily="34" charset="0"/>
-                <a:cs typeface="Arial" panose="020B0604020202020204" pitchFamily="34" charset="0"/>
-              </a:rPr>
-              <a:t>UART_REQ_1, PASS</a:t>
-            </a:r>
-          </a:p>
-          <a:p>
-            <a:r>
-              <a:rPr lang="nb-NO" sz="800" dirty="0">
-                <a:solidFill>
-                  <a:schemeClr val="tx1"/>
-                </a:solidFill>
-                <a:latin typeface="Arial" panose="020B0604020202020204" pitchFamily="34" charset="0"/>
-                <a:cs typeface="Arial" panose="020B0604020202020204" pitchFamily="34" charset="0"/>
-              </a:rPr>
-              <a:t>UART_REQ_2, FAIL</a:t>
-            </a:r>
-          </a:p>
-          <a:p>
-            <a:r>
-              <a:rPr lang="nb-NO" sz="800" dirty="0">
-                <a:solidFill>
-                  <a:schemeClr val="tx1"/>
-                </a:solidFill>
-                <a:latin typeface="Arial" panose="020B0604020202020204" pitchFamily="34" charset="0"/>
-                <a:cs typeface="Arial" panose="020B0604020202020204" pitchFamily="34" charset="0"/>
-              </a:rPr>
-              <a:t>UART_REQ_3, PASS</a:t>
-            </a:r>
-          </a:p>
-          <a:p>
-            <a:r>
-              <a:rPr lang="nb-NO" sz="800" dirty="0">
-                <a:solidFill>
-                  <a:schemeClr val="tx1"/>
-                </a:solidFill>
-                <a:latin typeface="Arial" panose="020B0604020202020204" pitchFamily="34" charset="0"/>
-                <a:cs typeface="Arial" panose="020B0604020202020204" pitchFamily="34" charset="0"/>
-              </a:rPr>
-              <a:t>UART_REQ_4, PASS</a:t>
-            </a:r>
-          </a:p>
-        </p:txBody>
-      </p:sp>
-      <p:sp>
-        <p:nvSpPr>
-          <p:cNvPr id="30" name="Rektangel 29">
-            <a:extLst>
-              <a:ext uri="{FF2B5EF4-FFF2-40B4-BE49-F238E27FC236}">
-                <a16:creationId xmlns:a16="http://schemas.microsoft.com/office/drawing/2014/main" id="{9A121EE4-BC04-4F90-9F50-3E8BF941E326}"/>
-              </a:ext>
-            </a:extLst>
-          </p:cNvPr>
-          <p:cNvSpPr/>
-          <p:nvPr/>
-        </p:nvSpPr>
-        <p:spPr>
-          <a:xfrm>
-            <a:off x="5292393" y="2147978"/>
-            <a:ext cx="1811849" cy="688505"/>
-          </a:xfrm>
-          <a:prstGeom prst="rect">
-            <a:avLst/>
-          </a:prstGeom>
-          <a:solidFill>
-            <a:schemeClr val="bg1">
-              <a:lumMod val="85000"/>
-            </a:schemeClr>
-          </a:solidFill>
-          <a:ln>
-            <a:solidFill>
-              <a:schemeClr val="tx1"/>
-            </a:solidFill>
-          </a:ln>
-        </p:spPr>
-        <p:style>
-          <a:lnRef idx="2">
-            <a:schemeClr val="accent1">
-              <a:shade val="50000"/>
-            </a:schemeClr>
-          </a:lnRef>
-          <a:fillRef idx="1">
-            <a:schemeClr val="accent1"/>
-          </a:fillRef>
-          <a:effectRef idx="0">
-            <a:schemeClr val="accent1"/>
-          </a:effectRef>
-          <a:fontRef idx="minor">
-            <a:schemeClr val="lt1"/>
-          </a:fontRef>
-        </p:style>
-        <p:txBody>
-          <a:bodyPr rtlCol="0" anchor="t" anchorCtr="0"/>
-          <a:lstStyle/>
-          <a:p>
+              <a:t> </a:t>
+            </a:r>
             <a:r>
               <a:rPr lang="nb-NO" sz="800" b="1" dirty="0" err="1">
                 <a:solidFill>
@@ -5686,27 +5584,7 @@
                 <a:latin typeface="Arial" panose="020B0604020202020204" pitchFamily="34" charset="0"/>
                 <a:cs typeface="Arial" panose="020B0604020202020204" pitchFamily="34" charset="0"/>
               </a:rPr>
-              <a:t>Coverage</a:t>
-            </a:r>
-            <a:r>
-              <a:rPr lang="nb-NO" sz="800" b="1" dirty="0">
-                <a:solidFill>
-                  <a:schemeClr val="tx1"/>
-                </a:solidFill>
-                <a:latin typeface="Arial" panose="020B0604020202020204" pitchFamily="34" charset="0"/>
-                <a:cs typeface="Arial" panose="020B0604020202020204" pitchFamily="34" charset="0"/>
-              </a:rPr>
-              <a:t> </a:t>
-            </a:r>
-            <a:r>
-              <a:rPr lang="nb-NO" sz="800" b="1" dirty="0" err="1">
-                <a:solidFill>
-                  <a:schemeClr val="tx1"/>
-                </a:solidFill>
-                <a:latin typeface="Arial" panose="020B0604020202020204" pitchFamily="34" charset="0"/>
-                <a:cs typeface="Arial" panose="020B0604020202020204" pitchFamily="34" charset="0"/>
-              </a:rPr>
-              <a:t>Summary</a:t>
+              <a:t>coverage</a:t>
             </a:r>
             <a:r>
               <a:rPr lang="nb-NO" sz="800" b="1" dirty="0">
@@ -5851,7 +5729,7 @@
         </p:nvSpPr>
         <p:spPr>
           <a:xfrm>
-            <a:off x="4943004" y="2300751"/>
+            <a:off x="5280966" y="2309776"/>
             <a:ext cx="278360" cy="150684"/>
           </a:xfrm>
           <a:prstGeom prst="ellipse">
@@ -5895,7 +5773,7 @@
                   <a:srgbClr val="FF0000"/>
                 </a:solidFill>
               </a:rPr>
-              <a:t>CS</a:t>
+              <a:t>SC</a:t>
             </a:r>
             <a:endParaRPr lang="nb-NO" sz="1400" dirty="0">
               <a:solidFill>
@@ -5975,10 +5853,10 @@
       </p:sp>
       <p:sp>
         <p:nvSpPr>
-          <p:cNvPr id="40" name="Ellipse 39">
-            <a:extLst>
-              <a:ext uri="{FF2B5EF4-FFF2-40B4-BE49-F238E27FC236}">
-                <a16:creationId xmlns:a16="http://schemas.microsoft.com/office/drawing/2014/main" id="{A1820FB0-0928-4A5B-8C7D-6063D48A12E8}"/>
+          <p:cNvPr id="42" name="Ellipse 41">
+            <a:extLst>
+              <a:ext uri="{FF2B5EF4-FFF2-40B4-BE49-F238E27FC236}">
+                <a16:creationId xmlns:a16="http://schemas.microsoft.com/office/drawing/2014/main" id="{84D2F4C1-93F6-4FA7-AD9F-56F54053A642}"/>
               </a:ext>
             </a:extLst>
           </p:cNvPr>
@@ -5987,7 +5865,7 @@
         </p:nvSpPr>
         <p:spPr>
           <a:xfrm>
-            <a:off x="6810266" y="1383471"/>
+            <a:off x="7231878" y="479257"/>
             <a:ext cx="278360" cy="150684"/>
           </a:xfrm>
           <a:prstGeom prst="ellipse">
@@ -6031,7 +5909,7 @@
                   <a:srgbClr val="FF0000"/>
                 </a:solidFill>
               </a:rPr>
-              <a:t>CF</a:t>
+              <a:t>RL</a:t>
             </a:r>
             <a:endParaRPr lang="nb-NO" sz="1400" dirty="0">
               <a:solidFill>
@@ -6043,10 +5921,10 @@
       </p:sp>
       <p:sp>
         <p:nvSpPr>
-          <p:cNvPr id="42" name="Ellipse 41">
-            <a:extLst>
-              <a:ext uri="{FF2B5EF4-FFF2-40B4-BE49-F238E27FC236}">
-                <a16:creationId xmlns:a16="http://schemas.microsoft.com/office/drawing/2014/main" id="{84D2F4C1-93F6-4FA7-AD9F-56F54053A642}"/>
+          <p:cNvPr id="43" name="Ellipse 42">
+            <a:extLst>
+              <a:ext uri="{FF2B5EF4-FFF2-40B4-BE49-F238E27FC236}">
+                <a16:creationId xmlns:a16="http://schemas.microsoft.com/office/drawing/2014/main" id="{A14B39CC-26AD-45B1-B5EC-ECA81B7A8E36}"/>
               </a:ext>
             </a:extLst>
           </p:cNvPr>
@@ -6055,75 +5933,7 @@
         </p:nvSpPr>
         <p:spPr>
           <a:xfrm>
-            <a:off x="6811747" y="461683"/>
-            <a:ext cx="278360" cy="150684"/>
-          </a:xfrm>
-          <a:prstGeom prst="ellipse">
-            <a:avLst/>
-          </a:prstGeom>
-          <a:solidFill>
-            <a:schemeClr val="bg1">
-              <a:lumMod val="95000"/>
-            </a:schemeClr>
-          </a:solidFill>
-          <a:ln>
-            <a:solidFill>
-              <a:srgbClr val="FF0000"/>
-            </a:solidFill>
-          </a:ln>
-        </p:spPr>
-        <p:style>
-          <a:lnRef idx="2">
-            <a:schemeClr val="accent1">
-              <a:shade val="50000"/>
-            </a:schemeClr>
-          </a:lnRef>
-          <a:fillRef idx="1">
-            <a:schemeClr val="accent1"/>
-          </a:fillRef>
-          <a:effectRef idx="0">
-            <a:schemeClr val="accent1"/>
-          </a:effectRef>
-          <a:fontRef idx="minor">
-            <a:schemeClr val="lt1"/>
-          </a:fontRef>
-        </p:style>
-        <p:txBody>
-          <a:bodyPr wrap="none" lIns="0" tIns="0" rIns="0" bIns="0" rtlCol="0" anchor="ctr"/>
-          <a:lstStyle/>
-          <a:p>
-            <a:pPr algn="ctr"/>
-            <a:r>
-              <a:rPr lang="nb-NO" sz="1100" dirty="0">
-                <a:solidFill>
-                  <a:srgbClr val="FF0000"/>
-                </a:solidFill>
-              </a:rPr>
-              <a:t>RL</a:t>
-            </a:r>
-            <a:endParaRPr lang="nb-NO" sz="1400" dirty="0">
-              <a:solidFill>
-                <a:srgbClr val="FF0000"/>
-              </a:solidFill>
-            </a:endParaRPr>
-          </a:p>
-        </p:txBody>
-      </p:sp>
-      <p:sp>
-        <p:nvSpPr>
-          <p:cNvPr id="43" name="Ellipse 42">
-            <a:extLst>
-              <a:ext uri="{FF2B5EF4-FFF2-40B4-BE49-F238E27FC236}">
-                <a16:creationId xmlns:a16="http://schemas.microsoft.com/office/drawing/2014/main" id="{A14B39CC-26AD-45B1-B5EC-ECA81B7A8E36}"/>
-              </a:ext>
-            </a:extLst>
-          </p:cNvPr>
-          <p:cNvSpPr/>
-          <p:nvPr/>
-        </p:nvSpPr>
-        <p:spPr>
-          <a:xfrm>
-            <a:off x="6808792" y="2160178"/>
+            <a:off x="7238067" y="2177752"/>
             <a:ext cx="278360" cy="150684"/>
           </a:xfrm>
           <a:prstGeom prst="ellipse">
@@ -6643,230 +6453,6 @@
       </p:sp>
       <p:sp>
         <p:nvSpPr>
-          <p:cNvPr id="67" name="Rektangel 66">
-            <a:extLst>
-              <a:ext uri="{FF2B5EF4-FFF2-40B4-BE49-F238E27FC236}">
-                <a16:creationId xmlns:a16="http://schemas.microsoft.com/office/drawing/2014/main" id="{E30AC308-B492-4EE9-9024-7C74F593DEDF}"/>
-              </a:ext>
-            </a:extLst>
-          </p:cNvPr>
-          <p:cNvSpPr/>
-          <p:nvPr/>
-        </p:nvSpPr>
-        <p:spPr>
-          <a:xfrm>
-            <a:off x="3605291" y="1514204"/>
-            <a:ext cx="1616073" cy="533392"/>
-          </a:xfrm>
-          <a:prstGeom prst="rect">
-            <a:avLst/>
-          </a:prstGeom>
-          <a:solidFill>
-            <a:schemeClr val="bg1">
-              <a:lumMod val="85000"/>
-            </a:schemeClr>
-          </a:solidFill>
-          <a:ln>
-            <a:solidFill>
-              <a:schemeClr val="tx1"/>
-            </a:solidFill>
-          </a:ln>
-        </p:spPr>
-        <p:style>
-          <a:lnRef idx="2">
-            <a:schemeClr val="accent1">
-              <a:shade val="50000"/>
-            </a:schemeClr>
-          </a:lnRef>
-          <a:fillRef idx="1">
-            <a:schemeClr val="accent1"/>
-          </a:fillRef>
-          <a:effectRef idx="0">
-            <a:schemeClr val="accent1"/>
-          </a:effectRef>
-          <a:fontRef idx="minor">
-            <a:schemeClr val="lt1"/>
-          </a:fontRef>
-        </p:style>
-        <p:txBody>
-          <a:bodyPr rtlCol="0" anchor="t" anchorCtr="0"/>
-          <a:lstStyle/>
-          <a:p>
-            <a:r>
-              <a:rPr lang="nb-NO" sz="800" b="1" dirty="0" err="1">
-                <a:solidFill>
-                  <a:schemeClr val="tx1"/>
-                </a:solidFill>
-                <a:latin typeface="Arial" panose="020B0604020202020204" pitchFamily="34" charset="0"/>
-                <a:cs typeface="Arial" panose="020B0604020202020204" pitchFamily="34" charset="0"/>
-              </a:rPr>
-              <a:t>Coverage</a:t>
-            </a:r>
-            <a:r>
-              <a:rPr lang="nb-NO" sz="800" b="1" dirty="0">
-                <a:solidFill>
-                  <a:schemeClr val="tx1"/>
-                </a:solidFill>
-                <a:latin typeface="Arial" panose="020B0604020202020204" pitchFamily="34" charset="0"/>
-                <a:cs typeface="Arial" panose="020B0604020202020204" pitchFamily="34" charset="0"/>
-              </a:rPr>
-              <a:t> file, CSV</a:t>
-            </a:r>
-          </a:p>
-          <a:p>
-            <a:r>
-              <a:rPr lang="nb-NO" sz="800" dirty="0">
-                <a:solidFill>
-                  <a:schemeClr val="tx1"/>
-                </a:solidFill>
-                <a:latin typeface="Arial" panose="020B0604020202020204" pitchFamily="34" charset="0"/>
-                <a:cs typeface="Arial" panose="020B0604020202020204" pitchFamily="34" charset="0"/>
-              </a:rPr>
-              <a:t>&lt;</a:t>
-            </a:r>
-            <a:r>
-              <a:rPr lang="nb-NO" sz="800" dirty="0" err="1">
-                <a:solidFill>
-                  <a:schemeClr val="tx1"/>
-                </a:solidFill>
-                <a:latin typeface="Arial" panose="020B0604020202020204" pitchFamily="34" charset="0"/>
-                <a:cs typeface="Arial" panose="020B0604020202020204" pitchFamily="34" charset="0"/>
-              </a:rPr>
-              <a:t>Req</a:t>
-            </a:r>
-            <a:r>
-              <a:rPr lang="nb-NO" sz="800" dirty="0">
-                <a:solidFill>
-                  <a:schemeClr val="tx1"/>
-                </a:solidFill>
-                <a:latin typeface="Arial" panose="020B0604020202020204" pitchFamily="34" charset="0"/>
-                <a:cs typeface="Arial" panose="020B0604020202020204" pitchFamily="34" charset="0"/>
-              </a:rPr>
-              <a:t>. </a:t>
-            </a:r>
-            <a:r>
-              <a:rPr lang="nb-NO" sz="800" dirty="0" err="1">
-                <a:solidFill>
-                  <a:schemeClr val="tx1"/>
-                </a:solidFill>
-                <a:latin typeface="Arial" panose="020B0604020202020204" pitchFamily="34" charset="0"/>
-                <a:cs typeface="Arial" panose="020B0604020202020204" pitchFamily="34" charset="0"/>
-              </a:rPr>
-              <a:t>Label</a:t>
-            </a:r>
-            <a:r>
-              <a:rPr lang="nb-NO" sz="800" dirty="0">
-                <a:solidFill>
-                  <a:schemeClr val="tx1"/>
-                </a:solidFill>
-                <a:latin typeface="Arial" panose="020B0604020202020204" pitchFamily="34" charset="0"/>
-                <a:cs typeface="Arial" panose="020B0604020202020204" pitchFamily="34" charset="0"/>
-              </a:rPr>
-              <a:t>&gt;, Pass | </a:t>
-            </a:r>
-            <a:r>
-              <a:rPr lang="nb-NO" sz="800" dirty="0" err="1">
-                <a:solidFill>
-                  <a:schemeClr val="tx1"/>
-                </a:solidFill>
-                <a:latin typeface="Arial" panose="020B0604020202020204" pitchFamily="34" charset="0"/>
-                <a:cs typeface="Arial" panose="020B0604020202020204" pitchFamily="34" charset="0"/>
-              </a:rPr>
-              <a:t>Fail</a:t>
-            </a:r>
-            <a:endParaRPr lang="nb-NO" sz="800" dirty="0">
-              <a:solidFill>
-                <a:schemeClr val="tx1"/>
-              </a:solidFill>
-              <a:latin typeface="Arial" panose="020B0604020202020204" pitchFamily="34" charset="0"/>
-              <a:cs typeface="Arial" panose="020B0604020202020204" pitchFamily="34" charset="0"/>
-            </a:endParaRPr>
-          </a:p>
-          <a:p>
-            <a:r>
-              <a:rPr lang="nb-NO" sz="800" dirty="0">
-                <a:solidFill>
-                  <a:schemeClr val="tx1"/>
-                </a:solidFill>
-                <a:latin typeface="Arial" panose="020B0604020202020204" pitchFamily="34" charset="0"/>
-                <a:cs typeface="Arial" panose="020B0604020202020204" pitchFamily="34" charset="0"/>
-              </a:rPr>
-              <a:t>&lt;</a:t>
-            </a:r>
-            <a:r>
-              <a:rPr lang="nb-NO" sz="800" dirty="0" err="1">
-                <a:solidFill>
-                  <a:schemeClr val="tx1"/>
-                </a:solidFill>
-                <a:latin typeface="Arial" panose="020B0604020202020204" pitchFamily="34" charset="0"/>
-                <a:cs typeface="Arial" panose="020B0604020202020204" pitchFamily="34" charset="0"/>
-              </a:rPr>
-              <a:t>Req</a:t>
-            </a:r>
-            <a:r>
-              <a:rPr lang="nb-NO" sz="800" dirty="0">
-                <a:solidFill>
-                  <a:schemeClr val="tx1"/>
-                </a:solidFill>
-                <a:latin typeface="Arial" panose="020B0604020202020204" pitchFamily="34" charset="0"/>
-                <a:cs typeface="Arial" panose="020B0604020202020204" pitchFamily="34" charset="0"/>
-              </a:rPr>
-              <a:t>. </a:t>
-            </a:r>
-            <a:r>
-              <a:rPr lang="nb-NO" sz="800" dirty="0" err="1">
-                <a:solidFill>
-                  <a:schemeClr val="tx1"/>
-                </a:solidFill>
-                <a:latin typeface="Arial" panose="020B0604020202020204" pitchFamily="34" charset="0"/>
-                <a:cs typeface="Arial" panose="020B0604020202020204" pitchFamily="34" charset="0"/>
-              </a:rPr>
-              <a:t>Label</a:t>
-            </a:r>
-            <a:r>
-              <a:rPr lang="nb-NO" sz="800" dirty="0">
-                <a:solidFill>
-                  <a:schemeClr val="tx1"/>
-                </a:solidFill>
-                <a:latin typeface="Arial" panose="020B0604020202020204" pitchFamily="34" charset="0"/>
-                <a:cs typeface="Arial" panose="020B0604020202020204" pitchFamily="34" charset="0"/>
-              </a:rPr>
-              <a:t>&gt;, Pass | </a:t>
-            </a:r>
-            <a:r>
-              <a:rPr lang="nb-NO" sz="800" dirty="0" err="1">
-                <a:solidFill>
-                  <a:schemeClr val="tx1"/>
-                </a:solidFill>
-                <a:latin typeface="Arial" panose="020B0604020202020204" pitchFamily="34" charset="0"/>
-                <a:cs typeface="Arial" panose="020B0604020202020204" pitchFamily="34" charset="0"/>
-              </a:rPr>
-              <a:t>Fail</a:t>
-            </a:r>
-            <a:endParaRPr lang="nb-NO" sz="800" dirty="0">
-              <a:solidFill>
-                <a:schemeClr val="tx1"/>
-              </a:solidFill>
-              <a:latin typeface="Arial" panose="020B0604020202020204" pitchFamily="34" charset="0"/>
-              <a:cs typeface="Arial" panose="020B0604020202020204" pitchFamily="34" charset="0"/>
-            </a:endParaRPr>
-          </a:p>
-          <a:p>
-            <a:r>
-              <a:rPr lang="nb-NO" sz="800" dirty="0">
-                <a:solidFill>
-                  <a:schemeClr val="tx1"/>
-                </a:solidFill>
-                <a:latin typeface="Arial" panose="020B0604020202020204" pitchFamily="34" charset="0"/>
-                <a:cs typeface="Arial" panose="020B0604020202020204" pitchFamily="34" charset="0"/>
-              </a:rPr>
-              <a:t>……….</a:t>
-            </a:r>
-          </a:p>
-        </p:txBody>
-      </p:sp>
-      <p:sp>
-        <p:nvSpPr>
           <p:cNvPr id="33" name="Ellipse 32">
             <a:extLst>
               <a:ext uri="{FF2B5EF4-FFF2-40B4-BE49-F238E27FC236}">
@@ -6923,7 +6509,7 @@
                   <a:srgbClr val="FF0000"/>
                 </a:solidFill>
               </a:rPr>
-              <a:t>CF</a:t>
+              <a:t>TC</a:t>
             </a:r>
             <a:endParaRPr lang="nb-NO" sz="1400" dirty="0">
               <a:solidFill>
@@ -6947,7 +6533,7 @@
         </p:nvSpPr>
         <p:spPr>
           <a:xfrm>
-            <a:off x="3013872" y="3304653"/>
+            <a:off x="5718216" y="1367378"/>
             <a:ext cx="1853220" cy="688505"/>
           </a:xfrm>
           <a:prstGeom prst="rect">
@@ -6992,6 +6578,26 @@
                 <a:latin typeface="Arial" panose="020B0604020202020204" pitchFamily="34" charset="0"/>
                 <a:cs typeface="Arial" panose="020B0604020202020204" pitchFamily="34" charset="0"/>
               </a:rPr>
+              <a:t>Testcase</a:t>
+            </a:r>
+            <a:r>
+              <a:rPr lang="nb-NO" sz="800" b="1" dirty="0">
+                <a:solidFill>
+                  <a:schemeClr val="tx1"/>
+                </a:solidFill>
+                <a:latin typeface="Arial" panose="020B0604020202020204" pitchFamily="34" charset="0"/>
+                <a:cs typeface="Arial" panose="020B0604020202020204" pitchFamily="34" charset="0"/>
+              </a:rPr>
+              <a:t> </a:t>
+            </a:r>
+            <a:r>
+              <a:rPr lang="nb-NO" sz="800" b="1" dirty="0" err="1">
+                <a:solidFill>
+                  <a:schemeClr val="tx1"/>
+                </a:solidFill>
+                <a:latin typeface="Arial" panose="020B0604020202020204" pitchFamily="34" charset="0"/>
+                <a:cs typeface="Arial" panose="020B0604020202020204" pitchFamily="34" charset="0"/>
+              </a:rPr>
               <a:t>Coverage</a:t>
             </a:r>
             <a:r>
@@ -7002,43 +6608,43 @@
                 <a:latin typeface="Arial" panose="020B0604020202020204" pitchFamily="34" charset="0"/>
                 <a:cs typeface="Arial" panose="020B0604020202020204" pitchFamily="34" charset="0"/>
               </a:rPr>
-              <a:t> file, CSV</a:t>
-            </a:r>
-          </a:p>
-          <a:p>
-            <a:r>
-              <a:rPr lang="nb-NO" sz="800" dirty="0">
-                <a:solidFill>
-                  <a:schemeClr val="tx1"/>
-                </a:solidFill>
-                <a:latin typeface="Arial" panose="020B0604020202020204" pitchFamily="34" charset="0"/>
-                <a:cs typeface="Arial" panose="020B0604020202020204" pitchFamily="34" charset="0"/>
-              </a:rPr>
-              <a:t>UART_REQ_1, TC_9k6,   PASS</a:t>
-            </a:r>
-          </a:p>
-          <a:p>
-            <a:r>
-              <a:rPr lang="nb-NO" sz="800" dirty="0">
-                <a:solidFill>
-                  <a:schemeClr val="tx1"/>
-                </a:solidFill>
-                <a:latin typeface="Arial" panose="020B0604020202020204" pitchFamily="34" charset="0"/>
-                <a:cs typeface="Arial" panose="020B0604020202020204" pitchFamily="34" charset="0"/>
-              </a:rPr>
-              <a:t>UART_REQ_2, TC_19k2, FAIL</a:t>
-            </a:r>
-          </a:p>
-          <a:p>
-            <a:r>
-              <a:rPr lang="nb-NO" sz="800" dirty="0">
-                <a:solidFill>
-                  <a:schemeClr val="tx1"/>
-                </a:solidFill>
-                <a:latin typeface="Arial" panose="020B0604020202020204" pitchFamily="34" charset="0"/>
-                <a:cs typeface="Arial" panose="020B0604020202020204" pitchFamily="34" charset="0"/>
-              </a:rPr>
-              <a:t>UART_REQ_3, TC_9k6,   PASS</a:t>
+              <a:t>, CSV</a:t>
+            </a:r>
+          </a:p>
+          <a:p>
+            <a:r>
+              <a:rPr lang="nb-NO" sz="800" dirty="0">
+                <a:solidFill>
+                  <a:schemeClr val="tx1"/>
+                </a:solidFill>
+                <a:latin typeface="Arial" panose="020B0604020202020204" pitchFamily="34" charset="0"/>
+                <a:cs typeface="Arial" panose="020B0604020202020204" pitchFamily="34" charset="0"/>
+              </a:rPr>
+              <a:t>UART_REQ_1, T_9k6,   PASS</a:t>
+            </a:r>
+          </a:p>
+          <a:p>
+            <a:r>
+              <a:rPr lang="nb-NO" sz="800" dirty="0">
+                <a:solidFill>
+                  <a:schemeClr val="tx1"/>
+                </a:solidFill>
+                <a:latin typeface="Arial" panose="020B0604020202020204" pitchFamily="34" charset="0"/>
+                <a:cs typeface="Arial" panose="020B0604020202020204" pitchFamily="34" charset="0"/>
+              </a:rPr>
+              <a:t>UART_REQ_2, T_19k2, FAIL</a:t>
+            </a:r>
+          </a:p>
+          <a:p>
+            <a:r>
+              <a:rPr lang="nb-NO" sz="800" dirty="0">
+                <a:solidFill>
+                  <a:schemeClr val="tx1"/>
+                </a:solidFill>
+                <a:latin typeface="Arial" panose="020B0604020202020204" pitchFamily="34" charset="0"/>
+                <a:cs typeface="Arial" panose="020B0604020202020204" pitchFamily="34" charset="0"/>
+              </a:rPr>
+              <a:t>UART_REQ_3, T_9k6,   PASS</a:t>
             </a:r>
           </a:p>
           <a:p>
@@ -7060,7 +6666,7 @@
                 <a:latin typeface="Arial" panose="020B0604020202020204" pitchFamily="34" charset="0"/>
                 <a:cs typeface="Arial" panose="020B0604020202020204" pitchFamily="34" charset="0"/>
               </a:rPr>
-              <a:t>TC_reset</a:t>
+              <a:t>T_reset</a:t>
             </a:r>
             <a:r>
               <a:rPr lang="nb-NO" sz="800" dirty="0">
@@ -7089,7 +6695,7 @@
         </p:nvSpPr>
         <p:spPr>
           <a:xfrm>
-            <a:off x="4558377" y="3323349"/>
+            <a:off x="7262721" y="1386074"/>
             <a:ext cx="278360" cy="150684"/>
           </a:xfrm>
           <a:prstGeom prst="ellipse">
@@ -7133,339 +6739,7 @@
                   <a:srgbClr val="FF0000"/>
                 </a:solidFill>
               </a:rPr>
-              <a:t>CF</a:t>
-            </a:r>
-            <a:endParaRPr lang="nb-NO" sz="1400" dirty="0">
-              <a:solidFill>
-                <a:srgbClr val="FF0000"/>
-              </a:solidFill>
-            </a:endParaRPr>
-          </a:p>
-        </p:txBody>
-      </p:sp>
-      <p:sp>
-        <p:nvSpPr>
-          <p:cNvPr id="70" name="Rektangel 69">
-            <a:extLst>
-              <a:ext uri="{FF2B5EF4-FFF2-40B4-BE49-F238E27FC236}">
-                <a16:creationId xmlns:a16="http://schemas.microsoft.com/office/drawing/2014/main" id="{8BEF124D-EF7B-41DC-A5D4-1646DF4CCF8F}"/>
-              </a:ext>
-            </a:extLst>
-          </p:cNvPr>
-          <p:cNvSpPr/>
-          <p:nvPr/>
-        </p:nvSpPr>
-        <p:spPr>
-          <a:xfrm>
-            <a:off x="485882" y="3304653"/>
-            <a:ext cx="2456961" cy="549651"/>
-          </a:xfrm>
-          <a:prstGeom prst="rect">
-            <a:avLst/>
-          </a:prstGeom>
-          <a:solidFill>
-            <a:schemeClr val="bg1">
-              <a:lumMod val="85000"/>
-            </a:schemeClr>
-          </a:solidFill>
-          <a:ln>
-            <a:solidFill>
-              <a:schemeClr val="tx1"/>
-            </a:solidFill>
-          </a:ln>
-        </p:spPr>
-        <p:style>
-          <a:lnRef idx="2">
-            <a:schemeClr val="accent1">
-              <a:shade val="50000"/>
-            </a:schemeClr>
-          </a:lnRef>
-          <a:fillRef idx="1">
-            <a:schemeClr val="accent1"/>
-          </a:fillRef>
-          <a:effectRef idx="0">
-            <a:schemeClr val="accent1"/>
-          </a:effectRef>
-          <a:fontRef idx="minor">
-            <a:schemeClr val="lt1"/>
-          </a:fontRef>
-        </p:style>
-        <p:txBody>
-          <a:bodyPr rtlCol="0" anchor="t" anchorCtr="0"/>
-          <a:lstStyle/>
-          <a:p>
-            <a:r>
-              <a:rPr lang="nb-NO" sz="800" b="1" dirty="0" err="1">
-                <a:solidFill>
-                  <a:schemeClr val="tx1"/>
-                </a:solidFill>
-                <a:latin typeface="Arial" panose="020B0604020202020204" pitchFamily="34" charset="0"/>
-                <a:cs typeface="Arial" panose="020B0604020202020204" pitchFamily="34" charset="0"/>
-              </a:rPr>
-              <a:t>Coverage</a:t>
-            </a:r>
-            <a:r>
-              <a:rPr lang="nb-NO" sz="800" b="1" dirty="0">
-                <a:solidFill>
-                  <a:schemeClr val="tx1"/>
-                </a:solidFill>
-                <a:latin typeface="Arial" panose="020B0604020202020204" pitchFamily="34" charset="0"/>
-                <a:cs typeface="Arial" panose="020B0604020202020204" pitchFamily="34" charset="0"/>
-              </a:rPr>
-              <a:t> file, CSV</a:t>
-            </a:r>
-          </a:p>
-          <a:p>
-            <a:r>
-              <a:rPr lang="nb-NO" sz="800" dirty="0">
-                <a:solidFill>
-                  <a:schemeClr val="tx1"/>
-                </a:solidFill>
-                <a:latin typeface="Arial" panose="020B0604020202020204" pitchFamily="34" charset="0"/>
-                <a:cs typeface="Arial" panose="020B0604020202020204" pitchFamily="34" charset="0"/>
-              </a:rPr>
-              <a:t>&lt;</a:t>
-            </a:r>
-            <a:r>
-              <a:rPr lang="nb-NO" sz="800" dirty="0" err="1">
-                <a:solidFill>
-                  <a:schemeClr val="tx1"/>
-                </a:solidFill>
-                <a:latin typeface="Arial" panose="020B0604020202020204" pitchFamily="34" charset="0"/>
-                <a:cs typeface="Arial" panose="020B0604020202020204" pitchFamily="34" charset="0"/>
-              </a:rPr>
-              <a:t>Req</a:t>
-            </a:r>
-            <a:r>
-              <a:rPr lang="nb-NO" sz="800" dirty="0">
-                <a:solidFill>
-                  <a:schemeClr val="tx1"/>
-                </a:solidFill>
-                <a:latin typeface="Arial" panose="020B0604020202020204" pitchFamily="34" charset="0"/>
-                <a:cs typeface="Arial" panose="020B0604020202020204" pitchFamily="34" charset="0"/>
-              </a:rPr>
-              <a:t>. </a:t>
-            </a:r>
-            <a:r>
-              <a:rPr lang="nb-NO" sz="800" dirty="0" err="1">
-                <a:solidFill>
-                  <a:schemeClr val="tx1"/>
-                </a:solidFill>
-                <a:latin typeface="Arial" panose="020B0604020202020204" pitchFamily="34" charset="0"/>
-                <a:cs typeface="Arial" panose="020B0604020202020204" pitchFamily="34" charset="0"/>
-              </a:rPr>
-              <a:t>Label</a:t>
-            </a:r>
-            <a:r>
-              <a:rPr lang="nb-NO" sz="800" dirty="0">
-                <a:solidFill>
-                  <a:schemeClr val="tx1"/>
-                </a:solidFill>
-                <a:latin typeface="Arial" panose="020B0604020202020204" pitchFamily="34" charset="0"/>
-                <a:cs typeface="Arial" panose="020B0604020202020204" pitchFamily="34" charset="0"/>
-              </a:rPr>
-              <a:t>&gt;, &lt;</a:t>
-            </a:r>
-            <a:r>
-              <a:rPr lang="nb-NO" sz="800" dirty="0" err="1">
-                <a:solidFill>
-                  <a:schemeClr val="tx1"/>
-                </a:solidFill>
-                <a:latin typeface="Arial" panose="020B0604020202020204" pitchFamily="34" charset="0"/>
-                <a:cs typeface="Arial" panose="020B0604020202020204" pitchFamily="34" charset="0"/>
-              </a:rPr>
-              <a:t>Testcase-name</a:t>
-            </a:r>
-            <a:r>
-              <a:rPr lang="nb-NO" sz="800" dirty="0">
-                <a:solidFill>
-                  <a:schemeClr val="tx1"/>
-                </a:solidFill>
-                <a:latin typeface="Arial" panose="020B0604020202020204" pitchFamily="34" charset="0"/>
-                <a:cs typeface="Arial" panose="020B0604020202020204" pitchFamily="34" charset="0"/>
-              </a:rPr>
-              <a:t>&gt;, Pass | </a:t>
-            </a:r>
-            <a:r>
-              <a:rPr lang="nb-NO" sz="800" dirty="0" err="1">
-                <a:solidFill>
-                  <a:schemeClr val="tx1"/>
-                </a:solidFill>
-                <a:latin typeface="Arial" panose="020B0604020202020204" pitchFamily="34" charset="0"/>
-                <a:cs typeface="Arial" panose="020B0604020202020204" pitchFamily="34" charset="0"/>
-              </a:rPr>
-              <a:t>Fail</a:t>
-            </a:r>
-            <a:endParaRPr lang="nb-NO" sz="800" dirty="0">
-              <a:solidFill>
-                <a:schemeClr val="tx1"/>
-              </a:solidFill>
-              <a:latin typeface="Arial" panose="020B0604020202020204" pitchFamily="34" charset="0"/>
-              <a:cs typeface="Arial" panose="020B0604020202020204" pitchFamily="34" charset="0"/>
-            </a:endParaRPr>
-          </a:p>
-          <a:p>
-            <a:r>
-              <a:rPr lang="nb-NO" sz="800" dirty="0">
-                <a:solidFill>
-                  <a:schemeClr val="tx1"/>
-                </a:solidFill>
-                <a:latin typeface="Arial" panose="020B0604020202020204" pitchFamily="34" charset="0"/>
-                <a:cs typeface="Arial" panose="020B0604020202020204" pitchFamily="34" charset="0"/>
-              </a:rPr>
-              <a:t>&lt;</a:t>
-            </a:r>
-            <a:r>
-              <a:rPr lang="nb-NO" sz="800" dirty="0" err="1">
-                <a:solidFill>
-                  <a:schemeClr val="tx1"/>
-                </a:solidFill>
-                <a:latin typeface="Arial" panose="020B0604020202020204" pitchFamily="34" charset="0"/>
-                <a:cs typeface="Arial" panose="020B0604020202020204" pitchFamily="34" charset="0"/>
-              </a:rPr>
-              <a:t>Req</a:t>
-            </a:r>
-            <a:r>
-              <a:rPr lang="nb-NO" sz="800" dirty="0">
-                <a:solidFill>
-                  <a:schemeClr val="tx1"/>
-                </a:solidFill>
-                <a:latin typeface="Arial" panose="020B0604020202020204" pitchFamily="34" charset="0"/>
-                <a:cs typeface="Arial" panose="020B0604020202020204" pitchFamily="34" charset="0"/>
-              </a:rPr>
-              <a:t>. </a:t>
-            </a:r>
-            <a:r>
-              <a:rPr lang="nb-NO" sz="800" dirty="0" err="1">
-                <a:solidFill>
-                  <a:schemeClr val="tx1"/>
-                </a:solidFill>
-                <a:latin typeface="Arial" panose="020B0604020202020204" pitchFamily="34" charset="0"/>
-                <a:cs typeface="Arial" panose="020B0604020202020204" pitchFamily="34" charset="0"/>
-              </a:rPr>
-              <a:t>Label</a:t>
-            </a:r>
-            <a:r>
-              <a:rPr lang="nb-NO" sz="800" dirty="0">
-                <a:solidFill>
-                  <a:schemeClr val="tx1"/>
-                </a:solidFill>
-                <a:latin typeface="Arial" panose="020B0604020202020204" pitchFamily="34" charset="0"/>
-                <a:cs typeface="Arial" panose="020B0604020202020204" pitchFamily="34" charset="0"/>
-              </a:rPr>
-              <a:t>&gt;, &lt;</a:t>
-            </a:r>
-            <a:r>
-              <a:rPr lang="nb-NO" sz="800" dirty="0" err="1">
-                <a:solidFill>
-                  <a:schemeClr val="tx1"/>
-                </a:solidFill>
-                <a:latin typeface="Arial" panose="020B0604020202020204" pitchFamily="34" charset="0"/>
-                <a:cs typeface="Arial" panose="020B0604020202020204" pitchFamily="34" charset="0"/>
-              </a:rPr>
-              <a:t>Testcase-name</a:t>
-            </a:r>
-            <a:r>
-              <a:rPr lang="nb-NO" sz="800" dirty="0">
-                <a:solidFill>
-                  <a:schemeClr val="tx1"/>
-                </a:solidFill>
-                <a:latin typeface="Arial" panose="020B0604020202020204" pitchFamily="34" charset="0"/>
-                <a:cs typeface="Arial" panose="020B0604020202020204" pitchFamily="34" charset="0"/>
-              </a:rPr>
-              <a:t>&gt;, Pass | </a:t>
-            </a:r>
-            <a:r>
-              <a:rPr lang="nb-NO" sz="800" dirty="0" err="1">
-                <a:solidFill>
-                  <a:schemeClr val="tx1"/>
-                </a:solidFill>
-                <a:latin typeface="Arial" panose="020B0604020202020204" pitchFamily="34" charset="0"/>
-                <a:cs typeface="Arial" panose="020B0604020202020204" pitchFamily="34" charset="0"/>
-              </a:rPr>
-              <a:t>Fail</a:t>
-            </a:r>
-            <a:endParaRPr lang="nb-NO" sz="800" dirty="0">
-              <a:solidFill>
-                <a:schemeClr val="tx1"/>
-              </a:solidFill>
-              <a:latin typeface="Arial" panose="020B0604020202020204" pitchFamily="34" charset="0"/>
-              <a:cs typeface="Arial" panose="020B0604020202020204" pitchFamily="34" charset="0"/>
-            </a:endParaRPr>
-          </a:p>
-          <a:p>
-            <a:r>
-              <a:rPr lang="nb-NO" sz="800" dirty="0">
-                <a:solidFill>
-                  <a:schemeClr val="tx1"/>
-                </a:solidFill>
-                <a:latin typeface="Arial" panose="020B0604020202020204" pitchFamily="34" charset="0"/>
-                <a:cs typeface="Arial" panose="020B0604020202020204" pitchFamily="34" charset="0"/>
-              </a:rPr>
-              <a:t>……….</a:t>
-            </a:r>
-          </a:p>
-        </p:txBody>
-      </p:sp>
-      <p:sp>
-        <p:nvSpPr>
-          <p:cNvPr id="71" name="Ellipse 70">
-            <a:extLst>
-              <a:ext uri="{FF2B5EF4-FFF2-40B4-BE49-F238E27FC236}">
-                <a16:creationId xmlns:a16="http://schemas.microsoft.com/office/drawing/2014/main" id="{0EAFF56F-5E0A-4C7F-9855-AE0430D5DD6E}"/>
-              </a:ext>
-            </a:extLst>
-          </p:cNvPr>
-          <p:cNvSpPr/>
-          <p:nvPr/>
-        </p:nvSpPr>
-        <p:spPr>
-          <a:xfrm>
-            <a:off x="2665956" y="3321874"/>
-            <a:ext cx="278360" cy="150684"/>
-          </a:xfrm>
-          <a:prstGeom prst="ellipse">
-            <a:avLst/>
-          </a:prstGeom>
-          <a:solidFill>
-            <a:schemeClr val="bg1">
-              <a:lumMod val="95000"/>
-            </a:schemeClr>
-          </a:solidFill>
-          <a:ln>
-            <a:solidFill>
-              <a:srgbClr val="FF0000"/>
-            </a:solidFill>
-          </a:ln>
-        </p:spPr>
-        <p:style>
-          <a:lnRef idx="2">
-            <a:schemeClr val="accent1">
-              <a:shade val="50000"/>
-            </a:schemeClr>
-          </a:lnRef>
-          <a:fillRef idx="1">
-            <a:schemeClr val="accent1"/>
-          </a:fillRef>
-          <a:effectRef idx="0">
-            <a:schemeClr val="accent1"/>
-          </a:effectRef>
-          <a:fontRef idx="minor">
-            <a:schemeClr val="lt1"/>
-          </a:fontRef>
-        </p:style>
-        <p:txBody>
-          <a:bodyPr wrap="none" lIns="0" tIns="0" rIns="0" bIns="0" rtlCol="0" anchor="ctr"/>
-          <a:lstStyle/>
-          <a:p>
-            <a:pPr algn="ctr"/>
-            <a:r>
-              <a:rPr lang="nb-NO" sz="1100" dirty="0">
-                <a:solidFill>
-                  <a:srgbClr val="FF0000"/>
-                </a:solidFill>
-              </a:rPr>
-              <a:t>CF</a:t>
+              <a:t>TC</a:t>
             </a:r>
             <a:endParaRPr lang="nb-NO" sz="1400" dirty="0">
               <a:solidFill>
@@ -7826,19 +7100,19 @@
                 <a:latin typeface="Arial" panose="020B0604020202020204" pitchFamily="34" charset="0"/>
                 <a:cs typeface="Arial" panose="020B0604020202020204" pitchFamily="34" charset="0"/>
               </a:rPr>
-              <a:t>UART_REQ_1, Baudrate 9k6 ,   TC_9k6</a:t>
-            </a:r>
-          </a:p>
-          <a:p>
-            <a:r>
-              <a:rPr lang="nb-NO" sz="800" dirty="0">
-                <a:solidFill>
-                  <a:schemeClr val="tx1"/>
-                </a:solidFill>
-                <a:latin typeface="Arial" panose="020B0604020202020204" pitchFamily="34" charset="0"/>
-                <a:cs typeface="Arial" panose="020B0604020202020204" pitchFamily="34" charset="0"/>
-              </a:rPr>
-              <a:t>UART_REQ_2, Baudrate 19k2 , TC_19k2</a:t>
+              <a:t>UART_REQ_1, Baudrate 9k6 ,   T_9k6</a:t>
+            </a:r>
+          </a:p>
+          <a:p>
+            <a:r>
+              <a:rPr lang="nb-NO" sz="800" dirty="0">
+                <a:solidFill>
+                  <a:schemeClr val="tx1"/>
+                </a:solidFill>
+                <a:latin typeface="Arial" panose="020B0604020202020204" pitchFamily="34" charset="0"/>
+                <a:cs typeface="Arial" panose="020B0604020202020204" pitchFamily="34" charset="0"/>
+              </a:rPr>
+              <a:t>UART_REQ_2, Baudrate 19k2 , T_19k2</a:t>
             </a:r>
           </a:p>
           <a:p>
@@ -7870,7 +7144,7 @@
                 <a:latin typeface="Arial" panose="020B0604020202020204" pitchFamily="34" charset="0"/>
                 <a:cs typeface="Arial" panose="020B0604020202020204" pitchFamily="34" charset="0"/>
               </a:rPr>
-              <a:t> ,        TC_9k6</a:t>
+              <a:t> ,        T_9k6</a:t>
             </a:r>
           </a:p>
           <a:p>
@@ -7912,7 +7186,7 @@
                 <a:latin typeface="Arial" panose="020B0604020202020204" pitchFamily="34" charset="0"/>
                 <a:cs typeface="Arial" panose="020B0604020202020204" pitchFamily="34" charset="0"/>
               </a:rPr>
-              <a:t>TC_reset</a:t>
+              <a:t>T_reset</a:t>
             </a:r>
             <a:r>
               <a:rPr lang="nb-NO" sz="800" dirty="0">
@@ -8494,19 +7768,19 @@
                 <a:latin typeface="Arial" panose="020B0604020202020204" pitchFamily="34" charset="0"/>
                 <a:cs typeface="Arial" panose="020B0604020202020204" pitchFamily="34" charset="0"/>
               </a:rPr>
-              <a:t>UART_REQ_1, Baudrate 9k6 ,   TC_9k6</a:t>
-            </a:r>
-          </a:p>
-          <a:p>
-            <a:r>
-              <a:rPr lang="nb-NO" sz="800" dirty="0">
-                <a:solidFill>
-                  <a:schemeClr val="tx1"/>
-                </a:solidFill>
-                <a:latin typeface="Arial" panose="020B0604020202020204" pitchFamily="34" charset="0"/>
-                <a:cs typeface="Arial" panose="020B0604020202020204" pitchFamily="34" charset="0"/>
-              </a:rPr>
-              <a:t>UART_REQ_2, Baudrate 19k2 , TC_19k2</a:t>
+              <a:t>UART_REQ_1, Baudrate 9k6 ,   T_9k6</a:t>
+            </a:r>
+          </a:p>
+          <a:p>
+            <a:r>
+              <a:rPr lang="nb-NO" sz="800" dirty="0">
+                <a:solidFill>
+                  <a:schemeClr val="tx1"/>
+                </a:solidFill>
+                <a:latin typeface="Arial" panose="020B0604020202020204" pitchFamily="34" charset="0"/>
+                <a:cs typeface="Arial" panose="020B0604020202020204" pitchFamily="34" charset="0"/>
+              </a:rPr>
+              <a:t>UART_REQ_2, Baudrate 19k2 , T_19k2</a:t>
             </a:r>
           </a:p>
           <a:p>
@@ -8538,7 +7812,7 @@
                 <a:latin typeface="Arial" panose="020B0604020202020204" pitchFamily="34" charset="0"/>
                 <a:cs typeface="Arial" panose="020B0604020202020204" pitchFamily="34" charset="0"/>
               </a:rPr>
-              <a:t> ,        TC_9k6, TC_19k2</a:t>
+              <a:t> ,        T_9k6, T_19k2</a:t>
             </a:r>
           </a:p>
           <a:p>
@@ -8580,17 +7854,17 @@
                 <a:latin typeface="Arial" panose="020B0604020202020204" pitchFamily="34" charset="0"/>
                 <a:cs typeface="Arial" panose="020B0604020202020204" pitchFamily="34" charset="0"/>
               </a:rPr>
-              <a:t>TC_reset</a:t>
-            </a:r>
-            <a:r>
-              <a:rPr lang="nb-NO" sz="800" dirty="0">
-                <a:solidFill>
-                  <a:schemeClr val="tx1"/>
-                </a:solidFill>
-                <a:latin typeface="Arial" panose="020B0604020202020204" pitchFamily="34" charset="0"/>
-                <a:cs typeface="Arial" panose="020B0604020202020204" pitchFamily="34" charset="0"/>
-              </a:rPr>
-              <a:t>, TC_9k6, TC_19k2</a:t>
+              <a:t>T_reset</a:t>
+            </a:r>
+            <a:r>
+              <a:rPr lang="nb-NO" sz="800" dirty="0">
+                <a:solidFill>
+                  <a:schemeClr val="tx1"/>
+                </a:solidFill>
+                <a:latin typeface="Arial" panose="020B0604020202020204" pitchFamily="34" charset="0"/>
+                <a:cs typeface="Arial" panose="020B0604020202020204" pitchFamily="34" charset="0"/>
+              </a:rPr>
+              <a:t>, T_9k6, T_19k2</a:t>
             </a:r>
           </a:p>
         </p:txBody>
@@ -8812,19 +8086,19 @@
                 <a:latin typeface="Arial" panose="020B0604020202020204" pitchFamily="34" charset="0"/>
                 <a:cs typeface="Arial" panose="020B0604020202020204" pitchFamily="34" charset="0"/>
               </a:rPr>
-              <a:t>UART_REQ_1, Baudrate 9k6 ,   TC_9k6</a:t>
-            </a:r>
-          </a:p>
-          <a:p>
-            <a:r>
-              <a:rPr lang="nb-NO" sz="800" dirty="0">
-                <a:solidFill>
-                  <a:schemeClr val="tx1"/>
-                </a:solidFill>
-                <a:latin typeface="Arial" panose="020B0604020202020204" pitchFamily="34" charset="0"/>
-                <a:cs typeface="Arial" panose="020B0604020202020204" pitchFamily="34" charset="0"/>
-              </a:rPr>
-              <a:t>UART_REQ_2, Baudrate 19k2 , TC_19k2</a:t>
+              <a:t>UART_REQ_1, Baudrate 9k6 ,   T_9k6</a:t>
+            </a:r>
+          </a:p>
+          <a:p>
+            <a:r>
+              <a:rPr lang="nb-NO" sz="800" dirty="0">
+                <a:solidFill>
+                  <a:schemeClr val="tx1"/>
+                </a:solidFill>
+                <a:latin typeface="Arial" panose="020B0604020202020204" pitchFamily="34" charset="0"/>
+                <a:cs typeface="Arial" panose="020B0604020202020204" pitchFamily="34" charset="0"/>
+              </a:rPr>
+              <a:t>UART_REQ_2, Baudrate 19k2 , T_19k2</a:t>
             </a:r>
           </a:p>
           <a:p>
@@ -8856,7 +8130,7 @@
                 <a:latin typeface="Arial" panose="020B0604020202020204" pitchFamily="34" charset="0"/>
                 <a:cs typeface="Arial" panose="020B0604020202020204" pitchFamily="34" charset="0"/>
               </a:rPr>
-              <a:t> ,        TC_9k6</a:t>
+              <a:t> ,        T_9k6</a:t>
             </a:r>
           </a:p>
           <a:p>
@@ -8888,7 +8162,7 @@
                 <a:latin typeface="Arial" panose="020B0604020202020204" pitchFamily="34" charset="0"/>
                 <a:cs typeface="Arial" panose="020B0604020202020204" pitchFamily="34" charset="0"/>
               </a:rPr>
-              <a:t> ,        TC_19k2</a:t>
+              <a:t> ,        T_19k2</a:t>
             </a:r>
           </a:p>
           <a:p>
@@ -8930,17 +8204,47 @@
                 <a:latin typeface="Arial" panose="020B0604020202020204" pitchFamily="34" charset="0"/>
                 <a:cs typeface="Arial" panose="020B0604020202020204" pitchFamily="34" charset="0"/>
               </a:rPr>
-              <a:t>TC_reset</a:t>
-            </a:r>
-            <a:r>
-              <a:rPr lang="nb-NO" sz="800" dirty="0">
-                <a:solidFill>
-                  <a:schemeClr val="tx1"/>
-                </a:solidFill>
-                <a:latin typeface="Arial" panose="020B0604020202020204" pitchFamily="34" charset="0"/>
-                <a:cs typeface="Arial" panose="020B0604020202020204" pitchFamily="34" charset="0"/>
-              </a:rPr>
-              <a:t>, TC_9k6, TC_19k2</a:t>
+              <a:t>T_reset</a:t>
+            </a:r>
+            <a:r>
+              <a:rPr lang="nb-NO" sz="800">
+                <a:solidFill>
+                  <a:schemeClr val="tx1"/>
+                </a:solidFill>
+                <a:latin typeface="Arial" panose="020B0604020202020204" pitchFamily="34" charset="0"/>
+                <a:cs typeface="Arial" panose="020B0604020202020204" pitchFamily="34" charset="0"/>
+              </a:rPr>
+              <a:t>, T_</a:t>
+            </a:r>
+            <a:r>
+              <a:rPr lang="nb-NO" sz="800" dirty="0">
+                <a:solidFill>
+                  <a:schemeClr val="tx1"/>
+                </a:solidFill>
+                <a:latin typeface="Arial" panose="020B0604020202020204" pitchFamily="34" charset="0"/>
+                <a:cs typeface="Arial" panose="020B0604020202020204" pitchFamily="34" charset="0"/>
+              </a:rPr>
+              <a:t>9k6</a:t>
+            </a:r>
+            <a:r>
+              <a:rPr lang="nb-NO" sz="800">
+                <a:solidFill>
+                  <a:schemeClr val="tx1"/>
+                </a:solidFill>
+                <a:latin typeface="Arial" panose="020B0604020202020204" pitchFamily="34" charset="0"/>
+                <a:cs typeface="Arial" panose="020B0604020202020204" pitchFamily="34" charset="0"/>
+              </a:rPr>
+              <a:t>, T_</a:t>
+            </a:r>
+            <a:r>
+              <a:rPr lang="nb-NO" sz="800" dirty="0">
+                <a:solidFill>
+                  <a:schemeClr val="tx1"/>
+                </a:solidFill>
+                <a:latin typeface="Arial" panose="020B0604020202020204" pitchFamily="34" charset="0"/>
+                <a:cs typeface="Arial" panose="020B0604020202020204" pitchFamily="34" charset="0"/>
+              </a:rPr>
+              <a:t>19k2</a:t>
             </a:r>
           </a:p>
         </p:txBody>
@@ -9004,6 +8308,364 @@
                 </a:solidFill>
               </a:rPr>
               <a:t>RL</a:t>
+            </a:r>
+            <a:endParaRPr lang="nb-NO" sz="1400" dirty="0">
+              <a:solidFill>
+                <a:srgbClr val="FF0000"/>
+              </a:solidFill>
+            </a:endParaRPr>
+          </a:p>
+        </p:txBody>
+      </p:sp>
+      <p:sp>
+        <p:nvSpPr>
+          <p:cNvPr id="53" name="Rektangel 52">
+            <a:extLst>
+              <a:ext uri="{FF2B5EF4-FFF2-40B4-BE49-F238E27FC236}">
+                <a16:creationId xmlns:a16="http://schemas.microsoft.com/office/drawing/2014/main" id="{2F9CDFC2-B681-46A4-963A-755AA2B7A179}"/>
+              </a:ext>
+            </a:extLst>
+          </p:cNvPr>
+          <p:cNvSpPr/>
+          <p:nvPr/>
+        </p:nvSpPr>
+        <p:spPr>
+          <a:xfrm>
+            <a:off x="3599870" y="1500086"/>
+            <a:ext cx="2062322" cy="549651"/>
+          </a:xfrm>
+          <a:prstGeom prst="rect">
+            <a:avLst/>
+          </a:prstGeom>
+          <a:solidFill>
+            <a:schemeClr val="bg1">
+              <a:lumMod val="85000"/>
+            </a:schemeClr>
+          </a:solidFill>
+          <a:ln>
+            <a:solidFill>
+              <a:schemeClr val="tx1"/>
+            </a:solidFill>
+          </a:ln>
+        </p:spPr>
+        <p:style>
+          <a:lnRef idx="2">
+            <a:schemeClr val="accent1">
+              <a:shade val="50000"/>
+            </a:schemeClr>
+          </a:lnRef>
+          <a:fillRef idx="1">
+            <a:schemeClr val="accent1"/>
+          </a:fillRef>
+          <a:effectRef idx="0">
+            <a:schemeClr val="accent1"/>
+          </a:effectRef>
+          <a:fontRef idx="minor">
+            <a:schemeClr val="lt1"/>
+          </a:fontRef>
+        </p:style>
+        <p:txBody>
+          <a:bodyPr rtlCol="0" anchor="t" anchorCtr="0"/>
+          <a:lstStyle/>
+          <a:p>
+            <a:r>
+              <a:rPr lang="nb-NO" sz="800" b="1" dirty="0" err="1">
+                <a:solidFill>
+                  <a:schemeClr val="tx1"/>
+                </a:solidFill>
+                <a:latin typeface="Arial" panose="020B0604020202020204" pitchFamily="34" charset="0"/>
+                <a:cs typeface="Arial" panose="020B0604020202020204" pitchFamily="34" charset="0"/>
+              </a:rPr>
+              <a:t>Testcase</a:t>
+            </a:r>
+            <a:r>
+              <a:rPr lang="nb-NO" sz="800" b="1" dirty="0">
+                <a:solidFill>
+                  <a:schemeClr val="tx1"/>
+                </a:solidFill>
+                <a:latin typeface="Arial" panose="020B0604020202020204" pitchFamily="34" charset="0"/>
+                <a:cs typeface="Arial" panose="020B0604020202020204" pitchFamily="34" charset="0"/>
+              </a:rPr>
+              <a:t> </a:t>
+            </a:r>
+            <a:r>
+              <a:rPr lang="nb-NO" sz="800" b="1" dirty="0" err="1">
+                <a:solidFill>
+                  <a:schemeClr val="tx1"/>
+                </a:solidFill>
+                <a:latin typeface="Arial" panose="020B0604020202020204" pitchFamily="34" charset="0"/>
+                <a:cs typeface="Arial" panose="020B0604020202020204" pitchFamily="34" charset="0"/>
+              </a:rPr>
+              <a:t>Coverage</a:t>
+            </a:r>
+            <a:r>
+              <a:rPr lang="nb-NO" sz="800" b="1" dirty="0">
+                <a:solidFill>
+                  <a:schemeClr val="tx1"/>
+                </a:solidFill>
+                <a:latin typeface="Arial" panose="020B0604020202020204" pitchFamily="34" charset="0"/>
+                <a:cs typeface="Arial" panose="020B0604020202020204" pitchFamily="34" charset="0"/>
+              </a:rPr>
+              <a:t>, CSV</a:t>
+            </a:r>
+          </a:p>
+          <a:p>
+            <a:r>
+              <a:rPr lang="nb-NO" sz="800" dirty="0">
+                <a:solidFill>
+                  <a:schemeClr val="tx1"/>
+                </a:solidFill>
+                <a:latin typeface="Arial" panose="020B0604020202020204" pitchFamily="34" charset="0"/>
+                <a:cs typeface="Arial" panose="020B0604020202020204" pitchFamily="34" charset="0"/>
+              </a:rPr>
+              <a:t>&lt;</a:t>
+            </a:r>
+            <a:r>
+              <a:rPr lang="nb-NO" sz="800" dirty="0" err="1">
+                <a:solidFill>
+                  <a:schemeClr val="tx1"/>
+                </a:solidFill>
+                <a:latin typeface="Arial" panose="020B0604020202020204" pitchFamily="34" charset="0"/>
+                <a:cs typeface="Arial" panose="020B0604020202020204" pitchFamily="34" charset="0"/>
+              </a:rPr>
+              <a:t>Req</a:t>
+            </a:r>
+            <a:r>
+              <a:rPr lang="nb-NO" sz="800" dirty="0">
+                <a:solidFill>
+                  <a:schemeClr val="tx1"/>
+                </a:solidFill>
+                <a:latin typeface="Arial" panose="020B0604020202020204" pitchFamily="34" charset="0"/>
+                <a:cs typeface="Arial" panose="020B0604020202020204" pitchFamily="34" charset="0"/>
+              </a:rPr>
+              <a:t>. </a:t>
+            </a:r>
+            <a:r>
+              <a:rPr lang="nb-NO" sz="800" dirty="0" err="1">
+                <a:solidFill>
+                  <a:schemeClr val="tx1"/>
+                </a:solidFill>
+                <a:latin typeface="Arial" panose="020B0604020202020204" pitchFamily="34" charset="0"/>
+                <a:cs typeface="Arial" panose="020B0604020202020204" pitchFamily="34" charset="0"/>
+              </a:rPr>
+              <a:t>Label</a:t>
+            </a:r>
+            <a:r>
+              <a:rPr lang="nb-NO" sz="800" dirty="0">
+                <a:solidFill>
+                  <a:schemeClr val="tx1"/>
+                </a:solidFill>
+                <a:latin typeface="Arial" panose="020B0604020202020204" pitchFamily="34" charset="0"/>
+                <a:cs typeface="Arial" panose="020B0604020202020204" pitchFamily="34" charset="0"/>
+              </a:rPr>
+              <a:t>&gt;, &lt;</a:t>
+            </a:r>
+            <a:r>
+              <a:rPr lang="nb-NO" sz="800" dirty="0" err="1">
+                <a:solidFill>
+                  <a:schemeClr val="tx1"/>
+                </a:solidFill>
+                <a:latin typeface="Arial" panose="020B0604020202020204" pitchFamily="34" charset="0"/>
+                <a:cs typeface="Arial" panose="020B0604020202020204" pitchFamily="34" charset="0"/>
+              </a:rPr>
+              <a:t>Testcase</a:t>
+            </a:r>
+            <a:r>
+              <a:rPr lang="nb-NO" sz="800" dirty="0">
+                <a:solidFill>
+                  <a:schemeClr val="tx1"/>
+                </a:solidFill>
+                <a:latin typeface="Arial" panose="020B0604020202020204" pitchFamily="34" charset="0"/>
+                <a:cs typeface="Arial" panose="020B0604020202020204" pitchFamily="34" charset="0"/>
+              </a:rPr>
+              <a:t>&gt;, &lt;</a:t>
+            </a:r>
+            <a:r>
+              <a:rPr lang="nb-NO" sz="800" dirty="0" err="1">
+                <a:solidFill>
+                  <a:schemeClr val="tx1"/>
+                </a:solidFill>
+                <a:latin typeface="Arial" panose="020B0604020202020204" pitchFamily="34" charset="0"/>
+                <a:cs typeface="Arial" panose="020B0604020202020204" pitchFamily="34" charset="0"/>
+              </a:rPr>
+              <a:t>test_status</a:t>
+            </a:r>
+            <a:r>
+              <a:rPr lang="nb-NO" sz="800" dirty="0">
+                <a:solidFill>
+                  <a:schemeClr val="tx1"/>
+                </a:solidFill>
+                <a:latin typeface="Arial" panose="020B0604020202020204" pitchFamily="34" charset="0"/>
+                <a:cs typeface="Arial" panose="020B0604020202020204" pitchFamily="34" charset="0"/>
+              </a:rPr>
+              <a:t>&gt;</a:t>
+            </a:r>
+          </a:p>
+          <a:p>
+            <a:r>
+              <a:rPr lang="nb-NO" sz="800" dirty="0">
+                <a:solidFill>
+                  <a:schemeClr val="tx1"/>
+                </a:solidFill>
+                <a:latin typeface="Arial" panose="020B0604020202020204" pitchFamily="34" charset="0"/>
+                <a:cs typeface="Arial" panose="020B0604020202020204" pitchFamily="34" charset="0"/>
+              </a:rPr>
+              <a:t>&lt;</a:t>
+            </a:r>
+            <a:r>
+              <a:rPr lang="nb-NO" sz="800" dirty="0" err="1">
+                <a:solidFill>
+                  <a:schemeClr val="tx1"/>
+                </a:solidFill>
+                <a:latin typeface="Arial" panose="020B0604020202020204" pitchFamily="34" charset="0"/>
+                <a:cs typeface="Arial" panose="020B0604020202020204" pitchFamily="34" charset="0"/>
+              </a:rPr>
+              <a:t>Req</a:t>
+            </a:r>
+            <a:r>
+              <a:rPr lang="nb-NO" sz="800" dirty="0">
+                <a:solidFill>
+                  <a:schemeClr val="tx1"/>
+                </a:solidFill>
+                <a:latin typeface="Arial" panose="020B0604020202020204" pitchFamily="34" charset="0"/>
+                <a:cs typeface="Arial" panose="020B0604020202020204" pitchFamily="34" charset="0"/>
+              </a:rPr>
+              <a:t>. </a:t>
+            </a:r>
+            <a:r>
+              <a:rPr lang="nb-NO" sz="800" dirty="0" err="1">
+                <a:solidFill>
+                  <a:schemeClr val="tx1"/>
+                </a:solidFill>
+                <a:latin typeface="Arial" panose="020B0604020202020204" pitchFamily="34" charset="0"/>
+                <a:cs typeface="Arial" panose="020B0604020202020204" pitchFamily="34" charset="0"/>
+              </a:rPr>
+              <a:t>Label</a:t>
+            </a:r>
+            <a:r>
+              <a:rPr lang="nb-NO" sz="800" dirty="0">
+                <a:solidFill>
+                  <a:schemeClr val="tx1"/>
+                </a:solidFill>
+                <a:latin typeface="Arial" panose="020B0604020202020204" pitchFamily="34" charset="0"/>
+                <a:cs typeface="Arial" panose="020B0604020202020204" pitchFamily="34" charset="0"/>
+              </a:rPr>
+              <a:t>&gt;, &lt;</a:t>
+            </a:r>
+            <a:r>
+              <a:rPr lang="nb-NO" sz="800" dirty="0" err="1">
+                <a:solidFill>
+                  <a:schemeClr val="tx1"/>
+                </a:solidFill>
+                <a:latin typeface="Arial" panose="020B0604020202020204" pitchFamily="34" charset="0"/>
+                <a:cs typeface="Arial" panose="020B0604020202020204" pitchFamily="34" charset="0"/>
+              </a:rPr>
+              <a:t>Testcase</a:t>
+            </a:r>
+            <a:r>
+              <a:rPr lang="nb-NO" sz="800" dirty="0">
+                <a:solidFill>
+                  <a:schemeClr val="tx1"/>
+                </a:solidFill>
+                <a:latin typeface="Arial" panose="020B0604020202020204" pitchFamily="34" charset="0"/>
+                <a:cs typeface="Arial" panose="020B0604020202020204" pitchFamily="34" charset="0"/>
+              </a:rPr>
+              <a:t>&gt;, &lt;</a:t>
+            </a:r>
+            <a:r>
+              <a:rPr lang="nb-NO" sz="800" dirty="0" err="1">
+                <a:solidFill>
+                  <a:schemeClr val="tx1"/>
+                </a:solidFill>
+                <a:latin typeface="Arial" panose="020B0604020202020204" pitchFamily="34" charset="0"/>
+                <a:cs typeface="Arial" panose="020B0604020202020204" pitchFamily="34" charset="0"/>
+              </a:rPr>
+              <a:t>test_status</a:t>
+            </a:r>
+            <a:r>
+              <a:rPr lang="nb-NO" sz="800" dirty="0">
+                <a:solidFill>
+                  <a:schemeClr val="tx1"/>
+                </a:solidFill>
+                <a:latin typeface="Arial" panose="020B0604020202020204" pitchFamily="34" charset="0"/>
+                <a:cs typeface="Arial" panose="020B0604020202020204" pitchFamily="34" charset="0"/>
+              </a:rPr>
+              <a:t>&gt;</a:t>
+            </a:r>
+          </a:p>
+          <a:p>
+            <a:r>
+              <a:rPr lang="nb-NO" sz="800" dirty="0">
+                <a:solidFill>
+                  <a:schemeClr val="tx1"/>
+                </a:solidFill>
+                <a:latin typeface="Arial" panose="020B0604020202020204" pitchFamily="34" charset="0"/>
+                <a:cs typeface="Arial" panose="020B0604020202020204" pitchFamily="34" charset="0"/>
+              </a:rPr>
+              <a:t>……….</a:t>
+            </a:r>
+          </a:p>
+        </p:txBody>
+      </p:sp>
+      <p:sp>
+        <p:nvSpPr>
+          <p:cNvPr id="56" name="Ellipse 55">
+            <a:extLst>
+              <a:ext uri="{FF2B5EF4-FFF2-40B4-BE49-F238E27FC236}">
+                <a16:creationId xmlns:a16="http://schemas.microsoft.com/office/drawing/2014/main" id="{D5AD5459-3E7B-44C9-BBC2-2ECD53E1D398}"/>
+              </a:ext>
+            </a:extLst>
+          </p:cNvPr>
+          <p:cNvSpPr/>
+          <p:nvPr/>
+        </p:nvSpPr>
+        <p:spPr>
+          <a:xfrm>
+            <a:off x="5248675" y="1502823"/>
+            <a:ext cx="278360" cy="150684"/>
+          </a:xfrm>
+          <a:prstGeom prst="ellipse">
+            <a:avLst/>
+          </a:prstGeom>
+          <a:solidFill>
+            <a:schemeClr val="bg1">
+              <a:lumMod val="95000"/>
+            </a:schemeClr>
+          </a:solidFill>
+          <a:ln>
+            <a:solidFill>
+              <a:srgbClr val="FF0000"/>
+            </a:solidFill>
+          </a:ln>
+        </p:spPr>
+        <p:style>
+          <a:lnRef idx="2">
+            <a:schemeClr val="accent1">
+              <a:shade val="50000"/>
+            </a:schemeClr>
+          </a:lnRef>
+          <a:fillRef idx="1">
+            <a:schemeClr val="accent1"/>
+          </a:fillRef>
+          <a:effectRef idx="0">
+            <a:schemeClr val="accent1"/>
+          </a:effectRef>
+          <a:fontRef idx="minor">
+            <a:schemeClr val="lt1"/>
+          </a:fontRef>
+        </p:style>
+        <p:txBody>
+          <a:bodyPr wrap="none" lIns="0" tIns="0" rIns="0" bIns="0" rtlCol="0" anchor="ctr"/>
+          <a:lstStyle/>
+          <a:p>
+            <a:pPr algn="ctr"/>
+            <a:r>
+              <a:rPr lang="nb-NO" sz="1100" dirty="0">
+                <a:solidFill>
+                  <a:srgbClr val="FF0000"/>
+                </a:solidFill>
+              </a:rPr>
+              <a:t>TC</a:t>
             </a:r>
             <a:endParaRPr lang="nb-NO" sz="1400" dirty="0">
               <a:solidFill>

</xml_diff>

<commit_message>
Multiple updates on spec cov
</commit_message>
<xml_diff>
--- a/bitvis_vip_spec_cov/doc/Figures.pptx
+++ b/bitvis_vip_spec_cov/doc/Figures.pptx
@@ -260,7 +260,7 @@
           <a:p>
             <a:fld id="{BCA49E38-FF81-43B3-86DC-4B20814BC221}" type="datetimeFigureOut">
               <a:rPr lang="nb-NO" smtClean="0"/>
-              <a:t>31.01.2020</a:t>
+              <a:t>03.02.2020</a:t>
             </a:fld>
             <a:endParaRPr lang="nb-NO"/>
           </a:p>
@@ -458,7 +458,7 @@
           <a:p>
             <a:fld id="{BCA49E38-FF81-43B3-86DC-4B20814BC221}" type="datetimeFigureOut">
               <a:rPr lang="nb-NO" smtClean="0"/>
-              <a:t>31.01.2020</a:t>
+              <a:t>03.02.2020</a:t>
             </a:fld>
             <a:endParaRPr lang="nb-NO"/>
           </a:p>
@@ -666,7 +666,7 @@
           <a:p>
             <a:fld id="{BCA49E38-FF81-43B3-86DC-4B20814BC221}" type="datetimeFigureOut">
               <a:rPr lang="nb-NO" smtClean="0"/>
-              <a:t>31.01.2020</a:t>
+              <a:t>03.02.2020</a:t>
             </a:fld>
             <a:endParaRPr lang="nb-NO"/>
           </a:p>
@@ -864,7 +864,7 @@
           <a:p>
             <a:fld id="{BCA49E38-FF81-43B3-86DC-4B20814BC221}" type="datetimeFigureOut">
               <a:rPr lang="nb-NO" smtClean="0"/>
-              <a:t>31.01.2020</a:t>
+              <a:t>03.02.2020</a:t>
             </a:fld>
             <a:endParaRPr lang="nb-NO"/>
           </a:p>
@@ -1139,7 +1139,7 @@
           <a:p>
             <a:fld id="{BCA49E38-FF81-43B3-86DC-4B20814BC221}" type="datetimeFigureOut">
               <a:rPr lang="nb-NO" smtClean="0"/>
-              <a:t>31.01.2020</a:t>
+              <a:t>03.02.2020</a:t>
             </a:fld>
             <a:endParaRPr lang="nb-NO"/>
           </a:p>
@@ -1404,7 +1404,7 @@
           <a:p>
             <a:fld id="{BCA49E38-FF81-43B3-86DC-4B20814BC221}" type="datetimeFigureOut">
               <a:rPr lang="nb-NO" smtClean="0"/>
-              <a:t>31.01.2020</a:t>
+              <a:t>03.02.2020</a:t>
             </a:fld>
             <a:endParaRPr lang="nb-NO"/>
           </a:p>
@@ -1816,7 +1816,7 @@
           <a:p>
             <a:fld id="{BCA49E38-FF81-43B3-86DC-4B20814BC221}" type="datetimeFigureOut">
               <a:rPr lang="nb-NO" smtClean="0"/>
-              <a:t>31.01.2020</a:t>
+              <a:t>03.02.2020</a:t>
             </a:fld>
             <a:endParaRPr lang="nb-NO"/>
           </a:p>
@@ -1957,7 +1957,7 @@
           <a:p>
             <a:fld id="{BCA49E38-FF81-43B3-86DC-4B20814BC221}" type="datetimeFigureOut">
               <a:rPr lang="nb-NO" smtClean="0"/>
-              <a:t>31.01.2020</a:t>
+              <a:t>03.02.2020</a:t>
             </a:fld>
             <a:endParaRPr lang="nb-NO"/>
           </a:p>
@@ -2070,7 +2070,7 @@
           <a:p>
             <a:fld id="{BCA49E38-FF81-43B3-86DC-4B20814BC221}" type="datetimeFigureOut">
               <a:rPr lang="nb-NO" smtClean="0"/>
-              <a:t>31.01.2020</a:t>
+              <a:t>03.02.2020</a:t>
             </a:fld>
             <a:endParaRPr lang="nb-NO"/>
           </a:p>
@@ -2381,7 +2381,7 @@
           <a:p>
             <a:fld id="{BCA49E38-FF81-43B3-86DC-4B20814BC221}" type="datetimeFigureOut">
               <a:rPr lang="nb-NO" smtClean="0"/>
-              <a:t>31.01.2020</a:t>
+              <a:t>03.02.2020</a:t>
             </a:fld>
             <a:endParaRPr lang="nb-NO"/>
           </a:p>
@@ -2669,7 +2669,7 @@
           <a:p>
             <a:fld id="{BCA49E38-FF81-43B3-86DC-4B20814BC221}" type="datetimeFigureOut">
               <a:rPr lang="nb-NO" smtClean="0"/>
-              <a:t>31.01.2020</a:t>
+              <a:t>03.02.2020</a:t>
             </a:fld>
             <a:endParaRPr lang="nb-NO"/>
           </a:p>
@@ -2910,7 +2910,7 @@
           <a:p>
             <a:fld id="{BCA49E38-FF81-43B3-86DC-4B20814BC221}" type="datetimeFigureOut">
               <a:rPr lang="nb-NO" smtClean="0"/>
-              <a:t>31.01.2020</a:t>
+              <a:t>03.02.2020</a:t>
             </a:fld>
             <a:endParaRPr lang="nb-NO"/>
           </a:p>
@@ -5160,7 +5160,27 @@
                 <a:latin typeface="Arial" panose="020B0604020202020204" pitchFamily="34" charset="0"/>
                 <a:cs typeface="Arial" panose="020B0604020202020204" pitchFamily="34" charset="0"/>
               </a:rPr>
-              <a:t>(</a:t>
+              <a:t>(&lt;</a:t>
+            </a:r>
+            <a:r>
+              <a:rPr lang="nb-NO" sz="800" dirty="0" err="1">
+                <a:solidFill>
+                  <a:schemeClr val="tx1"/>
+                </a:solidFill>
+                <a:latin typeface="Arial" panose="020B0604020202020204" pitchFamily="34" charset="0"/>
+                <a:cs typeface="Arial" panose="020B0604020202020204" pitchFamily="34" charset="0"/>
+              </a:rPr>
+              <a:t>testcase-name</a:t>
+            </a:r>
+            <a:r>
+              <a:rPr lang="nb-NO" sz="800" dirty="0">
+                <a:solidFill>
+                  <a:schemeClr val="tx1"/>
+                </a:solidFill>
+                <a:latin typeface="Arial" panose="020B0604020202020204" pitchFamily="34" charset="0"/>
+                <a:cs typeface="Arial" panose="020B0604020202020204" pitchFamily="34" charset="0"/>
+              </a:rPr>
+              <a:t>&gt;,</a:t>
             </a:r>
             <a:br>
               <a:rPr lang="nb-NO" sz="800" dirty="0">
@@ -6001,7 +6021,7 @@
         </p:nvSpPr>
         <p:spPr>
           <a:xfrm>
-            <a:off x="9789977" y="938779"/>
+            <a:off x="9862905" y="947724"/>
             <a:ext cx="278360" cy="150684"/>
           </a:xfrm>
           <a:prstGeom prst="ellipse">
@@ -6069,7 +6089,7 @@
         </p:nvSpPr>
         <p:spPr>
           <a:xfrm>
-            <a:off x="9795309" y="1492864"/>
+            <a:off x="9862905" y="1493862"/>
             <a:ext cx="278360" cy="150684"/>
           </a:xfrm>
           <a:prstGeom prst="ellipse">
@@ -6137,7 +6157,7 @@
         </p:nvSpPr>
         <p:spPr>
           <a:xfrm>
-            <a:off x="9789977" y="2426100"/>
+            <a:off x="9861454" y="2416255"/>
             <a:ext cx="278360" cy="150684"/>
           </a:xfrm>
           <a:prstGeom prst="ellipse">
@@ -8207,44 +8227,14 @@
               <a:t>T_reset</a:t>
             </a:r>
             <a:r>
-              <a:rPr lang="nb-NO" sz="800">
-                <a:solidFill>
-                  <a:schemeClr val="tx1"/>
-                </a:solidFill>
-                <a:latin typeface="Arial" panose="020B0604020202020204" pitchFamily="34" charset="0"/>
-                <a:cs typeface="Arial" panose="020B0604020202020204" pitchFamily="34" charset="0"/>
-              </a:rPr>
-              <a:t>, T_</a:t>
-            </a:r>
-            <a:r>
-              <a:rPr lang="nb-NO" sz="800" dirty="0">
-                <a:solidFill>
-                  <a:schemeClr val="tx1"/>
-                </a:solidFill>
-                <a:latin typeface="Arial" panose="020B0604020202020204" pitchFamily="34" charset="0"/>
-                <a:cs typeface="Arial" panose="020B0604020202020204" pitchFamily="34" charset="0"/>
-              </a:rPr>
-              <a:t>9k6</a:t>
-            </a:r>
-            <a:r>
-              <a:rPr lang="nb-NO" sz="800">
-                <a:solidFill>
-                  <a:schemeClr val="tx1"/>
-                </a:solidFill>
-                <a:latin typeface="Arial" panose="020B0604020202020204" pitchFamily="34" charset="0"/>
-                <a:cs typeface="Arial" panose="020B0604020202020204" pitchFamily="34" charset="0"/>
-              </a:rPr>
-              <a:t>, T_</a:t>
-            </a:r>
-            <a:r>
-              <a:rPr lang="nb-NO" sz="800" dirty="0">
-                <a:solidFill>
-                  <a:schemeClr val="tx1"/>
-                </a:solidFill>
-                <a:latin typeface="Arial" panose="020B0604020202020204" pitchFamily="34" charset="0"/>
-                <a:cs typeface="Arial" panose="020B0604020202020204" pitchFamily="34" charset="0"/>
-              </a:rPr>
-              <a:t>19k2</a:t>
+              <a:rPr lang="nb-NO" sz="800" dirty="0">
+                <a:solidFill>
+                  <a:schemeClr val="tx1"/>
+                </a:solidFill>
+                <a:latin typeface="Arial" panose="020B0604020202020204" pitchFamily="34" charset="0"/>
+                <a:cs typeface="Arial" panose="020B0604020202020204" pitchFamily="34" charset="0"/>
+              </a:rPr>
+              <a:t>, T_9k6, T_19k2</a:t>
             </a:r>
           </a:p>
         </p:txBody>
@@ -8786,19 +8776,19 @@
                 <a:latin typeface="Arial" panose="020B0604020202020204" pitchFamily="34" charset="0"/>
                 <a:cs typeface="Arial" panose="020B0604020202020204" pitchFamily="34" charset="0"/>
               </a:rPr>
-              <a:t>UART_REQ_1, Baudrate 9k6 ,   TC_9k6</a:t>
-            </a:r>
-          </a:p>
-          <a:p>
-            <a:r>
-              <a:rPr lang="nb-NO" sz="800" dirty="0">
-                <a:solidFill>
-                  <a:schemeClr val="tx1"/>
-                </a:solidFill>
-                <a:latin typeface="Arial" panose="020B0604020202020204" pitchFamily="34" charset="0"/>
-                <a:cs typeface="Arial" panose="020B0604020202020204" pitchFamily="34" charset="0"/>
-              </a:rPr>
-              <a:t>UART_REQ_2, Baudrate 19k2 , TC_19k2</a:t>
+              <a:t>UART_REQ_1, Baudrate 9k6 ,   T_9k6</a:t>
+            </a:r>
+          </a:p>
+          <a:p>
+            <a:r>
+              <a:rPr lang="nb-NO" sz="800" dirty="0">
+                <a:solidFill>
+                  <a:schemeClr val="tx1"/>
+                </a:solidFill>
+                <a:latin typeface="Arial" panose="020B0604020202020204" pitchFamily="34" charset="0"/>
+                <a:cs typeface="Arial" panose="020B0604020202020204" pitchFamily="34" charset="0"/>
+              </a:rPr>
+              <a:t>UART_REQ_2, Baudrate 19k2 , T_19k2</a:t>
             </a:r>
           </a:p>
           <a:p>
@@ -8830,7 +8820,7 @@
                 <a:latin typeface="Arial" panose="020B0604020202020204" pitchFamily="34" charset="0"/>
                 <a:cs typeface="Arial" panose="020B0604020202020204" pitchFamily="34" charset="0"/>
               </a:rPr>
-              <a:t> ,        TC_9k6</a:t>
+              <a:t> ,        T_9k6</a:t>
             </a:r>
           </a:p>
           <a:p>
@@ -8872,7 +8862,7 @@
                 <a:latin typeface="Arial" panose="020B0604020202020204" pitchFamily="34" charset="0"/>
                 <a:cs typeface="Arial" panose="020B0604020202020204" pitchFamily="34" charset="0"/>
               </a:rPr>
-              <a:t>TC_reset</a:t>
+              <a:t>T_reset</a:t>
             </a:r>
             <a:r>
               <a:rPr lang="nb-NO" sz="800" dirty="0">

</xml_diff>

<commit_message>
Spec cov QR updated after feedback
</commit_message>
<xml_diff>
--- a/bitvis_vip_spec_cov/doc/Figures.pptx
+++ b/bitvis_vip_spec_cov/doc/Figures.pptx
@@ -260,7 +260,7 @@
           <a:p>
             <a:fld id="{BCA49E38-FF81-43B3-86DC-4B20814BC221}" type="datetimeFigureOut">
               <a:rPr lang="nb-NO" smtClean="0"/>
-              <a:t>03.02.2020</a:t>
+              <a:t>04.02.2020</a:t>
             </a:fld>
             <a:endParaRPr lang="nb-NO"/>
           </a:p>
@@ -458,7 +458,7 @@
           <a:p>
             <a:fld id="{BCA49E38-FF81-43B3-86DC-4B20814BC221}" type="datetimeFigureOut">
               <a:rPr lang="nb-NO" smtClean="0"/>
-              <a:t>03.02.2020</a:t>
+              <a:t>04.02.2020</a:t>
             </a:fld>
             <a:endParaRPr lang="nb-NO"/>
           </a:p>
@@ -666,7 +666,7 @@
           <a:p>
             <a:fld id="{BCA49E38-FF81-43B3-86DC-4B20814BC221}" type="datetimeFigureOut">
               <a:rPr lang="nb-NO" smtClean="0"/>
-              <a:t>03.02.2020</a:t>
+              <a:t>04.02.2020</a:t>
             </a:fld>
             <a:endParaRPr lang="nb-NO"/>
           </a:p>
@@ -864,7 +864,7 @@
           <a:p>
             <a:fld id="{BCA49E38-FF81-43B3-86DC-4B20814BC221}" type="datetimeFigureOut">
               <a:rPr lang="nb-NO" smtClean="0"/>
-              <a:t>03.02.2020</a:t>
+              <a:t>04.02.2020</a:t>
             </a:fld>
             <a:endParaRPr lang="nb-NO"/>
           </a:p>
@@ -1139,7 +1139,7 @@
           <a:p>
             <a:fld id="{BCA49E38-FF81-43B3-86DC-4B20814BC221}" type="datetimeFigureOut">
               <a:rPr lang="nb-NO" smtClean="0"/>
-              <a:t>03.02.2020</a:t>
+              <a:t>04.02.2020</a:t>
             </a:fld>
             <a:endParaRPr lang="nb-NO"/>
           </a:p>
@@ -1404,7 +1404,7 @@
           <a:p>
             <a:fld id="{BCA49E38-FF81-43B3-86DC-4B20814BC221}" type="datetimeFigureOut">
               <a:rPr lang="nb-NO" smtClean="0"/>
-              <a:t>03.02.2020</a:t>
+              <a:t>04.02.2020</a:t>
             </a:fld>
             <a:endParaRPr lang="nb-NO"/>
           </a:p>
@@ -1816,7 +1816,7 @@
           <a:p>
             <a:fld id="{BCA49E38-FF81-43B3-86DC-4B20814BC221}" type="datetimeFigureOut">
               <a:rPr lang="nb-NO" smtClean="0"/>
-              <a:t>03.02.2020</a:t>
+              <a:t>04.02.2020</a:t>
             </a:fld>
             <a:endParaRPr lang="nb-NO"/>
           </a:p>
@@ -1957,7 +1957,7 @@
           <a:p>
             <a:fld id="{BCA49E38-FF81-43B3-86DC-4B20814BC221}" type="datetimeFigureOut">
               <a:rPr lang="nb-NO" smtClean="0"/>
-              <a:t>03.02.2020</a:t>
+              <a:t>04.02.2020</a:t>
             </a:fld>
             <a:endParaRPr lang="nb-NO"/>
           </a:p>
@@ -2070,7 +2070,7 @@
           <a:p>
             <a:fld id="{BCA49E38-FF81-43B3-86DC-4B20814BC221}" type="datetimeFigureOut">
               <a:rPr lang="nb-NO" smtClean="0"/>
-              <a:t>03.02.2020</a:t>
+              <a:t>04.02.2020</a:t>
             </a:fld>
             <a:endParaRPr lang="nb-NO"/>
           </a:p>
@@ -2381,7 +2381,7 @@
           <a:p>
             <a:fld id="{BCA49E38-FF81-43B3-86DC-4B20814BC221}" type="datetimeFigureOut">
               <a:rPr lang="nb-NO" smtClean="0"/>
-              <a:t>03.02.2020</a:t>
+              <a:t>04.02.2020</a:t>
             </a:fld>
             <a:endParaRPr lang="nb-NO"/>
           </a:p>
@@ -2669,7 +2669,7 @@
           <a:p>
             <a:fld id="{BCA49E38-FF81-43B3-86DC-4B20814BC221}" type="datetimeFigureOut">
               <a:rPr lang="nb-NO" smtClean="0"/>
-              <a:t>03.02.2020</a:t>
+              <a:t>04.02.2020</a:t>
             </a:fld>
             <a:endParaRPr lang="nb-NO"/>
           </a:p>
@@ -2910,7 +2910,7 @@
           <a:p>
             <a:fld id="{BCA49E38-FF81-43B3-86DC-4B20814BC221}" type="datetimeFigureOut">
               <a:rPr lang="nb-NO" smtClean="0"/>
-              <a:t>03.02.2020</a:t>
+              <a:t>04.02.2020</a:t>
             </a:fld>
             <a:endParaRPr lang="nb-NO"/>
           </a:p>
@@ -5341,7 +5341,7 @@
                 <a:latin typeface="Arial" panose="020B0604020202020204" pitchFamily="34" charset="0"/>
                 <a:cs typeface="Arial" panose="020B0604020202020204" pitchFamily="34" charset="0"/>
               </a:rPr>
-              <a:t>(UART_REQ_1); </a:t>
+              <a:t>("UART_REQ_1"); </a:t>
             </a:r>
             <a:r>
               <a:rPr lang="nb-NO" sz="800" dirty="0" err="1">
@@ -5361,7 +5361,7 @@
                 <a:latin typeface="Arial" panose="020B0604020202020204" pitchFamily="34" charset="0"/>
                 <a:cs typeface="Arial" panose="020B0604020202020204" pitchFamily="34" charset="0"/>
               </a:rPr>
-              <a:t>(UART_REQ_2);</a:t>
+              <a:t>("UART_REQ_2");</a:t>
             </a:r>
           </a:p>
           <a:p>
@@ -5451,7 +5451,7 @@
                 <a:latin typeface="Arial" panose="020B0604020202020204" pitchFamily="34" charset="0"/>
                 <a:cs typeface="Arial" panose="020B0604020202020204" pitchFamily="34" charset="0"/>
               </a:rPr>
-              <a:t>(UART_REQ_3); </a:t>
+              <a:t>("UART_REQ_3"); </a:t>
             </a:r>
           </a:p>
           <a:p>

</xml_diff>

<commit_message>
Update after feedback from Daniel
</commit_message>
<xml_diff>
--- a/bitvis_vip_spec_cov/doc/Figures.pptx
+++ b/bitvis_vip_spec_cov/doc/Figures.pptx
@@ -260,7 +260,7 @@
           <a:p>
             <a:fld id="{BCA49E38-FF81-43B3-86DC-4B20814BC221}" type="datetimeFigureOut">
               <a:rPr lang="nb-NO" smtClean="0"/>
-              <a:t>04.02.2020</a:t>
+              <a:t>05.02.2020</a:t>
             </a:fld>
             <a:endParaRPr lang="nb-NO"/>
           </a:p>
@@ -458,7 +458,7 @@
           <a:p>
             <a:fld id="{BCA49E38-FF81-43B3-86DC-4B20814BC221}" type="datetimeFigureOut">
               <a:rPr lang="nb-NO" smtClean="0"/>
-              <a:t>04.02.2020</a:t>
+              <a:t>05.02.2020</a:t>
             </a:fld>
             <a:endParaRPr lang="nb-NO"/>
           </a:p>
@@ -666,7 +666,7 @@
           <a:p>
             <a:fld id="{BCA49E38-FF81-43B3-86DC-4B20814BC221}" type="datetimeFigureOut">
               <a:rPr lang="nb-NO" smtClean="0"/>
-              <a:t>04.02.2020</a:t>
+              <a:t>05.02.2020</a:t>
             </a:fld>
             <a:endParaRPr lang="nb-NO"/>
           </a:p>
@@ -864,7 +864,7 @@
           <a:p>
             <a:fld id="{BCA49E38-FF81-43B3-86DC-4B20814BC221}" type="datetimeFigureOut">
               <a:rPr lang="nb-NO" smtClean="0"/>
-              <a:t>04.02.2020</a:t>
+              <a:t>05.02.2020</a:t>
             </a:fld>
             <a:endParaRPr lang="nb-NO"/>
           </a:p>
@@ -1139,7 +1139,7 @@
           <a:p>
             <a:fld id="{BCA49E38-FF81-43B3-86DC-4B20814BC221}" type="datetimeFigureOut">
               <a:rPr lang="nb-NO" smtClean="0"/>
-              <a:t>04.02.2020</a:t>
+              <a:t>05.02.2020</a:t>
             </a:fld>
             <a:endParaRPr lang="nb-NO"/>
           </a:p>
@@ -1404,7 +1404,7 @@
           <a:p>
             <a:fld id="{BCA49E38-FF81-43B3-86DC-4B20814BC221}" type="datetimeFigureOut">
               <a:rPr lang="nb-NO" smtClean="0"/>
-              <a:t>04.02.2020</a:t>
+              <a:t>05.02.2020</a:t>
             </a:fld>
             <a:endParaRPr lang="nb-NO"/>
           </a:p>
@@ -1816,7 +1816,7 @@
           <a:p>
             <a:fld id="{BCA49E38-FF81-43B3-86DC-4B20814BC221}" type="datetimeFigureOut">
               <a:rPr lang="nb-NO" smtClean="0"/>
-              <a:t>04.02.2020</a:t>
+              <a:t>05.02.2020</a:t>
             </a:fld>
             <a:endParaRPr lang="nb-NO"/>
           </a:p>
@@ -1957,7 +1957,7 @@
           <a:p>
             <a:fld id="{BCA49E38-FF81-43B3-86DC-4B20814BC221}" type="datetimeFigureOut">
               <a:rPr lang="nb-NO" smtClean="0"/>
-              <a:t>04.02.2020</a:t>
+              <a:t>05.02.2020</a:t>
             </a:fld>
             <a:endParaRPr lang="nb-NO"/>
           </a:p>
@@ -2070,7 +2070,7 @@
           <a:p>
             <a:fld id="{BCA49E38-FF81-43B3-86DC-4B20814BC221}" type="datetimeFigureOut">
               <a:rPr lang="nb-NO" smtClean="0"/>
-              <a:t>04.02.2020</a:t>
+              <a:t>05.02.2020</a:t>
             </a:fld>
             <a:endParaRPr lang="nb-NO"/>
           </a:p>
@@ -2381,7 +2381,7 @@
           <a:p>
             <a:fld id="{BCA49E38-FF81-43B3-86DC-4B20814BC221}" type="datetimeFigureOut">
               <a:rPr lang="nb-NO" smtClean="0"/>
-              <a:t>04.02.2020</a:t>
+              <a:t>05.02.2020</a:t>
             </a:fld>
             <a:endParaRPr lang="nb-NO"/>
           </a:p>
@@ -2669,7 +2669,7 @@
           <a:p>
             <a:fld id="{BCA49E38-FF81-43B3-86DC-4B20814BC221}" type="datetimeFigureOut">
               <a:rPr lang="nb-NO" smtClean="0"/>
-              <a:t>04.02.2020</a:t>
+              <a:t>05.02.2020</a:t>
             </a:fld>
             <a:endParaRPr lang="nb-NO"/>
           </a:p>
@@ -2910,7 +2910,7 @@
           <a:p>
             <a:fld id="{BCA49E38-FF81-43B3-86DC-4B20814BC221}" type="datetimeFigureOut">
               <a:rPr lang="nb-NO" smtClean="0"/>
-              <a:t>04.02.2020</a:t>
+              <a:t>05.02.2020</a:t>
             </a:fld>
             <a:endParaRPr lang="nb-NO"/>
           </a:p>
@@ -5992,12 +5992,12 @@
           <a:p>
             <a:pPr algn="ctr"/>
             <a:r>
-              <a:rPr lang="nb-NO" sz="1100" dirty="0">
+              <a:rPr lang="nb-NO" sz="1100">
                 <a:solidFill>
                   <a:srgbClr val="FF0000"/>
                 </a:solidFill>
               </a:rPr>
-              <a:t>CS</a:t>
+              <a:t>SC</a:t>
             </a:r>
             <a:endParaRPr lang="nb-NO" sz="1400" dirty="0">
               <a:solidFill>

</xml_diff>

<commit_message>
Changed first testcase coverage example to only have coverage from one testcase Pluss some minor changes
</commit_message>
<xml_diff>
--- a/bitvis_vip_spec_cov/doc/Figures.pptx
+++ b/bitvis_vip_spec_cov/doc/Figures.pptx
@@ -5024,16 +5024,14 @@
         </p:nvSpPr>
         <p:spPr>
           <a:xfrm>
-            <a:off x="8131953" y="581337"/>
-            <a:ext cx="2091203" cy="2070604"/>
+            <a:off x="8131953" y="448171"/>
+            <a:ext cx="2091203" cy="2243258"/>
           </a:xfrm>
           <a:prstGeom prst="rect">
             <a:avLst/>
           </a:prstGeom>
           <a:solidFill>
-            <a:schemeClr val="bg1">
-              <a:lumMod val="85000"/>
-            </a:schemeClr>
+            <a:schemeClr val="bg1"/>
           </a:solidFill>
           <a:ln>
             <a:solidFill>
@@ -5131,6 +5129,95 @@
               </a:rPr>
               <a:t>:</a:t>
             </a:r>
+          </a:p>
+          <a:p>
+            <a:r>
+              <a:rPr lang="nb-NO" sz="800" dirty="0">
+                <a:solidFill>
+                  <a:schemeClr val="tx1"/>
+                </a:solidFill>
+                <a:latin typeface="Arial" panose="020B0604020202020204" pitchFamily="34" charset="0"/>
+                <a:cs typeface="Arial" panose="020B0604020202020204" pitchFamily="34" charset="0"/>
+              </a:rPr>
+              <a:t>-- </a:t>
+            </a:r>
+            <a:r>
+              <a:rPr lang="nb-NO" sz="800" dirty="0" err="1">
+                <a:solidFill>
+                  <a:schemeClr val="tx1"/>
+                </a:solidFill>
+                <a:latin typeface="Arial" panose="020B0604020202020204" pitchFamily="34" charset="0"/>
+                <a:cs typeface="Arial" panose="020B0604020202020204" pitchFamily="34" charset="0"/>
+              </a:rPr>
+              <a:t>Assume</a:t>
+            </a:r>
+            <a:r>
+              <a:rPr lang="nb-NO" sz="800" dirty="0">
+                <a:solidFill>
+                  <a:schemeClr val="tx1"/>
+                </a:solidFill>
+                <a:latin typeface="Arial" panose="020B0604020202020204" pitchFamily="34" charset="0"/>
+                <a:cs typeface="Arial" panose="020B0604020202020204" pitchFamily="34" charset="0"/>
+              </a:rPr>
+              <a:t> </a:t>
+            </a:r>
+            <a:r>
+              <a:rPr lang="nb-NO" sz="800" dirty="0" err="1">
+                <a:solidFill>
+                  <a:schemeClr val="tx1"/>
+                </a:solidFill>
+                <a:latin typeface="Arial" panose="020B0604020202020204" pitchFamily="34" charset="0"/>
+                <a:cs typeface="Arial" panose="020B0604020202020204" pitchFamily="34" charset="0"/>
+              </a:rPr>
+              <a:t>one</a:t>
+            </a:r>
+            <a:r>
+              <a:rPr lang="nb-NO" sz="800" dirty="0">
+                <a:solidFill>
+                  <a:schemeClr val="tx1"/>
+                </a:solidFill>
+                <a:latin typeface="Arial" panose="020B0604020202020204" pitchFamily="34" charset="0"/>
+                <a:cs typeface="Arial" panose="020B0604020202020204" pitchFamily="34" charset="0"/>
+              </a:rPr>
+              <a:t> simple </a:t>
+            </a:r>
+            <a:r>
+              <a:rPr lang="nb-NO" sz="800" dirty="0" err="1">
+                <a:solidFill>
+                  <a:schemeClr val="tx1"/>
+                </a:solidFill>
+                <a:latin typeface="Arial" panose="020B0604020202020204" pitchFamily="34" charset="0"/>
+                <a:cs typeface="Arial" panose="020B0604020202020204" pitchFamily="34" charset="0"/>
+              </a:rPr>
+              <a:t>testcase</a:t>
+            </a:r>
+            <a:r>
+              <a:rPr lang="nb-NO" sz="800" dirty="0">
+                <a:solidFill>
+                  <a:schemeClr val="tx1"/>
+                </a:solidFill>
+                <a:latin typeface="Arial" panose="020B0604020202020204" pitchFamily="34" charset="0"/>
+                <a:cs typeface="Arial" panose="020B0604020202020204" pitchFamily="34" charset="0"/>
+              </a:rPr>
+              <a:t>: </a:t>
+            </a:r>
+            <a:r>
+              <a:rPr lang="nb-NO" sz="800" dirty="0" err="1">
+                <a:solidFill>
+                  <a:schemeClr val="tx1"/>
+                </a:solidFill>
+                <a:latin typeface="Arial" panose="020B0604020202020204" pitchFamily="34" charset="0"/>
+                <a:cs typeface="Arial" panose="020B0604020202020204" pitchFamily="34" charset="0"/>
+              </a:rPr>
+              <a:t>t_basic</a:t>
+            </a:r>
+            <a:endParaRPr lang="nb-NO" sz="800" dirty="0">
+              <a:solidFill>
+                <a:schemeClr val="tx1"/>
+              </a:solidFill>
+              <a:latin typeface="Arial" panose="020B0604020202020204" pitchFamily="34" charset="0"/>
+              <a:cs typeface="Arial" panose="020B0604020202020204" pitchFamily="34" charset="0"/>
+            </a:endParaRPr>
           </a:p>
           <a:p>
             <a:endParaRPr lang="nb-NO" sz="800" dirty="0">
@@ -5817,7 +5904,7 @@
         </p:nvSpPr>
         <p:spPr>
           <a:xfrm>
-            <a:off x="9931204" y="592471"/>
+            <a:off x="9935674" y="459305"/>
             <a:ext cx="278360" cy="150684"/>
           </a:xfrm>
           <a:prstGeom prst="ellipse">
@@ -6640,31 +6727,91 @@
                 <a:latin typeface="Arial" panose="020B0604020202020204" pitchFamily="34" charset="0"/>
                 <a:cs typeface="Arial" panose="020B0604020202020204" pitchFamily="34" charset="0"/>
               </a:rPr>
-              <a:t>UART_REQ_1, T_9k6,   PASS</a:t>
-            </a:r>
-          </a:p>
-          <a:p>
-            <a:r>
-              <a:rPr lang="nb-NO" sz="800" dirty="0">
-                <a:solidFill>
-                  <a:schemeClr val="tx1"/>
-                </a:solidFill>
-                <a:latin typeface="Arial" panose="020B0604020202020204" pitchFamily="34" charset="0"/>
-                <a:cs typeface="Arial" panose="020B0604020202020204" pitchFamily="34" charset="0"/>
-              </a:rPr>
-              <a:t>UART_REQ_2, T_19k2, FAIL</a:t>
-            </a:r>
-          </a:p>
-          <a:p>
-            <a:r>
-              <a:rPr lang="nb-NO" sz="800" dirty="0">
-                <a:solidFill>
-                  <a:schemeClr val="tx1"/>
-                </a:solidFill>
-                <a:latin typeface="Arial" panose="020B0604020202020204" pitchFamily="34" charset="0"/>
-                <a:cs typeface="Arial" panose="020B0604020202020204" pitchFamily="34" charset="0"/>
-              </a:rPr>
-              <a:t>UART_REQ_3, T_9k6,   PASS</a:t>
+              <a:t>UART_REQ_1, </a:t>
+            </a:r>
+            <a:r>
+              <a:rPr lang="nb-NO" sz="800" dirty="0" err="1">
+                <a:solidFill>
+                  <a:schemeClr val="tx1"/>
+                </a:solidFill>
+                <a:latin typeface="Arial" panose="020B0604020202020204" pitchFamily="34" charset="0"/>
+                <a:cs typeface="Arial" panose="020B0604020202020204" pitchFamily="34" charset="0"/>
+              </a:rPr>
+              <a:t>t_basic</a:t>
+            </a:r>
+            <a:r>
+              <a:rPr lang="nb-NO" sz="800" dirty="0">
+                <a:solidFill>
+                  <a:schemeClr val="tx1"/>
+                </a:solidFill>
+                <a:latin typeface="Arial" panose="020B0604020202020204" pitchFamily="34" charset="0"/>
+                <a:cs typeface="Arial" panose="020B0604020202020204" pitchFamily="34" charset="0"/>
+              </a:rPr>
+              <a:t>, PASS</a:t>
+            </a:r>
+          </a:p>
+          <a:p>
+            <a:r>
+              <a:rPr lang="nb-NO" sz="800" dirty="0">
+                <a:solidFill>
+                  <a:schemeClr val="tx1"/>
+                </a:solidFill>
+                <a:latin typeface="Arial" panose="020B0604020202020204" pitchFamily="34" charset="0"/>
+                <a:cs typeface="Arial" panose="020B0604020202020204" pitchFamily="34" charset="0"/>
+              </a:rPr>
+              <a:t>UART_REQ_2, </a:t>
+            </a:r>
+            <a:r>
+              <a:rPr lang="nb-NO" sz="800" dirty="0" err="1">
+                <a:solidFill>
+                  <a:schemeClr val="tx1"/>
+                </a:solidFill>
+                <a:latin typeface="Arial" panose="020B0604020202020204" pitchFamily="34" charset="0"/>
+                <a:cs typeface="Arial" panose="020B0604020202020204" pitchFamily="34" charset="0"/>
+              </a:rPr>
+              <a:t>t_basic</a:t>
+            </a:r>
+            <a:r>
+              <a:rPr lang="nb-NO" sz="800" dirty="0">
+                <a:solidFill>
+                  <a:schemeClr val="tx1"/>
+                </a:solidFill>
+                <a:latin typeface="Arial" panose="020B0604020202020204" pitchFamily="34" charset="0"/>
+                <a:cs typeface="Arial" panose="020B0604020202020204" pitchFamily="34" charset="0"/>
+              </a:rPr>
+              <a:t>, FAIL</a:t>
+            </a:r>
+          </a:p>
+          <a:p>
+            <a:r>
+              <a:rPr lang="nb-NO" sz="800" dirty="0">
+                <a:solidFill>
+                  <a:schemeClr val="tx1"/>
+                </a:solidFill>
+                <a:latin typeface="Arial" panose="020B0604020202020204" pitchFamily="34" charset="0"/>
+                <a:cs typeface="Arial" panose="020B0604020202020204" pitchFamily="34" charset="0"/>
+              </a:rPr>
+              <a:t>UART_REQ_3, </a:t>
+            </a:r>
+            <a:r>
+              <a:rPr lang="nb-NO" sz="800" dirty="0" err="1">
+                <a:solidFill>
+                  <a:schemeClr val="tx1"/>
+                </a:solidFill>
+                <a:latin typeface="Arial" panose="020B0604020202020204" pitchFamily="34" charset="0"/>
+                <a:cs typeface="Arial" panose="020B0604020202020204" pitchFamily="34" charset="0"/>
+              </a:rPr>
+              <a:t>t_basic</a:t>
+            </a:r>
+            <a:r>
+              <a:rPr lang="nb-NO" sz="800" dirty="0">
+                <a:solidFill>
+                  <a:schemeClr val="tx1"/>
+                </a:solidFill>
+                <a:latin typeface="Arial" panose="020B0604020202020204" pitchFamily="34" charset="0"/>
+                <a:cs typeface="Arial" panose="020B0604020202020204" pitchFamily="34" charset="0"/>
+              </a:rPr>
+              <a:t>, PASS</a:t>
             </a:r>
           </a:p>
           <a:p>
@@ -6686,7 +6833,7 @@
                 <a:latin typeface="Arial" panose="020B0604020202020204" pitchFamily="34" charset="0"/>
                 <a:cs typeface="Arial" panose="020B0604020202020204" pitchFamily="34" charset="0"/>
               </a:rPr>
-              <a:t>T_reset</a:t>
+              <a:t>t_basic</a:t>
             </a:r>
             <a:r>
               <a:rPr lang="nb-NO" sz="800" dirty="0">
@@ -6823,7 +6970,7 @@
             <a:r>
               <a:rPr lang="nb-NO" sz="800" b="1" dirty="0" err="1">
                 <a:solidFill>
-                  <a:schemeClr val="tx1"/>
+                  <a:srgbClr val="FF0000"/>
                 </a:solidFill>
                 <a:latin typeface="Arial" panose="020B0604020202020204" pitchFamily="34" charset="0"/>
                 <a:cs typeface="Arial" panose="020B0604020202020204" pitchFamily="34" charset="0"/>
@@ -6833,7 +6980,7 @@
             <a:r>
               <a:rPr lang="nb-NO" sz="800" b="1" dirty="0">
                 <a:solidFill>
-                  <a:schemeClr val="tx1"/>
+                  <a:srgbClr val="FF0000"/>
                 </a:solidFill>
                 <a:latin typeface="Arial" panose="020B0604020202020204" pitchFamily="34" charset="0"/>
                 <a:cs typeface="Arial" panose="020B0604020202020204" pitchFamily="34" charset="0"/>
@@ -6845,7 +6992,7 @@
             <a:r>
               <a:rPr lang="nb-NO" sz="800" dirty="0">
                 <a:solidFill>
-                  <a:schemeClr val="tx1"/>
+                  <a:srgbClr val="FF0000"/>
                 </a:solidFill>
                 <a:latin typeface="Arial" panose="020B0604020202020204" pitchFamily="34" charset="0"/>
                 <a:cs typeface="Arial" panose="020B0604020202020204" pitchFamily="34" charset="0"/>
@@ -6855,7 +7002,7 @@
             <a:r>
               <a:rPr lang="nb-NO" sz="800" dirty="0" err="1">
                 <a:solidFill>
-                  <a:schemeClr val="tx1"/>
+                  <a:srgbClr val="FF0000"/>
                 </a:solidFill>
                 <a:latin typeface="Arial" panose="020B0604020202020204" pitchFamily="34" charset="0"/>
                 <a:cs typeface="Arial" panose="020B0604020202020204" pitchFamily="34" charset="0"/>
@@ -6865,7 +7012,7 @@
             <a:r>
               <a:rPr lang="nb-NO" sz="800" dirty="0">
                 <a:solidFill>
-                  <a:schemeClr val="tx1"/>
+                  <a:srgbClr val="FF0000"/>
                 </a:solidFill>
                 <a:latin typeface="Arial" panose="020B0604020202020204" pitchFamily="34" charset="0"/>
                 <a:cs typeface="Arial" panose="020B0604020202020204" pitchFamily="34" charset="0"/>
@@ -6875,7 +7022,7 @@
             <a:r>
               <a:rPr lang="nb-NO" sz="800" dirty="0" err="1">
                 <a:solidFill>
-                  <a:schemeClr val="tx1"/>
+                  <a:srgbClr val="FF0000"/>
                 </a:solidFill>
                 <a:latin typeface="Arial" panose="020B0604020202020204" pitchFamily="34" charset="0"/>
                 <a:cs typeface="Arial" panose="020B0604020202020204" pitchFamily="34" charset="0"/>
@@ -6885,7 +7032,7 @@
             <a:r>
               <a:rPr lang="nb-NO" sz="800" dirty="0">
                 <a:solidFill>
-                  <a:schemeClr val="tx1"/>
+                  <a:srgbClr val="FF0000"/>
                 </a:solidFill>
                 <a:latin typeface="Arial" panose="020B0604020202020204" pitchFamily="34" charset="0"/>
                 <a:cs typeface="Arial" panose="020B0604020202020204" pitchFamily="34" charset="0"/>
@@ -6895,7 +7042,7 @@
             <a:r>
               <a:rPr lang="nb-NO" sz="800" dirty="0" err="1">
                 <a:solidFill>
-                  <a:schemeClr val="tx1"/>
+                  <a:srgbClr val="FF0000"/>
                 </a:solidFill>
                 <a:latin typeface="Arial" panose="020B0604020202020204" pitchFamily="34" charset="0"/>
                 <a:cs typeface="Arial" panose="020B0604020202020204" pitchFamily="34" charset="0"/>
@@ -6905,7 +7052,7 @@
             <a:r>
               <a:rPr lang="nb-NO" sz="800" dirty="0">
                 <a:solidFill>
-                  <a:schemeClr val="tx1"/>
+                  <a:srgbClr val="FF0000"/>
                 </a:solidFill>
                 <a:latin typeface="Arial" panose="020B0604020202020204" pitchFamily="34" charset="0"/>
                 <a:cs typeface="Arial" panose="020B0604020202020204" pitchFamily="34" charset="0"/>
@@ -6915,7 +7062,7 @@
             <a:r>
               <a:rPr lang="nb-NO" sz="800" dirty="0" err="1">
                 <a:solidFill>
-                  <a:schemeClr val="tx1"/>
+                  <a:srgbClr val="FF0000"/>
                 </a:solidFill>
                 <a:latin typeface="Arial" panose="020B0604020202020204" pitchFamily="34" charset="0"/>
                 <a:cs typeface="Arial" panose="020B0604020202020204" pitchFamily="34" charset="0"/>
@@ -6925,7 +7072,7 @@
             <a:r>
               <a:rPr lang="nb-NO" sz="800" dirty="0">
                 <a:solidFill>
-                  <a:schemeClr val="tx1"/>
+                  <a:srgbClr val="FF0000"/>
                 </a:solidFill>
                 <a:latin typeface="Arial" panose="020B0604020202020204" pitchFamily="34" charset="0"/>
                 <a:cs typeface="Arial" panose="020B0604020202020204" pitchFamily="34" charset="0"/>
@@ -6937,7 +7084,7 @@
             <a:r>
               <a:rPr lang="nb-NO" sz="800" dirty="0">
                 <a:solidFill>
-                  <a:schemeClr val="tx1"/>
+                  <a:srgbClr val="FF0000"/>
                 </a:solidFill>
                 <a:latin typeface="Arial" panose="020B0604020202020204" pitchFamily="34" charset="0"/>
                 <a:cs typeface="Arial" panose="020B0604020202020204" pitchFamily="34" charset="0"/>
@@ -6947,7 +7094,7 @@
             <a:r>
               <a:rPr lang="nb-NO" sz="800" dirty="0" err="1">
                 <a:solidFill>
-                  <a:schemeClr val="tx1"/>
+                  <a:srgbClr val="FF0000"/>
                 </a:solidFill>
                 <a:latin typeface="Arial" panose="020B0604020202020204" pitchFamily="34" charset="0"/>
                 <a:cs typeface="Arial" panose="020B0604020202020204" pitchFamily="34" charset="0"/>
@@ -6957,7 +7104,7 @@
             <a:r>
               <a:rPr lang="nb-NO" sz="800" dirty="0">
                 <a:solidFill>
-                  <a:schemeClr val="tx1"/>
+                  <a:srgbClr val="FF0000"/>
                 </a:solidFill>
                 <a:latin typeface="Arial" panose="020B0604020202020204" pitchFamily="34" charset="0"/>
                 <a:cs typeface="Arial" panose="020B0604020202020204" pitchFamily="34" charset="0"/>
@@ -6967,7 +7114,7 @@
             <a:r>
               <a:rPr lang="nb-NO" sz="800" dirty="0" err="1">
                 <a:solidFill>
-                  <a:schemeClr val="tx1"/>
+                  <a:srgbClr val="FF0000"/>
                 </a:solidFill>
                 <a:latin typeface="Arial" panose="020B0604020202020204" pitchFamily="34" charset="0"/>
                 <a:cs typeface="Arial" panose="020B0604020202020204" pitchFamily="34" charset="0"/>
@@ -6977,7 +7124,7 @@
             <a:r>
               <a:rPr lang="nb-NO" sz="800" dirty="0">
                 <a:solidFill>
-                  <a:schemeClr val="tx1"/>
+                  <a:srgbClr val="FF0000"/>
                 </a:solidFill>
                 <a:latin typeface="Arial" panose="020B0604020202020204" pitchFamily="34" charset="0"/>
                 <a:cs typeface="Arial" panose="020B0604020202020204" pitchFamily="34" charset="0"/>
@@ -6987,7 +7134,7 @@
             <a:r>
               <a:rPr lang="nb-NO" sz="800" dirty="0" err="1">
                 <a:solidFill>
-                  <a:schemeClr val="tx1"/>
+                  <a:srgbClr val="FF0000"/>
                 </a:solidFill>
                 <a:latin typeface="Arial" panose="020B0604020202020204" pitchFamily="34" charset="0"/>
                 <a:cs typeface="Arial" panose="020B0604020202020204" pitchFamily="34" charset="0"/>
@@ -6997,7 +7144,7 @@
             <a:r>
               <a:rPr lang="nb-NO" sz="800" dirty="0">
                 <a:solidFill>
-                  <a:schemeClr val="tx1"/>
+                  <a:srgbClr val="FF0000"/>
                 </a:solidFill>
                 <a:latin typeface="Arial" panose="020B0604020202020204" pitchFamily="34" charset="0"/>
                 <a:cs typeface="Arial" panose="020B0604020202020204" pitchFamily="34" charset="0"/>
@@ -7007,7 +7154,7 @@
             <a:r>
               <a:rPr lang="nb-NO" sz="800" dirty="0" err="1">
                 <a:solidFill>
-                  <a:schemeClr val="tx1"/>
+                  <a:srgbClr val="FF0000"/>
                 </a:solidFill>
                 <a:latin typeface="Arial" panose="020B0604020202020204" pitchFamily="34" charset="0"/>
                 <a:cs typeface="Arial" panose="020B0604020202020204" pitchFamily="34" charset="0"/>
@@ -7017,7 +7164,7 @@
             <a:r>
               <a:rPr lang="nb-NO" sz="800" dirty="0">
                 <a:solidFill>
-                  <a:schemeClr val="tx1"/>
+                  <a:srgbClr val="FF0000"/>
                 </a:solidFill>
                 <a:latin typeface="Arial" panose="020B0604020202020204" pitchFamily="34" charset="0"/>
                 <a:cs typeface="Arial" panose="020B0604020202020204" pitchFamily="34" charset="0"/>
@@ -7029,7 +7176,7 @@
             <a:r>
               <a:rPr lang="nb-NO" sz="800" dirty="0">
                 <a:solidFill>
-                  <a:schemeClr val="tx1"/>
+                  <a:srgbClr val="FF0000"/>
                 </a:solidFill>
                 <a:latin typeface="Arial" panose="020B0604020202020204" pitchFamily="34" charset="0"/>
                 <a:cs typeface="Arial" panose="020B0604020202020204" pitchFamily="34" charset="0"/>
@@ -7093,7 +7240,7 @@
             <a:r>
               <a:rPr lang="nb-NO" sz="800" b="1" dirty="0" err="1">
                 <a:solidFill>
-                  <a:schemeClr val="tx1"/>
+                  <a:srgbClr val="FF0000"/>
                 </a:solidFill>
                 <a:latin typeface="Arial" panose="020B0604020202020204" pitchFamily="34" charset="0"/>
                 <a:cs typeface="Arial" panose="020B0604020202020204" pitchFamily="34" charset="0"/>
@@ -7103,7 +7250,7 @@
             <a:r>
               <a:rPr lang="nb-NO" sz="800" b="1" dirty="0">
                 <a:solidFill>
-                  <a:schemeClr val="tx1"/>
+                  <a:srgbClr val="FF0000"/>
                 </a:solidFill>
                 <a:latin typeface="Arial" panose="020B0604020202020204" pitchFamily="34" charset="0"/>
                 <a:cs typeface="Arial" panose="020B0604020202020204" pitchFamily="34" charset="0"/>
@@ -7115,7 +7262,7 @@
             <a:r>
               <a:rPr lang="nb-NO" sz="800" dirty="0">
                 <a:solidFill>
-                  <a:schemeClr val="tx1"/>
+                  <a:srgbClr val="FF0000"/>
                 </a:solidFill>
                 <a:latin typeface="Arial" panose="020B0604020202020204" pitchFamily="34" charset="0"/>
                 <a:cs typeface="Arial" panose="020B0604020202020204" pitchFamily="34" charset="0"/>
@@ -7127,7 +7274,7 @@
             <a:r>
               <a:rPr lang="nb-NO" sz="800" dirty="0">
                 <a:solidFill>
-                  <a:schemeClr val="tx1"/>
+                  <a:srgbClr val="FF0000"/>
                 </a:solidFill>
                 <a:latin typeface="Arial" panose="020B0604020202020204" pitchFamily="34" charset="0"/>
                 <a:cs typeface="Arial" panose="020B0604020202020204" pitchFamily="34" charset="0"/>
@@ -7139,7 +7286,7 @@
             <a:r>
               <a:rPr lang="nb-NO" sz="800" dirty="0">
                 <a:solidFill>
-                  <a:schemeClr val="tx1"/>
+                  <a:srgbClr val="FF0000"/>
                 </a:solidFill>
                 <a:latin typeface="Arial" panose="020B0604020202020204" pitchFamily="34" charset="0"/>
                 <a:cs typeface="Arial" panose="020B0604020202020204" pitchFamily="34" charset="0"/>
@@ -7149,7 +7296,7 @@
             <a:r>
               <a:rPr lang="nb-NO" sz="800" dirty="0" err="1">
                 <a:solidFill>
-                  <a:schemeClr val="tx1"/>
+                  <a:srgbClr val="FF0000"/>
                 </a:solidFill>
                 <a:latin typeface="Arial" panose="020B0604020202020204" pitchFamily="34" charset="0"/>
                 <a:cs typeface="Arial" panose="020B0604020202020204" pitchFamily="34" charset="0"/>
@@ -7159,7 +7306,7 @@
             <a:r>
               <a:rPr lang="nb-NO" sz="800" dirty="0">
                 <a:solidFill>
-                  <a:schemeClr val="tx1"/>
+                  <a:srgbClr val="FF0000"/>
                 </a:solidFill>
                 <a:latin typeface="Arial" panose="020B0604020202020204" pitchFamily="34" charset="0"/>
                 <a:cs typeface="Arial" panose="020B0604020202020204" pitchFamily="34" charset="0"/>
@@ -7171,7 +7318,7 @@
             <a:r>
               <a:rPr lang="nb-NO" sz="800" dirty="0">
                 <a:solidFill>
-                  <a:schemeClr val="tx1"/>
+                  <a:srgbClr val="FF0000"/>
                 </a:solidFill>
                 <a:latin typeface="Arial" panose="020B0604020202020204" pitchFamily="34" charset="0"/>
                 <a:cs typeface="Arial" panose="020B0604020202020204" pitchFamily="34" charset="0"/>
@@ -7181,7 +7328,7 @@
             <a:r>
               <a:rPr lang="nb-NO" sz="800" dirty="0" err="1">
                 <a:solidFill>
-                  <a:schemeClr val="tx1"/>
+                  <a:srgbClr val="FF0000"/>
                 </a:solidFill>
                 <a:latin typeface="Arial" panose="020B0604020202020204" pitchFamily="34" charset="0"/>
                 <a:cs typeface="Arial" panose="020B0604020202020204" pitchFamily="34" charset="0"/>
@@ -7191,7 +7338,7 @@
             <a:r>
               <a:rPr lang="nb-NO" sz="800" dirty="0">
                 <a:solidFill>
-                  <a:schemeClr val="tx1"/>
+                  <a:srgbClr val="FF0000"/>
                 </a:solidFill>
                 <a:latin typeface="Arial" panose="020B0604020202020204" pitchFamily="34" charset="0"/>
                 <a:cs typeface="Arial" panose="020B0604020202020204" pitchFamily="34" charset="0"/>
@@ -7201,7 +7348,7 @@
             <a:r>
               <a:rPr lang="nb-NO" sz="800" dirty="0" err="1">
                 <a:solidFill>
-                  <a:schemeClr val="tx1"/>
+                  <a:srgbClr val="FF0000"/>
                 </a:solidFill>
                 <a:latin typeface="Arial" panose="020B0604020202020204" pitchFamily="34" charset="0"/>
                 <a:cs typeface="Arial" panose="020B0604020202020204" pitchFamily="34" charset="0"/>
@@ -7211,7 +7358,7 @@
             <a:r>
               <a:rPr lang="nb-NO" sz="800" dirty="0">
                 <a:solidFill>
-                  <a:schemeClr val="tx1"/>
+                  <a:srgbClr val="FF0000"/>
                 </a:solidFill>
                 <a:latin typeface="Arial" panose="020B0604020202020204" pitchFamily="34" charset="0"/>
                 <a:cs typeface="Arial" panose="020B0604020202020204" pitchFamily="34" charset="0"/>
@@ -7788,19 +7935,36 @@
                 <a:latin typeface="Arial" panose="020B0604020202020204" pitchFamily="34" charset="0"/>
                 <a:cs typeface="Arial" panose="020B0604020202020204" pitchFamily="34" charset="0"/>
               </a:rPr>
-              <a:t>UART_REQ_1, Baudrate 9k6 ,   T_9k6</a:t>
-            </a:r>
-          </a:p>
-          <a:p>
-            <a:r>
-              <a:rPr lang="nb-NO" sz="800" dirty="0">
-                <a:solidFill>
-                  <a:schemeClr val="tx1"/>
-                </a:solidFill>
-                <a:latin typeface="Arial" panose="020B0604020202020204" pitchFamily="34" charset="0"/>
-                <a:cs typeface="Arial" panose="020B0604020202020204" pitchFamily="34" charset="0"/>
-              </a:rPr>
-              <a:t>UART_REQ_2, Baudrate 19k2 , T_19k2</a:t>
+              <a:t>UART_REQ_1, Baudrate 9k6 ,   </a:t>
+            </a:r>
+            <a:r>
+              <a:rPr lang="nb-NO" sz="800" dirty="0" err="1">
+                <a:solidFill>
+                  <a:schemeClr val="tx1"/>
+                </a:solidFill>
+                <a:latin typeface="Arial" panose="020B0604020202020204" pitchFamily="34" charset="0"/>
+                <a:cs typeface="Arial" panose="020B0604020202020204" pitchFamily="34" charset="0"/>
+              </a:rPr>
+              <a:t>t_basic</a:t>
+            </a:r>
+            <a:endParaRPr lang="nb-NO" sz="800" dirty="0">
+              <a:solidFill>
+                <a:schemeClr val="tx1"/>
+              </a:solidFill>
+              <a:latin typeface="Arial" panose="020B0604020202020204" pitchFamily="34" charset="0"/>
+              <a:cs typeface="Arial" panose="020B0604020202020204" pitchFamily="34" charset="0"/>
+            </a:endParaRPr>
+          </a:p>
+          <a:p>
+            <a:r>
+              <a:rPr lang="nb-NO" sz="800" dirty="0">
+                <a:solidFill>
+                  <a:schemeClr val="tx1"/>
+                </a:solidFill>
+                <a:latin typeface="Arial" panose="020B0604020202020204" pitchFamily="34" charset="0"/>
+                <a:cs typeface="Arial" panose="020B0604020202020204" pitchFamily="34" charset="0"/>
+              </a:rPr>
+              <a:t>UART_REQ_2, Baudrate 19k2 , t_19k2</a:t>
             </a:r>
           </a:p>
           <a:p>
@@ -7832,7 +7996,27 @@
                 <a:latin typeface="Arial" panose="020B0604020202020204" pitchFamily="34" charset="0"/>
                 <a:cs typeface="Arial" panose="020B0604020202020204" pitchFamily="34" charset="0"/>
               </a:rPr>
-              <a:t> ,        T_9k6, T_19k2</a:t>
+              <a:t> ,        </a:t>
+            </a:r>
+            <a:r>
+              <a:rPr lang="nb-NO" sz="800" dirty="0" err="1">
+                <a:solidFill>
+                  <a:schemeClr val="tx1"/>
+                </a:solidFill>
+                <a:latin typeface="Arial" panose="020B0604020202020204" pitchFamily="34" charset="0"/>
+                <a:cs typeface="Arial" panose="020B0604020202020204" pitchFamily="34" charset="0"/>
+              </a:rPr>
+              <a:t>t_basic</a:t>
+            </a:r>
+            <a:r>
+              <a:rPr lang="nb-NO" sz="800" dirty="0">
+                <a:solidFill>
+                  <a:schemeClr val="tx1"/>
+                </a:solidFill>
+                <a:latin typeface="Arial" panose="020B0604020202020204" pitchFamily="34" charset="0"/>
+                <a:cs typeface="Arial" panose="020B0604020202020204" pitchFamily="34" charset="0"/>
+              </a:rPr>
+              <a:t>, t_19k2</a:t>
             </a:r>
           </a:p>
           <a:p>
@@ -7874,17 +8058,37 @@
                 <a:latin typeface="Arial" panose="020B0604020202020204" pitchFamily="34" charset="0"/>
                 <a:cs typeface="Arial" panose="020B0604020202020204" pitchFamily="34" charset="0"/>
               </a:rPr>
-              <a:t>T_reset</a:t>
-            </a:r>
-            <a:r>
-              <a:rPr lang="nb-NO" sz="800" dirty="0">
-                <a:solidFill>
-                  <a:schemeClr val="tx1"/>
-                </a:solidFill>
-                <a:latin typeface="Arial" panose="020B0604020202020204" pitchFamily="34" charset="0"/>
-                <a:cs typeface="Arial" panose="020B0604020202020204" pitchFamily="34" charset="0"/>
-              </a:rPr>
-              <a:t>, T_9k6, T_19k2</a:t>
+              <a:t>t_reset</a:t>
+            </a:r>
+            <a:r>
+              <a:rPr lang="nb-NO" sz="800" dirty="0">
+                <a:solidFill>
+                  <a:schemeClr val="tx1"/>
+                </a:solidFill>
+                <a:latin typeface="Arial" panose="020B0604020202020204" pitchFamily="34" charset="0"/>
+                <a:cs typeface="Arial" panose="020B0604020202020204" pitchFamily="34" charset="0"/>
+              </a:rPr>
+              <a:t>, </a:t>
+            </a:r>
+            <a:r>
+              <a:rPr lang="nb-NO" sz="800" dirty="0" err="1">
+                <a:solidFill>
+                  <a:schemeClr val="tx1"/>
+                </a:solidFill>
+                <a:latin typeface="Arial" panose="020B0604020202020204" pitchFamily="34" charset="0"/>
+                <a:cs typeface="Arial" panose="020B0604020202020204" pitchFamily="34" charset="0"/>
+              </a:rPr>
+              <a:t>t_basic</a:t>
+            </a:r>
+            <a:r>
+              <a:rPr lang="nb-NO" sz="800" dirty="0">
+                <a:solidFill>
+                  <a:schemeClr val="tx1"/>
+                </a:solidFill>
+                <a:latin typeface="Arial" panose="020B0604020202020204" pitchFamily="34" charset="0"/>
+                <a:cs typeface="Arial" panose="020B0604020202020204" pitchFamily="34" charset="0"/>
+              </a:rPr>
+              <a:t>, t_19k2</a:t>
             </a:r>
           </a:p>
         </p:txBody>
@@ -8106,19 +8310,36 @@
                 <a:latin typeface="Arial" panose="020B0604020202020204" pitchFamily="34" charset="0"/>
                 <a:cs typeface="Arial" panose="020B0604020202020204" pitchFamily="34" charset="0"/>
               </a:rPr>
-              <a:t>UART_REQ_1, Baudrate 9k6 ,   T_9k6</a:t>
-            </a:r>
-          </a:p>
-          <a:p>
-            <a:r>
-              <a:rPr lang="nb-NO" sz="800" dirty="0">
-                <a:solidFill>
-                  <a:schemeClr val="tx1"/>
-                </a:solidFill>
-                <a:latin typeface="Arial" panose="020B0604020202020204" pitchFamily="34" charset="0"/>
-                <a:cs typeface="Arial" panose="020B0604020202020204" pitchFamily="34" charset="0"/>
-              </a:rPr>
-              <a:t>UART_REQ_2, Baudrate 19k2 , T_19k2</a:t>
+              <a:t>UART_REQ_1, Baudrate 9k6 ,   </a:t>
+            </a:r>
+            <a:r>
+              <a:rPr lang="nb-NO" sz="800" dirty="0" err="1">
+                <a:solidFill>
+                  <a:schemeClr val="tx1"/>
+                </a:solidFill>
+                <a:latin typeface="Arial" panose="020B0604020202020204" pitchFamily="34" charset="0"/>
+                <a:cs typeface="Arial" panose="020B0604020202020204" pitchFamily="34" charset="0"/>
+              </a:rPr>
+              <a:t>t_basic</a:t>
+            </a:r>
+            <a:endParaRPr lang="nb-NO" sz="800" dirty="0">
+              <a:solidFill>
+                <a:schemeClr val="tx1"/>
+              </a:solidFill>
+              <a:latin typeface="Arial" panose="020B0604020202020204" pitchFamily="34" charset="0"/>
+              <a:cs typeface="Arial" panose="020B0604020202020204" pitchFamily="34" charset="0"/>
+            </a:endParaRPr>
+          </a:p>
+          <a:p>
+            <a:r>
+              <a:rPr lang="nb-NO" sz="800" dirty="0">
+                <a:solidFill>
+                  <a:schemeClr val="tx1"/>
+                </a:solidFill>
+                <a:latin typeface="Arial" panose="020B0604020202020204" pitchFamily="34" charset="0"/>
+                <a:cs typeface="Arial" panose="020B0604020202020204" pitchFamily="34" charset="0"/>
+              </a:rPr>
+              <a:t>UART_REQ_2, Baudrate 19k2 , t_19k2</a:t>
             </a:r>
           </a:p>
           <a:p>
@@ -8150,8 +8371,25 @@
                 <a:latin typeface="Arial" panose="020B0604020202020204" pitchFamily="34" charset="0"/>
                 <a:cs typeface="Arial" panose="020B0604020202020204" pitchFamily="34" charset="0"/>
               </a:rPr>
-              <a:t> ,        T_9k6</a:t>
-            </a:r>
+              <a:t> ,        </a:t>
+            </a:r>
+            <a:r>
+              <a:rPr lang="nb-NO" sz="800" dirty="0" err="1">
+                <a:solidFill>
+                  <a:schemeClr val="tx1"/>
+                </a:solidFill>
+                <a:latin typeface="Arial" panose="020B0604020202020204" pitchFamily="34" charset="0"/>
+                <a:cs typeface="Arial" panose="020B0604020202020204" pitchFamily="34" charset="0"/>
+              </a:rPr>
+              <a:t>t_basic</a:t>
+            </a:r>
+            <a:endParaRPr lang="nb-NO" sz="800" dirty="0">
+              <a:solidFill>
+                <a:schemeClr val="tx1"/>
+              </a:solidFill>
+              <a:latin typeface="Arial" panose="020B0604020202020204" pitchFamily="34" charset="0"/>
+              <a:cs typeface="Arial" panose="020B0604020202020204" pitchFamily="34" charset="0"/>
+            </a:endParaRPr>
           </a:p>
           <a:p>
             <a:r>
@@ -8182,7 +8420,7 @@
                 <a:latin typeface="Arial" panose="020B0604020202020204" pitchFamily="34" charset="0"/>
                 <a:cs typeface="Arial" panose="020B0604020202020204" pitchFamily="34" charset="0"/>
               </a:rPr>
-              <a:t> ,        T_19k2</a:t>
+              <a:t> ,        t_19k2</a:t>
             </a:r>
           </a:p>
           <a:p>
@@ -8224,17 +8462,37 @@
                 <a:latin typeface="Arial" panose="020B0604020202020204" pitchFamily="34" charset="0"/>
                 <a:cs typeface="Arial" panose="020B0604020202020204" pitchFamily="34" charset="0"/>
               </a:rPr>
-              <a:t>T_reset</a:t>
-            </a:r>
-            <a:r>
-              <a:rPr lang="nb-NO" sz="800" dirty="0">
-                <a:solidFill>
-                  <a:schemeClr val="tx1"/>
-                </a:solidFill>
-                <a:latin typeface="Arial" panose="020B0604020202020204" pitchFamily="34" charset="0"/>
-                <a:cs typeface="Arial" panose="020B0604020202020204" pitchFamily="34" charset="0"/>
-              </a:rPr>
-              <a:t>, T_9k6, T_19k2</a:t>
+              <a:t>t_reset</a:t>
+            </a:r>
+            <a:r>
+              <a:rPr lang="nb-NO" sz="800" dirty="0">
+                <a:solidFill>
+                  <a:schemeClr val="tx1"/>
+                </a:solidFill>
+                <a:latin typeface="Arial" panose="020B0604020202020204" pitchFamily="34" charset="0"/>
+                <a:cs typeface="Arial" panose="020B0604020202020204" pitchFamily="34" charset="0"/>
+              </a:rPr>
+              <a:t>, </a:t>
+            </a:r>
+            <a:r>
+              <a:rPr lang="nb-NO" sz="800" dirty="0" err="1">
+                <a:solidFill>
+                  <a:schemeClr val="tx1"/>
+                </a:solidFill>
+                <a:latin typeface="Arial" panose="020B0604020202020204" pitchFamily="34" charset="0"/>
+                <a:cs typeface="Arial" panose="020B0604020202020204" pitchFamily="34" charset="0"/>
+              </a:rPr>
+              <a:t>t_basic</a:t>
+            </a:r>
+            <a:r>
+              <a:rPr lang="nb-NO" sz="800" dirty="0">
+                <a:solidFill>
+                  <a:schemeClr val="tx1"/>
+                </a:solidFill>
+                <a:latin typeface="Arial" panose="020B0604020202020204" pitchFamily="34" charset="0"/>
+                <a:cs typeface="Arial" panose="020B0604020202020204" pitchFamily="34" charset="0"/>
+              </a:rPr>
+              <a:t>, t_19k2</a:t>
             </a:r>
           </a:p>
         </p:txBody>
@@ -8656,6 +8914,628 @@
                 </a:solidFill>
               </a:rPr>
               <a:t>TC</a:t>
+            </a:r>
+            <a:endParaRPr lang="nb-NO" sz="1400" dirty="0">
+              <a:solidFill>
+                <a:srgbClr val="FF0000"/>
+              </a:solidFill>
+            </a:endParaRPr>
+          </a:p>
+        </p:txBody>
+      </p:sp>
+      <p:sp>
+        <p:nvSpPr>
+          <p:cNvPr id="50" name="Rektangel 49">
+            <a:extLst>
+              <a:ext uri="{FF2B5EF4-FFF2-40B4-BE49-F238E27FC236}">
+                <a16:creationId xmlns:a16="http://schemas.microsoft.com/office/drawing/2014/main" id="{49022407-A780-44A8-A2AA-2AE7C83FCAF0}"/>
+              </a:ext>
+            </a:extLst>
+          </p:cNvPr>
+          <p:cNvSpPr/>
+          <p:nvPr/>
+        </p:nvSpPr>
+        <p:spPr>
+          <a:xfrm>
+            <a:off x="909768" y="3298295"/>
+            <a:ext cx="2417164" cy="539079"/>
+          </a:xfrm>
+          <a:prstGeom prst="rect">
+            <a:avLst/>
+          </a:prstGeom>
+          <a:solidFill>
+            <a:schemeClr val="bg1">
+              <a:lumMod val="85000"/>
+            </a:schemeClr>
+          </a:solidFill>
+          <a:ln>
+            <a:solidFill>
+              <a:schemeClr val="tx1"/>
+            </a:solidFill>
+          </a:ln>
+        </p:spPr>
+        <p:style>
+          <a:lnRef idx="2">
+            <a:schemeClr val="accent1">
+              <a:shade val="50000"/>
+            </a:schemeClr>
+          </a:lnRef>
+          <a:fillRef idx="1">
+            <a:schemeClr val="accent1"/>
+          </a:fillRef>
+          <a:effectRef idx="0">
+            <a:schemeClr val="accent1"/>
+          </a:effectRef>
+          <a:fontRef idx="minor">
+            <a:schemeClr val="lt1"/>
+          </a:fontRef>
+        </p:style>
+        <p:txBody>
+          <a:bodyPr rtlCol="0" anchor="t" anchorCtr="0"/>
+          <a:lstStyle/>
+          <a:p>
+            <a:r>
+              <a:rPr lang="nb-NO" sz="800" b="1" dirty="0" err="1">
+                <a:solidFill>
+                  <a:schemeClr val="tx1"/>
+                </a:solidFill>
+                <a:latin typeface="Arial" panose="020B0604020202020204" pitchFamily="34" charset="0"/>
+                <a:cs typeface="Arial" panose="020B0604020202020204" pitchFamily="34" charset="0"/>
+              </a:rPr>
+              <a:t>Requirement</a:t>
+            </a:r>
+            <a:r>
+              <a:rPr lang="nb-NO" sz="800" b="1" dirty="0">
+                <a:solidFill>
+                  <a:schemeClr val="tx1"/>
+                </a:solidFill>
+                <a:latin typeface="Arial" panose="020B0604020202020204" pitchFamily="34" charset="0"/>
+                <a:cs typeface="Arial" panose="020B0604020202020204" pitchFamily="34" charset="0"/>
+              </a:rPr>
+              <a:t> list, CSV</a:t>
+            </a:r>
+          </a:p>
+          <a:p>
+            <a:r>
+              <a:rPr lang="nb-NO" sz="800" dirty="0">
+                <a:solidFill>
+                  <a:schemeClr val="tx1"/>
+                </a:solidFill>
+                <a:latin typeface="Arial" panose="020B0604020202020204" pitchFamily="34" charset="0"/>
+                <a:cs typeface="Arial" panose="020B0604020202020204" pitchFamily="34" charset="0"/>
+              </a:rPr>
+              <a:t>&lt;</a:t>
+            </a:r>
+            <a:r>
+              <a:rPr lang="nb-NO" sz="800" dirty="0" err="1">
+                <a:solidFill>
+                  <a:schemeClr val="tx1"/>
+                </a:solidFill>
+                <a:latin typeface="Arial" panose="020B0604020202020204" pitchFamily="34" charset="0"/>
+                <a:cs typeface="Arial" panose="020B0604020202020204" pitchFamily="34" charset="0"/>
+              </a:rPr>
+              <a:t>Req</a:t>
+            </a:r>
+            <a:r>
+              <a:rPr lang="nb-NO" sz="800" dirty="0">
+                <a:solidFill>
+                  <a:schemeClr val="tx1"/>
+                </a:solidFill>
+                <a:latin typeface="Arial" panose="020B0604020202020204" pitchFamily="34" charset="0"/>
+                <a:cs typeface="Arial" panose="020B0604020202020204" pitchFamily="34" charset="0"/>
+              </a:rPr>
+              <a:t>. </a:t>
+            </a:r>
+            <a:r>
+              <a:rPr lang="nb-NO" sz="800" dirty="0" err="1">
+                <a:solidFill>
+                  <a:schemeClr val="tx1"/>
+                </a:solidFill>
+                <a:latin typeface="Arial" panose="020B0604020202020204" pitchFamily="34" charset="0"/>
+                <a:cs typeface="Arial" panose="020B0604020202020204" pitchFamily="34" charset="0"/>
+              </a:rPr>
+              <a:t>Label</a:t>
+            </a:r>
+            <a:r>
+              <a:rPr lang="nb-NO" sz="800" dirty="0">
+                <a:solidFill>
+                  <a:schemeClr val="tx1"/>
+                </a:solidFill>
+                <a:latin typeface="Arial" panose="020B0604020202020204" pitchFamily="34" charset="0"/>
+                <a:cs typeface="Arial" panose="020B0604020202020204" pitchFamily="34" charset="0"/>
+              </a:rPr>
+              <a:t>&gt;, &lt;</a:t>
+            </a:r>
+            <a:r>
+              <a:rPr lang="nb-NO" sz="800" dirty="0" err="1">
+                <a:solidFill>
+                  <a:schemeClr val="tx1"/>
+                </a:solidFill>
+                <a:latin typeface="Arial" panose="020B0604020202020204" pitchFamily="34" charset="0"/>
+                <a:cs typeface="Arial" panose="020B0604020202020204" pitchFamily="34" charset="0"/>
+              </a:rPr>
+              <a:t>Description</a:t>
+            </a:r>
+            <a:r>
+              <a:rPr lang="nb-NO" sz="800" dirty="0">
+                <a:solidFill>
+                  <a:schemeClr val="tx1"/>
+                </a:solidFill>
+                <a:latin typeface="Arial" panose="020B0604020202020204" pitchFamily="34" charset="0"/>
+                <a:cs typeface="Arial" panose="020B0604020202020204" pitchFamily="34" charset="0"/>
+              </a:rPr>
+              <a:t>&gt;, &lt;</a:t>
+            </a:r>
+            <a:r>
+              <a:rPr lang="nb-NO" sz="800" dirty="0" err="1">
+                <a:solidFill>
+                  <a:schemeClr val="tx1"/>
+                </a:solidFill>
+                <a:latin typeface="Arial" panose="020B0604020202020204" pitchFamily="34" charset="0"/>
+                <a:cs typeface="Arial" panose="020B0604020202020204" pitchFamily="34" charset="0"/>
+              </a:rPr>
+              <a:t>Testcase-name</a:t>
+            </a:r>
+            <a:r>
+              <a:rPr lang="nb-NO" sz="800" dirty="0">
+                <a:solidFill>
+                  <a:schemeClr val="tx1"/>
+                </a:solidFill>
+                <a:latin typeface="Arial" panose="020B0604020202020204" pitchFamily="34" charset="0"/>
+                <a:cs typeface="Arial" panose="020B0604020202020204" pitchFamily="34" charset="0"/>
+              </a:rPr>
+              <a:t>&gt;</a:t>
+            </a:r>
+          </a:p>
+          <a:p>
+            <a:r>
+              <a:rPr lang="nb-NO" sz="800" dirty="0">
+                <a:solidFill>
+                  <a:schemeClr val="tx1"/>
+                </a:solidFill>
+                <a:latin typeface="Arial" panose="020B0604020202020204" pitchFamily="34" charset="0"/>
+                <a:cs typeface="Arial" panose="020B0604020202020204" pitchFamily="34" charset="0"/>
+              </a:rPr>
+              <a:t>&lt;</a:t>
+            </a:r>
+            <a:r>
+              <a:rPr lang="nb-NO" sz="800" dirty="0" err="1">
+                <a:solidFill>
+                  <a:schemeClr val="tx1"/>
+                </a:solidFill>
+                <a:latin typeface="Arial" panose="020B0604020202020204" pitchFamily="34" charset="0"/>
+                <a:cs typeface="Arial" panose="020B0604020202020204" pitchFamily="34" charset="0"/>
+              </a:rPr>
+              <a:t>Req</a:t>
+            </a:r>
+            <a:r>
+              <a:rPr lang="nb-NO" sz="800" dirty="0">
+                <a:solidFill>
+                  <a:schemeClr val="tx1"/>
+                </a:solidFill>
+                <a:latin typeface="Arial" panose="020B0604020202020204" pitchFamily="34" charset="0"/>
+                <a:cs typeface="Arial" panose="020B0604020202020204" pitchFamily="34" charset="0"/>
+              </a:rPr>
+              <a:t>. </a:t>
+            </a:r>
+            <a:r>
+              <a:rPr lang="nb-NO" sz="800" dirty="0" err="1">
+                <a:solidFill>
+                  <a:schemeClr val="tx1"/>
+                </a:solidFill>
+                <a:latin typeface="Arial" panose="020B0604020202020204" pitchFamily="34" charset="0"/>
+                <a:cs typeface="Arial" panose="020B0604020202020204" pitchFamily="34" charset="0"/>
+              </a:rPr>
+              <a:t>Label</a:t>
+            </a:r>
+            <a:r>
+              <a:rPr lang="nb-NO" sz="800" dirty="0">
+                <a:solidFill>
+                  <a:schemeClr val="tx1"/>
+                </a:solidFill>
+                <a:latin typeface="Arial" panose="020B0604020202020204" pitchFamily="34" charset="0"/>
+                <a:cs typeface="Arial" panose="020B0604020202020204" pitchFamily="34" charset="0"/>
+              </a:rPr>
+              <a:t>&gt;, &lt;</a:t>
+            </a:r>
+            <a:r>
+              <a:rPr lang="nb-NO" sz="800" dirty="0" err="1">
+                <a:solidFill>
+                  <a:schemeClr val="tx1"/>
+                </a:solidFill>
+                <a:latin typeface="Arial" panose="020B0604020202020204" pitchFamily="34" charset="0"/>
+                <a:cs typeface="Arial" panose="020B0604020202020204" pitchFamily="34" charset="0"/>
+              </a:rPr>
+              <a:t>Description</a:t>
+            </a:r>
+            <a:r>
+              <a:rPr lang="nb-NO" sz="800" dirty="0">
+                <a:solidFill>
+                  <a:schemeClr val="tx1"/>
+                </a:solidFill>
+                <a:latin typeface="Arial" panose="020B0604020202020204" pitchFamily="34" charset="0"/>
+                <a:cs typeface="Arial" panose="020B0604020202020204" pitchFamily="34" charset="0"/>
+              </a:rPr>
+              <a:t>&gt;, &lt;</a:t>
+            </a:r>
+            <a:r>
+              <a:rPr lang="nb-NO" sz="800" dirty="0" err="1">
+                <a:solidFill>
+                  <a:schemeClr val="tx1"/>
+                </a:solidFill>
+                <a:latin typeface="Arial" panose="020B0604020202020204" pitchFamily="34" charset="0"/>
+                <a:cs typeface="Arial" panose="020B0604020202020204" pitchFamily="34" charset="0"/>
+              </a:rPr>
+              <a:t>Testcase-name</a:t>
+            </a:r>
+            <a:r>
+              <a:rPr lang="nb-NO" sz="800" dirty="0">
+                <a:solidFill>
+                  <a:schemeClr val="tx1"/>
+                </a:solidFill>
+                <a:latin typeface="Arial" panose="020B0604020202020204" pitchFamily="34" charset="0"/>
+                <a:cs typeface="Arial" panose="020B0604020202020204" pitchFamily="34" charset="0"/>
+              </a:rPr>
+              <a:t>&gt;</a:t>
+            </a:r>
+          </a:p>
+          <a:p>
+            <a:r>
+              <a:rPr lang="nb-NO" sz="800" dirty="0">
+                <a:solidFill>
+                  <a:schemeClr val="tx1"/>
+                </a:solidFill>
+                <a:latin typeface="Arial" panose="020B0604020202020204" pitchFamily="34" charset="0"/>
+                <a:cs typeface="Arial" panose="020B0604020202020204" pitchFamily="34" charset="0"/>
+              </a:rPr>
+              <a:t>……….</a:t>
+            </a:r>
+          </a:p>
+        </p:txBody>
+      </p:sp>
+      <p:sp>
+        <p:nvSpPr>
+          <p:cNvPr id="51" name="Rektangel 50">
+            <a:extLst>
+              <a:ext uri="{FF2B5EF4-FFF2-40B4-BE49-F238E27FC236}">
+                <a16:creationId xmlns:a16="http://schemas.microsoft.com/office/drawing/2014/main" id="{5C70DCF9-22A8-46E4-B01C-F7C32C941982}"/>
+              </a:ext>
+            </a:extLst>
+          </p:cNvPr>
+          <p:cNvSpPr/>
+          <p:nvPr/>
+        </p:nvSpPr>
+        <p:spPr>
+          <a:xfrm>
+            <a:off x="3397963" y="3298295"/>
+            <a:ext cx="2216970" cy="688505"/>
+          </a:xfrm>
+          <a:prstGeom prst="rect">
+            <a:avLst/>
+          </a:prstGeom>
+          <a:solidFill>
+            <a:schemeClr val="bg1">
+              <a:lumMod val="85000"/>
+            </a:schemeClr>
+          </a:solidFill>
+          <a:ln>
+            <a:solidFill>
+              <a:schemeClr val="tx1"/>
+            </a:solidFill>
+          </a:ln>
+        </p:spPr>
+        <p:style>
+          <a:lnRef idx="2">
+            <a:schemeClr val="accent1">
+              <a:shade val="50000"/>
+            </a:schemeClr>
+          </a:lnRef>
+          <a:fillRef idx="1">
+            <a:schemeClr val="accent1"/>
+          </a:fillRef>
+          <a:effectRef idx="0">
+            <a:schemeClr val="accent1"/>
+          </a:effectRef>
+          <a:fontRef idx="minor">
+            <a:schemeClr val="lt1"/>
+          </a:fontRef>
+        </p:style>
+        <p:txBody>
+          <a:bodyPr rtlCol="0" anchor="t" anchorCtr="0"/>
+          <a:lstStyle/>
+          <a:p>
+            <a:r>
+              <a:rPr lang="nb-NO" sz="800" b="1" dirty="0" err="1">
+                <a:solidFill>
+                  <a:schemeClr val="tx1"/>
+                </a:solidFill>
+                <a:latin typeface="Arial" panose="020B0604020202020204" pitchFamily="34" charset="0"/>
+                <a:cs typeface="Arial" panose="020B0604020202020204" pitchFamily="34" charset="0"/>
+              </a:rPr>
+              <a:t>Requirement</a:t>
+            </a:r>
+            <a:r>
+              <a:rPr lang="nb-NO" sz="800" b="1" dirty="0">
+                <a:solidFill>
+                  <a:schemeClr val="tx1"/>
+                </a:solidFill>
+                <a:latin typeface="Arial" panose="020B0604020202020204" pitchFamily="34" charset="0"/>
+                <a:cs typeface="Arial" panose="020B0604020202020204" pitchFamily="34" charset="0"/>
+              </a:rPr>
+              <a:t> list, CSV</a:t>
+            </a:r>
+          </a:p>
+          <a:p>
+            <a:r>
+              <a:rPr lang="nb-NO" sz="800" dirty="0">
+                <a:solidFill>
+                  <a:schemeClr val="tx1"/>
+                </a:solidFill>
+                <a:latin typeface="Arial" panose="020B0604020202020204" pitchFamily="34" charset="0"/>
+                <a:cs typeface="Arial" panose="020B0604020202020204" pitchFamily="34" charset="0"/>
+              </a:rPr>
+              <a:t>UART_REQ_1, Baudrate 9k6 ,   </a:t>
+            </a:r>
+            <a:r>
+              <a:rPr lang="nb-NO" sz="800" dirty="0" err="1">
+                <a:solidFill>
+                  <a:schemeClr val="tx1"/>
+                </a:solidFill>
+                <a:latin typeface="Arial" panose="020B0604020202020204" pitchFamily="34" charset="0"/>
+                <a:cs typeface="Arial" panose="020B0604020202020204" pitchFamily="34" charset="0"/>
+              </a:rPr>
+              <a:t>t_basic</a:t>
+            </a:r>
+            <a:endParaRPr lang="nb-NO" sz="800" dirty="0">
+              <a:solidFill>
+                <a:schemeClr val="tx1"/>
+              </a:solidFill>
+              <a:latin typeface="Arial" panose="020B0604020202020204" pitchFamily="34" charset="0"/>
+              <a:cs typeface="Arial" panose="020B0604020202020204" pitchFamily="34" charset="0"/>
+            </a:endParaRPr>
+          </a:p>
+          <a:p>
+            <a:r>
+              <a:rPr lang="nb-NO" sz="800" dirty="0">
+                <a:solidFill>
+                  <a:schemeClr val="tx1"/>
+                </a:solidFill>
+                <a:latin typeface="Arial" panose="020B0604020202020204" pitchFamily="34" charset="0"/>
+                <a:cs typeface="Arial" panose="020B0604020202020204" pitchFamily="34" charset="0"/>
+              </a:rPr>
+              <a:t>UART_REQ_2, Baudrate 19k2 , t_19k2</a:t>
+            </a:r>
+          </a:p>
+          <a:p>
+            <a:r>
+              <a:rPr lang="nb-NO" sz="800" dirty="0">
+                <a:solidFill>
+                  <a:schemeClr val="tx1"/>
+                </a:solidFill>
+                <a:latin typeface="Arial" panose="020B0604020202020204" pitchFamily="34" charset="0"/>
+                <a:cs typeface="Arial" panose="020B0604020202020204" pitchFamily="34" charset="0"/>
+              </a:rPr>
+              <a:t>UART_REQ_3, Odd </a:t>
+            </a:r>
+            <a:r>
+              <a:rPr lang="nb-NO" sz="800" dirty="0" err="1">
+                <a:solidFill>
+                  <a:schemeClr val="tx1"/>
+                </a:solidFill>
+                <a:latin typeface="Arial" panose="020B0604020202020204" pitchFamily="34" charset="0"/>
+                <a:cs typeface="Arial" panose="020B0604020202020204" pitchFamily="34" charset="0"/>
+              </a:rPr>
+              <a:t>parity</a:t>
+            </a:r>
+            <a:r>
+              <a:rPr lang="nb-NO" sz="800" dirty="0">
+                <a:solidFill>
+                  <a:schemeClr val="tx1"/>
+                </a:solidFill>
+                <a:latin typeface="Arial" panose="020B0604020202020204" pitchFamily="34" charset="0"/>
+                <a:cs typeface="Arial" panose="020B0604020202020204" pitchFamily="34" charset="0"/>
+              </a:rPr>
+              <a:t> ,        </a:t>
+            </a:r>
+            <a:r>
+              <a:rPr lang="nb-NO" sz="800" dirty="0" err="1">
+                <a:solidFill>
+                  <a:schemeClr val="tx1"/>
+                </a:solidFill>
+                <a:latin typeface="Arial" panose="020B0604020202020204" pitchFamily="34" charset="0"/>
+                <a:cs typeface="Arial" panose="020B0604020202020204" pitchFamily="34" charset="0"/>
+              </a:rPr>
+              <a:t>t_basic</a:t>
+            </a:r>
+            <a:endParaRPr lang="nb-NO" sz="800" dirty="0">
+              <a:solidFill>
+                <a:schemeClr val="tx1"/>
+              </a:solidFill>
+              <a:latin typeface="Arial" panose="020B0604020202020204" pitchFamily="34" charset="0"/>
+              <a:cs typeface="Arial" panose="020B0604020202020204" pitchFamily="34" charset="0"/>
+            </a:endParaRPr>
+          </a:p>
+          <a:p>
+            <a:r>
+              <a:rPr lang="nb-NO" sz="800" dirty="0">
+                <a:solidFill>
+                  <a:schemeClr val="tx1"/>
+                </a:solidFill>
+                <a:latin typeface="Arial" panose="020B0604020202020204" pitchFamily="34" charset="0"/>
+                <a:cs typeface="Arial" panose="020B0604020202020204" pitchFamily="34" charset="0"/>
+              </a:rPr>
+              <a:t>UART_REQ_4, Active </a:t>
+            </a:r>
+            <a:r>
+              <a:rPr lang="nb-NO" sz="800" dirty="0" err="1">
+                <a:solidFill>
+                  <a:schemeClr val="tx1"/>
+                </a:solidFill>
+                <a:latin typeface="Arial" panose="020B0604020202020204" pitchFamily="34" charset="0"/>
+                <a:cs typeface="Arial" panose="020B0604020202020204" pitchFamily="34" charset="0"/>
+              </a:rPr>
+              <a:t>low</a:t>
+            </a:r>
+            <a:r>
+              <a:rPr lang="nb-NO" sz="800" dirty="0">
+                <a:solidFill>
+                  <a:schemeClr val="tx1"/>
+                </a:solidFill>
+                <a:latin typeface="Arial" panose="020B0604020202020204" pitchFamily="34" charset="0"/>
+                <a:cs typeface="Arial" panose="020B0604020202020204" pitchFamily="34" charset="0"/>
+              </a:rPr>
+              <a:t> reset, </a:t>
+            </a:r>
+            <a:r>
+              <a:rPr lang="nb-NO" sz="800" dirty="0" err="1">
+                <a:solidFill>
+                  <a:schemeClr val="tx1"/>
+                </a:solidFill>
+                <a:latin typeface="Arial" panose="020B0604020202020204" pitchFamily="34" charset="0"/>
+                <a:cs typeface="Arial" panose="020B0604020202020204" pitchFamily="34" charset="0"/>
+              </a:rPr>
+              <a:t>t_reset</a:t>
+            </a:r>
+            <a:r>
+              <a:rPr lang="nb-NO" sz="800" dirty="0">
+                <a:solidFill>
+                  <a:schemeClr val="tx1"/>
+                </a:solidFill>
+                <a:latin typeface="Arial" panose="020B0604020202020204" pitchFamily="34" charset="0"/>
+                <a:cs typeface="Arial" panose="020B0604020202020204" pitchFamily="34" charset="0"/>
+              </a:rPr>
+              <a:t>,</a:t>
+            </a:r>
+          </a:p>
+        </p:txBody>
+      </p:sp>
+      <p:sp>
+        <p:nvSpPr>
+          <p:cNvPr id="52" name="Ellipse 51">
+            <a:extLst>
+              <a:ext uri="{FF2B5EF4-FFF2-40B4-BE49-F238E27FC236}">
+                <a16:creationId xmlns:a16="http://schemas.microsoft.com/office/drawing/2014/main" id="{2D8A227F-DB32-4D6F-A820-C5BE5AEDF89D}"/>
+              </a:ext>
+            </a:extLst>
+          </p:cNvPr>
+          <p:cNvSpPr/>
+          <p:nvPr/>
+        </p:nvSpPr>
+        <p:spPr>
+          <a:xfrm>
+            <a:off x="3051527" y="3310332"/>
+            <a:ext cx="278360" cy="150684"/>
+          </a:xfrm>
+          <a:prstGeom prst="ellipse">
+            <a:avLst/>
+          </a:prstGeom>
+          <a:solidFill>
+            <a:schemeClr val="bg1">
+              <a:lumMod val="95000"/>
+            </a:schemeClr>
+          </a:solidFill>
+          <a:ln>
+            <a:solidFill>
+              <a:srgbClr val="FF0000"/>
+            </a:solidFill>
+          </a:ln>
+        </p:spPr>
+        <p:style>
+          <a:lnRef idx="2">
+            <a:schemeClr val="accent1">
+              <a:shade val="50000"/>
+            </a:schemeClr>
+          </a:lnRef>
+          <a:fillRef idx="1">
+            <a:schemeClr val="accent1"/>
+          </a:fillRef>
+          <a:effectRef idx="0">
+            <a:schemeClr val="accent1"/>
+          </a:effectRef>
+          <a:fontRef idx="minor">
+            <a:schemeClr val="lt1"/>
+          </a:fontRef>
+        </p:style>
+        <p:txBody>
+          <a:bodyPr wrap="none" lIns="0" tIns="0" rIns="0" bIns="0" rtlCol="0" anchor="ctr"/>
+          <a:lstStyle/>
+          <a:p>
+            <a:pPr algn="ctr"/>
+            <a:r>
+              <a:rPr lang="nb-NO" sz="1100" dirty="0">
+                <a:solidFill>
+                  <a:srgbClr val="FF0000"/>
+                </a:solidFill>
+              </a:rPr>
+              <a:t>RL</a:t>
+            </a:r>
+            <a:endParaRPr lang="nb-NO" sz="1400" dirty="0">
+              <a:solidFill>
+                <a:srgbClr val="FF0000"/>
+              </a:solidFill>
+            </a:endParaRPr>
+          </a:p>
+        </p:txBody>
+      </p:sp>
+      <p:sp>
+        <p:nvSpPr>
+          <p:cNvPr id="54" name="Ellipse 53">
+            <a:extLst>
+              <a:ext uri="{FF2B5EF4-FFF2-40B4-BE49-F238E27FC236}">
+                <a16:creationId xmlns:a16="http://schemas.microsoft.com/office/drawing/2014/main" id="{42413AD2-45EA-43EB-826C-32A34A11EA6B}"/>
+              </a:ext>
+            </a:extLst>
+          </p:cNvPr>
+          <p:cNvSpPr/>
+          <p:nvPr/>
+        </p:nvSpPr>
+        <p:spPr>
+          <a:xfrm>
+            <a:off x="5299062" y="3311807"/>
+            <a:ext cx="278360" cy="150684"/>
+          </a:xfrm>
+          <a:prstGeom prst="ellipse">
+            <a:avLst/>
+          </a:prstGeom>
+          <a:solidFill>
+            <a:schemeClr val="bg1">
+              <a:lumMod val="95000"/>
+            </a:schemeClr>
+          </a:solidFill>
+          <a:ln>
+            <a:solidFill>
+              <a:srgbClr val="FF0000"/>
+            </a:solidFill>
+          </a:ln>
+        </p:spPr>
+        <p:style>
+          <a:lnRef idx="2">
+            <a:schemeClr val="accent1">
+              <a:shade val="50000"/>
+            </a:schemeClr>
+          </a:lnRef>
+          <a:fillRef idx="1">
+            <a:schemeClr val="accent1"/>
+          </a:fillRef>
+          <a:effectRef idx="0">
+            <a:schemeClr val="accent1"/>
+          </a:effectRef>
+          <a:fontRef idx="minor">
+            <a:schemeClr val="lt1"/>
+          </a:fontRef>
+        </p:style>
+        <p:txBody>
+          <a:bodyPr wrap="none" lIns="0" tIns="0" rIns="0" bIns="0" rtlCol="0" anchor="ctr"/>
+          <a:lstStyle/>
+          <a:p>
+            <a:pPr algn="ctr"/>
+            <a:r>
+              <a:rPr lang="nb-NO" sz="1100" dirty="0">
+                <a:solidFill>
+                  <a:srgbClr val="FF0000"/>
+                </a:solidFill>
+              </a:rPr>
+              <a:t>RL</a:t>
             </a:r>
             <a:endParaRPr lang="nb-NO" sz="1400" dirty="0">
               <a:solidFill>
@@ -8776,19 +9656,36 @@
                 <a:latin typeface="Arial" panose="020B0604020202020204" pitchFamily="34" charset="0"/>
                 <a:cs typeface="Arial" panose="020B0604020202020204" pitchFamily="34" charset="0"/>
               </a:rPr>
-              <a:t>UART_REQ_1, Baudrate 9k6 ,   T_9k6</a:t>
-            </a:r>
-          </a:p>
-          <a:p>
-            <a:r>
-              <a:rPr lang="nb-NO" sz="800" dirty="0">
-                <a:solidFill>
-                  <a:schemeClr val="tx1"/>
-                </a:solidFill>
-                <a:latin typeface="Arial" panose="020B0604020202020204" pitchFamily="34" charset="0"/>
-                <a:cs typeface="Arial" panose="020B0604020202020204" pitchFamily="34" charset="0"/>
-              </a:rPr>
-              <a:t>UART_REQ_2, Baudrate 19k2 , T_19k2</a:t>
+              <a:t>UART_REQ_1, Baudrate 9k6 ,   </a:t>
+            </a:r>
+            <a:r>
+              <a:rPr lang="nb-NO" sz="800" dirty="0" err="1">
+                <a:solidFill>
+                  <a:schemeClr val="tx1"/>
+                </a:solidFill>
+                <a:latin typeface="Arial" panose="020B0604020202020204" pitchFamily="34" charset="0"/>
+                <a:cs typeface="Arial" panose="020B0604020202020204" pitchFamily="34" charset="0"/>
+              </a:rPr>
+              <a:t>t_basic</a:t>
+            </a:r>
+            <a:endParaRPr lang="nb-NO" sz="800" dirty="0">
+              <a:solidFill>
+                <a:schemeClr val="tx1"/>
+              </a:solidFill>
+              <a:latin typeface="Arial" panose="020B0604020202020204" pitchFamily="34" charset="0"/>
+              <a:cs typeface="Arial" panose="020B0604020202020204" pitchFamily="34" charset="0"/>
+            </a:endParaRPr>
+          </a:p>
+          <a:p>
+            <a:r>
+              <a:rPr lang="nb-NO" sz="800" dirty="0">
+                <a:solidFill>
+                  <a:schemeClr val="tx1"/>
+                </a:solidFill>
+                <a:latin typeface="Arial" panose="020B0604020202020204" pitchFamily="34" charset="0"/>
+                <a:cs typeface="Arial" panose="020B0604020202020204" pitchFamily="34" charset="0"/>
+              </a:rPr>
+              <a:t>UART_REQ_2, Baudrate 19k2 , t_19k2</a:t>
             </a:r>
           </a:p>
           <a:p>
@@ -8820,8 +9717,25 @@
                 <a:latin typeface="Arial" panose="020B0604020202020204" pitchFamily="34" charset="0"/>
                 <a:cs typeface="Arial" panose="020B0604020202020204" pitchFamily="34" charset="0"/>
               </a:rPr>
-              <a:t> ,        T_9k6</a:t>
-            </a:r>
+              <a:t> ,        </a:t>
+            </a:r>
+            <a:r>
+              <a:rPr lang="nb-NO" sz="800" dirty="0" err="1">
+                <a:solidFill>
+                  <a:schemeClr val="tx1"/>
+                </a:solidFill>
+                <a:latin typeface="Arial" panose="020B0604020202020204" pitchFamily="34" charset="0"/>
+                <a:cs typeface="Arial" panose="020B0604020202020204" pitchFamily="34" charset="0"/>
+              </a:rPr>
+              <a:t>t_basic</a:t>
+            </a:r>
+            <a:endParaRPr lang="nb-NO" sz="800" dirty="0">
+              <a:solidFill>
+                <a:schemeClr val="tx1"/>
+              </a:solidFill>
+              <a:latin typeface="Arial" panose="020B0604020202020204" pitchFamily="34" charset="0"/>
+              <a:cs typeface="Arial" panose="020B0604020202020204" pitchFamily="34" charset="0"/>
+            </a:endParaRPr>
           </a:p>
           <a:p>
             <a:r>
@@ -8862,7 +9776,7 @@
                 <a:latin typeface="Arial" panose="020B0604020202020204" pitchFamily="34" charset="0"/>
                 <a:cs typeface="Arial" panose="020B0604020202020204" pitchFamily="34" charset="0"/>
               </a:rPr>
-              <a:t>T_reset</a:t>
+              <a:t>t_reset</a:t>
             </a:r>
             <a:r>
               <a:rPr lang="nb-NO" sz="800" dirty="0">

</xml_diff>

<commit_message>
Changed from 'Testcase coverage' to 'Partial coverage' + Minor changes
</commit_message>
<xml_diff>
--- a/bitvis_vip_spec_cov/doc/Figures.pptx
+++ b/bitvis_vip_spec_cov/doc/Figures.pptx
@@ -6764,7 +6764,7 @@
                 <a:latin typeface="Arial" panose="020B0604020202020204" pitchFamily="34" charset="0"/>
                 <a:cs typeface="Arial" panose="020B0604020202020204" pitchFamily="34" charset="0"/>
               </a:rPr>
-              <a:t>Testcase</a:t>
+              <a:t>Partial</a:t>
             </a:r>
             <a:r>
               <a:rPr lang="nb-NO" sz="800" b="1" dirty="0">
@@ -6985,7 +6985,7 @@
                   <a:srgbClr val="FF0000"/>
                 </a:solidFill>
               </a:rPr>
-              <a:t>TC</a:t>
+              <a:t>PC</a:t>
             </a:r>
             <a:endParaRPr lang="nb-NO" sz="1400" dirty="0">
               <a:solidFill>
@@ -8703,7 +8703,7 @@
                 <a:latin typeface="Arial" panose="020B0604020202020204" pitchFamily="34" charset="0"/>
                 <a:cs typeface="Arial" panose="020B0604020202020204" pitchFamily="34" charset="0"/>
               </a:rPr>
-              <a:t>Testcase</a:t>
+              <a:t>Partial</a:t>
             </a:r>
             <a:r>
               <a:rPr lang="nb-NO" sz="800" b="1" dirty="0">
@@ -8992,7 +8992,7 @@
                   <a:srgbClr val="FF0000"/>
                 </a:solidFill>
               </a:rPr>
-              <a:t>TC</a:t>
+              <a:t>PC</a:t>
             </a:r>
             <a:endParaRPr lang="nb-NO" sz="1400" dirty="0">
               <a:solidFill>

</xml_diff>

<commit_message>
Improved specification vs partial coverage
</commit_message>
<xml_diff>
--- a/bitvis_vip_spec_cov/doc/Figures.pptx
+++ b/bitvis_vip_spec_cov/doc/Figures.pptx
@@ -7,6 +7,7 @@
   <p:sldIdLst>
     <p:sldId id="257" r:id="rId2"/>
     <p:sldId id="258" r:id="rId3"/>
+    <p:sldId id="259" r:id="rId4"/>
   </p:sldIdLst>
   <p:sldSz cx="12192000" cy="6858000"/>
   <p:notesSz cx="6858000" cy="9144000"/>
@@ -6187,7 +6188,7 @@
         </p:nvSpPr>
         <p:spPr>
           <a:xfrm>
-            <a:off x="9862905" y="947724"/>
+            <a:off x="9862905" y="964658"/>
             <a:ext cx="278360" cy="150684"/>
           </a:xfrm>
           <a:prstGeom prst="ellipse">
@@ -6255,7 +6256,7 @@
         </p:nvSpPr>
         <p:spPr>
           <a:xfrm>
-            <a:off x="9862905" y="1493862"/>
+            <a:off x="9862905" y="1595466"/>
             <a:ext cx="278360" cy="150684"/>
           </a:xfrm>
           <a:prstGeom prst="ellipse">
@@ -6323,7 +6324,7 @@
         </p:nvSpPr>
         <p:spPr>
           <a:xfrm>
-            <a:off x="9861454" y="2416255"/>
+            <a:off x="9861454" y="2526326"/>
             <a:ext cx="278360" cy="150684"/>
           </a:xfrm>
           <a:prstGeom prst="ellipse">
@@ -6986,594 +6987,6 @@
                 </a:solidFill>
               </a:rPr>
               <a:t>PC</a:t>
-            </a:r>
-            <a:endParaRPr lang="nb-NO" sz="1400" dirty="0">
-              <a:solidFill>
-                <a:srgbClr val="FF0000"/>
-              </a:solidFill>
-            </a:endParaRPr>
-          </a:p>
-        </p:txBody>
-      </p:sp>
-      <p:sp>
-        <p:nvSpPr>
-          <p:cNvPr id="72" name="Rektangel 71">
-            <a:extLst>
-              <a:ext uri="{FF2B5EF4-FFF2-40B4-BE49-F238E27FC236}">
-                <a16:creationId xmlns:a16="http://schemas.microsoft.com/office/drawing/2014/main" id="{BE7198D6-CF8A-442D-BC40-9E66AF6EA737}"/>
-              </a:ext>
-            </a:extLst>
-          </p:cNvPr>
-          <p:cNvSpPr/>
-          <p:nvPr/>
-        </p:nvSpPr>
-        <p:spPr>
-          <a:xfrm>
-            <a:off x="6303146" y="3362447"/>
-            <a:ext cx="2417164" cy="539079"/>
-          </a:xfrm>
-          <a:prstGeom prst="rect">
-            <a:avLst/>
-          </a:prstGeom>
-          <a:solidFill>
-            <a:schemeClr val="bg1">
-              <a:lumMod val="85000"/>
-            </a:schemeClr>
-          </a:solidFill>
-          <a:ln>
-            <a:solidFill>
-              <a:schemeClr val="tx1"/>
-            </a:solidFill>
-          </a:ln>
-        </p:spPr>
-        <p:style>
-          <a:lnRef idx="2">
-            <a:schemeClr val="accent1">
-              <a:shade val="50000"/>
-            </a:schemeClr>
-          </a:lnRef>
-          <a:fillRef idx="1">
-            <a:schemeClr val="accent1"/>
-          </a:fillRef>
-          <a:effectRef idx="0">
-            <a:schemeClr val="accent1"/>
-          </a:effectRef>
-          <a:fontRef idx="minor">
-            <a:schemeClr val="lt1"/>
-          </a:fontRef>
-        </p:style>
-        <p:txBody>
-          <a:bodyPr rtlCol="0" anchor="t" anchorCtr="0"/>
-          <a:lstStyle/>
-          <a:p>
-            <a:r>
-              <a:rPr lang="nb-NO" sz="800" b="1" dirty="0" err="1">
-                <a:solidFill>
-                  <a:srgbClr val="FF0000"/>
-                </a:solidFill>
-                <a:latin typeface="Arial" panose="020B0604020202020204" pitchFamily="34" charset="0"/>
-                <a:cs typeface="Arial" panose="020B0604020202020204" pitchFamily="34" charset="0"/>
-              </a:rPr>
-              <a:t>Requirement</a:t>
-            </a:r>
-            <a:r>
-              <a:rPr lang="nb-NO" sz="800" b="1" dirty="0">
-                <a:solidFill>
-                  <a:srgbClr val="FF0000"/>
-                </a:solidFill>
-                <a:latin typeface="Arial" panose="020B0604020202020204" pitchFamily="34" charset="0"/>
-                <a:cs typeface="Arial" panose="020B0604020202020204" pitchFamily="34" charset="0"/>
-              </a:rPr>
-              <a:t> list, CSV</a:t>
-            </a:r>
-          </a:p>
-          <a:p>
-            <a:r>
-              <a:rPr lang="nb-NO" sz="800" dirty="0">
-                <a:solidFill>
-                  <a:srgbClr val="FF0000"/>
-                </a:solidFill>
-                <a:latin typeface="Arial" panose="020B0604020202020204" pitchFamily="34" charset="0"/>
-                <a:cs typeface="Arial" panose="020B0604020202020204" pitchFamily="34" charset="0"/>
-              </a:rPr>
-              <a:t>&lt;</a:t>
-            </a:r>
-            <a:r>
-              <a:rPr lang="nb-NO" sz="800" dirty="0" err="1">
-                <a:solidFill>
-                  <a:srgbClr val="FF0000"/>
-                </a:solidFill>
-                <a:latin typeface="Arial" panose="020B0604020202020204" pitchFamily="34" charset="0"/>
-                <a:cs typeface="Arial" panose="020B0604020202020204" pitchFamily="34" charset="0"/>
-              </a:rPr>
-              <a:t>Req</a:t>
-            </a:r>
-            <a:r>
-              <a:rPr lang="nb-NO" sz="800" dirty="0">
-                <a:solidFill>
-                  <a:srgbClr val="FF0000"/>
-                </a:solidFill>
-                <a:latin typeface="Arial" panose="020B0604020202020204" pitchFamily="34" charset="0"/>
-                <a:cs typeface="Arial" panose="020B0604020202020204" pitchFamily="34" charset="0"/>
-              </a:rPr>
-              <a:t>. </a:t>
-            </a:r>
-            <a:r>
-              <a:rPr lang="nb-NO" sz="800" dirty="0" err="1">
-                <a:solidFill>
-                  <a:srgbClr val="FF0000"/>
-                </a:solidFill>
-                <a:latin typeface="Arial" panose="020B0604020202020204" pitchFamily="34" charset="0"/>
-                <a:cs typeface="Arial" panose="020B0604020202020204" pitchFamily="34" charset="0"/>
-              </a:rPr>
-              <a:t>Label</a:t>
-            </a:r>
-            <a:r>
-              <a:rPr lang="nb-NO" sz="800" dirty="0">
-                <a:solidFill>
-                  <a:srgbClr val="FF0000"/>
-                </a:solidFill>
-                <a:latin typeface="Arial" panose="020B0604020202020204" pitchFamily="34" charset="0"/>
-                <a:cs typeface="Arial" panose="020B0604020202020204" pitchFamily="34" charset="0"/>
-              </a:rPr>
-              <a:t>&gt;, &lt;</a:t>
-            </a:r>
-            <a:r>
-              <a:rPr lang="nb-NO" sz="800" dirty="0" err="1">
-                <a:solidFill>
-                  <a:srgbClr val="FF0000"/>
-                </a:solidFill>
-                <a:latin typeface="Arial" panose="020B0604020202020204" pitchFamily="34" charset="0"/>
-                <a:cs typeface="Arial" panose="020B0604020202020204" pitchFamily="34" charset="0"/>
-              </a:rPr>
-              <a:t>Description</a:t>
-            </a:r>
-            <a:r>
-              <a:rPr lang="nb-NO" sz="800" dirty="0">
-                <a:solidFill>
-                  <a:srgbClr val="FF0000"/>
-                </a:solidFill>
-                <a:latin typeface="Arial" panose="020B0604020202020204" pitchFamily="34" charset="0"/>
-                <a:cs typeface="Arial" panose="020B0604020202020204" pitchFamily="34" charset="0"/>
-              </a:rPr>
-              <a:t>&gt;, &lt;</a:t>
-            </a:r>
-            <a:r>
-              <a:rPr lang="nb-NO" sz="800" dirty="0" err="1">
-                <a:solidFill>
-                  <a:srgbClr val="FF0000"/>
-                </a:solidFill>
-                <a:latin typeface="Arial" panose="020B0604020202020204" pitchFamily="34" charset="0"/>
-                <a:cs typeface="Arial" panose="020B0604020202020204" pitchFamily="34" charset="0"/>
-              </a:rPr>
-              <a:t>Testcase-name</a:t>
-            </a:r>
-            <a:r>
-              <a:rPr lang="nb-NO" sz="800" dirty="0">
-                <a:solidFill>
-                  <a:srgbClr val="FF0000"/>
-                </a:solidFill>
-                <a:latin typeface="Arial" panose="020B0604020202020204" pitchFamily="34" charset="0"/>
-                <a:cs typeface="Arial" panose="020B0604020202020204" pitchFamily="34" charset="0"/>
-              </a:rPr>
-              <a:t>&gt;</a:t>
-            </a:r>
-          </a:p>
-          <a:p>
-            <a:r>
-              <a:rPr lang="nb-NO" sz="800" dirty="0">
-                <a:solidFill>
-                  <a:srgbClr val="FF0000"/>
-                </a:solidFill>
-                <a:latin typeface="Arial" panose="020B0604020202020204" pitchFamily="34" charset="0"/>
-                <a:cs typeface="Arial" panose="020B0604020202020204" pitchFamily="34" charset="0"/>
-              </a:rPr>
-              <a:t>&lt;</a:t>
-            </a:r>
-            <a:r>
-              <a:rPr lang="nb-NO" sz="800" dirty="0" err="1">
-                <a:solidFill>
-                  <a:srgbClr val="FF0000"/>
-                </a:solidFill>
-                <a:latin typeface="Arial" panose="020B0604020202020204" pitchFamily="34" charset="0"/>
-                <a:cs typeface="Arial" panose="020B0604020202020204" pitchFamily="34" charset="0"/>
-              </a:rPr>
-              <a:t>Req</a:t>
-            </a:r>
-            <a:r>
-              <a:rPr lang="nb-NO" sz="800" dirty="0">
-                <a:solidFill>
-                  <a:srgbClr val="FF0000"/>
-                </a:solidFill>
-                <a:latin typeface="Arial" panose="020B0604020202020204" pitchFamily="34" charset="0"/>
-                <a:cs typeface="Arial" panose="020B0604020202020204" pitchFamily="34" charset="0"/>
-              </a:rPr>
-              <a:t>. </a:t>
-            </a:r>
-            <a:r>
-              <a:rPr lang="nb-NO" sz="800" dirty="0" err="1">
-                <a:solidFill>
-                  <a:srgbClr val="FF0000"/>
-                </a:solidFill>
-                <a:latin typeface="Arial" panose="020B0604020202020204" pitchFamily="34" charset="0"/>
-                <a:cs typeface="Arial" panose="020B0604020202020204" pitchFamily="34" charset="0"/>
-              </a:rPr>
-              <a:t>Label</a:t>
-            </a:r>
-            <a:r>
-              <a:rPr lang="nb-NO" sz="800" dirty="0">
-                <a:solidFill>
-                  <a:srgbClr val="FF0000"/>
-                </a:solidFill>
-                <a:latin typeface="Arial" panose="020B0604020202020204" pitchFamily="34" charset="0"/>
-                <a:cs typeface="Arial" panose="020B0604020202020204" pitchFamily="34" charset="0"/>
-              </a:rPr>
-              <a:t>&gt;, &lt;</a:t>
-            </a:r>
-            <a:r>
-              <a:rPr lang="nb-NO" sz="800" dirty="0" err="1">
-                <a:solidFill>
-                  <a:srgbClr val="FF0000"/>
-                </a:solidFill>
-                <a:latin typeface="Arial" panose="020B0604020202020204" pitchFamily="34" charset="0"/>
-                <a:cs typeface="Arial" panose="020B0604020202020204" pitchFamily="34" charset="0"/>
-              </a:rPr>
-              <a:t>Description</a:t>
-            </a:r>
-            <a:r>
-              <a:rPr lang="nb-NO" sz="800" dirty="0">
-                <a:solidFill>
-                  <a:srgbClr val="FF0000"/>
-                </a:solidFill>
-                <a:latin typeface="Arial" panose="020B0604020202020204" pitchFamily="34" charset="0"/>
-                <a:cs typeface="Arial" panose="020B0604020202020204" pitchFamily="34" charset="0"/>
-              </a:rPr>
-              <a:t>&gt;, &lt;</a:t>
-            </a:r>
-            <a:r>
-              <a:rPr lang="nb-NO" sz="800" dirty="0" err="1">
-                <a:solidFill>
-                  <a:srgbClr val="FF0000"/>
-                </a:solidFill>
-                <a:latin typeface="Arial" panose="020B0604020202020204" pitchFamily="34" charset="0"/>
-                <a:cs typeface="Arial" panose="020B0604020202020204" pitchFamily="34" charset="0"/>
-              </a:rPr>
-              <a:t>Testcase-name</a:t>
-            </a:r>
-            <a:r>
-              <a:rPr lang="nb-NO" sz="800" dirty="0">
-                <a:solidFill>
-                  <a:srgbClr val="FF0000"/>
-                </a:solidFill>
-                <a:latin typeface="Arial" panose="020B0604020202020204" pitchFamily="34" charset="0"/>
-                <a:cs typeface="Arial" panose="020B0604020202020204" pitchFamily="34" charset="0"/>
-              </a:rPr>
-              <a:t>&gt;</a:t>
-            </a:r>
-          </a:p>
-          <a:p>
-            <a:r>
-              <a:rPr lang="nb-NO" sz="800" dirty="0">
-                <a:solidFill>
-                  <a:srgbClr val="FF0000"/>
-                </a:solidFill>
-                <a:latin typeface="Arial" panose="020B0604020202020204" pitchFamily="34" charset="0"/>
-                <a:cs typeface="Arial" panose="020B0604020202020204" pitchFamily="34" charset="0"/>
-              </a:rPr>
-              <a:t>……….</a:t>
-            </a:r>
-          </a:p>
-        </p:txBody>
-      </p:sp>
-      <p:sp>
-        <p:nvSpPr>
-          <p:cNvPr id="78" name="Rektangel 77">
-            <a:extLst>
-              <a:ext uri="{FF2B5EF4-FFF2-40B4-BE49-F238E27FC236}">
-                <a16:creationId xmlns:a16="http://schemas.microsoft.com/office/drawing/2014/main" id="{0ED75388-B70C-4429-814C-02FD73E0D219}"/>
-              </a:ext>
-            </a:extLst>
-          </p:cNvPr>
-          <p:cNvSpPr/>
-          <p:nvPr/>
-        </p:nvSpPr>
-        <p:spPr>
-          <a:xfrm>
-            <a:off x="8791341" y="3362447"/>
-            <a:ext cx="2216970" cy="688505"/>
-          </a:xfrm>
-          <a:prstGeom prst="rect">
-            <a:avLst/>
-          </a:prstGeom>
-          <a:solidFill>
-            <a:schemeClr val="bg1">
-              <a:lumMod val="85000"/>
-            </a:schemeClr>
-          </a:solidFill>
-          <a:ln>
-            <a:solidFill>
-              <a:schemeClr val="tx1"/>
-            </a:solidFill>
-          </a:ln>
-        </p:spPr>
-        <p:style>
-          <a:lnRef idx="2">
-            <a:schemeClr val="accent1">
-              <a:shade val="50000"/>
-            </a:schemeClr>
-          </a:lnRef>
-          <a:fillRef idx="1">
-            <a:schemeClr val="accent1"/>
-          </a:fillRef>
-          <a:effectRef idx="0">
-            <a:schemeClr val="accent1"/>
-          </a:effectRef>
-          <a:fontRef idx="minor">
-            <a:schemeClr val="lt1"/>
-          </a:fontRef>
-        </p:style>
-        <p:txBody>
-          <a:bodyPr rtlCol="0" anchor="t" anchorCtr="0"/>
-          <a:lstStyle/>
-          <a:p>
-            <a:r>
-              <a:rPr lang="nb-NO" sz="800" b="1" dirty="0" err="1">
-                <a:solidFill>
-                  <a:srgbClr val="FF0000"/>
-                </a:solidFill>
-                <a:latin typeface="Arial" panose="020B0604020202020204" pitchFamily="34" charset="0"/>
-                <a:cs typeface="Arial" panose="020B0604020202020204" pitchFamily="34" charset="0"/>
-              </a:rPr>
-              <a:t>Requirement</a:t>
-            </a:r>
-            <a:r>
-              <a:rPr lang="nb-NO" sz="800" b="1" dirty="0">
-                <a:solidFill>
-                  <a:srgbClr val="FF0000"/>
-                </a:solidFill>
-                <a:latin typeface="Arial" panose="020B0604020202020204" pitchFamily="34" charset="0"/>
-                <a:cs typeface="Arial" panose="020B0604020202020204" pitchFamily="34" charset="0"/>
-              </a:rPr>
-              <a:t> list, CSV</a:t>
-            </a:r>
-          </a:p>
-          <a:p>
-            <a:r>
-              <a:rPr lang="nb-NO" sz="800" dirty="0">
-                <a:solidFill>
-                  <a:srgbClr val="FF0000"/>
-                </a:solidFill>
-                <a:latin typeface="Arial" panose="020B0604020202020204" pitchFamily="34" charset="0"/>
-                <a:cs typeface="Arial" panose="020B0604020202020204" pitchFamily="34" charset="0"/>
-              </a:rPr>
-              <a:t>UART_REQ_1, Baudrate 9k6 ,   T_9k6</a:t>
-            </a:r>
-          </a:p>
-          <a:p>
-            <a:r>
-              <a:rPr lang="nb-NO" sz="800" dirty="0">
-                <a:solidFill>
-                  <a:srgbClr val="FF0000"/>
-                </a:solidFill>
-                <a:latin typeface="Arial" panose="020B0604020202020204" pitchFamily="34" charset="0"/>
-                <a:cs typeface="Arial" panose="020B0604020202020204" pitchFamily="34" charset="0"/>
-              </a:rPr>
-              <a:t>UART_REQ_2, Baudrate 19k2 , T_19k2</a:t>
-            </a:r>
-          </a:p>
-          <a:p>
-            <a:r>
-              <a:rPr lang="nb-NO" sz="800" dirty="0">
-                <a:solidFill>
-                  <a:srgbClr val="FF0000"/>
-                </a:solidFill>
-                <a:latin typeface="Arial" panose="020B0604020202020204" pitchFamily="34" charset="0"/>
-                <a:cs typeface="Arial" panose="020B0604020202020204" pitchFamily="34" charset="0"/>
-              </a:rPr>
-              <a:t>UART_REQ_3, Odd </a:t>
-            </a:r>
-            <a:r>
-              <a:rPr lang="nb-NO" sz="800" dirty="0" err="1">
-                <a:solidFill>
-                  <a:srgbClr val="FF0000"/>
-                </a:solidFill>
-                <a:latin typeface="Arial" panose="020B0604020202020204" pitchFamily="34" charset="0"/>
-                <a:cs typeface="Arial" panose="020B0604020202020204" pitchFamily="34" charset="0"/>
-              </a:rPr>
-              <a:t>parity</a:t>
-            </a:r>
-            <a:r>
-              <a:rPr lang="nb-NO" sz="800" dirty="0">
-                <a:solidFill>
-                  <a:srgbClr val="FF0000"/>
-                </a:solidFill>
-                <a:latin typeface="Arial" panose="020B0604020202020204" pitchFamily="34" charset="0"/>
-                <a:cs typeface="Arial" panose="020B0604020202020204" pitchFamily="34" charset="0"/>
-              </a:rPr>
-              <a:t> ,        T_9k6</a:t>
-            </a:r>
-          </a:p>
-          <a:p>
-            <a:r>
-              <a:rPr lang="nb-NO" sz="800" dirty="0">
-                <a:solidFill>
-                  <a:srgbClr val="FF0000"/>
-                </a:solidFill>
-                <a:latin typeface="Arial" panose="020B0604020202020204" pitchFamily="34" charset="0"/>
-                <a:cs typeface="Arial" panose="020B0604020202020204" pitchFamily="34" charset="0"/>
-              </a:rPr>
-              <a:t>UART_REQ_4, Active </a:t>
-            </a:r>
-            <a:r>
-              <a:rPr lang="nb-NO" sz="800" dirty="0" err="1">
-                <a:solidFill>
-                  <a:srgbClr val="FF0000"/>
-                </a:solidFill>
-                <a:latin typeface="Arial" panose="020B0604020202020204" pitchFamily="34" charset="0"/>
-                <a:cs typeface="Arial" panose="020B0604020202020204" pitchFamily="34" charset="0"/>
-              </a:rPr>
-              <a:t>low</a:t>
-            </a:r>
-            <a:r>
-              <a:rPr lang="nb-NO" sz="800" dirty="0">
-                <a:solidFill>
-                  <a:srgbClr val="FF0000"/>
-                </a:solidFill>
-                <a:latin typeface="Arial" panose="020B0604020202020204" pitchFamily="34" charset="0"/>
-                <a:cs typeface="Arial" panose="020B0604020202020204" pitchFamily="34" charset="0"/>
-              </a:rPr>
-              <a:t> reset, </a:t>
-            </a:r>
-            <a:r>
-              <a:rPr lang="nb-NO" sz="800" dirty="0" err="1">
-                <a:solidFill>
-                  <a:srgbClr val="FF0000"/>
-                </a:solidFill>
-                <a:latin typeface="Arial" panose="020B0604020202020204" pitchFamily="34" charset="0"/>
-                <a:cs typeface="Arial" panose="020B0604020202020204" pitchFamily="34" charset="0"/>
-              </a:rPr>
-              <a:t>T_reset</a:t>
-            </a:r>
-            <a:r>
-              <a:rPr lang="nb-NO" sz="800" dirty="0">
-                <a:solidFill>
-                  <a:srgbClr val="FF0000"/>
-                </a:solidFill>
-                <a:latin typeface="Arial" panose="020B0604020202020204" pitchFamily="34" charset="0"/>
-                <a:cs typeface="Arial" panose="020B0604020202020204" pitchFamily="34" charset="0"/>
-              </a:rPr>
-              <a:t>,</a:t>
-            </a:r>
-          </a:p>
-        </p:txBody>
-      </p:sp>
-      <p:sp>
-        <p:nvSpPr>
-          <p:cNvPr id="79" name="Ellipse 78">
-            <a:extLst>
-              <a:ext uri="{FF2B5EF4-FFF2-40B4-BE49-F238E27FC236}">
-                <a16:creationId xmlns:a16="http://schemas.microsoft.com/office/drawing/2014/main" id="{DCDA0560-6D4D-4E66-A20A-E26742CF72C2}"/>
-              </a:ext>
-            </a:extLst>
-          </p:cNvPr>
-          <p:cNvSpPr/>
-          <p:nvPr/>
-        </p:nvSpPr>
-        <p:spPr>
-          <a:xfrm>
-            <a:off x="8444905" y="3374484"/>
-            <a:ext cx="278360" cy="150684"/>
-          </a:xfrm>
-          <a:prstGeom prst="ellipse">
-            <a:avLst/>
-          </a:prstGeom>
-          <a:solidFill>
-            <a:schemeClr val="bg1">
-              <a:lumMod val="95000"/>
-            </a:schemeClr>
-          </a:solidFill>
-          <a:ln>
-            <a:solidFill>
-              <a:srgbClr val="FF0000"/>
-            </a:solidFill>
-          </a:ln>
-        </p:spPr>
-        <p:style>
-          <a:lnRef idx="2">
-            <a:schemeClr val="accent1">
-              <a:shade val="50000"/>
-            </a:schemeClr>
-          </a:lnRef>
-          <a:fillRef idx="1">
-            <a:schemeClr val="accent1"/>
-          </a:fillRef>
-          <a:effectRef idx="0">
-            <a:schemeClr val="accent1"/>
-          </a:effectRef>
-          <a:fontRef idx="minor">
-            <a:schemeClr val="lt1"/>
-          </a:fontRef>
-        </p:style>
-        <p:txBody>
-          <a:bodyPr wrap="none" lIns="0" tIns="0" rIns="0" bIns="0" rtlCol="0" anchor="ctr"/>
-          <a:lstStyle/>
-          <a:p>
-            <a:pPr algn="ctr"/>
-            <a:r>
-              <a:rPr lang="nb-NO" sz="1100" dirty="0">
-                <a:solidFill>
-                  <a:srgbClr val="FF0000"/>
-                </a:solidFill>
-              </a:rPr>
-              <a:t>RL</a:t>
-            </a:r>
-            <a:endParaRPr lang="nb-NO" sz="1400" dirty="0">
-              <a:solidFill>
-                <a:srgbClr val="FF0000"/>
-              </a:solidFill>
-            </a:endParaRPr>
-          </a:p>
-        </p:txBody>
-      </p:sp>
-      <p:sp>
-        <p:nvSpPr>
-          <p:cNvPr id="80" name="Ellipse 79">
-            <a:extLst>
-              <a:ext uri="{FF2B5EF4-FFF2-40B4-BE49-F238E27FC236}">
-                <a16:creationId xmlns:a16="http://schemas.microsoft.com/office/drawing/2014/main" id="{0DE85626-91F8-4C4A-AB3E-EE30A2F0FEB9}"/>
-              </a:ext>
-            </a:extLst>
-          </p:cNvPr>
-          <p:cNvSpPr/>
-          <p:nvPr/>
-        </p:nvSpPr>
-        <p:spPr>
-          <a:xfrm>
-            <a:off x="10692440" y="3375959"/>
-            <a:ext cx="278360" cy="150684"/>
-          </a:xfrm>
-          <a:prstGeom prst="ellipse">
-            <a:avLst/>
-          </a:prstGeom>
-          <a:solidFill>
-            <a:schemeClr val="bg1">
-              <a:lumMod val="95000"/>
-            </a:schemeClr>
-          </a:solidFill>
-          <a:ln>
-            <a:solidFill>
-              <a:srgbClr val="FF0000"/>
-            </a:solidFill>
-          </a:ln>
-        </p:spPr>
-        <p:style>
-          <a:lnRef idx="2">
-            <a:schemeClr val="accent1">
-              <a:shade val="50000"/>
-            </a:schemeClr>
-          </a:lnRef>
-          <a:fillRef idx="1">
-            <a:schemeClr val="accent1"/>
-          </a:fillRef>
-          <a:effectRef idx="0">
-            <a:schemeClr val="accent1"/>
-          </a:effectRef>
-          <a:fontRef idx="minor">
-            <a:schemeClr val="lt1"/>
-          </a:fontRef>
-        </p:style>
-        <p:txBody>
-          <a:bodyPr wrap="none" lIns="0" tIns="0" rIns="0" bIns="0" rtlCol="0" anchor="ctr"/>
-          <a:lstStyle/>
-          <a:p>
-            <a:pPr algn="ctr"/>
-            <a:r>
-              <a:rPr lang="nb-NO" sz="1100" dirty="0">
-                <a:solidFill>
-                  <a:srgbClr val="FF0000"/>
-                </a:solidFill>
-              </a:rPr>
-              <a:t>RL</a:t>
             </a:r>
             <a:endParaRPr lang="nb-NO" sz="1400" dirty="0">
               <a:solidFill>
@@ -10450,6 +9863,1893 @@
     <p:extLst>
       <p:ext uri="{BB962C8B-B14F-4D97-AF65-F5344CB8AC3E}">
         <p14:creationId xmlns:p14="http://schemas.microsoft.com/office/powerpoint/2010/main" val="443539470"/>
+      </p:ext>
+    </p:extLst>
+  </p:cSld>
+  <p:clrMapOvr>
+    <a:masterClrMapping/>
+  </p:clrMapOvr>
+</p:sld>
+</file>
+
+<file path=ppt/slides/slide3.xml><?xml version="1.0" encoding="utf-8"?>
+<p:sld xmlns:a="http://schemas.openxmlformats.org/drawingml/2006/main" xmlns:r="http://schemas.openxmlformats.org/officeDocument/2006/relationships" xmlns:p="http://schemas.openxmlformats.org/presentationml/2006/main">
+  <p:cSld>
+    <p:spTree>
+      <p:nvGrpSpPr>
+        <p:cNvPr id="1" name=""/>
+        <p:cNvGrpSpPr/>
+        <p:nvPr/>
+      </p:nvGrpSpPr>
+      <p:grpSpPr>
+        <a:xfrm>
+          <a:off x="0" y="0"/>
+          <a:ext cx="0" cy="0"/>
+          <a:chOff x="0" y="0"/>
+          <a:chExt cx="0" cy="0"/>
+        </a:xfrm>
+      </p:grpSpPr>
+      <p:cxnSp>
+        <p:nvCxnSpPr>
+          <p:cNvPr id="28" name="Rett pilkobling 27">
+            <a:extLst>
+              <a:ext uri="{FF2B5EF4-FFF2-40B4-BE49-F238E27FC236}">
+                <a16:creationId xmlns:a16="http://schemas.microsoft.com/office/drawing/2014/main" id="{87EAD300-E964-40D2-96F1-3071143DB26A}"/>
+              </a:ext>
+            </a:extLst>
+          </p:cNvPr>
+          <p:cNvCxnSpPr>
+            <a:cxnSpLocks/>
+          </p:cNvCxnSpPr>
+          <p:nvPr/>
+        </p:nvCxnSpPr>
+        <p:spPr>
+          <a:xfrm flipV="1">
+            <a:off x="4309121" y="1395125"/>
+            <a:ext cx="339091" cy="388"/>
+          </a:xfrm>
+          <a:prstGeom prst="straightConnector1">
+            <a:avLst/>
+          </a:prstGeom>
+          <a:ln w="12700">
+            <a:solidFill>
+              <a:schemeClr val="tx1"/>
+            </a:solidFill>
+            <a:tailEnd type="triangle"/>
+          </a:ln>
+        </p:spPr>
+        <p:style>
+          <a:lnRef idx="1">
+            <a:schemeClr val="accent1"/>
+          </a:lnRef>
+          <a:fillRef idx="0">
+            <a:schemeClr val="accent1"/>
+          </a:fillRef>
+          <a:effectRef idx="0">
+            <a:schemeClr val="accent1"/>
+          </a:effectRef>
+          <a:fontRef idx="minor">
+            <a:schemeClr val="tx1"/>
+          </a:fontRef>
+        </p:style>
+      </p:cxnSp>
+      <p:cxnSp>
+        <p:nvCxnSpPr>
+          <p:cNvPr id="29" name="Rett pilkobling 28">
+            <a:extLst>
+              <a:ext uri="{FF2B5EF4-FFF2-40B4-BE49-F238E27FC236}">
+                <a16:creationId xmlns:a16="http://schemas.microsoft.com/office/drawing/2014/main" id="{83492E41-64FF-4054-9214-6B5ECAAE75C0}"/>
+              </a:ext>
+            </a:extLst>
+          </p:cNvPr>
+          <p:cNvCxnSpPr>
+            <a:cxnSpLocks/>
+          </p:cNvCxnSpPr>
+          <p:nvPr/>
+        </p:nvCxnSpPr>
+        <p:spPr>
+          <a:xfrm>
+            <a:off x="4309120" y="1448202"/>
+            <a:ext cx="352910" cy="0"/>
+          </a:xfrm>
+          <a:prstGeom prst="straightConnector1">
+            <a:avLst/>
+          </a:prstGeom>
+          <a:ln w="12700">
+            <a:solidFill>
+              <a:schemeClr val="tx1"/>
+            </a:solidFill>
+            <a:tailEnd type="triangle"/>
+          </a:ln>
+        </p:spPr>
+        <p:style>
+          <a:lnRef idx="1">
+            <a:schemeClr val="accent1"/>
+          </a:lnRef>
+          <a:fillRef idx="0">
+            <a:schemeClr val="accent1"/>
+          </a:fillRef>
+          <a:effectRef idx="0">
+            <a:schemeClr val="accent1"/>
+          </a:effectRef>
+          <a:fontRef idx="minor">
+            <a:schemeClr val="tx1"/>
+          </a:fontRef>
+        </p:style>
+      </p:cxnSp>
+      <p:cxnSp>
+        <p:nvCxnSpPr>
+          <p:cNvPr id="30" name="Rett pilkobling 29">
+            <a:extLst>
+              <a:ext uri="{FF2B5EF4-FFF2-40B4-BE49-F238E27FC236}">
+                <a16:creationId xmlns:a16="http://schemas.microsoft.com/office/drawing/2014/main" id="{15AAE904-1977-46FF-AC1B-499B046B9FBE}"/>
+              </a:ext>
+            </a:extLst>
+          </p:cNvPr>
+          <p:cNvCxnSpPr>
+            <a:cxnSpLocks/>
+          </p:cNvCxnSpPr>
+          <p:nvPr/>
+        </p:nvCxnSpPr>
+        <p:spPr>
+          <a:xfrm>
+            <a:off x="4386869" y="1490533"/>
+            <a:ext cx="265146" cy="0"/>
+          </a:xfrm>
+          <a:prstGeom prst="straightConnector1">
+            <a:avLst/>
+          </a:prstGeom>
+          <a:ln w="12700">
+            <a:solidFill>
+              <a:schemeClr val="tx1"/>
+            </a:solidFill>
+            <a:tailEnd type="triangle"/>
+          </a:ln>
+        </p:spPr>
+        <p:style>
+          <a:lnRef idx="1">
+            <a:schemeClr val="accent1"/>
+          </a:lnRef>
+          <a:fillRef idx="0">
+            <a:schemeClr val="accent1"/>
+          </a:fillRef>
+          <a:effectRef idx="0">
+            <a:schemeClr val="accent1"/>
+          </a:effectRef>
+          <a:fontRef idx="minor">
+            <a:schemeClr val="tx1"/>
+          </a:fontRef>
+        </p:style>
+      </p:cxnSp>
+      <p:cxnSp>
+        <p:nvCxnSpPr>
+          <p:cNvPr id="31" name="Rett pilkobling 30">
+            <a:extLst>
+              <a:ext uri="{FF2B5EF4-FFF2-40B4-BE49-F238E27FC236}">
+                <a16:creationId xmlns:a16="http://schemas.microsoft.com/office/drawing/2014/main" id="{92FEA1AD-C242-4744-9050-276B727839A5}"/>
+              </a:ext>
+            </a:extLst>
+          </p:cNvPr>
+          <p:cNvCxnSpPr>
+            <a:cxnSpLocks/>
+          </p:cNvCxnSpPr>
+          <p:nvPr/>
+        </p:nvCxnSpPr>
+        <p:spPr>
+          <a:xfrm>
+            <a:off x="4386866" y="1524395"/>
+            <a:ext cx="265146" cy="0"/>
+          </a:xfrm>
+          <a:prstGeom prst="straightConnector1">
+            <a:avLst/>
+          </a:prstGeom>
+          <a:ln w="12700">
+            <a:solidFill>
+              <a:schemeClr val="tx1"/>
+            </a:solidFill>
+            <a:tailEnd type="triangle"/>
+          </a:ln>
+        </p:spPr>
+        <p:style>
+          <a:lnRef idx="1">
+            <a:schemeClr val="accent1"/>
+          </a:lnRef>
+          <a:fillRef idx="0">
+            <a:schemeClr val="accent1"/>
+          </a:fillRef>
+          <a:effectRef idx="0">
+            <a:schemeClr val="accent1"/>
+          </a:effectRef>
+          <a:fontRef idx="minor">
+            <a:schemeClr val="tx1"/>
+          </a:fontRef>
+        </p:style>
+      </p:cxnSp>
+      <p:cxnSp>
+        <p:nvCxnSpPr>
+          <p:cNvPr id="32" name="Rett pilkobling 31">
+            <a:extLst>
+              <a:ext uri="{FF2B5EF4-FFF2-40B4-BE49-F238E27FC236}">
+                <a16:creationId xmlns:a16="http://schemas.microsoft.com/office/drawing/2014/main" id="{A1E2183C-3E25-48DF-ABB0-481E513CB133}"/>
+              </a:ext>
+            </a:extLst>
+          </p:cNvPr>
+          <p:cNvCxnSpPr>
+            <a:cxnSpLocks/>
+          </p:cNvCxnSpPr>
+          <p:nvPr/>
+        </p:nvCxnSpPr>
+        <p:spPr>
+          <a:xfrm>
+            <a:off x="4292595" y="1583260"/>
+            <a:ext cx="352910" cy="0"/>
+          </a:xfrm>
+          <a:prstGeom prst="straightConnector1">
+            <a:avLst/>
+          </a:prstGeom>
+          <a:ln w="12700">
+            <a:solidFill>
+              <a:schemeClr val="tx1"/>
+            </a:solidFill>
+            <a:tailEnd type="triangle"/>
+          </a:ln>
+        </p:spPr>
+        <p:style>
+          <a:lnRef idx="1">
+            <a:schemeClr val="accent1"/>
+          </a:lnRef>
+          <a:fillRef idx="0">
+            <a:schemeClr val="accent1"/>
+          </a:fillRef>
+          <a:effectRef idx="0">
+            <a:schemeClr val="accent1"/>
+          </a:effectRef>
+          <a:fontRef idx="minor">
+            <a:schemeClr val="tx1"/>
+          </a:fontRef>
+        </p:style>
+      </p:cxnSp>
+      <p:cxnSp>
+        <p:nvCxnSpPr>
+          <p:cNvPr id="33" name="Rett pilkobling 32">
+            <a:extLst>
+              <a:ext uri="{FF2B5EF4-FFF2-40B4-BE49-F238E27FC236}">
+                <a16:creationId xmlns:a16="http://schemas.microsoft.com/office/drawing/2014/main" id="{6AC66990-7915-45EE-8507-B06F7D932243}"/>
+              </a:ext>
+            </a:extLst>
+          </p:cNvPr>
+          <p:cNvCxnSpPr>
+            <a:cxnSpLocks/>
+          </p:cNvCxnSpPr>
+          <p:nvPr/>
+        </p:nvCxnSpPr>
+        <p:spPr>
+          <a:xfrm>
+            <a:off x="4258735" y="1177255"/>
+            <a:ext cx="403296" cy="0"/>
+          </a:xfrm>
+          <a:prstGeom prst="straightConnector1">
+            <a:avLst/>
+          </a:prstGeom>
+          <a:ln w="12700">
+            <a:solidFill>
+              <a:schemeClr val="tx1"/>
+            </a:solidFill>
+            <a:tailEnd type="triangle"/>
+          </a:ln>
+        </p:spPr>
+        <p:style>
+          <a:lnRef idx="1">
+            <a:schemeClr val="accent1"/>
+          </a:lnRef>
+          <a:fillRef idx="0">
+            <a:schemeClr val="accent1"/>
+          </a:fillRef>
+          <a:effectRef idx="0">
+            <a:schemeClr val="accent1"/>
+          </a:effectRef>
+          <a:fontRef idx="minor">
+            <a:schemeClr val="tx1"/>
+          </a:fontRef>
+        </p:style>
+      </p:cxnSp>
+      <p:sp>
+        <p:nvSpPr>
+          <p:cNvPr id="3" name="Rektangel 2">
+            <a:extLst>
+              <a:ext uri="{FF2B5EF4-FFF2-40B4-BE49-F238E27FC236}">
+                <a16:creationId xmlns:a16="http://schemas.microsoft.com/office/drawing/2014/main" id="{65B91CA6-FA24-4046-9BAC-AD207A8DAB4B}"/>
+              </a:ext>
+            </a:extLst>
+          </p:cNvPr>
+          <p:cNvSpPr/>
+          <p:nvPr/>
+        </p:nvSpPr>
+        <p:spPr>
+          <a:xfrm>
+            <a:off x="449558" y="266220"/>
+            <a:ext cx="1063112" cy="215444"/>
+          </a:xfrm>
+          <a:prstGeom prst="rect">
+            <a:avLst/>
+          </a:prstGeom>
+        </p:spPr>
+        <p:txBody>
+          <a:bodyPr wrap="none">
+            <a:spAutoFit/>
+          </a:bodyPr>
+          <a:lstStyle/>
+          <a:p>
+            <a:pPr lvl="0"/>
+            <a:r>
+              <a:rPr lang="nb-NO" sz="800" b="1" dirty="0">
+                <a:solidFill>
+                  <a:prstClr val="black"/>
+                </a:solidFill>
+                <a:latin typeface="Arial" panose="020B0604020202020204" pitchFamily="34" charset="0"/>
+                <a:cs typeface="Arial" panose="020B0604020202020204" pitchFamily="34" charset="0"/>
+              </a:rPr>
+              <a:t>From </a:t>
+            </a:r>
+            <a:r>
+              <a:rPr lang="nb-NO" sz="800" b="1" dirty="0" err="1">
+                <a:solidFill>
+                  <a:prstClr val="black"/>
+                </a:solidFill>
+                <a:latin typeface="Arial" panose="020B0604020202020204" pitchFamily="34" charset="0"/>
+                <a:cs typeface="Arial" panose="020B0604020202020204" pitchFamily="34" charset="0"/>
+              </a:rPr>
+              <a:t>the</a:t>
+            </a:r>
+            <a:r>
+              <a:rPr lang="nb-NO" sz="800" b="1" dirty="0">
+                <a:solidFill>
+                  <a:prstClr val="black"/>
+                </a:solidFill>
+                <a:latin typeface="Arial" panose="020B0604020202020204" pitchFamily="34" charset="0"/>
+                <a:cs typeface="Arial" panose="020B0604020202020204" pitchFamily="34" charset="0"/>
+              </a:rPr>
+              <a:t> UART IP</a:t>
+            </a:r>
+          </a:p>
+        </p:txBody>
+      </p:sp>
+      <p:sp>
+        <p:nvSpPr>
+          <p:cNvPr id="15" name="Rektangel 14">
+            <a:extLst>
+              <a:ext uri="{FF2B5EF4-FFF2-40B4-BE49-F238E27FC236}">
+                <a16:creationId xmlns:a16="http://schemas.microsoft.com/office/drawing/2014/main" id="{85CBF661-B228-4CCF-B60E-9135496DC74C}"/>
+              </a:ext>
+            </a:extLst>
+          </p:cNvPr>
+          <p:cNvSpPr/>
+          <p:nvPr/>
+        </p:nvSpPr>
+        <p:spPr>
+          <a:xfrm>
+            <a:off x="3285880" y="1091261"/>
+            <a:ext cx="980910" cy="576669"/>
+          </a:xfrm>
+          <a:prstGeom prst="rect">
+            <a:avLst/>
+          </a:prstGeom>
+          <a:solidFill>
+            <a:schemeClr val="bg1">
+              <a:lumMod val="85000"/>
+            </a:schemeClr>
+          </a:solidFill>
+          <a:ln>
+            <a:solidFill>
+              <a:schemeClr val="tx1"/>
+            </a:solidFill>
+          </a:ln>
+        </p:spPr>
+        <p:style>
+          <a:lnRef idx="2">
+            <a:schemeClr val="accent1">
+              <a:shade val="50000"/>
+            </a:schemeClr>
+          </a:lnRef>
+          <a:fillRef idx="1">
+            <a:schemeClr val="accent1"/>
+          </a:fillRef>
+          <a:effectRef idx="0">
+            <a:schemeClr val="accent1"/>
+          </a:effectRef>
+          <a:fontRef idx="minor">
+            <a:schemeClr val="lt1"/>
+          </a:fontRef>
+        </p:style>
+        <p:txBody>
+          <a:bodyPr lIns="36000" tIns="36000" rIns="36000" bIns="36000" rtlCol="0" anchor="t" anchorCtr="0"/>
+          <a:lstStyle/>
+          <a:p>
+            <a:pPr algn="ctr"/>
+            <a:r>
+              <a:rPr lang="nb-NO" sz="800" dirty="0" err="1">
+                <a:solidFill>
+                  <a:schemeClr val="tx1"/>
+                </a:solidFill>
+                <a:latin typeface="Arial" panose="020B0604020202020204" pitchFamily="34" charset="0"/>
+                <a:cs typeface="Arial" panose="020B0604020202020204" pitchFamily="34" charset="0"/>
+              </a:rPr>
+              <a:t>Partial</a:t>
+            </a:r>
+            <a:r>
+              <a:rPr lang="nb-NO" sz="800" dirty="0">
+                <a:solidFill>
+                  <a:schemeClr val="tx1"/>
+                </a:solidFill>
+                <a:latin typeface="Arial" panose="020B0604020202020204" pitchFamily="34" charset="0"/>
+                <a:cs typeface="Arial" panose="020B0604020202020204" pitchFamily="34" charset="0"/>
+              </a:rPr>
+              <a:t> </a:t>
+            </a:r>
+            <a:r>
+              <a:rPr lang="nb-NO" sz="800" dirty="0" err="1">
+                <a:solidFill>
+                  <a:schemeClr val="tx1"/>
+                </a:solidFill>
+                <a:latin typeface="Arial" panose="020B0604020202020204" pitchFamily="34" charset="0"/>
+                <a:cs typeface="Arial" panose="020B0604020202020204" pitchFamily="34" charset="0"/>
+              </a:rPr>
+              <a:t>coverage</a:t>
+            </a:r>
+            <a:r>
+              <a:rPr lang="nb-NO" sz="800" dirty="0">
+                <a:solidFill>
+                  <a:schemeClr val="tx1"/>
+                </a:solidFill>
+                <a:latin typeface="Arial" panose="020B0604020202020204" pitchFamily="34" charset="0"/>
+                <a:cs typeface="Arial" panose="020B0604020202020204" pitchFamily="34" charset="0"/>
+              </a:rPr>
+              <a:t> 1</a:t>
+            </a:r>
+          </a:p>
+        </p:txBody>
+      </p:sp>
+      <p:sp>
+        <p:nvSpPr>
+          <p:cNvPr id="16" name="Rektangel 15">
+            <a:extLst>
+              <a:ext uri="{FF2B5EF4-FFF2-40B4-BE49-F238E27FC236}">
+                <a16:creationId xmlns:a16="http://schemas.microsoft.com/office/drawing/2014/main" id="{6190F4EC-E699-4F22-8832-91FDB460FDC3}"/>
+              </a:ext>
+            </a:extLst>
+          </p:cNvPr>
+          <p:cNvSpPr/>
+          <p:nvPr/>
+        </p:nvSpPr>
+        <p:spPr>
+          <a:xfrm>
+            <a:off x="3328211" y="1319863"/>
+            <a:ext cx="980910" cy="576669"/>
+          </a:xfrm>
+          <a:prstGeom prst="rect">
+            <a:avLst/>
+          </a:prstGeom>
+          <a:solidFill>
+            <a:schemeClr val="bg1">
+              <a:lumMod val="85000"/>
+            </a:schemeClr>
+          </a:solidFill>
+          <a:ln>
+            <a:solidFill>
+              <a:schemeClr val="tx1"/>
+            </a:solidFill>
+          </a:ln>
+        </p:spPr>
+        <p:style>
+          <a:lnRef idx="2">
+            <a:schemeClr val="accent1">
+              <a:shade val="50000"/>
+            </a:schemeClr>
+          </a:lnRef>
+          <a:fillRef idx="1">
+            <a:schemeClr val="accent1"/>
+          </a:fillRef>
+          <a:effectRef idx="0">
+            <a:schemeClr val="accent1"/>
+          </a:effectRef>
+          <a:fontRef idx="minor">
+            <a:schemeClr val="lt1"/>
+          </a:fontRef>
+        </p:style>
+        <p:txBody>
+          <a:bodyPr lIns="36000" tIns="36000" rIns="36000" bIns="36000" rtlCol="0" anchor="t" anchorCtr="0"/>
+          <a:lstStyle/>
+          <a:p>
+            <a:pPr algn="ctr"/>
+            <a:r>
+              <a:rPr lang="nb-NO" sz="800" dirty="0" err="1">
+                <a:solidFill>
+                  <a:schemeClr val="tx1"/>
+                </a:solidFill>
+                <a:latin typeface="Arial" panose="020B0604020202020204" pitchFamily="34" charset="0"/>
+                <a:cs typeface="Arial" panose="020B0604020202020204" pitchFamily="34" charset="0"/>
+              </a:rPr>
+              <a:t>Testcase</a:t>
+            </a:r>
+            <a:r>
+              <a:rPr lang="nb-NO" sz="800" dirty="0">
+                <a:solidFill>
+                  <a:schemeClr val="tx1"/>
+                </a:solidFill>
+                <a:latin typeface="Arial" panose="020B0604020202020204" pitchFamily="34" charset="0"/>
+                <a:cs typeface="Arial" panose="020B0604020202020204" pitchFamily="34" charset="0"/>
+              </a:rPr>
+              <a:t> 1</a:t>
+            </a:r>
+          </a:p>
+        </p:txBody>
+      </p:sp>
+      <p:sp>
+        <p:nvSpPr>
+          <p:cNvPr id="17" name="Rektangel 16">
+            <a:extLst>
+              <a:ext uri="{FF2B5EF4-FFF2-40B4-BE49-F238E27FC236}">
+                <a16:creationId xmlns:a16="http://schemas.microsoft.com/office/drawing/2014/main" id="{2E8C3254-94D4-4C5A-8701-D5F201D3E624}"/>
+              </a:ext>
+            </a:extLst>
+          </p:cNvPr>
+          <p:cNvSpPr/>
+          <p:nvPr/>
+        </p:nvSpPr>
+        <p:spPr>
+          <a:xfrm>
+            <a:off x="3353611" y="1357494"/>
+            <a:ext cx="980910" cy="576669"/>
+          </a:xfrm>
+          <a:prstGeom prst="rect">
+            <a:avLst/>
+          </a:prstGeom>
+          <a:solidFill>
+            <a:schemeClr val="bg1">
+              <a:lumMod val="85000"/>
+            </a:schemeClr>
+          </a:solidFill>
+          <a:ln>
+            <a:solidFill>
+              <a:schemeClr val="tx1"/>
+            </a:solidFill>
+          </a:ln>
+        </p:spPr>
+        <p:style>
+          <a:lnRef idx="2">
+            <a:schemeClr val="accent1">
+              <a:shade val="50000"/>
+            </a:schemeClr>
+          </a:lnRef>
+          <a:fillRef idx="1">
+            <a:schemeClr val="accent1"/>
+          </a:fillRef>
+          <a:effectRef idx="0">
+            <a:schemeClr val="accent1"/>
+          </a:effectRef>
+          <a:fontRef idx="minor">
+            <a:schemeClr val="lt1"/>
+          </a:fontRef>
+        </p:style>
+        <p:txBody>
+          <a:bodyPr lIns="36000" tIns="36000" rIns="36000" bIns="36000" rtlCol="0" anchor="t" anchorCtr="0"/>
+          <a:lstStyle/>
+          <a:p>
+            <a:pPr algn="ctr"/>
+            <a:r>
+              <a:rPr lang="nb-NO" sz="800" dirty="0" err="1">
+                <a:solidFill>
+                  <a:schemeClr val="tx1"/>
+                </a:solidFill>
+                <a:latin typeface="Arial" panose="020B0604020202020204" pitchFamily="34" charset="0"/>
+                <a:cs typeface="Arial" panose="020B0604020202020204" pitchFamily="34" charset="0"/>
+              </a:rPr>
+              <a:t>Testcase</a:t>
+            </a:r>
+            <a:r>
+              <a:rPr lang="nb-NO" sz="800" dirty="0">
+                <a:solidFill>
+                  <a:schemeClr val="tx1"/>
+                </a:solidFill>
+                <a:latin typeface="Arial" panose="020B0604020202020204" pitchFamily="34" charset="0"/>
+                <a:cs typeface="Arial" panose="020B0604020202020204" pitchFamily="34" charset="0"/>
+              </a:rPr>
+              <a:t> 1</a:t>
+            </a:r>
+          </a:p>
+        </p:txBody>
+      </p:sp>
+      <p:sp>
+        <p:nvSpPr>
+          <p:cNvPr id="18" name="Rektangel 17">
+            <a:extLst>
+              <a:ext uri="{FF2B5EF4-FFF2-40B4-BE49-F238E27FC236}">
+                <a16:creationId xmlns:a16="http://schemas.microsoft.com/office/drawing/2014/main" id="{F780C12F-907D-4958-B454-7B97747161E0}"/>
+              </a:ext>
+            </a:extLst>
+          </p:cNvPr>
+          <p:cNvSpPr/>
+          <p:nvPr/>
+        </p:nvSpPr>
+        <p:spPr>
+          <a:xfrm>
+            <a:off x="3379011" y="1395125"/>
+            <a:ext cx="980910" cy="576669"/>
+          </a:xfrm>
+          <a:prstGeom prst="rect">
+            <a:avLst/>
+          </a:prstGeom>
+          <a:solidFill>
+            <a:schemeClr val="bg1">
+              <a:lumMod val="85000"/>
+            </a:schemeClr>
+          </a:solidFill>
+          <a:ln>
+            <a:solidFill>
+              <a:schemeClr val="tx1"/>
+            </a:solidFill>
+          </a:ln>
+        </p:spPr>
+        <p:style>
+          <a:lnRef idx="2">
+            <a:schemeClr val="accent1">
+              <a:shade val="50000"/>
+            </a:schemeClr>
+          </a:lnRef>
+          <a:fillRef idx="1">
+            <a:schemeClr val="accent1"/>
+          </a:fillRef>
+          <a:effectRef idx="0">
+            <a:schemeClr val="accent1"/>
+          </a:effectRef>
+          <a:fontRef idx="minor">
+            <a:schemeClr val="lt1"/>
+          </a:fontRef>
+        </p:style>
+        <p:txBody>
+          <a:bodyPr lIns="36000" tIns="36000" rIns="36000" bIns="36000" rtlCol="0" anchor="t" anchorCtr="0"/>
+          <a:lstStyle/>
+          <a:p>
+            <a:pPr algn="ctr"/>
+            <a:r>
+              <a:rPr lang="nb-NO" sz="800" dirty="0" err="1">
+                <a:solidFill>
+                  <a:schemeClr val="tx1"/>
+                </a:solidFill>
+                <a:latin typeface="Arial" panose="020B0604020202020204" pitchFamily="34" charset="0"/>
+                <a:cs typeface="Arial" panose="020B0604020202020204" pitchFamily="34" charset="0"/>
+              </a:rPr>
+              <a:t>Testcase</a:t>
+            </a:r>
+            <a:r>
+              <a:rPr lang="nb-NO" sz="800" dirty="0">
+                <a:solidFill>
+                  <a:schemeClr val="tx1"/>
+                </a:solidFill>
+                <a:latin typeface="Arial" panose="020B0604020202020204" pitchFamily="34" charset="0"/>
+                <a:cs typeface="Arial" panose="020B0604020202020204" pitchFamily="34" charset="0"/>
+              </a:rPr>
+              <a:t> 1</a:t>
+            </a:r>
+          </a:p>
+        </p:txBody>
+      </p:sp>
+      <p:sp>
+        <p:nvSpPr>
+          <p:cNvPr id="19" name="Rektangel 18">
+            <a:extLst>
+              <a:ext uri="{FF2B5EF4-FFF2-40B4-BE49-F238E27FC236}">
+                <a16:creationId xmlns:a16="http://schemas.microsoft.com/office/drawing/2014/main" id="{ED569A9E-19C4-4576-A467-0D2245399325}"/>
+              </a:ext>
+            </a:extLst>
+          </p:cNvPr>
+          <p:cNvSpPr/>
+          <p:nvPr/>
+        </p:nvSpPr>
+        <p:spPr>
+          <a:xfrm>
+            <a:off x="3421756" y="1432756"/>
+            <a:ext cx="980910" cy="576669"/>
+          </a:xfrm>
+          <a:prstGeom prst="rect">
+            <a:avLst/>
+          </a:prstGeom>
+          <a:solidFill>
+            <a:schemeClr val="bg1">
+              <a:lumMod val="85000"/>
+            </a:schemeClr>
+          </a:solidFill>
+          <a:ln>
+            <a:solidFill>
+              <a:schemeClr val="tx1"/>
+            </a:solidFill>
+          </a:ln>
+        </p:spPr>
+        <p:style>
+          <a:lnRef idx="2">
+            <a:schemeClr val="accent1">
+              <a:shade val="50000"/>
+            </a:schemeClr>
+          </a:lnRef>
+          <a:fillRef idx="1">
+            <a:schemeClr val="accent1"/>
+          </a:fillRef>
+          <a:effectRef idx="0">
+            <a:schemeClr val="accent1"/>
+          </a:effectRef>
+          <a:fontRef idx="minor">
+            <a:schemeClr val="lt1"/>
+          </a:fontRef>
+        </p:style>
+        <p:txBody>
+          <a:bodyPr lIns="36000" tIns="36000" rIns="36000" bIns="36000" rtlCol="0" anchor="t" anchorCtr="0"/>
+          <a:lstStyle/>
+          <a:p>
+            <a:pPr algn="ctr"/>
+            <a:r>
+              <a:rPr lang="nb-NO" sz="800" dirty="0" err="1">
+                <a:solidFill>
+                  <a:schemeClr val="tx1"/>
+                </a:solidFill>
+                <a:latin typeface="Arial" panose="020B0604020202020204" pitchFamily="34" charset="0"/>
+                <a:cs typeface="Arial" panose="020B0604020202020204" pitchFamily="34" charset="0"/>
+              </a:rPr>
+              <a:t>Partial</a:t>
+            </a:r>
+            <a:r>
+              <a:rPr lang="nb-NO" sz="800" dirty="0">
+                <a:solidFill>
+                  <a:schemeClr val="tx1"/>
+                </a:solidFill>
+                <a:latin typeface="Arial" panose="020B0604020202020204" pitchFamily="34" charset="0"/>
+                <a:cs typeface="Arial" panose="020B0604020202020204" pitchFamily="34" charset="0"/>
+              </a:rPr>
+              <a:t> </a:t>
+            </a:r>
+            <a:r>
+              <a:rPr lang="nb-NO" sz="800" dirty="0" err="1">
+                <a:solidFill>
+                  <a:schemeClr val="tx1"/>
+                </a:solidFill>
+                <a:latin typeface="Arial" panose="020B0604020202020204" pitchFamily="34" charset="0"/>
+                <a:cs typeface="Arial" panose="020B0604020202020204" pitchFamily="34" charset="0"/>
+              </a:rPr>
+              <a:t>coverage</a:t>
+            </a:r>
+            <a:r>
+              <a:rPr lang="nb-NO" sz="800" dirty="0">
+                <a:solidFill>
+                  <a:schemeClr val="tx1"/>
+                </a:solidFill>
+                <a:latin typeface="Arial" panose="020B0604020202020204" pitchFamily="34" charset="0"/>
+                <a:cs typeface="Arial" panose="020B0604020202020204" pitchFamily="34" charset="0"/>
+              </a:rPr>
+              <a:t> N</a:t>
+            </a:r>
+          </a:p>
+          <a:p>
+            <a:pPr algn="ctr"/>
+            <a:endParaRPr lang="nb-NO" sz="800" dirty="0">
+              <a:solidFill>
+                <a:schemeClr val="tx1"/>
+              </a:solidFill>
+              <a:latin typeface="Arial" panose="020B0604020202020204" pitchFamily="34" charset="0"/>
+              <a:cs typeface="Arial" panose="020B0604020202020204" pitchFamily="34" charset="0"/>
+            </a:endParaRPr>
+          </a:p>
+          <a:p>
+            <a:pPr algn="ctr"/>
+            <a:r>
+              <a:rPr lang="nb-NO" sz="800" dirty="0">
+                <a:solidFill>
+                  <a:schemeClr val="tx1"/>
+                </a:solidFill>
+                <a:latin typeface="Arial" panose="020B0604020202020204" pitchFamily="34" charset="0"/>
+                <a:cs typeface="Arial" panose="020B0604020202020204" pitchFamily="34" charset="0"/>
+              </a:rPr>
+              <a:t>(CSV)</a:t>
+            </a:r>
+          </a:p>
+        </p:txBody>
+      </p:sp>
+      <p:cxnSp>
+        <p:nvCxnSpPr>
+          <p:cNvPr id="23" name="Rett pilkobling 22">
+            <a:extLst>
+              <a:ext uri="{FF2B5EF4-FFF2-40B4-BE49-F238E27FC236}">
+                <a16:creationId xmlns:a16="http://schemas.microsoft.com/office/drawing/2014/main" id="{1F6A1EEB-4D4F-47F0-851E-44510BD3FE22}"/>
+              </a:ext>
+            </a:extLst>
+          </p:cNvPr>
+          <p:cNvCxnSpPr>
+            <a:cxnSpLocks/>
+          </p:cNvCxnSpPr>
+          <p:nvPr/>
+        </p:nvCxnSpPr>
+        <p:spPr>
+          <a:xfrm>
+            <a:off x="2979855" y="1395513"/>
+            <a:ext cx="352910" cy="0"/>
+          </a:xfrm>
+          <a:prstGeom prst="straightConnector1">
+            <a:avLst/>
+          </a:prstGeom>
+          <a:ln w="12700">
+            <a:solidFill>
+              <a:schemeClr val="tx1"/>
+            </a:solidFill>
+            <a:tailEnd type="triangle"/>
+          </a:ln>
+        </p:spPr>
+        <p:style>
+          <a:lnRef idx="1">
+            <a:schemeClr val="accent1"/>
+          </a:lnRef>
+          <a:fillRef idx="0">
+            <a:schemeClr val="accent1"/>
+          </a:fillRef>
+          <a:effectRef idx="0">
+            <a:schemeClr val="accent1"/>
+          </a:effectRef>
+          <a:fontRef idx="minor">
+            <a:schemeClr val="tx1"/>
+          </a:fontRef>
+        </p:style>
+      </p:cxnSp>
+      <p:cxnSp>
+        <p:nvCxnSpPr>
+          <p:cNvPr id="24" name="Rett pilkobling 23">
+            <a:extLst>
+              <a:ext uri="{FF2B5EF4-FFF2-40B4-BE49-F238E27FC236}">
+                <a16:creationId xmlns:a16="http://schemas.microsoft.com/office/drawing/2014/main" id="{D333830A-547C-4FB8-AAD6-BB386D4D6C74}"/>
+              </a:ext>
+            </a:extLst>
+          </p:cNvPr>
+          <p:cNvCxnSpPr>
+            <a:cxnSpLocks/>
+          </p:cNvCxnSpPr>
+          <p:nvPr/>
+        </p:nvCxnSpPr>
+        <p:spPr>
+          <a:xfrm>
+            <a:off x="3005255" y="1448202"/>
+            <a:ext cx="352910" cy="0"/>
+          </a:xfrm>
+          <a:prstGeom prst="straightConnector1">
+            <a:avLst/>
+          </a:prstGeom>
+          <a:ln w="12700">
+            <a:solidFill>
+              <a:schemeClr val="tx1"/>
+            </a:solidFill>
+            <a:tailEnd type="triangle"/>
+          </a:ln>
+        </p:spPr>
+        <p:style>
+          <a:lnRef idx="1">
+            <a:schemeClr val="accent1"/>
+          </a:lnRef>
+          <a:fillRef idx="0">
+            <a:schemeClr val="accent1"/>
+          </a:fillRef>
+          <a:effectRef idx="0">
+            <a:schemeClr val="accent1"/>
+          </a:effectRef>
+          <a:fontRef idx="minor">
+            <a:schemeClr val="tx1"/>
+          </a:fontRef>
+        </p:style>
+      </p:cxnSp>
+      <p:cxnSp>
+        <p:nvCxnSpPr>
+          <p:cNvPr id="25" name="Rett pilkobling 24">
+            <a:extLst>
+              <a:ext uri="{FF2B5EF4-FFF2-40B4-BE49-F238E27FC236}">
+                <a16:creationId xmlns:a16="http://schemas.microsoft.com/office/drawing/2014/main" id="{F8D29FF9-C94E-4604-94E7-208CAFEC3647}"/>
+              </a:ext>
+            </a:extLst>
+          </p:cNvPr>
+          <p:cNvCxnSpPr>
+            <a:cxnSpLocks/>
+          </p:cNvCxnSpPr>
+          <p:nvPr/>
+        </p:nvCxnSpPr>
+        <p:spPr>
+          <a:xfrm>
+            <a:off x="3030655" y="1490533"/>
+            <a:ext cx="352910" cy="0"/>
+          </a:xfrm>
+          <a:prstGeom prst="straightConnector1">
+            <a:avLst/>
+          </a:prstGeom>
+          <a:ln w="12700">
+            <a:solidFill>
+              <a:schemeClr val="tx1"/>
+            </a:solidFill>
+            <a:tailEnd type="triangle"/>
+          </a:ln>
+        </p:spPr>
+        <p:style>
+          <a:lnRef idx="1">
+            <a:schemeClr val="accent1"/>
+          </a:lnRef>
+          <a:fillRef idx="0">
+            <a:schemeClr val="accent1"/>
+          </a:fillRef>
+          <a:effectRef idx="0">
+            <a:schemeClr val="accent1"/>
+          </a:effectRef>
+          <a:fontRef idx="minor">
+            <a:schemeClr val="tx1"/>
+          </a:fontRef>
+        </p:style>
+      </p:cxnSp>
+      <p:cxnSp>
+        <p:nvCxnSpPr>
+          <p:cNvPr id="26" name="Rett pilkobling 25">
+            <a:extLst>
+              <a:ext uri="{FF2B5EF4-FFF2-40B4-BE49-F238E27FC236}">
+                <a16:creationId xmlns:a16="http://schemas.microsoft.com/office/drawing/2014/main" id="{3CB2A524-8198-4923-823B-55F77E3C3E38}"/>
+              </a:ext>
+            </a:extLst>
+          </p:cNvPr>
+          <p:cNvCxnSpPr>
+            <a:cxnSpLocks/>
+          </p:cNvCxnSpPr>
+          <p:nvPr/>
+        </p:nvCxnSpPr>
+        <p:spPr>
+          <a:xfrm>
+            <a:off x="3056053" y="1524395"/>
+            <a:ext cx="352910" cy="0"/>
+          </a:xfrm>
+          <a:prstGeom prst="straightConnector1">
+            <a:avLst/>
+          </a:prstGeom>
+          <a:ln w="12700">
+            <a:solidFill>
+              <a:schemeClr val="tx1"/>
+            </a:solidFill>
+            <a:tailEnd type="triangle"/>
+          </a:ln>
+        </p:spPr>
+        <p:style>
+          <a:lnRef idx="1">
+            <a:schemeClr val="accent1"/>
+          </a:lnRef>
+          <a:fillRef idx="0">
+            <a:schemeClr val="accent1"/>
+          </a:fillRef>
+          <a:effectRef idx="0">
+            <a:schemeClr val="accent1"/>
+          </a:effectRef>
+          <a:fontRef idx="minor">
+            <a:schemeClr val="tx1"/>
+          </a:fontRef>
+        </p:style>
+      </p:cxnSp>
+      <p:cxnSp>
+        <p:nvCxnSpPr>
+          <p:cNvPr id="27" name="Rett pilkobling 26">
+            <a:extLst>
+              <a:ext uri="{FF2B5EF4-FFF2-40B4-BE49-F238E27FC236}">
+                <a16:creationId xmlns:a16="http://schemas.microsoft.com/office/drawing/2014/main" id="{4C028495-3A09-4B35-8860-5A38B5F76866}"/>
+              </a:ext>
+            </a:extLst>
+          </p:cNvPr>
+          <p:cNvCxnSpPr>
+            <a:cxnSpLocks/>
+          </p:cNvCxnSpPr>
+          <p:nvPr/>
+        </p:nvCxnSpPr>
+        <p:spPr>
+          <a:xfrm>
+            <a:off x="3073400" y="1583260"/>
+            <a:ext cx="352910" cy="0"/>
+          </a:xfrm>
+          <a:prstGeom prst="straightConnector1">
+            <a:avLst/>
+          </a:prstGeom>
+          <a:ln w="12700">
+            <a:solidFill>
+              <a:schemeClr val="tx1"/>
+            </a:solidFill>
+            <a:tailEnd type="triangle"/>
+          </a:ln>
+        </p:spPr>
+        <p:style>
+          <a:lnRef idx="1">
+            <a:schemeClr val="accent1"/>
+          </a:lnRef>
+          <a:fillRef idx="0">
+            <a:schemeClr val="accent1"/>
+          </a:fillRef>
+          <a:effectRef idx="0">
+            <a:schemeClr val="accent1"/>
+          </a:effectRef>
+          <a:fontRef idx="minor">
+            <a:schemeClr val="tx1"/>
+          </a:fontRef>
+        </p:style>
+      </p:cxnSp>
+      <p:sp>
+        <p:nvSpPr>
+          <p:cNvPr id="78" name="Rektangel 77">
+            <a:extLst>
+              <a:ext uri="{FF2B5EF4-FFF2-40B4-BE49-F238E27FC236}">
+                <a16:creationId xmlns:a16="http://schemas.microsoft.com/office/drawing/2014/main" id="{0ED75388-B70C-4429-814C-02FD73E0D219}"/>
+              </a:ext>
+            </a:extLst>
+          </p:cNvPr>
+          <p:cNvSpPr/>
+          <p:nvPr/>
+        </p:nvSpPr>
+        <p:spPr>
+          <a:xfrm>
+            <a:off x="2252963" y="1091261"/>
+            <a:ext cx="684564" cy="576669"/>
+          </a:xfrm>
+          <a:prstGeom prst="rect">
+            <a:avLst/>
+          </a:prstGeom>
+          <a:solidFill>
+            <a:schemeClr val="bg1"/>
+          </a:solidFill>
+          <a:ln>
+            <a:solidFill>
+              <a:schemeClr val="tx1"/>
+            </a:solidFill>
+          </a:ln>
+        </p:spPr>
+        <p:style>
+          <a:lnRef idx="2">
+            <a:schemeClr val="accent1">
+              <a:shade val="50000"/>
+            </a:schemeClr>
+          </a:lnRef>
+          <a:fillRef idx="1">
+            <a:schemeClr val="accent1"/>
+          </a:fillRef>
+          <a:effectRef idx="0">
+            <a:schemeClr val="accent1"/>
+          </a:effectRef>
+          <a:fontRef idx="minor">
+            <a:schemeClr val="lt1"/>
+          </a:fontRef>
+        </p:style>
+        <p:txBody>
+          <a:bodyPr lIns="36000" tIns="36000" rIns="36000" bIns="36000" rtlCol="0" anchor="t" anchorCtr="0"/>
+          <a:lstStyle/>
+          <a:p>
+            <a:pPr algn="ctr"/>
+            <a:r>
+              <a:rPr lang="nb-NO" sz="800" dirty="0" err="1">
+                <a:solidFill>
+                  <a:schemeClr val="tx1"/>
+                </a:solidFill>
+                <a:latin typeface="Arial" panose="020B0604020202020204" pitchFamily="34" charset="0"/>
+                <a:cs typeface="Arial" panose="020B0604020202020204" pitchFamily="34" charset="0"/>
+              </a:rPr>
+              <a:t>Testcase</a:t>
+            </a:r>
+            <a:r>
+              <a:rPr lang="nb-NO" sz="800" dirty="0">
+                <a:solidFill>
+                  <a:schemeClr val="tx1"/>
+                </a:solidFill>
+                <a:latin typeface="Arial" panose="020B0604020202020204" pitchFamily="34" charset="0"/>
+                <a:cs typeface="Arial" panose="020B0604020202020204" pitchFamily="34" charset="0"/>
+              </a:rPr>
+              <a:t> 1</a:t>
+            </a:r>
+          </a:p>
+        </p:txBody>
+      </p:sp>
+      <p:sp>
+        <p:nvSpPr>
+          <p:cNvPr id="10" name="Rektangel 9">
+            <a:extLst>
+              <a:ext uri="{FF2B5EF4-FFF2-40B4-BE49-F238E27FC236}">
+                <a16:creationId xmlns:a16="http://schemas.microsoft.com/office/drawing/2014/main" id="{BD5267BA-EE1C-447D-98FF-558B470C2C58}"/>
+              </a:ext>
+            </a:extLst>
+          </p:cNvPr>
+          <p:cNvSpPr/>
+          <p:nvPr/>
+        </p:nvSpPr>
+        <p:spPr>
+          <a:xfrm>
+            <a:off x="2295291" y="1319863"/>
+            <a:ext cx="684564" cy="576669"/>
+          </a:xfrm>
+          <a:prstGeom prst="rect">
+            <a:avLst/>
+          </a:prstGeom>
+          <a:solidFill>
+            <a:schemeClr val="bg1"/>
+          </a:solidFill>
+          <a:ln>
+            <a:solidFill>
+              <a:schemeClr val="tx1"/>
+            </a:solidFill>
+          </a:ln>
+        </p:spPr>
+        <p:style>
+          <a:lnRef idx="2">
+            <a:schemeClr val="accent1">
+              <a:shade val="50000"/>
+            </a:schemeClr>
+          </a:lnRef>
+          <a:fillRef idx="1">
+            <a:schemeClr val="accent1"/>
+          </a:fillRef>
+          <a:effectRef idx="0">
+            <a:schemeClr val="accent1"/>
+          </a:effectRef>
+          <a:fontRef idx="minor">
+            <a:schemeClr val="lt1"/>
+          </a:fontRef>
+        </p:style>
+        <p:txBody>
+          <a:bodyPr lIns="36000" tIns="36000" rIns="36000" bIns="36000" rtlCol="0" anchor="t" anchorCtr="0"/>
+          <a:lstStyle/>
+          <a:p>
+            <a:pPr algn="ctr"/>
+            <a:r>
+              <a:rPr lang="nb-NO" sz="800" dirty="0" err="1">
+                <a:solidFill>
+                  <a:schemeClr val="tx1"/>
+                </a:solidFill>
+                <a:latin typeface="Arial" panose="020B0604020202020204" pitchFamily="34" charset="0"/>
+                <a:cs typeface="Arial" panose="020B0604020202020204" pitchFamily="34" charset="0"/>
+              </a:rPr>
+              <a:t>Testcase</a:t>
+            </a:r>
+            <a:r>
+              <a:rPr lang="nb-NO" sz="800" dirty="0">
+                <a:solidFill>
+                  <a:schemeClr val="tx1"/>
+                </a:solidFill>
+                <a:latin typeface="Arial" panose="020B0604020202020204" pitchFamily="34" charset="0"/>
+                <a:cs typeface="Arial" panose="020B0604020202020204" pitchFamily="34" charset="0"/>
+              </a:rPr>
+              <a:t> 1</a:t>
+            </a:r>
+          </a:p>
+        </p:txBody>
+      </p:sp>
+      <p:sp>
+        <p:nvSpPr>
+          <p:cNvPr id="11" name="Rektangel 10">
+            <a:extLst>
+              <a:ext uri="{FF2B5EF4-FFF2-40B4-BE49-F238E27FC236}">
+                <a16:creationId xmlns:a16="http://schemas.microsoft.com/office/drawing/2014/main" id="{E9DD90E3-E443-415A-AEEC-75CE3CE510DF}"/>
+              </a:ext>
+            </a:extLst>
+          </p:cNvPr>
+          <p:cNvSpPr/>
+          <p:nvPr/>
+        </p:nvSpPr>
+        <p:spPr>
+          <a:xfrm>
+            <a:off x="2320691" y="1357494"/>
+            <a:ext cx="684564" cy="576669"/>
+          </a:xfrm>
+          <a:prstGeom prst="rect">
+            <a:avLst/>
+          </a:prstGeom>
+          <a:solidFill>
+            <a:schemeClr val="bg1"/>
+          </a:solidFill>
+          <a:ln>
+            <a:solidFill>
+              <a:schemeClr val="tx1"/>
+            </a:solidFill>
+          </a:ln>
+        </p:spPr>
+        <p:style>
+          <a:lnRef idx="2">
+            <a:schemeClr val="accent1">
+              <a:shade val="50000"/>
+            </a:schemeClr>
+          </a:lnRef>
+          <a:fillRef idx="1">
+            <a:schemeClr val="accent1"/>
+          </a:fillRef>
+          <a:effectRef idx="0">
+            <a:schemeClr val="accent1"/>
+          </a:effectRef>
+          <a:fontRef idx="minor">
+            <a:schemeClr val="lt1"/>
+          </a:fontRef>
+        </p:style>
+        <p:txBody>
+          <a:bodyPr lIns="36000" tIns="36000" rIns="36000" bIns="36000" rtlCol="0" anchor="t" anchorCtr="0"/>
+          <a:lstStyle/>
+          <a:p>
+            <a:pPr algn="ctr"/>
+            <a:r>
+              <a:rPr lang="nb-NO" sz="800" dirty="0" err="1">
+                <a:solidFill>
+                  <a:schemeClr val="tx1"/>
+                </a:solidFill>
+                <a:latin typeface="Arial" panose="020B0604020202020204" pitchFamily="34" charset="0"/>
+                <a:cs typeface="Arial" panose="020B0604020202020204" pitchFamily="34" charset="0"/>
+              </a:rPr>
+              <a:t>Testcase</a:t>
+            </a:r>
+            <a:r>
+              <a:rPr lang="nb-NO" sz="800" dirty="0">
+                <a:solidFill>
+                  <a:schemeClr val="tx1"/>
+                </a:solidFill>
+                <a:latin typeface="Arial" panose="020B0604020202020204" pitchFamily="34" charset="0"/>
+                <a:cs typeface="Arial" panose="020B0604020202020204" pitchFamily="34" charset="0"/>
+              </a:rPr>
+              <a:t> 1</a:t>
+            </a:r>
+          </a:p>
+        </p:txBody>
+      </p:sp>
+      <p:sp>
+        <p:nvSpPr>
+          <p:cNvPr id="12" name="Rektangel 11">
+            <a:extLst>
+              <a:ext uri="{FF2B5EF4-FFF2-40B4-BE49-F238E27FC236}">
+                <a16:creationId xmlns:a16="http://schemas.microsoft.com/office/drawing/2014/main" id="{4F613B7D-A72D-4C1E-B96A-62F3F4DF2737}"/>
+              </a:ext>
+            </a:extLst>
+          </p:cNvPr>
+          <p:cNvSpPr/>
+          <p:nvPr/>
+        </p:nvSpPr>
+        <p:spPr>
+          <a:xfrm>
+            <a:off x="2346091" y="1395125"/>
+            <a:ext cx="684564" cy="576669"/>
+          </a:xfrm>
+          <a:prstGeom prst="rect">
+            <a:avLst/>
+          </a:prstGeom>
+          <a:solidFill>
+            <a:schemeClr val="bg1"/>
+          </a:solidFill>
+          <a:ln>
+            <a:solidFill>
+              <a:schemeClr val="tx1"/>
+            </a:solidFill>
+          </a:ln>
+        </p:spPr>
+        <p:style>
+          <a:lnRef idx="2">
+            <a:schemeClr val="accent1">
+              <a:shade val="50000"/>
+            </a:schemeClr>
+          </a:lnRef>
+          <a:fillRef idx="1">
+            <a:schemeClr val="accent1"/>
+          </a:fillRef>
+          <a:effectRef idx="0">
+            <a:schemeClr val="accent1"/>
+          </a:effectRef>
+          <a:fontRef idx="minor">
+            <a:schemeClr val="lt1"/>
+          </a:fontRef>
+        </p:style>
+        <p:txBody>
+          <a:bodyPr lIns="36000" tIns="36000" rIns="36000" bIns="36000" rtlCol="0" anchor="t" anchorCtr="0"/>
+          <a:lstStyle/>
+          <a:p>
+            <a:pPr algn="ctr"/>
+            <a:r>
+              <a:rPr lang="nb-NO" sz="800" dirty="0" err="1">
+                <a:solidFill>
+                  <a:schemeClr val="tx1"/>
+                </a:solidFill>
+                <a:latin typeface="Arial" panose="020B0604020202020204" pitchFamily="34" charset="0"/>
+                <a:cs typeface="Arial" panose="020B0604020202020204" pitchFamily="34" charset="0"/>
+              </a:rPr>
+              <a:t>Testcase</a:t>
+            </a:r>
+            <a:r>
+              <a:rPr lang="nb-NO" sz="800" dirty="0">
+                <a:solidFill>
+                  <a:schemeClr val="tx1"/>
+                </a:solidFill>
+                <a:latin typeface="Arial" panose="020B0604020202020204" pitchFamily="34" charset="0"/>
+                <a:cs typeface="Arial" panose="020B0604020202020204" pitchFamily="34" charset="0"/>
+              </a:rPr>
+              <a:t> 1</a:t>
+            </a:r>
+          </a:p>
+        </p:txBody>
+      </p:sp>
+      <p:sp>
+        <p:nvSpPr>
+          <p:cNvPr id="13" name="Rektangel 12">
+            <a:extLst>
+              <a:ext uri="{FF2B5EF4-FFF2-40B4-BE49-F238E27FC236}">
+                <a16:creationId xmlns:a16="http://schemas.microsoft.com/office/drawing/2014/main" id="{9BDA61FB-3CFA-45FE-94A8-2F549A7292CD}"/>
+              </a:ext>
+            </a:extLst>
+          </p:cNvPr>
+          <p:cNvSpPr/>
+          <p:nvPr/>
+        </p:nvSpPr>
+        <p:spPr>
+          <a:xfrm>
+            <a:off x="2388836" y="1432756"/>
+            <a:ext cx="684564" cy="576669"/>
+          </a:xfrm>
+          <a:prstGeom prst="rect">
+            <a:avLst/>
+          </a:prstGeom>
+          <a:solidFill>
+            <a:schemeClr val="bg1"/>
+          </a:solidFill>
+          <a:ln>
+            <a:solidFill>
+              <a:schemeClr val="tx1"/>
+            </a:solidFill>
+          </a:ln>
+        </p:spPr>
+        <p:style>
+          <a:lnRef idx="2">
+            <a:schemeClr val="accent1">
+              <a:shade val="50000"/>
+            </a:schemeClr>
+          </a:lnRef>
+          <a:fillRef idx="1">
+            <a:schemeClr val="accent1"/>
+          </a:fillRef>
+          <a:effectRef idx="0">
+            <a:schemeClr val="accent1"/>
+          </a:effectRef>
+          <a:fontRef idx="minor">
+            <a:schemeClr val="lt1"/>
+          </a:fontRef>
+        </p:style>
+        <p:txBody>
+          <a:bodyPr lIns="36000" tIns="36000" rIns="36000" bIns="36000" rtlCol="0" anchor="t" anchorCtr="0"/>
+          <a:lstStyle/>
+          <a:p>
+            <a:pPr algn="ctr"/>
+            <a:r>
+              <a:rPr lang="nb-NO" sz="800" dirty="0" err="1">
+                <a:solidFill>
+                  <a:schemeClr val="tx1"/>
+                </a:solidFill>
+                <a:latin typeface="Arial" panose="020B0604020202020204" pitchFamily="34" charset="0"/>
+                <a:cs typeface="Arial" panose="020B0604020202020204" pitchFamily="34" charset="0"/>
+              </a:rPr>
+              <a:t>Testcase</a:t>
+            </a:r>
+            <a:r>
+              <a:rPr lang="nb-NO" sz="800" dirty="0">
+                <a:solidFill>
+                  <a:schemeClr val="tx1"/>
+                </a:solidFill>
+                <a:latin typeface="Arial" panose="020B0604020202020204" pitchFamily="34" charset="0"/>
+                <a:cs typeface="Arial" panose="020B0604020202020204" pitchFamily="34" charset="0"/>
+              </a:rPr>
+              <a:t> N</a:t>
+            </a:r>
+          </a:p>
+          <a:p>
+            <a:pPr algn="ctr"/>
+            <a:endParaRPr lang="nb-NO" sz="800" dirty="0">
+              <a:solidFill>
+                <a:schemeClr val="tx1"/>
+              </a:solidFill>
+              <a:latin typeface="Arial" panose="020B0604020202020204" pitchFamily="34" charset="0"/>
+              <a:cs typeface="Arial" panose="020B0604020202020204" pitchFamily="34" charset="0"/>
+            </a:endParaRPr>
+          </a:p>
+          <a:p>
+            <a:pPr algn="ctr"/>
+            <a:r>
+              <a:rPr lang="nb-NO" sz="800" dirty="0">
+                <a:solidFill>
+                  <a:schemeClr val="tx1"/>
+                </a:solidFill>
+                <a:latin typeface="Arial" panose="020B0604020202020204" pitchFamily="34" charset="0"/>
+                <a:cs typeface="Arial" panose="020B0604020202020204" pitchFamily="34" charset="0"/>
+              </a:rPr>
+              <a:t>(VHDL)</a:t>
+            </a:r>
+          </a:p>
+        </p:txBody>
+      </p:sp>
+      <p:cxnSp>
+        <p:nvCxnSpPr>
+          <p:cNvPr id="20" name="Rett pilkobling 19">
+            <a:extLst>
+              <a:ext uri="{FF2B5EF4-FFF2-40B4-BE49-F238E27FC236}">
+                <a16:creationId xmlns:a16="http://schemas.microsoft.com/office/drawing/2014/main" id="{DB76E76A-36FB-4B4C-86A2-A692C12902B3}"/>
+              </a:ext>
+            </a:extLst>
+          </p:cNvPr>
+          <p:cNvCxnSpPr>
+            <a:cxnSpLocks/>
+          </p:cNvCxnSpPr>
+          <p:nvPr/>
+        </p:nvCxnSpPr>
+        <p:spPr>
+          <a:xfrm>
+            <a:off x="2929469" y="1177255"/>
+            <a:ext cx="352910" cy="0"/>
+          </a:xfrm>
+          <a:prstGeom prst="straightConnector1">
+            <a:avLst/>
+          </a:prstGeom>
+          <a:ln w="12700">
+            <a:solidFill>
+              <a:schemeClr val="tx1"/>
+            </a:solidFill>
+            <a:tailEnd type="triangle"/>
+          </a:ln>
+        </p:spPr>
+        <p:style>
+          <a:lnRef idx="1">
+            <a:schemeClr val="accent1"/>
+          </a:lnRef>
+          <a:fillRef idx="0">
+            <a:schemeClr val="accent1"/>
+          </a:fillRef>
+          <a:effectRef idx="0">
+            <a:schemeClr val="accent1"/>
+          </a:effectRef>
+          <a:fontRef idx="minor">
+            <a:schemeClr val="tx1"/>
+          </a:fontRef>
+        </p:style>
+      </p:cxnSp>
+      <p:sp>
+        <p:nvSpPr>
+          <p:cNvPr id="38" name="Rektangel 37">
+            <a:extLst>
+              <a:ext uri="{FF2B5EF4-FFF2-40B4-BE49-F238E27FC236}">
+                <a16:creationId xmlns:a16="http://schemas.microsoft.com/office/drawing/2014/main" id="{A5F6BEEF-11E4-4433-B664-D4AA0FBE9EF3}"/>
+              </a:ext>
+            </a:extLst>
+          </p:cNvPr>
+          <p:cNvSpPr/>
+          <p:nvPr/>
+        </p:nvSpPr>
+        <p:spPr>
+          <a:xfrm>
+            <a:off x="5569021" y="1090322"/>
+            <a:ext cx="684564" cy="576669"/>
+          </a:xfrm>
+          <a:prstGeom prst="rect">
+            <a:avLst/>
+          </a:prstGeom>
+          <a:solidFill>
+            <a:schemeClr val="bg1">
+              <a:lumMod val="85000"/>
+            </a:schemeClr>
+          </a:solidFill>
+          <a:ln>
+            <a:solidFill>
+              <a:schemeClr val="tx1"/>
+            </a:solidFill>
+          </a:ln>
+        </p:spPr>
+        <p:style>
+          <a:lnRef idx="2">
+            <a:schemeClr val="accent1">
+              <a:shade val="50000"/>
+            </a:schemeClr>
+          </a:lnRef>
+          <a:fillRef idx="1">
+            <a:schemeClr val="accent1"/>
+          </a:fillRef>
+          <a:effectRef idx="0">
+            <a:schemeClr val="accent1"/>
+          </a:effectRef>
+          <a:fontRef idx="minor">
+            <a:schemeClr val="lt1"/>
+          </a:fontRef>
+        </p:style>
+        <p:txBody>
+          <a:bodyPr lIns="36000" tIns="36000" rIns="36000" bIns="36000" rtlCol="0" anchor="t" anchorCtr="0"/>
+          <a:lstStyle/>
+          <a:p>
+            <a:pPr algn="ctr"/>
+            <a:r>
+              <a:rPr lang="nb-NO" sz="800" dirty="0" err="1">
+                <a:solidFill>
+                  <a:schemeClr val="tx1"/>
+                </a:solidFill>
+                <a:latin typeface="Arial" panose="020B0604020202020204" pitchFamily="34" charset="0"/>
+                <a:cs typeface="Arial" panose="020B0604020202020204" pitchFamily="34" charset="0"/>
+              </a:rPr>
+              <a:t>Specification</a:t>
+            </a:r>
+            <a:r>
+              <a:rPr lang="nb-NO" sz="800" dirty="0">
+                <a:solidFill>
+                  <a:schemeClr val="tx1"/>
+                </a:solidFill>
+                <a:latin typeface="Arial" panose="020B0604020202020204" pitchFamily="34" charset="0"/>
+                <a:cs typeface="Arial" panose="020B0604020202020204" pitchFamily="34" charset="0"/>
+              </a:rPr>
+              <a:t> </a:t>
+            </a:r>
+            <a:r>
+              <a:rPr lang="nb-NO" sz="800" dirty="0" err="1">
+                <a:solidFill>
+                  <a:schemeClr val="tx1"/>
+                </a:solidFill>
+                <a:latin typeface="Arial" panose="020B0604020202020204" pitchFamily="34" charset="0"/>
+                <a:cs typeface="Arial" panose="020B0604020202020204" pitchFamily="34" charset="0"/>
+              </a:rPr>
+              <a:t>coverage</a:t>
+            </a:r>
+            <a:endParaRPr lang="nb-NO" sz="800" dirty="0">
+              <a:solidFill>
+                <a:schemeClr val="tx1"/>
+              </a:solidFill>
+              <a:latin typeface="Arial" panose="020B0604020202020204" pitchFamily="34" charset="0"/>
+              <a:cs typeface="Arial" panose="020B0604020202020204" pitchFamily="34" charset="0"/>
+            </a:endParaRPr>
+          </a:p>
+          <a:p>
+            <a:pPr algn="ctr"/>
+            <a:endParaRPr lang="nb-NO" sz="800" dirty="0">
+              <a:solidFill>
+                <a:schemeClr val="tx1"/>
+              </a:solidFill>
+              <a:latin typeface="Arial" panose="020B0604020202020204" pitchFamily="34" charset="0"/>
+              <a:cs typeface="Arial" panose="020B0604020202020204" pitchFamily="34" charset="0"/>
+            </a:endParaRPr>
+          </a:p>
+          <a:p>
+            <a:pPr algn="ctr"/>
+            <a:r>
+              <a:rPr lang="nb-NO" sz="800" dirty="0">
+                <a:solidFill>
+                  <a:schemeClr val="tx1"/>
+                </a:solidFill>
+                <a:latin typeface="Arial" panose="020B0604020202020204" pitchFamily="34" charset="0"/>
+                <a:cs typeface="Arial" panose="020B0604020202020204" pitchFamily="34" charset="0"/>
+              </a:rPr>
+              <a:t>(CSV)</a:t>
+            </a:r>
+          </a:p>
+        </p:txBody>
+      </p:sp>
+      <p:cxnSp>
+        <p:nvCxnSpPr>
+          <p:cNvPr id="39" name="Rett pilkobling 38">
+            <a:extLst>
+              <a:ext uri="{FF2B5EF4-FFF2-40B4-BE49-F238E27FC236}">
+                <a16:creationId xmlns:a16="http://schemas.microsoft.com/office/drawing/2014/main" id="{127D1084-8E80-4116-ABEA-13AA0A20F2AF}"/>
+              </a:ext>
+            </a:extLst>
+          </p:cNvPr>
+          <p:cNvCxnSpPr>
+            <a:cxnSpLocks/>
+          </p:cNvCxnSpPr>
+          <p:nvPr/>
+        </p:nvCxnSpPr>
+        <p:spPr>
+          <a:xfrm>
+            <a:off x="5165725" y="1319863"/>
+            <a:ext cx="403296" cy="0"/>
+          </a:xfrm>
+          <a:prstGeom prst="straightConnector1">
+            <a:avLst/>
+          </a:prstGeom>
+          <a:ln w="12700">
+            <a:solidFill>
+              <a:schemeClr val="tx1"/>
+            </a:solidFill>
+            <a:tailEnd type="triangle"/>
+          </a:ln>
+        </p:spPr>
+        <p:style>
+          <a:lnRef idx="1">
+            <a:schemeClr val="accent1"/>
+          </a:lnRef>
+          <a:fillRef idx="0">
+            <a:schemeClr val="accent1"/>
+          </a:fillRef>
+          <a:effectRef idx="0">
+            <a:schemeClr val="accent1"/>
+          </a:effectRef>
+          <a:fontRef idx="minor">
+            <a:schemeClr val="tx1"/>
+          </a:fontRef>
+        </p:style>
+      </p:cxnSp>
+      <p:sp>
+        <p:nvSpPr>
+          <p:cNvPr id="34" name="Rektangel 33">
+            <a:extLst>
+              <a:ext uri="{FF2B5EF4-FFF2-40B4-BE49-F238E27FC236}">
+                <a16:creationId xmlns:a16="http://schemas.microsoft.com/office/drawing/2014/main" id="{3657661F-C54B-4C05-A7C0-81D18239A9F8}"/>
+              </a:ext>
+            </a:extLst>
+          </p:cNvPr>
+          <p:cNvSpPr/>
+          <p:nvPr/>
+        </p:nvSpPr>
+        <p:spPr>
+          <a:xfrm>
+            <a:off x="4648212" y="1091261"/>
+            <a:ext cx="603315" cy="918162"/>
+          </a:xfrm>
+          <a:prstGeom prst="rect">
+            <a:avLst/>
+          </a:prstGeom>
+          <a:solidFill>
+            <a:schemeClr val="bg1"/>
+          </a:solidFill>
+          <a:ln>
+            <a:solidFill>
+              <a:schemeClr val="tx1"/>
+            </a:solidFill>
+          </a:ln>
+        </p:spPr>
+        <p:style>
+          <a:lnRef idx="2">
+            <a:schemeClr val="accent1">
+              <a:shade val="50000"/>
+            </a:schemeClr>
+          </a:lnRef>
+          <a:fillRef idx="1">
+            <a:schemeClr val="accent1"/>
+          </a:fillRef>
+          <a:effectRef idx="0">
+            <a:schemeClr val="accent1"/>
+          </a:effectRef>
+          <a:fontRef idx="minor">
+            <a:schemeClr val="lt1"/>
+          </a:fontRef>
+        </p:style>
+        <p:txBody>
+          <a:bodyPr lIns="36000" tIns="36000" rIns="36000" bIns="36000" rtlCol="0" anchor="t" anchorCtr="0"/>
+          <a:lstStyle/>
+          <a:p>
+            <a:pPr algn="ctr"/>
+            <a:r>
+              <a:rPr lang="nb-NO" sz="800" dirty="0">
+                <a:solidFill>
+                  <a:schemeClr val="tx1"/>
+                </a:solidFill>
+                <a:latin typeface="Arial" panose="020B0604020202020204" pitchFamily="34" charset="0"/>
+                <a:cs typeface="Arial" panose="020B0604020202020204" pitchFamily="34" charset="0"/>
+              </a:rPr>
+              <a:t>Post </a:t>
+            </a:r>
+            <a:r>
+              <a:rPr lang="nb-NO" sz="800" dirty="0" err="1">
+                <a:solidFill>
+                  <a:schemeClr val="tx1"/>
+                </a:solidFill>
+                <a:latin typeface="Arial" panose="020B0604020202020204" pitchFamily="34" charset="0"/>
+                <a:cs typeface="Arial" panose="020B0604020202020204" pitchFamily="34" charset="0"/>
+              </a:rPr>
+              <a:t>processing</a:t>
+            </a:r>
+            <a:endParaRPr lang="nb-NO" sz="800" dirty="0">
+              <a:solidFill>
+                <a:schemeClr val="tx1"/>
+              </a:solidFill>
+              <a:latin typeface="Arial" panose="020B0604020202020204" pitchFamily="34" charset="0"/>
+              <a:cs typeface="Arial" panose="020B0604020202020204" pitchFamily="34" charset="0"/>
+            </a:endParaRPr>
+          </a:p>
+          <a:p>
+            <a:pPr algn="ctr"/>
+            <a:endParaRPr lang="nb-NO" sz="800" dirty="0">
+              <a:solidFill>
+                <a:schemeClr val="tx1"/>
+              </a:solidFill>
+              <a:latin typeface="Arial" panose="020B0604020202020204" pitchFamily="34" charset="0"/>
+              <a:cs typeface="Arial" panose="020B0604020202020204" pitchFamily="34" charset="0"/>
+            </a:endParaRPr>
+          </a:p>
+          <a:p>
+            <a:pPr algn="ctr"/>
+            <a:r>
+              <a:rPr lang="nb-NO" sz="800" dirty="0">
+                <a:solidFill>
+                  <a:schemeClr val="tx1"/>
+                </a:solidFill>
+                <a:latin typeface="Arial" panose="020B0604020202020204" pitchFamily="34" charset="0"/>
+                <a:cs typeface="Arial" panose="020B0604020202020204" pitchFamily="34" charset="0"/>
+              </a:rPr>
+              <a:t>(Python)</a:t>
+            </a:r>
+          </a:p>
+        </p:txBody>
+      </p:sp>
+      <p:sp>
+        <p:nvSpPr>
+          <p:cNvPr id="41" name="Rektangel 40">
+            <a:extLst>
+              <a:ext uri="{FF2B5EF4-FFF2-40B4-BE49-F238E27FC236}">
+                <a16:creationId xmlns:a16="http://schemas.microsoft.com/office/drawing/2014/main" id="{D896FDC8-96F3-4267-9311-6E889F7F5306}"/>
+              </a:ext>
+            </a:extLst>
+          </p:cNvPr>
+          <p:cNvSpPr/>
+          <p:nvPr/>
+        </p:nvSpPr>
+        <p:spPr>
+          <a:xfrm>
+            <a:off x="1407926" y="1253067"/>
+            <a:ext cx="657539" cy="413924"/>
+          </a:xfrm>
+          <a:prstGeom prst="rect">
+            <a:avLst/>
+          </a:prstGeom>
+          <a:solidFill>
+            <a:schemeClr val="bg1">
+              <a:lumMod val="85000"/>
+            </a:schemeClr>
+          </a:solidFill>
+          <a:ln>
+            <a:solidFill>
+              <a:schemeClr val="tx1"/>
+            </a:solidFill>
+          </a:ln>
+        </p:spPr>
+        <p:style>
+          <a:lnRef idx="2">
+            <a:schemeClr val="accent1">
+              <a:shade val="50000"/>
+            </a:schemeClr>
+          </a:lnRef>
+          <a:fillRef idx="1">
+            <a:schemeClr val="accent1"/>
+          </a:fillRef>
+          <a:effectRef idx="0">
+            <a:schemeClr val="accent1"/>
+          </a:effectRef>
+          <a:fontRef idx="minor">
+            <a:schemeClr val="lt1"/>
+          </a:fontRef>
+        </p:style>
+        <p:txBody>
+          <a:bodyPr lIns="36000" tIns="36000" rIns="36000" bIns="36000" rtlCol="0" anchor="t" anchorCtr="0"/>
+          <a:lstStyle/>
+          <a:p>
+            <a:pPr algn="ctr"/>
+            <a:r>
+              <a:rPr lang="nb-NO" sz="800" dirty="0" err="1">
+                <a:solidFill>
+                  <a:schemeClr val="tx1"/>
+                </a:solidFill>
+                <a:latin typeface="Arial" panose="020B0604020202020204" pitchFamily="34" charset="0"/>
+                <a:cs typeface="Arial" panose="020B0604020202020204" pitchFamily="34" charset="0"/>
+              </a:rPr>
+              <a:t>Requirement</a:t>
+            </a:r>
+            <a:r>
+              <a:rPr lang="nb-NO" sz="800" dirty="0">
+                <a:solidFill>
+                  <a:schemeClr val="tx1"/>
+                </a:solidFill>
+                <a:latin typeface="Arial" panose="020B0604020202020204" pitchFamily="34" charset="0"/>
+                <a:cs typeface="Arial" panose="020B0604020202020204" pitchFamily="34" charset="0"/>
+              </a:rPr>
+              <a:t> list</a:t>
+            </a:r>
+          </a:p>
+          <a:p>
+            <a:pPr algn="ctr"/>
+            <a:r>
+              <a:rPr lang="nb-NO" sz="800" dirty="0">
+                <a:solidFill>
+                  <a:schemeClr val="tx1"/>
+                </a:solidFill>
+                <a:latin typeface="Arial" panose="020B0604020202020204" pitchFamily="34" charset="0"/>
+                <a:cs typeface="Arial" panose="020B0604020202020204" pitchFamily="34" charset="0"/>
+              </a:rPr>
+              <a:t>(CSV)</a:t>
+            </a:r>
+          </a:p>
+        </p:txBody>
+      </p:sp>
+      <p:sp>
+        <p:nvSpPr>
+          <p:cNvPr id="9" name="Pil: høyre 8">
+            <a:extLst>
+              <a:ext uri="{FF2B5EF4-FFF2-40B4-BE49-F238E27FC236}">
+                <a16:creationId xmlns:a16="http://schemas.microsoft.com/office/drawing/2014/main" id="{CCD5D356-7741-460D-AAFC-83244A6F7780}"/>
+              </a:ext>
+            </a:extLst>
+          </p:cNvPr>
+          <p:cNvSpPr/>
+          <p:nvPr/>
+        </p:nvSpPr>
+        <p:spPr>
+          <a:xfrm>
+            <a:off x="2065465" y="1395125"/>
+            <a:ext cx="202878" cy="129270"/>
+          </a:xfrm>
+          <a:prstGeom prst="rightArrow">
+            <a:avLst/>
+          </a:prstGeom>
+        </p:spPr>
+        <p:style>
+          <a:lnRef idx="2">
+            <a:schemeClr val="accent1">
+              <a:shade val="50000"/>
+            </a:schemeClr>
+          </a:lnRef>
+          <a:fillRef idx="1">
+            <a:schemeClr val="accent1"/>
+          </a:fillRef>
+          <a:effectRef idx="0">
+            <a:schemeClr val="accent1"/>
+          </a:effectRef>
+          <a:fontRef idx="minor">
+            <a:schemeClr val="lt1"/>
+          </a:fontRef>
+        </p:style>
+        <p:txBody>
+          <a:bodyPr rtlCol="0" anchor="ctr"/>
+          <a:lstStyle/>
+          <a:p>
+            <a:pPr algn="ctr"/>
+            <a:endParaRPr lang="en-GB"/>
+          </a:p>
+        </p:txBody>
+      </p:sp>
+      <p:sp>
+        <p:nvSpPr>
+          <p:cNvPr id="43" name="Pil: høyre 42">
+            <a:extLst>
+              <a:ext uri="{FF2B5EF4-FFF2-40B4-BE49-F238E27FC236}">
+                <a16:creationId xmlns:a16="http://schemas.microsoft.com/office/drawing/2014/main" id="{124536DD-60CC-4D9A-9646-EEC0EBBCB749}"/>
+              </a:ext>
+            </a:extLst>
+          </p:cNvPr>
+          <p:cNvSpPr/>
+          <p:nvPr/>
+        </p:nvSpPr>
+        <p:spPr>
+          <a:xfrm>
+            <a:off x="2082148" y="1434353"/>
+            <a:ext cx="297008" cy="90042"/>
+          </a:xfrm>
+          <a:prstGeom prst="rightArrow">
+            <a:avLst/>
+          </a:prstGeom>
+        </p:spPr>
+        <p:style>
+          <a:lnRef idx="2">
+            <a:schemeClr val="accent1">
+              <a:shade val="50000"/>
+            </a:schemeClr>
+          </a:lnRef>
+          <a:fillRef idx="1">
+            <a:schemeClr val="accent1"/>
+          </a:fillRef>
+          <a:effectRef idx="0">
+            <a:schemeClr val="accent1"/>
+          </a:effectRef>
+          <a:fontRef idx="minor">
+            <a:schemeClr val="lt1"/>
+          </a:fontRef>
+        </p:style>
+        <p:txBody>
+          <a:bodyPr rtlCol="0" anchor="ctr"/>
+          <a:lstStyle/>
+          <a:p>
+            <a:pPr algn="ctr"/>
+            <a:endParaRPr lang="en-GB"/>
+          </a:p>
+        </p:txBody>
+      </p:sp>
+    </p:spTree>
+    <p:extLst>
+      <p:ext uri="{BB962C8B-B14F-4D97-AF65-F5344CB8AC3E}">
+        <p14:creationId xmlns:p14="http://schemas.microsoft.com/office/powerpoint/2010/main" val="849268121"/>
       </p:ext>
     </p:extLst>
   </p:cSld>

</xml_diff>

<commit_message>
SPEC_COV: changed call to register_spec_cov(), updated internal TB, figures, QR and code. Updated golden
</commit_message>
<xml_diff>
--- a/bitvis_vip_spec_cov/doc/Figures.pptx
+++ b/bitvis_vip_spec_cov/doc/Figures.pptx
@@ -261,7 +261,7 @@
           <a:p>
             <a:fld id="{BCA49E38-FF81-43B3-86DC-4B20814BC221}" type="datetimeFigureOut">
               <a:rPr lang="nb-NO" smtClean="0"/>
-              <a:t>06.02.2020</a:t>
+              <a:t>21.02.2020</a:t>
             </a:fld>
             <a:endParaRPr lang="nb-NO"/>
           </a:p>
@@ -459,7 +459,7 @@
           <a:p>
             <a:fld id="{BCA49E38-FF81-43B3-86DC-4B20814BC221}" type="datetimeFigureOut">
               <a:rPr lang="nb-NO" smtClean="0"/>
-              <a:t>06.02.2020</a:t>
+              <a:t>21.02.2020</a:t>
             </a:fld>
             <a:endParaRPr lang="nb-NO"/>
           </a:p>
@@ -667,7 +667,7 @@
           <a:p>
             <a:fld id="{BCA49E38-FF81-43B3-86DC-4B20814BC221}" type="datetimeFigureOut">
               <a:rPr lang="nb-NO" smtClean="0"/>
-              <a:t>06.02.2020</a:t>
+              <a:t>21.02.2020</a:t>
             </a:fld>
             <a:endParaRPr lang="nb-NO"/>
           </a:p>
@@ -865,7 +865,7 @@
           <a:p>
             <a:fld id="{BCA49E38-FF81-43B3-86DC-4B20814BC221}" type="datetimeFigureOut">
               <a:rPr lang="nb-NO" smtClean="0"/>
-              <a:t>06.02.2020</a:t>
+              <a:t>21.02.2020</a:t>
             </a:fld>
             <a:endParaRPr lang="nb-NO"/>
           </a:p>
@@ -1140,7 +1140,7 @@
           <a:p>
             <a:fld id="{BCA49E38-FF81-43B3-86DC-4B20814BC221}" type="datetimeFigureOut">
               <a:rPr lang="nb-NO" smtClean="0"/>
-              <a:t>06.02.2020</a:t>
+              <a:t>21.02.2020</a:t>
             </a:fld>
             <a:endParaRPr lang="nb-NO"/>
           </a:p>
@@ -1405,7 +1405,7 @@
           <a:p>
             <a:fld id="{BCA49E38-FF81-43B3-86DC-4B20814BC221}" type="datetimeFigureOut">
               <a:rPr lang="nb-NO" smtClean="0"/>
-              <a:t>06.02.2020</a:t>
+              <a:t>21.02.2020</a:t>
             </a:fld>
             <a:endParaRPr lang="nb-NO"/>
           </a:p>
@@ -1817,7 +1817,7 @@
           <a:p>
             <a:fld id="{BCA49E38-FF81-43B3-86DC-4B20814BC221}" type="datetimeFigureOut">
               <a:rPr lang="nb-NO" smtClean="0"/>
-              <a:t>06.02.2020</a:t>
+              <a:t>21.02.2020</a:t>
             </a:fld>
             <a:endParaRPr lang="nb-NO"/>
           </a:p>
@@ -1958,7 +1958,7 @@
           <a:p>
             <a:fld id="{BCA49E38-FF81-43B3-86DC-4B20814BC221}" type="datetimeFigureOut">
               <a:rPr lang="nb-NO" smtClean="0"/>
-              <a:t>06.02.2020</a:t>
+              <a:t>21.02.2020</a:t>
             </a:fld>
             <a:endParaRPr lang="nb-NO"/>
           </a:p>
@@ -2071,7 +2071,7 @@
           <a:p>
             <a:fld id="{BCA49E38-FF81-43B3-86DC-4B20814BC221}" type="datetimeFigureOut">
               <a:rPr lang="nb-NO" smtClean="0"/>
-              <a:t>06.02.2020</a:t>
+              <a:t>21.02.2020</a:t>
             </a:fld>
             <a:endParaRPr lang="nb-NO"/>
           </a:p>
@@ -2382,7 +2382,7 @@
           <a:p>
             <a:fld id="{BCA49E38-FF81-43B3-86DC-4B20814BC221}" type="datetimeFigureOut">
               <a:rPr lang="nb-NO" smtClean="0"/>
-              <a:t>06.02.2020</a:t>
+              <a:t>21.02.2020</a:t>
             </a:fld>
             <a:endParaRPr lang="nb-NO"/>
           </a:p>
@@ -2670,7 +2670,7 @@
           <a:p>
             <a:fld id="{BCA49E38-FF81-43B3-86DC-4B20814BC221}" type="datetimeFigureOut">
               <a:rPr lang="nb-NO" smtClean="0"/>
-              <a:t>06.02.2020</a:t>
+              <a:t>21.02.2020</a:t>
             </a:fld>
             <a:endParaRPr lang="nb-NO"/>
           </a:p>
@@ -2911,7 +2911,7 @@
           <a:p>
             <a:fld id="{BCA49E38-FF81-43B3-86DC-4B20814BC221}" type="datetimeFigureOut">
               <a:rPr lang="nb-NO" smtClean="0"/>
-              <a:t>06.02.2020</a:t>
+              <a:t>21.02.2020</a:t>
             </a:fld>
             <a:endParaRPr lang="nb-NO"/>
           </a:p>
@@ -4926,7 +4926,7 @@
                 <a:latin typeface="Arial" panose="020B0604020202020204" pitchFamily="34" charset="0"/>
                 <a:cs typeface="Arial" panose="020B0604020202020204" pitchFamily="34" charset="0"/>
               </a:rPr>
-              <a:t>                   File </a:t>
+              <a:t>                                File </a:t>
             </a:r>
             <a:r>
               <a:rPr lang="nb-NO" sz="800" b="1" dirty="0" err="1">
@@ -4946,7 +4946,7 @@
                 <a:latin typeface="Arial" panose="020B0604020202020204" pitchFamily="34" charset="0"/>
                 <a:cs typeface="Arial" panose="020B0604020202020204" pitchFamily="34" charset="0"/>
               </a:rPr>
-              <a:t>                                                                          </a:t>
+              <a:t>                                                            </a:t>
             </a:r>
             <a:r>
               <a:rPr lang="nb-NO" sz="800" b="1" dirty="0" err="1">
@@ -5498,7 +5498,7 @@
                 <a:latin typeface="Arial" panose="020B0604020202020204" pitchFamily="34" charset="0"/>
                 <a:cs typeface="Arial" panose="020B0604020202020204" pitchFamily="34" charset="0"/>
               </a:rPr>
-              <a:t>log_req_cov</a:t>
+              <a:t>register_req_cov</a:t>
             </a:r>
             <a:r>
               <a:rPr lang="nb-NO" sz="800" dirty="0">
@@ -5518,7 +5518,7 @@
                 <a:latin typeface="Arial" panose="020B0604020202020204" pitchFamily="34" charset="0"/>
                 <a:cs typeface="Arial" panose="020B0604020202020204" pitchFamily="34" charset="0"/>
               </a:rPr>
-              <a:t>log_req_cov</a:t>
+              <a:t>register_req_cov</a:t>
             </a:r>
             <a:r>
               <a:rPr lang="nb-NO" sz="800" dirty="0">
@@ -5608,7 +5608,7 @@
                 <a:latin typeface="Arial" panose="020B0604020202020204" pitchFamily="34" charset="0"/>
                 <a:cs typeface="Arial" panose="020B0604020202020204" pitchFamily="34" charset="0"/>
               </a:rPr>
-              <a:t>log_req_cov</a:t>
+              <a:t>register_req_cov</a:t>
             </a:r>
             <a:r>
               <a:rPr lang="nb-NO" sz="800" dirty="0">
@@ -11396,13 +11396,16 @@
           </a:p>
           <a:p>
             <a:pPr algn="ctr"/>
-            <a:endParaRPr lang="nb-NO" sz="800" dirty="0">
-              <a:solidFill>
-                <a:schemeClr val="tx1"/>
-              </a:solidFill>
-              <a:latin typeface="Arial" panose="020B0604020202020204" pitchFamily="34" charset="0"/>
-              <a:cs typeface="Arial" panose="020B0604020202020204" pitchFamily="34" charset="0"/>
-            </a:endParaRPr>
+            <a:r>
+              <a:rPr lang="nb-NO" sz="800" dirty="0">
+                <a:solidFill>
+                  <a:schemeClr val="tx1"/>
+                </a:solidFill>
+                <a:latin typeface="Arial" panose="020B0604020202020204" pitchFamily="34" charset="0"/>
+                <a:cs typeface="Arial" panose="020B0604020202020204" pitchFamily="34" charset="0"/>
+              </a:rPr>
+              <a:t>files</a:t>
+            </a:r>
           </a:p>
           <a:p>
             <a:pPr algn="ctr"/>
@@ -11746,6 +11749,51 @@
           </a:p>
         </p:txBody>
       </p:sp>
+      <p:cxnSp>
+        <p:nvCxnSpPr>
+          <p:cNvPr id="7" name="Vinkel 6">
+            <a:extLst>
+              <a:ext uri="{FF2B5EF4-FFF2-40B4-BE49-F238E27FC236}">
+                <a16:creationId xmlns:a16="http://schemas.microsoft.com/office/drawing/2014/main" id="{C1FDE432-E03A-DA4F-99D7-22B4090F09B2}"/>
+              </a:ext>
+            </a:extLst>
+          </p:cNvPr>
+          <p:cNvCxnSpPr>
+            <a:cxnSpLocks/>
+            <a:stCxn id="41" idx="0"/>
+            <a:endCxn id="34" idx="0"/>
+          </p:cNvCxnSpPr>
+          <p:nvPr/>
+        </p:nvCxnSpPr>
+        <p:spPr>
+          <a:xfrm rot="5400000" flipH="1" flipV="1">
+            <a:off x="3262380" y="-434423"/>
+            <a:ext cx="161806" cy="3213174"/>
+          </a:xfrm>
+          <a:prstGeom prst="bentConnector3">
+            <a:avLst>
+              <a:gd name="adj1" fmla="val 241280"/>
+            </a:avLst>
+          </a:prstGeom>
+          <a:ln>
+            <a:tailEnd type="triangle"/>
+          </a:ln>
+        </p:spPr>
+        <p:style>
+          <a:lnRef idx="1">
+            <a:schemeClr val="dk1"/>
+          </a:lnRef>
+          <a:fillRef idx="0">
+            <a:schemeClr val="dk1"/>
+          </a:fillRef>
+          <a:effectRef idx="0">
+            <a:schemeClr val="dk1"/>
+          </a:effectRef>
+          <a:fontRef idx="minor">
+            <a:schemeClr val="tx1"/>
+          </a:fontRef>
+        </p:style>
+      </p:cxnSp>
     </p:spTree>
     <p:extLst>
       <p:ext uri="{BB962C8B-B14F-4D97-AF65-F5344CB8AC3E}">

</xml_diff>

<commit_message>
BV_UVVM-846: changed register_req_cov() to tick_off_req_cov() in document, internal and public TBs, pkg.
</commit_message>
<xml_diff>
--- a/bitvis_vip_spec_cov/doc/Figures.pptx
+++ b/bitvis_vip_spec_cov/doc/Figures.pptx
@@ -261,7 +261,7 @@
           <a:p>
             <a:fld id="{BCA49E38-FF81-43B3-86DC-4B20814BC221}" type="datetimeFigureOut">
               <a:rPr lang="nb-NO" smtClean="0"/>
-              <a:t>21.02.2020</a:t>
+              <a:t>05.03.2020</a:t>
             </a:fld>
             <a:endParaRPr lang="nb-NO"/>
           </a:p>
@@ -459,7 +459,7 @@
           <a:p>
             <a:fld id="{BCA49E38-FF81-43B3-86DC-4B20814BC221}" type="datetimeFigureOut">
               <a:rPr lang="nb-NO" smtClean="0"/>
-              <a:t>21.02.2020</a:t>
+              <a:t>05.03.2020</a:t>
             </a:fld>
             <a:endParaRPr lang="nb-NO"/>
           </a:p>
@@ -667,7 +667,7 @@
           <a:p>
             <a:fld id="{BCA49E38-FF81-43B3-86DC-4B20814BC221}" type="datetimeFigureOut">
               <a:rPr lang="nb-NO" smtClean="0"/>
-              <a:t>21.02.2020</a:t>
+              <a:t>05.03.2020</a:t>
             </a:fld>
             <a:endParaRPr lang="nb-NO"/>
           </a:p>
@@ -865,7 +865,7 @@
           <a:p>
             <a:fld id="{BCA49E38-FF81-43B3-86DC-4B20814BC221}" type="datetimeFigureOut">
               <a:rPr lang="nb-NO" smtClean="0"/>
-              <a:t>21.02.2020</a:t>
+              <a:t>05.03.2020</a:t>
             </a:fld>
             <a:endParaRPr lang="nb-NO"/>
           </a:p>
@@ -1140,7 +1140,7 @@
           <a:p>
             <a:fld id="{BCA49E38-FF81-43B3-86DC-4B20814BC221}" type="datetimeFigureOut">
               <a:rPr lang="nb-NO" smtClean="0"/>
-              <a:t>21.02.2020</a:t>
+              <a:t>05.03.2020</a:t>
             </a:fld>
             <a:endParaRPr lang="nb-NO"/>
           </a:p>
@@ -1405,7 +1405,7 @@
           <a:p>
             <a:fld id="{BCA49E38-FF81-43B3-86DC-4B20814BC221}" type="datetimeFigureOut">
               <a:rPr lang="nb-NO" smtClean="0"/>
-              <a:t>21.02.2020</a:t>
+              <a:t>05.03.2020</a:t>
             </a:fld>
             <a:endParaRPr lang="nb-NO"/>
           </a:p>
@@ -1817,7 +1817,7 @@
           <a:p>
             <a:fld id="{BCA49E38-FF81-43B3-86DC-4B20814BC221}" type="datetimeFigureOut">
               <a:rPr lang="nb-NO" smtClean="0"/>
-              <a:t>21.02.2020</a:t>
+              <a:t>05.03.2020</a:t>
             </a:fld>
             <a:endParaRPr lang="nb-NO"/>
           </a:p>
@@ -1958,7 +1958,7 @@
           <a:p>
             <a:fld id="{BCA49E38-FF81-43B3-86DC-4B20814BC221}" type="datetimeFigureOut">
               <a:rPr lang="nb-NO" smtClean="0"/>
-              <a:t>21.02.2020</a:t>
+              <a:t>05.03.2020</a:t>
             </a:fld>
             <a:endParaRPr lang="nb-NO"/>
           </a:p>
@@ -2071,7 +2071,7 @@
           <a:p>
             <a:fld id="{BCA49E38-FF81-43B3-86DC-4B20814BC221}" type="datetimeFigureOut">
               <a:rPr lang="nb-NO" smtClean="0"/>
-              <a:t>21.02.2020</a:t>
+              <a:t>05.03.2020</a:t>
             </a:fld>
             <a:endParaRPr lang="nb-NO"/>
           </a:p>
@@ -2382,7 +2382,7 @@
           <a:p>
             <a:fld id="{BCA49E38-FF81-43B3-86DC-4B20814BC221}" type="datetimeFigureOut">
               <a:rPr lang="nb-NO" smtClean="0"/>
-              <a:t>21.02.2020</a:t>
+              <a:t>05.03.2020</a:t>
             </a:fld>
             <a:endParaRPr lang="nb-NO"/>
           </a:p>
@@ -2670,7 +2670,7 @@
           <a:p>
             <a:fld id="{BCA49E38-FF81-43B3-86DC-4B20814BC221}" type="datetimeFigureOut">
               <a:rPr lang="nb-NO" smtClean="0"/>
-              <a:t>21.02.2020</a:t>
+              <a:t>05.03.2020</a:t>
             </a:fld>
             <a:endParaRPr lang="nb-NO"/>
           </a:p>
@@ -2911,7 +2911,7 @@
           <a:p>
             <a:fld id="{BCA49E38-FF81-43B3-86DC-4B20814BC221}" type="datetimeFigureOut">
               <a:rPr lang="nb-NO" smtClean="0"/>
-              <a:t>21.02.2020</a:t>
+              <a:t>05.03.2020</a:t>
             </a:fld>
             <a:endParaRPr lang="nb-NO"/>
           </a:p>
@@ -5498,7 +5498,7 @@
                 <a:latin typeface="Arial" panose="020B0604020202020204" pitchFamily="34" charset="0"/>
                 <a:cs typeface="Arial" panose="020B0604020202020204" pitchFamily="34" charset="0"/>
               </a:rPr>
-              <a:t>register_req_cov</a:t>
+              <a:t>tick_off_req_cov</a:t>
             </a:r>
             <a:r>
               <a:rPr lang="nb-NO" sz="800" dirty="0">
@@ -5518,7 +5518,7 @@
                 <a:latin typeface="Arial" panose="020B0604020202020204" pitchFamily="34" charset="0"/>
                 <a:cs typeface="Arial" panose="020B0604020202020204" pitchFamily="34" charset="0"/>
               </a:rPr>
-              <a:t>register_req_cov</a:t>
+              <a:t>tick_off_req_cov</a:t>
             </a:r>
             <a:r>
               <a:rPr lang="nb-NO" sz="800" dirty="0">
@@ -7137,6 +7137,26 @@
                 <a:latin typeface="Arial" panose="020B0604020202020204" pitchFamily="34" charset="0"/>
                 <a:cs typeface="Arial" panose="020B0604020202020204" pitchFamily="34" charset="0"/>
               </a:rPr>
+              <a:t>&gt; [, &lt;</a:t>
+            </a:r>
+            <a:r>
+              <a:rPr lang="nb-NO" sz="800" dirty="0" err="1">
+                <a:solidFill>
+                  <a:schemeClr val="tx1"/>
+                </a:solidFill>
+                <a:latin typeface="Arial" panose="020B0604020202020204" pitchFamily="34" charset="0"/>
+                <a:cs typeface="Arial" panose="020B0604020202020204" pitchFamily="34" charset="0"/>
+              </a:rPr>
+              <a:t>Testcase-name</a:t>
+            </a:r>
+            <a:r>
+              <a:rPr lang="nb-NO" sz="800" dirty="0">
+                <a:solidFill>
+                  <a:schemeClr val="tx1"/>
+                </a:solidFill>
+                <a:latin typeface="Arial" panose="020B0604020202020204" pitchFamily="34" charset="0"/>
+                <a:cs typeface="Arial" panose="020B0604020202020204" pitchFamily="34" charset="0"/>
+              </a:rPr>
               <a:t>&gt;, &lt;</a:t>
             </a:r>
             <a:r>
@@ -7157,6 +7177,98 @@
                 <a:latin typeface="Arial" panose="020B0604020202020204" pitchFamily="34" charset="0"/>
                 <a:cs typeface="Arial" panose="020B0604020202020204" pitchFamily="34" charset="0"/>
               </a:rPr>
+              <a:t>&gt;, &lt;</a:t>
+            </a:r>
+            <a:r>
+              <a:rPr lang="nb-NO" sz="800" dirty="0" err="1">
+                <a:solidFill>
+                  <a:schemeClr val="tx1"/>
+                </a:solidFill>
+                <a:latin typeface="Arial" panose="020B0604020202020204" pitchFamily="34" charset="0"/>
+                <a:cs typeface="Arial" panose="020B0604020202020204" pitchFamily="34" charset="0"/>
+              </a:rPr>
+              <a:t>Testcase-name</a:t>
+            </a:r>
+            <a:r>
+              <a:rPr lang="nb-NO" sz="800" dirty="0">
+                <a:solidFill>
+                  <a:schemeClr val="tx1"/>
+                </a:solidFill>
+                <a:latin typeface="Arial" panose="020B0604020202020204" pitchFamily="34" charset="0"/>
+                <a:cs typeface="Arial" panose="020B0604020202020204" pitchFamily="34" charset="0"/>
+              </a:rPr>
+              <a:t>&gt;, …]</a:t>
+            </a:r>
+          </a:p>
+          <a:p>
+            <a:r>
+              <a:rPr lang="nb-NO" sz="800" dirty="0">
+                <a:solidFill>
+                  <a:schemeClr val="tx1"/>
+                </a:solidFill>
+                <a:latin typeface="Arial" panose="020B0604020202020204" pitchFamily="34" charset="0"/>
+                <a:cs typeface="Arial" panose="020B0604020202020204" pitchFamily="34" charset="0"/>
+              </a:rPr>
+              <a:t>&lt;</a:t>
+            </a:r>
+            <a:r>
+              <a:rPr lang="nb-NO" sz="800" dirty="0" err="1">
+                <a:solidFill>
+                  <a:schemeClr val="tx1"/>
+                </a:solidFill>
+                <a:latin typeface="Arial" panose="020B0604020202020204" pitchFamily="34" charset="0"/>
+                <a:cs typeface="Arial" panose="020B0604020202020204" pitchFamily="34" charset="0"/>
+              </a:rPr>
+              <a:t>Req</a:t>
+            </a:r>
+            <a:r>
+              <a:rPr lang="nb-NO" sz="800" dirty="0">
+                <a:solidFill>
+                  <a:schemeClr val="tx1"/>
+                </a:solidFill>
+                <a:latin typeface="Arial" panose="020B0604020202020204" pitchFamily="34" charset="0"/>
+                <a:cs typeface="Arial" panose="020B0604020202020204" pitchFamily="34" charset="0"/>
+              </a:rPr>
+              <a:t>. </a:t>
+            </a:r>
+            <a:r>
+              <a:rPr lang="nb-NO" sz="800" dirty="0" err="1">
+                <a:solidFill>
+                  <a:schemeClr val="tx1"/>
+                </a:solidFill>
+                <a:latin typeface="Arial" panose="020B0604020202020204" pitchFamily="34" charset="0"/>
+                <a:cs typeface="Arial" panose="020B0604020202020204" pitchFamily="34" charset="0"/>
+              </a:rPr>
+              <a:t>Label</a:t>
+            </a:r>
+            <a:r>
+              <a:rPr lang="nb-NO" sz="800" dirty="0">
+                <a:solidFill>
+                  <a:schemeClr val="tx1"/>
+                </a:solidFill>
+                <a:latin typeface="Arial" panose="020B0604020202020204" pitchFamily="34" charset="0"/>
+                <a:cs typeface="Arial" panose="020B0604020202020204" pitchFamily="34" charset="0"/>
+              </a:rPr>
+              <a:t>&gt;, &lt;</a:t>
+            </a:r>
+            <a:r>
+              <a:rPr lang="nb-NO" sz="800" dirty="0" err="1">
+                <a:solidFill>
+                  <a:schemeClr val="tx1"/>
+                </a:solidFill>
+                <a:latin typeface="Arial" panose="020B0604020202020204" pitchFamily="34" charset="0"/>
+                <a:cs typeface="Arial" panose="020B0604020202020204" pitchFamily="34" charset="0"/>
+              </a:rPr>
+              <a:t>Description</a:t>
+            </a:r>
+            <a:r>
+              <a:rPr lang="nb-NO" sz="800" dirty="0">
+                <a:solidFill>
+                  <a:schemeClr val="tx1"/>
+                </a:solidFill>
+                <a:latin typeface="Arial" panose="020B0604020202020204" pitchFamily="34" charset="0"/>
+                <a:cs typeface="Arial" panose="020B0604020202020204" pitchFamily="34" charset="0"/>
+              </a:rPr>
               <a:t>&gt; [, &lt;</a:t>
             </a:r>
             <a:r>
@@ -7178,118 +7290,6 @@
                 <a:cs typeface="Arial" panose="020B0604020202020204" pitchFamily="34" charset="0"/>
               </a:rPr>
               <a:t>&gt;, &lt;</a:t>
-            </a:r>
-            <a:r>
-              <a:rPr lang="nb-NO" sz="800" dirty="0" err="1">
-                <a:solidFill>
-                  <a:schemeClr val="tx1"/>
-                </a:solidFill>
-                <a:latin typeface="Arial" panose="020B0604020202020204" pitchFamily="34" charset="0"/>
-                <a:cs typeface="Arial" panose="020B0604020202020204" pitchFamily="34" charset="0"/>
-              </a:rPr>
-              <a:t>Testcase-name</a:t>
-            </a:r>
-            <a:r>
-              <a:rPr lang="nb-NO" sz="800" dirty="0">
-                <a:solidFill>
-                  <a:schemeClr val="tx1"/>
-                </a:solidFill>
-                <a:latin typeface="Arial" panose="020B0604020202020204" pitchFamily="34" charset="0"/>
-                <a:cs typeface="Arial" panose="020B0604020202020204" pitchFamily="34" charset="0"/>
-              </a:rPr>
-              <a:t>&gt;, …]</a:t>
-            </a:r>
-          </a:p>
-          <a:p>
-            <a:r>
-              <a:rPr lang="nb-NO" sz="800" dirty="0">
-                <a:solidFill>
-                  <a:schemeClr val="tx1"/>
-                </a:solidFill>
-                <a:latin typeface="Arial" panose="020B0604020202020204" pitchFamily="34" charset="0"/>
-                <a:cs typeface="Arial" panose="020B0604020202020204" pitchFamily="34" charset="0"/>
-              </a:rPr>
-              <a:t>&lt;</a:t>
-            </a:r>
-            <a:r>
-              <a:rPr lang="nb-NO" sz="800" dirty="0" err="1">
-                <a:solidFill>
-                  <a:schemeClr val="tx1"/>
-                </a:solidFill>
-                <a:latin typeface="Arial" panose="020B0604020202020204" pitchFamily="34" charset="0"/>
-                <a:cs typeface="Arial" panose="020B0604020202020204" pitchFamily="34" charset="0"/>
-              </a:rPr>
-              <a:t>Req</a:t>
-            </a:r>
-            <a:r>
-              <a:rPr lang="nb-NO" sz="800" dirty="0">
-                <a:solidFill>
-                  <a:schemeClr val="tx1"/>
-                </a:solidFill>
-                <a:latin typeface="Arial" panose="020B0604020202020204" pitchFamily="34" charset="0"/>
-                <a:cs typeface="Arial" panose="020B0604020202020204" pitchFamily="34" charset="0"/>
-              </a:rPr>
-              <a:t>. </a:t>
-            </a:r>
-            <a:r>
-              <a:rPr lang="nb-NO" sz="800" dirty="0" err="1">
-                <a:solidFill>
-                  <a:schemeClr val="tx1"/>
-                </a:solidFill>
-                <a:latin typeface="Arial" panose="020B0604020202020204" pitchFamily="34" charset="0"/>
-                <a:cs typeface="Arial" panose="020B0604020202020204" pitchFamily="34" charset="0"/>
-              </a:rPr>
-              <a:t>Label</a:t>
-            </a:r>
-            <a:r>
-              <a:rPr lang="nb-NO" sz="800" dirty="0">
-                <a:solidFill>
-                  <a:schemeClr val="tx1"/>
-                </a:solidFill>
-                <a:latin typeface="Arial" panose="020B0604020202020204" pitchFamily="34" charset="0"/>
-                <a:cs typeface="Arial" panose="020B0604020202020204" pitchFamily="34" charset="0"/>
-              </a:rPr>
-              <a:t>&gt;, &lt;</a:t>
-            </a:r>
-            <a:r>
-              <a:rPr lang="nb-NO" sz="800" dirty="0" err="1">
-                <a:solidFill>
-                  <a:schemeClr val="tx1"/>
-                </a:solidFill>
-                <a:latin typeface="Arial" panose="020B0604020202020204" pitchFamily="34" charset="0"/>
-                <a:cs typeface="Arial" panose="020B0604020202020204" pitchFamily="34" charset="0"/>
-              </a:rPr>
-              <a:t>Description</a:t>
-            </a:r>
-            <a:r>
-              <a:rPr lang="nb-NO" sz="800" dirty="0">
-                <a:solidFill>
-                  <a:schemeClr val="tx1"/>
-                </a:solidFill>
-                <a:latin typeface="Arial" panose="020B0604020202020204" pitchFamily="34" charset="0"/>
-                <a:cs typeface="Arial" panose="020B0604020202020204" pitchFamily="34" charset="0"/>
-              </a:rPr>
-              <a:t>&gt;, &lt;</a:t>
-            </a:r>
-            <a:r>
-              <a:rPr lang="nb-NO" sz="800" dirty="0" err="1">
-                <a:solidFill>
-                  <a:schemeClr val="tx1"/>
-                </a:solidFill>
-                <a:latin typeface="Arial" panose="020B0604020202020204" pitchFamily="34" charset="0"/>
-                <a:cs typeface="Arial" panose="020B0604020202020204" pitchFamily="34" charset="0"/>
-              </a:rPr>
-              <a:t>Testcase-name</a:t>
-            </a:r>
-            <a:r>
-              <a:rPr lang="nb-NO" sz="800" dirty="0">
-                <a:solidFill>
-                  <a:schemeClr val="tx1"/>
-                </a:solidFill>
-                <a:latin typeface="Arial" panose="020B0604020202020204" pitchFamily="34" charset="0"/>
-                <a:cs typeface="Arial" panose="020B0604020202020204" pitchFamily="34" charset="0"/>
-              </a:rPr>
-              <a:t>&gt; [, &lt;</a:t>
             </a:r>
             <a:r>
               <a:rPr lang="nb-NO" sz="800" dirty="0" err="1">
@@ -8556,6 +8556,78 @@
                 <a:latin typeface="Arial" panose="020B0604020202020204" pitchFamily="34" charset="0"/>
                 <a:cs typeface="Arial" panose="020B0604020202020204" pitchFamily="34" charset="0"/>
               </a:rPr>
+              <a:t>&gt;[, &lt;</a:t>
+            </a:r>
+            <a:r>
+              <a:rPr lang="nb-NO" sz="800" dirty="0" err="1">
+                <a:solidFill>
+                  <a:schemeClr val="tx1"/>
+                </a:solidFill>
+                <a:latin typeface="Arial" panose="020B0604020202020204" pitchFamily="34" charset="0"/>
+                <a:cs typeface="Arial" panose="020B0604020202020204" pitchFamily="34" charset="0"/>
+              </a:rPr>
+              <a:t>Testcase-name</a:t>
+            </a:r>
+            <a:r>
+              <a:rPr lang="nb-NO" sz="800" dirty="0">
+                <a:solidFill>
+                  <a:schemeClr val="tx1"/>
+                </a:solidFill>
+                <a:latin typeface="Arial" panose="020B0604020202020204" pitchFamily="34" charset="0"/>
+                <a:cs typeface="Arial" panose="020B0604020202020204" pitchFamily="34" charset="0"/>
+              </a:rPr>
+              <a:t>&gt;]</a:t>
+            </a:r>
+          </a:p>
+          <a:p>
+            <a:r>
+              <a:rPr lang="nb-NO" sz="800" dirty="0">
+                <a:solidFill>
+                  <a:schemeClr val="tx1"/>
+                </a:solidFill>
+                <a:latin typeface="Arial" panose="020B0604020202020204" pitchFamily="34" charset="0"/>
+                <a:cs typeface="Arial" panose="020B0604020202020204" pitchFamily="34" charset="0"/>
+              </a:rPr>
+              <a:t>&lt;</a:t>
+            </a:r>
+            <a:r>
+              <a:rPr lang="nb-NO" sz="800" dirty="0" err="1">
+                <a:solidFill>
+                  <a:schemeClr val="tx1"/>
+                </a:solidFill>
+                <a:latin typeface="Arial" panose="020B0604020202020204" pitchFamily="34" charset="0"/>
+                <a:cs typeface="Arial" panose="020B0604020202020204" pitchFamily="34" charset="0"/>
+              </a:rPr>
+              <a:t>Req</a:t>
+            </a:r>
+            <a:r>
+              <a:rPr lang="nb-NO" sz="800" dirty="0">
+                <a:solidFill>
+                  <a:schemeClr val="tx1"/>
+                </a:solidFill>
+                <a:latin typeface="Arial" panose="020B0604020202020204" pitchFamily="34" charset="0"/>
+                <a:cs typeface="Arial" panose="020B0604020202020204" pitchFamily="34" charset="0"/>
+              </a:rPr>
+              <a:t>. </a:t>
+            </a:r>
+            <a:r>
+              <a:rPr lang="nb-NO" sz="800" dirty="0" err="1">
+                <a:solidFill>
+                  <a:schemeClr val="tx1"/>
+                </a:solidFill>
+                <a:latin typeface="Arial" panose="020B0604020202020204" pitchFamily="34" charset="0"/>
+                <a:cs typeface="Arial" panose="020B0604020202020204" pitchFamily="34" charset="0"/>
+              </a:rPr>
+              <a:t>Label</a:t>
+            </a:r>
+            <a:r>
+              <a:rPr lang="nb-NO" sz="800" dirty="0">
+                <a:solidFill>
+                  <a:schemeClr val="tx1"/>
+                </a:solidFill>
+                <a:latin typeface="Arial" panose="020B0604020202020204" pitchFamily="34" charset="0"/>
+                <a:cs typeface="Arial" panose="020B0604020202020204" pitchFamily="34" charset="0"/>
+              </a:rPr>
               <a:t>&gt;, &lt;</a:t>
             </a:r>
             <a:r>
@@ -8566,6 +8638,26 @@
                 <a:latin typeface="Arial" panose="020B0604020202020204" pitchFamily="34" charset="0"/>
                 <a:cs typeface="Arial" panose="020B0604020202020204" pitchFamily="34" charset="0"/>
               </a:rPr>
+              <a:t>Description</a:t>
+            </a:r>
+            <a:r>
+              <a:rPr lang="nb-NO" sz="800" dirty="0">
+                <a:solidFill>
+                  <a:schemeClr val="tx1"/>
+                </a:solidFill>
+                <a:latin typeface="Arial" panose="020B0604020202020204" pitchFamily="34" charset="0"/>
+                <a:cs typeface="Arial" panose="020B0604020202020204" pitchFamily="34" charset="0"/>
+              </a:rPr>
+              <a:t>&gt;[, &lt;</a:t>
+            </a:r>
+            <a:r>
+              <a:rPr lang="nb-NO" sz="800" dirty="0" err="1">
+                <a:solidFill>
+                  <a:schemeClr val="tx1"/>
+                </a:solidFill>
+                <a:latin typeface="Arial" panose="020B0604020202020204" pitchFamily="34" charset="0"/>
+                <a:cs typeface="Arial" panose="020B0604020202020204" pitchFamily="34" charset="0"/>
+              </a:rPr>
               <a:t>Testcase-name</a:t>
             </a:r>
             <a:r>
@@ -8576,99 +8668,7 @@
                 <a:latin typeface="Arial" panose="020B0604020202020204" pitchFamily="34" charset="0"/>
                 <a:cs typeface="Arial" panose="020B0604020202020204" pitchFamily="34" charset="0"/>
               </a:rPr>
-              <a:t>&gt;</a:t>
-            </a:r>
-          </a:p>
-          <a:p>
-            <a:r>
-              <a:rPr lang="nb-NO" sz="800" dirty="0">
-                <a:solidFill>
-                  <a:schemeClr val="tx1"/>
-                </a:solidFill>
-                <a:latin typeface="Arial" panose="020B0604020202020204" pitchFamily="34" charset="0"/>
-                <a:cs typeface="Arial" panose="020B0604020202020204" pitchFamily="34" charset="0"/>
-              </a:rPr>
-              <a:t>&lt;</a:t>
-            </a:r>
-            <a:r>
-              <a:rPr lang="nb-NO" sz="800" dirty="0" err="1">
-                <a:solidFill>
-                  <a:schemeClr val="tx1"/>
-                </a:solidFill>
-                <a:latin typeface="Arial" panose="020B0604020202020204" pitchFamily="34" charset="0"/>
-                <a:cs typeface="Arial" panose="020B0604020202020204" pitchFamily="34" charset="0"/>
-              </a:rPr>
-              <a:t>Req</a:t>
-            </a:r>
-            <a:r>
-              <a:rPr lang="nb-NO" sz="800" dirty="0">
-                <a:solidFill>
-                  <a:schemeClr val="tx1"/>
-                </a:solidFill>
-                <a:latin typeface="Arial" panose="020B0604020202020204" pitchFamily="34" charset="0"/>
-                <a:cs typeface="Arial" panose="020B0604020202020204" pitchFamily="34" charset="0"/>
-              </a:rPr>
-              <a:t>. </a:t>
-            </a:r>
-            <a:r>
-              <a:rPr lang="nb-NO" sz="800" dirty="0" err="1">
-                <a:solidFill>
-                  <a:schemeClr val="tx1"/>
-                </a:solidFill>
-                <a:latin typeface="Arial" panose="020B0604020202020204" pitchFamily="34" charset="0"/>
-                <a:cs typeface="Arial" panose="020B0604020202020204" pitchFamily="34" charset="0"/>
-              </a:rPr>
-              <a:t>Label</a:t>
-            </a:r>
-            <a:r>
-              <a:rPr lang="nb-NO" sz="800" dirty="0">
-                <a:solidFill>
-                  <a:schemeClr val="tx1"/>
-                </a:solidFill>
-                <a:latin typeface="Arial" panose="020B0604020202020204" pitchFamily="34" charset="0"/>
-                <a:cs typeface="Arial" panose="020B0604020202020204" pitchFamily="34" charset="0"/>
-              </a:rPr>
-              <a:t>&gt;, &lt;</a:t>
-            </a:r>
-            <a:r>
-              <a:rPr lang="nb-NO" sz="800" dirty="0" err="1">
-                <a:solidFill>
-                  <a:schemeClr val="tx1"/>
-                </a:solidFill>
-                <a:latin typeface="Arial" panose="020B0604020202020204" pitchFamily="34" charset="0"/>
-                <a:cs typeface="Arial" panose="020B0604020202020204" pitchFamily="34" charset="0"/>
-              </a:rPr>
-              <a:t>Description</a:t>
-            </a:r>
-            <a:r>
-              <a:rPr lang="nb-NO" sz="800" dirty="0">
-                <a:solidFill>
-                  <a:schemeClr val="tx1"/>
-                </a:solidFill>
-                <a:latin typeface="Arial" panose="020B0604020202020204" pitchFamily="34" charset="0"/>
-                <a:cs typeface="Arial" panose="020B0604020202020204" pitchFamily="34" charset="0"/>
-              </a:rPr>
-              <a:t>&gt;, &lt;</a:t>
-            </a:r>
-            <a:r>
-              <a:rPr lang="nb-NO" sz="800" dirty="0" err="1">
-                <a:solidFill>
-                  <a:schemeClr val="tx1"/>
-                </a:solidFill>
-                <a:latin typeface="Arial" panose="020B0604020202020204" pitchFamily="34" charset="0"/>
-                <a:cs typeface="Arial" panose="020B0604020202020204" pitchFamily="34" charset="0"/>
-              </a:rPr>
-              <a:t>Testcase-name</a:t>
-            </a:r>
-            <a:r>
-              <a:rPr lang="nb-NO" sz="800" dirty="0">
-                <a:solidFill>
-                  <a:schemeClr val="tx1"/>
-                </a:solidFill>
-                <a:latin typeface="Arial" panose="020B0604020202020204" pitchFamily="34" charset="0"/>
-                <a:cs typeface="Arial" panose="020B0604020202020204" pitchFamily="34" charset="0"/>
-              </a:rPr>
-              <a:t>&gt;</a:t>
+              <a:t>&gt;]</a:t>
             </a:r>
           </a:p>
           <a:p>

</xml_diff>

<commit_message>
BV_UVVM-846: updated QR docx and Figures with new script output files list.
</commit_message>
<xml_diff>
--- a/bitvis_vip_spec_cov/doc/Figures.pptx
+++ b/bitvis_vip_spec_cov/doc/Figures.pptx
@@ -5706,8 +5706,8 @@
         </p:nvSpPr>
         <p:spPr>
           <a:xfrm>
-            <a:off x="5718214" y="2165552"/>
-            <a:ext cx="1853220" cy="688505"/>
+            <a:off x="5718213" y="2165552"/>
+            <a:ext cx="2180491" cy="688505"/>
           </a:xfrm>
           <a:prstGeom prst="rect">
             <a:avLst/>
@@ -5793,44 +5793,192 @@
                 <a:latin typeface="Arial" panose="020B0604020202020204" pitchFamily="34" charset="0"/>
                 <a:cs typeface="Arial" panose="020B0604020202020204" pitchFamily="34" charset="0"/>
               </a:rPr>
-              <a:t>UART_REQ_1, COMPLIANT</a:t>
-            </a:r>
-          </a:p>
-          <a:p>
-            <a:r>
-              <a:rPr lang="nb-NO" sz="800" dirty="0">
-                <a:solidFill>
-                  <a:schemeClr val="tx1"/>
-                </a:solidFill>
-                <a:latin typeface="Arial" panose="020B0604020202020204" pitchFamily="34" charset="0"/>
-                <a:cs typeface="Arial" panose="020B0604020202020204" pitchFamily="34" charset="0"/>
-              </a:rPr>
-              <a:t>UART_REQ_2, NON COMPLIANT</a:t>
-            </a:r>
-          </a:p>
-          <a:p>
-            <a:r>
-              <a:rPr lang="nb-NO" sz="800" dirty="0">
-                <a:solidFill>
-                  <a:schemeClr val="tx1"/>
-                </a:solidFill>
-                <a:latin typeface="Arial" panose="020B0604020202020204" pitchFamily="34" charset="0"/>
-                <a:cs typeface="Arial" panose="020B0604020202020204" pitchFamily="34" charset="0"/>
-              </a:rPr>
-              <a:t>UART_REQ_3, COMPLIANT</a:t>
-            </a:r>
-          </a:p>
-          <a:p>
-            <a:r>
-              <a:rPr lang="nb-NO" sz="800" dirty="0">
-                <a:solidFill>
-                  <a:schemeClr val="tx1"/>
-                </a:solidFill>
-                <a:latin typeface="Arial" panose="020B0604020202020204" pitchFamily="34" charset="0"/>
-                <a:cs typeface="Arial" panose="020B0604020202020204" pitchFamily="34" charset="0"/>
-              </a:rPr>
-              <a:t>UART_REQ_4, COMPLIANT</a:t>
-            </a:r>
+              <a:t>&lt;</a:t>
+            </a:r>
+            <a:r>
+              <a:rPr lang="nb-NO" sz="800" dirty="0" err="1">
+                <a:solidFill>
+                  <a:schemeClr val="tx1"/>
+                </a:solidFill>
+                <a:latin typeface="Arial" panose="020B0604020202020204" pitchFamily="34" charset="0"/>
+                <a:cs typeface="Arial" panose="020B0604020202020204" pitchFamily="34" charset="0"/>
+              </a:rPr>
+              <a:t>spec_cov_file</a:t>
+            </a:r>
+            <a:r>
+              <a:rPr lang="nb-NO" sz="800" dirty="0">
+                <a:solidFill>
+                  <a:schemeClr val="tx1"/>
+                </a:solidFill>
+                <a:latin typeface="Arial" panose="020B0604020202020204" pitchFamily="34" charset="0"/>
+                <a:cs typeface="Arial" panose="020B0604020202020204" pitchFamily="34" charset="0"/>
+              </a:rPr>
+              <a:t>&gt;.</a:t>
+            </a:r>
+            <a:r>
+              <a:rPr lang="nb-NO" sz="800" dirty="0" err="1">
+                <a:solidFill>
+                  <a:schemeClr val="tx1"/>
+                </a:solidFill>
+                <a:latin typeface="Arial" panose="020B0604020202020204" pitchFamily="34" charset="0"/>
+                <a:cs typeface="Arial" panose="020B0604020202020204" pitchFamily="34" charset="0"/>
+              </a:rPr>
+              <a:t>req_vs_single_tc.csv</a:t>
+            </a:r>
+            <a:endParaRPr lang="nb-NO" sz="800" dirty="0">
+              <a:solidFill>
+                <a:schemeClr val="tx1"/>
+              </a:solidFill>
+              <a:latin typeface="Arial" panose="020B0604020202020204" pitchFamily="34" charset="0"/>
+              <a:cs typeface="Arial" panose="020B0604020202020204" pitchFamily="34" charset="0"/>
+            </a:endParaRPr>
+          </a:p>
+          <a:p>
+            <a:r>
+              <a:rPr lang="nb-NO" sz="800" dirty="0">
+                <a:solidFill>
+                  <a:schemeClr val="tx1"/>
+                </a:solidFill>
+                <a:latin typeface="Arial" panose="020B0604020202020204" pitchFamily="34" charset="0"/>
+                <a:cs typeface="Arial" panose="020B0604020202020204" pitchFamily="34" charset="0"/>
+              </a:rPr>
+              <a:t>&lt;</a:t>
+            </a:r>
+            <a:r>
+              <a:rPr lang="nb-NO" sz="800" dirty="0" err="1">
+                <a:solidFill>
+                  <a:schemeClr val="tx1"/>
+                </a:solidFill>
+                <a:latin typeface="Arial" panose="020B0604020202020204" pitchFamily="34" charset="0"/>
+                <a:cs typeface="Arial" panose="020B0604020202020204" pitchFamily="34" charset="0"/>
+              </a:rPr>
+              <a:t>spec_cov_file</a:t>
+            </a:r>
+            <a:r>
+              <a:rPr lang="nb-NO" sz="800" dirty="0">
+                <a:solidFill>
+                  <a:schemeClr val="tx1"/>
+                </a:solidFill>
+                <a:latin typeface="Arial" panose="020B0604020202020204" pitchFamily="34" charset="0"/>
+                <a:cs typeface="Arial" panose="020B0604020202020204" pitchFamily="34" charset="0"/>
+              </a:rPr>
+              <a:t>&gt;.</a:t>
+            </a:r>
+            <a:r>
+              <a:rPr lang="nb-NO" sz="800" dirty="0" err="1">
+                <a:solidFill>
+                  <a:schemeClr val="tx1"/>
+                </a:solidFill>
+                <a:latin typeface="Arial" panose="020B0604020202020204" pitchFamily="34" charset="0"/>
+                <a:cs typeface="Arial" panose="020B0604020202020204" pitchFamily="34" charset="0"/>
+              </a:rPr>
+              <a:t>tc_vs_reqs.csv</a:t>
+            </a:r>
+            <a:endParaRPr lang="nb-NO" sz="800" dirty="0">
+              <a:solidFill>
+                <a:schemeClr val="tx1"/>
+              </a:solidFill>
+              <a:latin typeface="Arial" panose="020B0604020202020204" pitchFamily="34" charset="0"/>
+              <a:cs typeface="Arial" panose="020B0604020202020204" pitchFamily="34" charset="0"/>
+            </a:endParaRPr>
+          </a:p>
+          <a:p>
+            <a:r>
+              <a:rPr lang="nb-NO" sz="800" dirty="0">
+                <a:solidFill>
+                  <a:schemeClr val="tx1"/>
+                </a:solidFill>
+                <a:latin typeface="Arial" panose="020B0604020202020204" pitchFamily="34" charset="0"/>
+                <a:cs typeface="Arial" panose="020B0604020202020204" pitchFamily="34" charset="0"/>
+              </a:rPr>
+              <a:t>&lt;</a:t>
+            </a:r>
+            <a:r>
+              <a:rPr lang="nb-NO" sz="800" dirty="0" err="1">
+                <a:solidFill>
+                  <a:schemeClr val="tx1"/>
+                </a:solidFill>
+                <a:latin typeface="Arial" panose="020B0604020202020204" pitchFamily="34" charset="0"/>
+                <a:cs typeface="Arial" panose="020B0604020202020204" pitchFamily="34" charset="0"/>
+              </a:rPr>
+              <a:t>spec_cov_file</a:t>
+            </a:r>
+            <a:r>
+              <a:rPr lang="nb-NO" sz="800" dirty="0">
+                <a:solidFill>
+                  <a:schemeClr val="tx1"/>
+                </a:solidFill>
+                <a:latin typeface="Arial" panose="020B0604020202020204" pitchFamily="34" charset="0"/>
+                <a:cs typeface="Arial" panose="020B0604020202020204" pitchFamily="34" charset="0"/>
+              </a:rPr>
+              <a:t>&gt;.</a:t>
+            </a:r>
+            <a:r>
+              <a:rPr lang="nb-NO" sz="800" dirty="0" err="1">
+                <a:solidFill>
+                  <a:schemeClr val="tx1"/>
+                </a:solidFill>
+                <a:latin typeface="Arial" panose="020B0604020202020204" pitchFamily="34" charset="0"/>
+                <a:cs typeface="Arial" panose="020B0604020202020204" pitchFamily="34" charset="0"/>
+              </a:rPr>
+              <a:t>req_vs_tcs.csv</a:t>
+            </a:r>
+            <a:endParaRPr lang="nb-NO" sz="800" dirty="0">
+              <a:solidFill>
+                <a:schemeClr val="tx1"/>
+              </a:solidFill>
+              <a:latin typeface="Arial" panose="020B0604020202020204" pitchFamily="34" charset="0"/>
+              <a:cs typeface="Arial" panose="020B0604020202020204" pitchFamily="34" charset="0"/>
+            </a:endParaRPr>
+          </a:p>
+          <a:p>
+            <a:r>
+              <a:rPr lang="nb-NO" sz="800" dirty="0">
+                <a:solidFill>
+                  <a:schemeClr val="tx1"/>
+                </a:solidFill>
+                <a:latin typeface="Arial" panose="020B0604020202020204" pitchFamily="34" charset="0"/>
+                <a:cs typeface="Arial" panose="020B0604020202020204" pitchFamily="34" charset="0"/>
+              </a:rPr>
+              <a:t>- See </a:t>
+            </a:r>
+            <a:r>
+              <a:rPr lang="nb-NO" sz="800" dirty="0" err="1">
+                <a:solidFill>
+                  <a:schemeClr val="tx1"/>
+                </a:solidFill>
+                <a:latin typeface="Arial" panose="020B0604020202020204" pitchFamily="34" charset="0"/>
+                <a:cs typeface="Arial" panose="020B0604020202020204" pitchFamily="34" charset="0"/>
+              </a:rPr>
+              <a:t>Section</a:t>
+            </a:r>
+            <a:r>
+              <a:rPr lang="nb-NO" sz="800" dirty="0">
+                <a:solidFill>
+                  <a:schemeClr val="tx1"/>
+                </a:solidFill>
+                <a:latin typeface="Arial" panose="020B0604020202020204" pitchFamily="34" charset="0"/>
+                <a:cs typeface="Arial" panose="020B0604020202020204" pitchFamily="34" charset="0"/>
+              </a:rPr>
+              <a:t> 10.2 for </a:t>
+            </a:r>
+            <a:r>
+              <a:rPr lang="nb-NO" sz="800" dirty="0" err="1">
+                <a:solidFill>
+                  <a:schemeClr val="tx1"/>
+                </a:solidFill>
+                <a:latin typeface="Arial" panose="020B0604020202020204" pitchFamily="34" charset="0"/>
+                <a:cs typeface="Arial" panose="020B0604020202020204" pitchFamily="34" charset="0"/>
+              </a:rPr>
+              <a:t>details</a:t>
+            </a:r>
+            <a:endParaRPr lang="nb-NO" sz="800" dirty="0">
+              <a:solidFill>
+                <a:schemeClr val="tx1"/>
+              </a:solidFill>
+              <a:latin typeface="Arial" panose="020B0604020202020204" pitchFamily="34" charset="0"/>
+              <a:cs typeface="Arial" panose="020B0604020202020204" pitchFamily="34" charset="0"/>
+            </a:endParaRPr>
           </a:p>
         </p:txBody>
       </p:sp>

</xml_diff>

<commit_message>
BV_UVVM-846: updated Spec Cov documentation and figures with review changes.
</commit_message>
<xml_diff>
--- a/bitvis_vip_spec_cov/doc/Figures.pptx
+++ b/bitvis_vip_spec_cov/doc/Figures.pptx
@@ -261,7 +261,7 @@
           <a:p>
             <a:fld id="{BCA49E38-FF81-43B3-86DC-4B20814BC221}" type="datetimeFigureOut">
               <a:rPr lang="nb-NO" smtClean="0"/>
-              <a:t>05.03.2020</a:t>
+              <a:t>16.03.2020</a:t>
             </a:fld>
             <a:endParaRPr lang="nb-NO"/>
           </a:p>
@@ -459,7 +459,7 @@
           <a:p>
             <a:fld id="{BCA49E38-FF81-43B3-86DC-4B20814BC221}" type="datetimeFigureOut">
               <a:rPr lang="nb-NO" smtClean="0"/>
-              <a:t>05.03.2020</a:t>
+              <a:t>16.03.2020</a:t>
             </a:fld>
             <a:endParaRPr lang="nb-NO"/>
           </a:p>
@@ -667,7 +667,7 @@
           <a:p>
             <a:fld id="{BCA49E38-FF81-43B3-86DC-4B20814BC221}" type="datetimeFigureOut">
               <a:rPr lang="nb-NO" smtClean="0"/>
-              <a:t>05.03.2020</a:t>
+              <a:t>16.03.2020</a:t>
             </a:fld>
             <a:endParaRPr lang="nb-NO"/>
           </a:p>
@@ -865,7 +865,7 @@
           <a:p>
             <a:fld id="{BCA49E38-FF81-43B3-86DC-4B20814BC221}" type="datetimeFigureOut">
               <a:rPr lang="nb-NO" smtClean="0"/>
-              <a:t>05.03.2020</a:t>
+              <a:t>16.03.2020</a:t>
             </a:fld>
             <a:endParaRPr lang="nb-NO"/>
           </a:p>
@@ -1140,7 +1140,7 @@
           <a:p>
             <a:fld id="{BCA49E38-FF81-43B3-86DC-4B20814BC221}" type="datetimeFigureOut">
               <a:rPr lang="nb-NO" smtClean="0"/>
-              <a:t>05.03.2020</a:t>
+              <a:t>16.03.2020</a:t>
             </a:fld>
             <a:endParaRPr lang="nb-NO"/>
           </a:p>
@@ -1405,7 +1405,7 @@
           <a:p>
             <a:fld id="{BCA49E38-FF81-43B3-86DC-4B20814BC221}" type="datetimeFigureOut">
               <a:rPr lang="nb-NO" smtClean="0"/>
-              <a:t>05.03.2020</a:t>
+              <a:t>16.03.2020</a:t>
             </a:fld>
             <a:endParaRPr lang="nb-NO"/>
           </a:p>
@@ -1817,7 +1817,7 @@
           <a:p>
             <a:fld id="{BCA49E38-FF81-43B3-86DC-4B20814BC221}" type="datetimeFigureOut">
               <a:rPr lang="nb-NO" smtClean="0"/>
-              <a:t>05.03.2020</a:t>
+              <a:t>16.03.2020</a:t>
             </a:fld>
             <a:endParaRPr lang="nb-NO"/>
           </a:p>
@@ -1958,7 +1958,7 @@
           <a:p>
             <a:fld id="{BCA49E38-FF81-43B3-86DC-4B20814BC221}" type="datetimeFigureOut">
               <a:rPr lang="nb-NO" smtClean="0"/>
-              <a:t>05.03.2020</a:t>
+              <a:t>16.03.2020</a:t>
             </a:fld>
             <a:endParaRPr lang="nb-NO"/>
           </a:p>
@@ -2071,7 +2071,7 @@
           <a:p>
             <a:fld id="{BCA49E38-FF81-43B3-86DC-4B20814BC221}" type="datetimeFigureOut">
               <a:rPr lang="nb-NO" smtClean="0"/>
-              <a:t>05.03.2020</a:t>
+              <a:t>16.03.2020</a:t>
             </a:fld>
             <a:endParaRPr lang="nb-NO"/>
           </a:p>
@@ -2382,7 +2382,7 @@
           <a:p>
             <a:fld id="{BCA49E38-FF81-43B3-86DC-4B20814BC221}" type="datetimeFigureOut">
               <a:rPr lang="nb-NO" smtClean="0"/>
-              <a:t>05.03.2020</a:t>
+              <a:t>16.03.2020</a:t>
             </a:fld>
             <a:endParaRPr lang="nb-NO"/>
           </a:p>
@@ -2670,7 +2670,7 @@
           <a:p>
             <a:fld id="{BCA49E38-FF81-43B3-86DC-4B20814BC221}" type="datetimeFigureOut">
               <a:rPr lang="nb-NO" smtClean="0"/>
-              <a:t>05.03.2020</a:t>
+              <a:t>16.03.2020</a:t>
             </a:fld>
             <a:endParaRPr lang="nb-NO"/>
           </a:p>
@@ -2911,7 +2911,7 @@
           <a:p>
             <a:fld id="{BCA49E38-FF81-43B3-86DC-4B20814BC221}" type="datetimeFigureOut">
               <a:rPr lang="nb-NO" smtClean="0"/>
-              <a:t>05.03.2020</a:t>
+              <a:t>16.03.2020</a:t>
             </a:fld>
             <a:endParaRPr lang="nb-NO"/>
           </a:p>
@@ -5601,6 +5601,16 @@
               </a:rPr>
             </a:br>
             <a:r>
+              <a:rPr lang="nb-NO" sz="800" dirty="0">
+                <a:solidFill>
+                  <a:schemeClr val="tx1"/>
+                </a:solidFill>
+                <a:latin typeface="Arial" panose="020B0604020202020204" pitchFamily="34" charset="0"/>
+                <a:cs typeface="Arial" panose="020B0604020202020204" pitchFamily="34" charset="0"/>
+              </a:rPr>
+              <a:t>tick_</a:t>
+            </a:r>
+            <a:r>
               <a:rPr lang="nb-NO" sz="800" dirty="0" err="1">
                 <a:solidFill>
                   <a:schemeClr val="tx1"/>
@@ -5608,7 +5618,27 @@
                 <a:latin typeface="Arial" panose="020B0604020202020204" pitchFamily="34" charset="0"/>
                 <a:cs typeface="Arial" panose="020B0604020202020204" pitchFamily="34" charset="0"/>
               </a:rPr>
-              <a:t>register_req_cov</a:t>
+              <a:t>off</a:t>
+            </a:r>
+            <a:r>
+              <a:rPr lang="nb-NO" sz="800" dirty="0">
+                <a:solidFill>
+                  <a:schemeClr val="tx1"/>
+                </a:solidFill>
+                <a:latin typeface="Arial" panose="020B0604020202020204" pitchFamily="34" charset="0"/>
+                <a:cs typeface="Arial" panose="020B0604020202020204" pitchFamily="34" charset="0"/>
+              </a:rPr>
+              <a:t>__</a:t>
+            </a:r>
+            <a:r>
+              <a:rPr lang="nb-NO" sz="800" dirty="0" err="1">
+                <a:solidFill>
+                  <a:schemeClr val="tx1"/>
+                </a:solidFill>
+                <a:latin typeface="Arial" panose="020B0604020202020204" pitchFamily="34" charset="0"/>
+                <a:cs typeface="Arial" panose="020B0604020202020204" pitchFamily="34" charset="0"/>
+              </a:rPr>
+              <a:t>req_cov</a:t>
             </a:r>
             <a:r>
               <a:rPr lang="nb-NO" sz="800" dirty="0">
@@ -6965,7 +6995,7 @@
                 <a:latin typeface="Arial" panose="020B0604020202020204" pitchFamily="34" charset="0"/>
                 <a:cs typeface="Arial" panose="020B0604020202020204" pitchFamily="34" charset="0"/>
               </a:rPr>
-              <a:t>t_basic</a:t>
+              <a:t>tc_basic</a:t>
             </a:r>
             <a:r>
               <a:rPr lang="nb-NO" sz="800" dirty="0">
@@ -6997,7 +7027,7 @@
                 <a:latin typeface="Arial" panose="020B0604020202020204" pitchFamily="34" charset="0"/>
                 <a:cs typeface="Arial" panose="020B0604020202020204" pitchFamily="34" charset="0"/>
               </a:rPr>
-              <a:t>t_basic</a:t>
+              <a:t>tc_basic</a:t>
             </a:r>
             <a:r>
               <a:rPr lang="nb-NO" sz="800" dirty="0">
@@ -7029,7 +7059,7 @@
                 <a:latin typeface="Arial" panose="020B0604020202020204" pitchFamily="34" charset="0"/>
                 <a:cs typeface="Arial" panose="020B0604020202020204" pitchFamily="34" charset="0"/>
               </a:rPr>
-              <a:t>t_basic</a:t>
+              <a:t>tc_basic</a:t>
             </a:r>
             <a:r>
               <a:rPr lang="nb-NO" sz="800" dirty="0">
@@ -7061,7 +7091,7 @@
                 <a:latin typeface="Arial" panose="020B0604020202020204" pitchFamily="34" charset="0"/>
                 <a:cs typeface="Arial" panose="020B0604020202020204" pitchFamily="34" charset="0"/>
               </a:rPr>
-              <a:t>t_basic</a:t>
+              <a:t>tc_basic</a:t>
             </a:r>
             <a:r>
               <a:rPr lang="nb-NO" sz="800" dirty="0">
@@ -7585,7 +7615,7 @@
                 <a:latin typeface="Arial" panose="020B0604020202020204" pitchFamily="34" charset="0"/>
                 <a:cs typeface="Arial" panose="020B0604020202020204" pitchFamily="34" charset="0"/>
               </a:rPr>
-              <a:t>t_basic</a:t>
+              <a:t>tc_basic</a:t>
             </a:r>
             <a:endParaRPr lang="nb-NO" sz="800" dirty="0">
               <a:solidFill>
@@ -7604,7 +7634,7 @@
                 <a:latin typeface="Arial" panose="020B0604020202020204" pitchFamily="34" charset="0"/>
                 <a:cs typeface="Arial" panose="020B0604020202020204" pitchFamily="34" charset="0"/>
               </a:rPr>
-              <a:t>UART_REQ_2, Baudrate 19k2 , t_19k2</a:t>
+              <a:t>UART_REQ_2, Baudrate 19k2 , tc_19k2</a:t>
             </a:r>
           </a:p>
           <a:p>
@@ -7646,17 +7676,17 @@
                 <a:latin typeface="Arial" panose="020B0604020202020204" pitchFamily="34" charset="0"/>
                 <a:cs typeface="Arial" panose="020B0604020202020204" pitchFamily="34" charset="0"/>
               </a:rPr>
-              <a:t>t_basic</a:t>
-            </a:r>
-            <a:r>
-              <a:rPr lang="nb-NO" sz="800" dirty="0">
-                <a:solidFill>
-                  <a:schemeClr val="tx1"/>
-                </a:solidFill>
-                <a:latin typeface="Arial" panose="020B0604020202020204" pitchFamily="34" charset="0"/>
-                <a:cs typeface="Arial" panose="020B0604020202020204" pitchFamily="34" charset="0"/>
-              </a:rPr>
-              <a:t>, t_19k2</a:t>
+              <a:t>tc_basic</a:t>
+            </a:r>
+            <a:r>
+              <a:rPr lang="nb-NO" sz="800" dirty="0">
+                <a:solidFill>
+                  <a:schemeClr val="tx1"/>
+                </a:solidFill>
+                <a:latin typeface="Arial" panose="020B0604020202020204" pitchFamily="34" charset="0"/>
+                <a:cs typeface="Arial" panose="020B0604020202020204" pitchFamily="34" charset="0"/>
+              </a:rPr>
+              <a:t>, tc_19k2</a:t>
             </a:r>
           </a:p>
           <a:p>
@@ -7698,7 +7728,7 @@
                 <a:latin typeface="Arial" panose="020B0604020202020204" pitchFamily="34" charset="0"/>
                 <a:cs typeface="Arial" panose="020B0604020202020204" pitchFamily="34" charset="0"/>
               </a:rPr>
-              <a:t>t_reset</a:t>
+              <a:t>tc_reset</a:t>
             </a:r>
             <a:r>
               <a:rPr lang="nb-NO" sz="800" dirty="0">
@@ -7718,17 +7748,17 @@
                 <a:latin typeface="Arial" panose="020B0604020202020204" pitchFamily="34" charset="0"/>
                 <a:cs typeface="Arial" panose="020B0604020202020204" pitchFamily="34" charset="0"/>
               </a:rPr>
-              <a:t>t_basic</a:t>
-            </a:r>
-            <a:r>
-              <a:rPr lang="nb-NO" sz="800" dirty="0">
-                <a:solidFill>
-                  <a:schemeClr val="tx1"/>
-                </a:solidFill>
-                <a:latin typeface="Arial" panose="020B0604020202020204" pitchFamily="34" charset="0"/>
-                <a:cs typeface="Arial" panose="020B0604020202020204" pitchFamily="34" charset="0"/>
-              </a:rPr>
-              <a:t>, t_19k2</a:t>
+              <a:t>tc_basic</a:t>
+            </a:r>
+            <a:r>
+              <a:rPr lang="nb-NO" sz="800" dirty="0">
+                <a:solidFill>
+                  <a:schemeClr val="tx1"/>
+                </a:solidFill>
+                <a:latin typeface="Arial" panose="020B0604020202020204" pitchFamily="34" charset="0"/>
+                <a:cs typeface="Arial" panose="020B0604020202020204" pitchFamily="34" charset="0"/>
+              </a:rPr>
+              <a:t>, tc_19k2</a:t>
             </a:r>
           </a:p>
         </p:txBody>
@@ -7960,7 +7990,7 @@
                 <a:latin typeface="Arial" panose="020B0604020202020204" pitchFamily="34" charset="0"/>
                 <a:cs typeface="Arial" panose="020B0604020202020204" pitchFamily="34" charset="0"/>
               </a:rPr>
-              <a:t>t_basic</a:t>
+              <a:t>tc_basic</a:t>
             </a:r>
             <a:endParaRPr lang="nb-NO" sz="800" dirty="0">
               <a:solidFill>
@@ -7979,7 +8009,7 @@
                 <a:latin typeface="Arial" panose="020B0604020202020204" pitchFamily="34" charset="0"/>
                 <a:cs typeface="Arial" panose="020B0604020202020204" pitchFamily="34" charset="0"/>
               </a:rPr>
-              <a:t>UART_REQ_2, Baudrate 19k2 , t_19k2</a:t>
+              <a:t>UART_REQ_2, Baudrate 19k2 , tc_19k2</a:t>
             </a:r>
           </a:p>
           <a:p>
@@ -8021,7 +8051,7 @@
                 <a:latin typeface="Arial" panose="020B0604020202020204" pitchFamily="34" charset="0"/>
                 <a:cs typeface="Arial" panose="020B0604020202020204" pitchFamily="34" charset="0"/>
               </a:rPr>
-              <a:t>t_basic</a:t>
+              <a:t>tc_basic</a:t>
             </a:r>
             <a:endParaRPr lang="nb-NO" sz="800" dirty="0">
               <a:solidFill>
@@ -8060,7 +8090,7 @@
                 <a:latin typeface="Arial" panose="020B0604020202020204" pitchFamily="34" charset="0"/>
                 <a:cs typeface="Arial" panose="020B0604020202020204" pitchFamily="34" charset="0"/>
               </a:rPr>
-              <a:t> ,        t_19k2</a:t>
+              <a:t> ,        tc_19k2</a:t>
             </a:r>
           </a:p>
           <a:p>
@@ -8102,7 +8132,7 @@
                 <a:latin typeface="Arial" panose="020B0604020202020204" pitchFamily="34" charset="0"/>
                 <a:cs typeface="Arial" panose="020B0604020202020204" pitchFamily="34" charset="0"/>
               </a:rPr>
-              <a:t>t_reset</a:t>
+              <a:t>tc_reset</a:t>
             </a:r>
             <a:r>
               <a:rPr lang="nb-NO" sz="800" dirty="0">
@@ -8122,17 +8152,17 @@
                 <a:latin typeface="Arial" panose="020B0604020202020204" pitchFamily="34" charset="0"/>
                 <a:cs typeface="Arial" panose="020B0604020202020204" pitchFamily="34" charset="0"/>
               </a:rPr>
-              <a:t>t_basic</a:t>
-            </a:r>
-            <a:r>
-              <a:rPr lang="nb-NO" sz="800" dirty="0">
-                <a:solidFill>
-                  <a:schemeClr val="tx1"/>
-                </a:solidFill>
-                <a:latin typeface="Arial" panose="020B0604020202020204" pitchFamily="34" charset="0"/>
-                <a:cs typeface="Arial" panose="020B0604020202020204" pitchFamily="34" charset="0"/>
-              </a:rPr>
-              <a:t>, t_19k2</a:t>
+              <a:t>tc_basic</a:t>
+            </a:r>
+            <a:r>
+              <a:rPr lang="nb-NO" sz="800" dirty="0">
+                <a:solidFill>
+                  <a:schemeClr val="tx1"/>
+                </a:solidFill>
+                <a:latin typeface="Arial" panose="020B0604020202020204" pitchFamily="34" charset="0"/>
+                <a:cs typeface="Arial" panose="020B0604020202020204" pitchFamily="34" charset="0"/>
+              </a:rPr>
+              <a:t>, tc_19k2</a:t>
             </a:r>
           </a:p>
         </p:txBody>
@@ -8924,7 +8954,7 @@
                 <a:latin typeface="Arial" panose="020B0604020202020204" pitchFamily="34" charset="0"/>
                 <a:cs typeface="Arial" panose="020B0604020202020204" pitchFamily="34" charset="0"/>
               </a:rPr>
-              <a:t>t_basic</a:t>
+              <a:t>tc_basic</a:t>
             </a:r>
             <a:endParaRPr lang="nb-NO" sz="800" dirty="0">
               <a:solidFill>
@@ -8943,7 +8973,7 @@
                 <a:latin typeface="Arial" panose="020B0604020202020204" pitchFamily="34" charset="0"/>
                 <a:cs typeface="Arial" panose="020B0604020202020204" pitchFamily="34" charset="0"/>
               </a:rPr>
-              <a:t>UART_REQ_2, Baudrate 19k2 , t_19k2</a:t>
+              <a:t>UART_REQ_2, Baudrate 19k2 , tc_19k2</a:t>
             </a:r>
           </a:p>
           <a:p>
@@ -8985,7 +9015,7 @@
                 <a:latin typeface="Arial" panose="020B0604020202020204" pitchFamily="34" charset="0"/>
                 <a:cs typeface="Arial" panose="020B0604020202020204" pitchFamily="34" charset="0"/>
               </a:rPr>
-              <a:t>t_basic</a:t>
+              <a:t>tc_basic</a:t>
             </a:r>
             <a:endParaRPr lang="nb-NO" sz="800" dirty="0">
               <a:solidFill>
@@ -9034,7 +9064,7 @@
                 <a:latin typeface="Arial" panose="020B0604020202020204" pitchFamily="34" charset="0"/>
                 <a:cs typeface="Arial" panose="020B0604020202020204" pitchFamily="34" charset="0"/>
               </a:rPr>
-              <a:t>t_reset</a:t>
+              <a:t>tc_reset</a:t>
             </a:r>
             <a:r>
               <a:rPr lang="nb-NO" sz="800" dirty="0">
@@ -9306,7 +9336,7 @@
                 <a:latin typeface="Arial" panose="020B0604020202020204" pitchFamily="34" charset="0"/>
                 <a:cs typeface="Arial" panose="020B0604020202020204" pitchFamily="34" charset="0"/>
               </a:rPr>
-              <a:t>t_basic</a:t>
+              <a:t>tc_basic</a:t>
             </a:r>
             <a:endParaRPr lang="nb-NO" sz="800" dirty="0">
               <a:solidFill>
@@ -9325,7 +9355,7 @@
                 <a:latin typeface="Arial" panose="020B0604020202020204" pitchFamily="34" charset="0"/>
                 <a:cs typeface="Arial" panose="020B0604020202020204" pitchFamily="34" charset="0"/>
               </a:rPr>
-              <a:t>UART_REQ_2, Baudrate 19k2 , t_19k2</a:t>
+              <a:t>UART_REQ_2, Baudrate 19k2 , tc_19k2</a:t>
             </a:r>
           </a:p>
           <a:p>
@@ -9367,7 +9397,7 @@
                 <a:latin typeface="Arial" panose="020B0604020202020204" pitchFamily="34" charset="0"/>
                 <a:cs typeface="Arial" panose="020B0604020202020204" pitchFamily="34" charset="0"/>
               </a:rPr>
-              <a:t>t_basic</a:t>
+              <a:t>tc_basic</a:t>
             </a:r>
             <a:endParaRPr lang="nb-NO" sz="800" dirty="0">
               <a:solidFill>
@@ -9416,18 +9446,15 @@
                 <a:latin typeface="Arial" panose="020B0604020202020204" pitchFamily="34" charset="0"/>
                 <a:cs typeface="Arial" panose="020B0604020202020204" pitchFamily="34" charset="0"/>
               </a:rPr>
-              <a:t>t_reset</a:t>
-            </a:r>
-            <a:r>
-              <a:rPr lang="nb-NO" sz="800" dirty="0">
-                <a:solidFill>
-                  <a:schemeClr val="tx1"/>
-                </a:solidFill>
-                <a:latin typeface="Arial" panose="020B0604020202020204" pitchFamily="34" charset="0"/>
-                <a:cs typeface="Arial" panose="020B0604020202020204" pitchFamily="34" charset="0"/>
-              </a:rPr>
-              <a:t>,</a:t>
-            </a:r>
+              <a:t>tc_reset</a:t>
+            </a:r>
+            <a:endParaRPr lang="nb-NO" sz="800" dirty="0">
+              <a:solidFill>
+                <a:schemeClr val="tx1"/>
+              </a:solidFill>
+              <a:latin typeface="Arial" panose="020B0604020202020204" pitchFamily="34" charset="0"/>
+              <a:cs typeface="Arial" panose="020B0604020202020204" pitchFamily="34" charset="0"/>
+            </a:endParaRPr>
           </a:p>
         </p:txBody>
       </p:sp>

</xml_diff>

<commit_message>
Minor documentation update. On fig. page 3: Specification coverage
</commit_message>
<xml_diff>
--- a/bitvis_vip_spec_cov/doc/Figures.pptx
+++ b/bitvis_vip_spec_cov/doc/Figures.pptx
@@ -261,7 +261,7 @@
           <a:p>
             <a:fld id="{BCA49E38-FF81-43B3-86DC-4B20814BC221}" type="datetimeFigureOut">
               <a:rPr lang="nb-NO" smtClean="0"/>
-              <a:t>16.03.2020</a:t>
+              <a:t>27.05.2020</a:t>
             </a:fld>
             <a:endParaRPr lang="nb-NO"/>
           </a:p>
@@ -459,7 +459,7 @@
           <a:p>
             <a:fld id="{BCA49E38-FF81-43B3-86DC-4B20814BC221}" type="datetimeFigureOut">
               <a:rPr lang="nb-NO" smtClean="0"/>
-              <a:t>16.03.2020</a:t>
+              <a:t>27.05.2020</a:t>
             </a:fld>
             <a:endParaRPr lang="nb-NO"/>
           </a:p>
@@ -667,7 +667,7 @@
           <a:p>
             <a:fld id="{BCA49E38-FF81-43B3-86DC-4B20814BC221}" type="datetimeFigureOut">
               <a:rPr lang="nb-NO" smtClean="0"/>
-              <a:t>16.03.2020</a:t>
+              <a:t>27.05.2020</a:t>
             </a:fld>
             <a:endParaRPr lang="nb-NO"/>
           </a:p>
@@ -865,7 +865,7 @@
           <a:p>
             <a:fld id="{BCA49E38-FF81-43B3-86DC-4B20814BC221}" type="datetimeFigureOut">
               <a:rPr lang="nb-NO" smtClean="0"/>
-              <a:t>16.03.2020</a:t>
+              <a:t>27.05.2020</a:t>
             </a:fld>
             <a:endParaRPr lang="nb-NO"/>
           </a:p>
@@ -1140,7 +1140,7 @@
           <a:p>
             <a:fld id="{BCA49E38-FF81-43B3-86DC-4B20814BC221}" type="datetimeFigureOut">
               <a:rPr lang="nb-NO" smtClean="0"/>
-              <a:t>16.03.2020</a:t>
+              <a:t>27.05.2020</a:t>
             </a:fld>
             <a:endParaRPr lang="nb-NO"/>
           </a:p>
@@ -1405,7 +1405,7 @@
           <a:p>
             <a:fld id="{BCA49E38-FF81-43B3-86DC-4B20814BC221}" type="datetimeFigureOut">
               <a:rPr lang="nb-NO" smtClean="0"/>
-              <a:t>16.03.2020</a:t>
+              <a:t>27.05.2020</a:t>
             </a:fld>
             <a:endParaRPr lang="nb-NO"/>
           </a:p>
@@ -1817,7 +1817,7 @@
           <a:p>
             <a:fld id="{BCA49E38-FF81-43B3-86DC-4B20814BC221}" type="datetimeFigureOut">
               <a:rPr lang="nb-NO" smtClean="0"/>
-              <a:t>16.03.2020</a:t>
+              <a:t>27.05.2020</a:t>
             </a:fld>
             <a:endParaRPr lang="nb-NO"/>
           </a:p>
@@ -1958,7 +1958,7 @@
           <a:p>
             <a:fld id="{BCA49E38-FF81-43B3-86DC-4B20814BC221}" type="datetimeFigureOut">
               <a:rPr lang="nb-NO" smtClean="0"/>
-              <a:t>16.03.2020</a:t>
+              <a:t>27.05.2020</a:t>
             </a:fld>
             <a:endParaRPr lang="nb-NO"/>
           </a:p>
@@ -2071,7 +2071,7 @@
           <a:p>
             <a:fld id="{BCA49E38-FF81-43B3-86DC-4B20814BC221}" type="datetimeFigureOut">
               <a:rPr lang="nb-NO" smtClean="0"/>
-              <a:t>16.03.2020</a:t>
+              <a:t>27.05.2020</a:t>
             </a:fld>
             <a:endParaRPr lang="nb-NO"/>
           </a:p>
@@ -2382,7 +2382,7 @@
           <a:p>
             <a:fld id="{BCA49E38-FF81-43B3-86DC-4B20814BC221}" type="datetimeFigureOut">
               <a:rPr lang="nb-NO" smtClean="0"/>
-              <a:t>16.03.2020</a:t>
+              <a:t>27.05.2020</a:t>
             </a:fld>
             <a:endParaRPr lang="nb-NO"/>
           </a:p>
@@ -2670,7 +2670,7 @@
           <a:p>
             <a:fld id="{BCA49E38-FF81-43B3-86DC-4B20814BC221}" type="datetimeFigureOut">
               <a:rPr lang="nb-NO" smtClean="0"/>
-              <a:t>16.03.2020</a:t>
+              <a:t>27.05.2020</a:t>
             </a:fld>
             <a:endParaRPr lang="nb-NO"/>
           </a:p>
@@ -2911,7 +2911,7 @@
           <a:p>
             <a:fld id="{BCA49E38-FF81-43B3-86DC-4B20814BC221}" type="datetimeFigureOut">
               <a:rPr lang="nb-NO" smtClean="0"/>
-              <a:t>16.03.2020</a:t>
+              <a:t>27.05.2020</a:t>
             </a:fld>
             <a:endParaRPr lang="nb-NO"/>
           </a:p>
@@ -4332,7 +4332,7 @@
         <p:spPr>
           <a:xfrm>
             <a:off x="3605292" y="2297400"/>
-            <a:ext cx="2056900" cy="539079"/>
+            <a:ext cx="2056900" cy="599039"/>
           </a:xfrm>
           <a:prstGeom prst="rect">
             <a:avLst/>
@@ -4365,7 +4365,7 @@
           </a:fontRef>
         </p:style>
         <p:txBody>
-          <a:bodyPr rtlCol="0" anchor="t" anchorCtr="0"/>
+          <a:bodyPr lIns="72000" tIns="0" rIns="72000" bIns="0" rtlCol="0" anchor="t" anchorCtr="0"/>
           <a:lstStyle/>
           <a:p>
             <a:r>
@@ -4411,27 +4411,176 @@
           </a:p>
           <a:p>
             <a:r>
-              <a:rPr lang="nb-NO" sz="800" dirty="0">
-                <a:solidFill>
-                  <a:schemeClr val="tx1"/>
-                </a:solidFill>
-                <a:latin typeface="Arial" panose="020B0604020202020204" pitchFamily="34" charset="0"/>
-                <a:cs typeface="Arial" panose="020B0604020202020204" pitchFamily="34" charset="0"/>
-              </a:rPr>
-              <a:t>&lt;</a:t>
-            </a:r>
-            <a:r>
-              <a:rPr lang="nb-NO" sz="800" dirty="0" err="1">
-                <a:solidFill>
-                  <a:schemeClr val="tx1"/>
-                </a:solidFill>
-                <a:latin typeface="Arial" panose="020B0604020202020204" pitchFamily="34" charset="0"/>
-                <a:cs typeface="Arial" panose="020B0604020202020204" pitchFamily="34" charset="0"/>
-              </a:rPr>
-              <a:t>Req</a:t>
-            </a:r>
-            <a:r>
-              <a:rPr lang="nb-NO" sz="800" dirty="0">
+              <a:rPr lang="nb-NO" sz="750" dirty="0">
+                <a:solidFill>
+                  <a:schemeClr val="tx1"/>
+                </a:solidFill>
+                <a:latin typeface="Arial" panose="020B0604020202020204" pitchFamily="34" charset="0"/>
+                <a:cs typeface="Arial" panose="020B0604020202020204" pitchFamily="34" charset="0"/>
+              </a:rPr>
+              <a:t>Three files </a:t>
+            </a:r>
+            <a:r>
+              <a:rPr lang="nb-NO" sz="750" dirty="0" err="1">
+                <a:solidFill>
+                  <a:schemeClr val="tx1"/>
+                </a:solidFill>
+                <a:latin typeface="Arial" panose="020B0604020202020204" pitchFamily="34" charset="0"/>
+                <a:cs typeface="Arial" panose="020B0604020202020204" pitchFamily="34" charset="0"/>
+              </a:rPr>
+              <a:t>are</a:t>
+            </a:r>
+            <a:r>
+              <a:rPr lang="nb-NO" sz="750" dirty="0">
+                <a:solidFill>
+                  <a:schemeClr val="tx1"/>
+                </a:solidFill>
+                <a:latin typeface="Arial" panose="020B0604020202020204" pitchFamily="34" charset="0"/>
+                <a:cs typeface="Arial" panose="020B0604020202020204" pitchFamily="34" charset="0"/>
+              </a:rPr>
+              <a:t> </a:t>
+            </a:r>
+            <a:r>
+              <a:rPr lang="nb-NO" sz="750" dirty="0" err="1">
+                <a:solidFill>
+                  <a:schemeClr val="tx1"/>
+                </a:solidFill>
+                <a:latin typeface="Arial" panose="020B0604020202020204" pitchFamily="34" charset="0"/>
+                <a:cs typeface="Arial" panose="020B0604020202020204" pitchFamily="34" charset="0"/>
+              </a:rPr>
+              <a:t>generated</a:t>
+            </a:r>
+            <a:r>
+              <a:rPr lang="nb-NO" sz="750" dirty="0">
+                <a:solidFill>
+                  <a:schemeClr val="tx1"/>
+                </a:solidFill>
+                <a:latin typeface="Arial" panose="020B0604020202020204" pitchFamily="34" charset="0"/>
+                <a:cs typeface="Arial" panose="020B0604020202020204" pitchFamily="34" charset="0"/>
+              </a:rPr>
+              <a:t>: </a:t>
+            </a:r>
+            <a:r>
+              <a:rPr lang="nb-NO" sz="750" b="1" dirty="0">
+                <a:solidFill>
+                  <a:schemeClr val="tx1"/>
+                </a:solidFill>
+                <a:latin typeface="Arial" panose="020B0604020202020204" pitchFamily="34" charset="0"/>
+                <a:cs typeface="Arial" panose="020B0604020202020204" pitchFamily="34" charset="0"/>
+              </a:rPr>
+              <a:t>(</a:t>
+            </a:r>
+            <a:r>
+              <a:rPr lang="nb-NO" sz="750" b="1" dirty="0" err="1">
+                <a:solidFill>
+                  <a:schemeClr val="tx1"/>
+                </a:solidFill>
+                <a:latin typeface="Arial" panose="020B0604020202020204" pitchFamily="34" charset="0"/>
+                <a:cs typeface="Arial" panose="020B0604020202020204" pitchFamily="34" charset="0"/>
+              </a:rPr>
+              <a:t>see</a:t>
+            </a:r>
+            <a:r>
+              <a:rPr lang="nb-NO" sz="750" b="1" dirty="0">
+                <a:solidFill>
+                  <a:schemeClr val="tx1"/>
+                </a:solidFill>
+                <a:latin typeface="Arial" panose="020B0604020202020204" pitchFamily="34" charset="0"/>
+                <a:cs typeface="Arial" panose="020B0604020202020204" pitchFamily="34" charset="0"/>
+              </a:rPr>
+              <a:t> </a:t>
+            </a:r>
+            <a:r>
+              <a:rPr lang="nb-NO" sz="750" b="1" dirty="0" err="1">
+                <a:solidFill>
+                  <a:schemeClr val="tx1"/>
+                </a:solidFill>
+                <a:latin typeface="Arial" panose="020B0604020202020204" pitchFamily="34" charset="0"/>
+                <a:cs typeface="Arial" panose="020B0604020202020204" pitchFamily="34" charset="0"/>
+              </a:rPr>
+              <a:t>ch</a:t>
+            </a:r>
+            <a:r>
+              <a:rPr lang="nb-NO" sz="750" b="1" dirty="0">
+                <a:solidFill>
+                  <a:schemeClr val="tx1"/>
+                </a:solidFill>
+                <a:latin typeface="Arial" panose="020B0604020202020204" pitchFamily="34" charset="0"/>
+                <a:cs typeface="Arial" panose="020B0604020202020204" pitchFamily="34" charset="0"/>
+              </a:rPr>
+              <a:t>.</a:t>
+            </a:r>
+            <a:r>
+              <a:rPr lang="nb-NO" sz="700" b="1" dirty="0">
+                <a:solidFill>
+                  <a:schemeClr val="tx1"/>
+                </a:solidFill>
+                <a:latin typeface="Arial" panose="020B0604020202020204" pitchFamily="34" charset="0"/>
+                <a:cs typeface="Arial" panose="020B0604020202020204" pitchFamily="34" charset="0"/>
+              </a:rPr>
+              <a:t> 10.2)</a:t>
+            </a:r>
+            <a:r>
+              <a:rPr lang="nb-NO" sz="750" b="1" dirty="0">
+                <a:solidFill>
+                  <a:schemeClr val="tx1"/>
+                </a:solidFill>
+                <a:latin typeface="Arial" panose="020B0604020202020204" pitchFamily="34" charset="0"/>
+                <a:cs typeface="Arial" panose="020B0604020202020204" pitchFamily="34" charset="0"/>
+              </a:rPr>
+              <a:t> </a:t>
+            </a:r>
+            <a:br>
+              <a:rPr lang="nb-NO" sz="750" dirty="0">
+                <a:solidFill>
+                  <a:schemeClr val="tx1"/>
+                </a:solidFill>
+                <a:latin typeface="Arial" panose="020B0604020202020204" pitchFamily="34" charset="0"/>
+                <a:cs typeface="Arial" panose="020B0604020202020204" pitchFamily="34" charset="0"/>
+              </a:rPr>
+            </a:br>
+            <a:r>
+              <a:rPr lang="nb-NO" sz="750" dirty="0">
+                <a:solidFill>
+                  <a:schemeClr val="tx1"/>
+                </a:solidFill>
+                <a:latin typeface="Arial" panose="020B0604020202020204" pitchFamily="34" charset="0"/>
+                <a:cs typeface="Arial" panose="020B0604020202020204" pitchFamily="34" charset="0"/>
+              </a:rPr>
+              <a:t>- </a:t>
+            </a:r>
+            <a:r>
+              <a:rPr lang="nb-NO" sz="750" dirty="0" err="1">
+                <a:solidFill>
+                  <a:schemeClr val="tx1"/>
+                </a:solidFill>
+                <a:latin typeface="Arial" panose="020B0604020202020204" pitchFamily="34" charset="0"/>
+                <a:cs typeface="Arial" panose="020B0604020202020204" pitchFamily="34" charset="0"/>
+              </a:rPr>
+              <a:t>Compliance</a:t>
+            </a:r>
+            <a:r>
+              <a:rPr lang="nb-NO" sz="750" dirty="0">
+                <a:solidFill>
+                  <a:schemeClr val="tx1"/>
+                </a:solidFill>
+                <a:latin typeface="Arial" panose="020B0604020202020204" pitchFamily="34" charset="0"/>
+                <a:cs typeface="Arial" panose="020B0604020202020204" pitchFamily="34" charset="0"/>
+              </a:rPr>
+              <a:t> for </a:t>
+            </a:r>
+            <a:r>
+              <a:rPr lang="nb-NO" sz="750" dirty="0" err="1">
+                <a:solidFill>
+                  <a:schemeClr val="tx1"/>
+                </a:solidFill>
+                <a:latin typeface="Arial" panose="020B0604020202020204" pitchFamily="34" charset="0"/>
+                <a:cs typeface="Arial" panose="020B0604020202020204" pitchFamily="34" charset="0"/>
+              </a:rPr>
+              <a:t>Reqs</a:t>
+            </a:r>
+            <a:r>
+              <a:rPr lang="nb-NO" sz="750" dirty="0">
                 <a:solidFill>
                   <a:schemeClr val="tx1"/>
                 </a:solidFill>
@@ -4441,69 +4590,86 @@
               <a:t>. </a:t>
             </a:r>
             <a:r>
-              <a:rPr lang="nb-NO" sz="800" dirty="0" err="1">
-                <a:solidFill>
-                  <a:schemeClr val="tx1"/>
-                </a:solidFill>
-                <a:latin typeface="Arial" panose="020B0604020202020204" pitchFamily="34" charset="0"/>
-                <a:cs typeface="Arial" panose="020B0604020202020204" pitchFamily="34" charset="0"/>
-              </a:rPr>
-              <a:t>Label</a:t>
-            </a:r>
-            <a:r>
-              <a:rPr lang="nb-NO" sz="800" dirty="0">
-                <a:solidFill>
-                  <a:schemeClr val="tx1"/>
-                </a:solidFill>
-                <a:latin typeface="Arial" panose="020B0604020202020204" pitchFamily="34" charset="0"/>
-                <a:cs typeface="Arial" panose="020B0604020202020204" pitchFamily="34" charset="0"/>
-              </a:rPr>
-              <a:t>&gt;, &lt;</a:t>
-            </a:r>
-            <a:r>
-              <a:rPr lang="nb-NO" sz="800" dirty="0" err="1">
-                <a:solidFill>
-                  <a:schemeClr val="tx1"/>
-                </a:solidFill>
-                <a:latin typeface="Arial" panose="020B0604020202020204" pitchFamily="34" charset="0"/>
-                <a:cs typeface="Arial" panose="020B0604020202020204" pitchFamily="34" charset="0"/>
-              </a:rPr>
-              <a:t>Compliancy</a:t>
-            </a:r>
-            <a:r>
-              <a:rPr lang="nb-NO" sz="800" dirty="0">
-                <a:solidFill>
-                  <a:schemeClr val="tx1"/>
-                </a:solidFill>
-                <a:latin typeface="Arial" panose="020B0604020202020204" pitchFamily="34" charset="0"/>
-                <a:cs typeface="Arial" panose="020B0604020202020204" pitchFamily="34" charset="0"/>
-              </a:rPr>
-              <a:t>&gt;</a:t>
-            </a:r>
-          </a:p>
-          <a:p>
-            <a:r>
-              <a:rPr lang="nb-NO" sz="800" dirty="0">
-                <a:solidFill>
-                  <a:schemeClr val="tx1"/>
-                </a:solidFill>
-                <a:latin typeface="Arial" panose="020B0604020202020204" pitchFamily="34" charset="0"/>
-                <a:cs typeface="Arial" panose="020B0604020202020204" pitchFamily="34" charset="0"/>
-              </a:rPr>
-              <a:t>&lt;</a:t>
-            </a:r>
-            <a:r>
-              <a:rPr lang="nb-NO" sz="800" dirty="0" err="1">
-                <a:solidFill>
-                  <a:schemeClr val="tx1"/>
-                </a:solidFill>
-                <a:latin typeface="Arial" panose="020B0604020202020204" pitchFamily="34" charset="0"/>
-                <a:cs typeface="Arial" panose="020B0604020202020204" pitchFamily="34" charset="0"/>
-              </a:rPr>
-              <a:t>Req</a:t>
-            </a:r>
-            <a:r>
-              <a:rPr lang="nb-NO" sz="800" dirty="0">
+              <a:rPr lang="nb-NO" sz="750" dirty="0" err="1">
+                <a:solidFill>
+                  <a:schemeClr val="tx1"/>
+                </a:solidFill>
+                <a:latin typeface="Arial" panose="020B0604020202020204" pitchFamily="34" charset="0"/>
+                <a:cs typeface="Arial" panose="020B0604020202020204" pitchFamily="34" charset="0"/>
+              </a:rPr>
+              <a:t>vs</a:t>
+            </a:r>
+            <a:r>
+              <a:rPr lang="nb-NO" sz="750" dirty="0">
+                <a:solidFill>
+                  <a:schemeClr val="tx1"/>
+                </a:solidFill>
+                <a:latin typeface="Arial" panose="020B0604020202020204" pitchFamily="34" charset="0"/>
+                <a:cs typeface="Arial" panose="020B0604020202020204" pitchFamily="34" charset="0"/>
+              </a:rPr>
+              <a:t> single </a:t>
+            </a:r>
+            <a:r>
+              <a:rPr lang="nb-NO" sz="750" dirty="0" err="1">
+                <a:solidFill>
+                  <a:schemeClr val="tx1"/>
+                </a:solidFill>
+                <a:latin typeface="Arial" panose="020B0604020202020204" pitchFamily="34" charset="0"/>
+                <a:cs typeface="Arial" panose="020B0604020202020204" pitchFamily="34" charset="0"/>
+              </a:rPr>
+              <a:t>testcase</a:t>
+            </a:r>
+            <a:endParaRPr lang="nb-NO" sz="750" dirty="0">
+              <a:solidFill>
+                <a:schemeClr val="tx1"/>
+              </a:solidFill>
+              <a:latin typeface="Arial" panose="020B0604020202020204" pitchFamily="34" charset="0"/>
+              <a:cs typeface="Arial" panose="020B0604020202020204" pitchFamily="34" charset="0"/>
+            </a:endParaRPr>
+          </a:p>
+          <a:p>
+            <a:r>
+              <a:rPr lang="nb-NO" sz="750" dirty="0">
+                <a:solidFill>
+                  <a:schemeClr val="tx1"/>
+                </a:solidFill>
+                <a:latin typeface="Arial" panose="020B0604020202020204" pitchFamily="34" charset="0"/>
+                <a:cs typeface="Arial" panose="020B0604020202020204" pitchFamily="34" charset="0"/>
+              </a:rPr>
+              <a:t>- </a:t>
+            </a:r>
+            <a:r>
+              <a:rPr lang="nb-NO" sz="750" dirty="0" err="1">
+                <a:solidFill>
+                  <a:schemeClr val="tx1"/>
+                </a:solidFill>
+                <a:latin typeface="Arial" panose="020B0604020202020204" pitchFamily="34" charset="0"/>
+                <a:cs typeface="Arial" panose="020B0604020202020204" pitchFamily="34" charset="0"/>
+              </a:rPr>
+              <a:t>Compliance</a:t>
+            </a:r>
+            <a:r>
+              <a:rPr lang="nb-NO" sz="750" dirty="0">
+                <a:solidFill>
+                  <a:schemeClr val="tx1"/>
+                </a:solidFill>
+                <a:latin typeface="Arial" panose="020B0604020202020204" pitchFamily="34" charset="0"/>
+                <a:cs typeface="Arial" panose="020B0604020202020204" pitchFamily="34" charset="0"/>
+              </a:rPr>
+              <a:t> for </a:t>
+            </a:r>
+            <a:r>
+              <a:rPr lang="nb-NO" sz="750" dirty="0" err="1">
+                <a:solidFill>
+                  <a:schemeClr val="tx1"/>
+                </a:solidFill>
+                <a:latin typeface="Arial" panose="020B0604020202020204" pitchFamily="34" charset="0"/>
+                <a:cs typeface="Arial" panose="020B0604020202020204" pitchFamily="34" charset="0"/>
+              </a:rPr>
+              <a:t>Reqs</a:t>
+            </a:r>
+            <a:r>
+              <a:rPr lang="nb-NO" sz="750" dirty="0">
                 <a:solidFill>
                   <a:schemeClr val="tx1"/>
                 </a:solidFill>
@@ -4513,57 +4679,111 @@
               <a:t>. </a:t>
             </a:r>
             <a:r>
-              <a:rPr lang="nb-NO" sz="800" dirty="0" err="1">
-                <a:solidFill>
-                  <a:schemeClr val="tx1"/>
-                </a:solidFill>
-                <a:latin typeface="Arial" panose="020B0604020202020204" pitchFamily="34" charset="0"/>
-                <a:cs typeface="Arial" panose="020B0604020202020204" pitchFamily="34" charset="0"/>
-              </a:rPr>
-              <a:t>Label</a:t>
-            </a:r>
-            <a:r>
-              <a:rPr lang="nb-NO" sz="800" dirty="0">
-                <a:solidFill>
-                  <a:schemeClr val="tx1"/>
-                </a:solidFill>
-                <a:latin typeface="Arial" panose="020B0604020202020204" pitchFamily="34" charset="0"/>
-                <a:cs typeface="Arial" panose="020B0604020202020204" pitchFamily="34" charset="0"/>
-              </a:rPr>
-              <a:t>&gt;, &lt;</a:t>
-            </a:r>
-            <a:r>
-              <a:rPr lang="nb-NO" sz="800" dirty="0" err="1">
-                <a:solidFill>
-                  <a:schemeClr val="tx1"/>
-                </a:solidFill>
-                <a:latin typeface="Arial" panose="020B0604020202020204" pitchFamily="34" charset="0"/>
-                <a:cs typeface="Arial" panose="020B0604020202020204" pitchFamily="34" charset="0"/>
-              </a:rPr>
-              <a:t>Compliancy</a:t>
-            </a:r>
-            <a:r>
-              <a:rPr lang="nb-NO" sz="800" dirty="0">
-                <a:solidFill>
-                  <a:schemeClr val="tx1"/>
-                </a:solidFill>
-                <a:latin typeface="Arial" panose="020B0604020202020204" pitchFamily="34" charset="0"/>
-                <a:cs typeface="Arial" panose="020B0604020202020204" pitchFamily="34" charset="0"/>
-              </a:rPr>
-              <a:t>&gt;</a:t>
-            </a:r>
-          </a:p>
-          <a:p>
-            <a:r>
-              <a:rPr lang="nb-NO" sz="800" dirty="0">
-                <a:solidFill>
-                  <a:schemeClr val="tx1"/>
-                </a:solidFill>
-                <a:latin typeface="Arial" panose="020B0604020202020204" pitchFamily="34" charset="0"/>
-                <a:cs typeface="Arial" panose="020B0604020202020204" pitchFamily="34" charset="0"/>
-              </a:rPr>
-              <a:t>……….</a:t>
-            </a:r>
+              <a:rPr lang="nb-NO" sz="750" dirty="0" err="1">
+                <a:solidFill>
+                  <a:schemeClr val="tx1"/>
+                </a:solidFill>
+                <a:latin typeface="Arial" panose="020B0604020202020204" pitchFamily="34" charset="0"/>
+                <a:cs typeface="Arial" panose="020B0604020202020204" pitchFamily="34" charset="0"/>
+              </a:rPr>
+              <a:t>vs</a:t>
+            </a:r>
+            <a:r>
+              <a:rPr lang="nb-NO" sz="750" dirty="0">
+                <a:solidFill>
+                  <a:schemeClr val="tx1"/>
+                </a:solidFill>
+                <a:latin typeface="Arial" panose="020B0604020202020204" pitchFamily="34" charset="0"/>
+                <a:cs typeface="Arial" panose="020B0604020202020204" pitchFamily="34" charset="0"/>
+              </a:rPr>
+              <a:t> multiple </a:t>
+            </a:r>
+            <a:r>
+              <a:rPr lang="nb-NO" sz="750" dirty="0" err="1">
+                <a:solidFill>
+                  <a:schemeClr val="tx1"/>
+                </a:solidFill>
+                <a:latin typeface="Arial" panose="020B0604020202020204" pitchFamily="34" charset="0"/>
+                <a:cs typeface="Arial" panose="020B0604020202020204" pitchFamily="34" charset="0"/>
+              </a:rPr>
+              <a:t>testcases</a:t>
+            </a:r>
+            <a:br>
+              <a:rPr lang="nb-NO" sz="750" dirty="0">
+                <a:solidFill>
+                  <a:schemeClr val="tx1"/>
+                </a:solidFill>
+                <a:latin typeface="Arial" panose="020B0604020202020204" pitchFamily="34" charset="0"/>
+                <a:cs typeface="Arial" panose="020B0604020202020204" pitchFamily="34" charset="0"/>
+              </a:rPr>
+            </a:br>
+            <a:r>
+              <a:rPr lang="nb-NO" sz="750" dirty="0">
+                <a:solidFill>
+                  <a:schemeClr val="tx1"/>
+                </a:solidFill>
+                <a:latin typeface="Arial" panose="020B0604020202020204" pitchFamily="34" charset="0"/>
+                <a:cs typeface="Arial" panose="020B0604020202020204" pitchFamily="34" charset="0"/>
+              </a:rPr>
+              <a:t>- Status for </a:t>
+            </a:r>
+            <a:r>
+              <a:rPr lang="nb-NO" sz="750" dirty="0" err="1">
+                <a:solidFill>
+                  <a:schemeClr val="tx1"/>
+                </a:solidFill>
+                <a:latin typeface="Arial" panose="020B0604020202020204" pitchFamily="34" charset="0"/>
+                <a:cs typeface="Arial" panose="020B0604020202020204" pitchFamily="34" charset="0"/>
+              </a:rPr>
+              <a:t>Reqs</a:t>
+            </a:r>
+            <a:r>
+              <a:rPr lang="nb-NO" sz="750" dirty="0">
+                <a:solidFill>
+                  <a:schemeClr val="tx1"/>
+                </a:solidFill>
+                <a:latin typeface="Arial" panose="020B0604020202020204" pitchFamily="34" charset="0"/>
+                <a:cs typeface="Arial" panose="020B0604020202020204" pitchFamily="34" charset="0"/>
+              </a:rPr>
+              <a:t>. in </a:t>
+            </a:r>
+            <a:r>
+              <a:rPr lang="nb-NO" sz="750" dirty="0" err="1">
+                <a:solidFill>
+                  <a:schemeClr val="tx1"/>
+                </a:solidFill>
+                <a:latin typeface="Arial" panose="020B0604020202020204" pitchFamily="34" charset="0"/>
+                <a:cs typeface="Arial" panose="020B0604020202020204" pitchFamily="34" charset="0"/>
+              </a:rPr>
+              <a:t>each</a:t>
+            </a:r>
+            <a:r>
+              <a:rPr lang="nb-NO" sz="750" dirty="0">
+                <a:solidFill>
+                  <a:schemeClr val="tx1"/>
+                </a:solidFill>
+                <a:latin typeface="Arial" panose="020B0604020202020204" pitchFamily="34" charset="0"/>
+                <a:cs typeface="Arial" panose="020B0604020202020204" pitchFamily="34" charset="0"/>
+              </a:rPr>
+              <a:t> </a:t>
+            </a:r>
+            <a:r>
+              <a:rPr lang="nb-NO" sz="750" dirty="0" err="1">
+                <a:solidFill>
+                  <a:schemeClr val="tx1"/>
+                </a:solidFill>
+                <a:latin typeface="Arial" panose="020B0604020202020204" pitchFamily="34" charset="0"/>
+                <a:cs typeface="Arial" panose="020B0604020202020204" pitchFamily="34" charset="0"/>
+              </a:rPr>
+              <a:t>testcase</a:t>
+            </a:r>
+            <a:endParaRPr lang="nb-NO" sz="750" dirty="0">
+              <a:solidFill>
+                <a:schemeClr val="tx1"/>
+              </a:solidFill>
+              <a:latin typeface="Arial" panose="020B0604020202020204" pitchFamily="34" charset="0"/>
+              <a:cs typeface="Arial" panose="020B0604020202020204" pitchFamily="34" charset="0"/>
+            </a:endParaRPr>
           </a:p>
         </p:txBody>
       </p:sp>
@@ -5026,7 +5246,7 @@
         <p:spPr>
           <a:xfrm>
             <a:off x="8131953" y="448170"/>
-            <a:ext cx="2091203" cy="2317687"/>
+            <a:ext cx="2091203" cy="2429500"/>
           </a:xfrm>
           <a:prstGeom prst="rect">
             <a:avLst/>
@@ -5737,7 +5957,7 @@
         <p:spPr>
           <a:xfrm>
             <a:off x="5718213" y="2165552"/>
-            <a:ext cx="2180491" cy="688505"/>
+            <a:ext cx="2180491" cy="730883"/>
           </a:xfrm>
           <a:prstGeom prst="rect">
             <a:avLst/>
@@ -5770,7 +5990,7 @@
           </a:fontRef>
         </p:style>
         <p:txBody>
-          <a:bodyPr rtlCol="0" anchor="t" anchorCtr="0"/>
+          <a:bodyPr tIns="0" rtlCol="0" anchor="t" anchorCtr="0"/>
           <a:lstStyle/>
           <a:p>
             <a:r>
@@ -5816,174 +6036,263 @@
           </a:p>
           <a:p>
             <a:r>
-              <a:rPr lang="nb-NO" sz="800" dirty="0">
-                <a:solidFill>
-                  <a:schemeClr val="tx1"/>
-                </a:solidFill>
-                <a:latin typeface="Arial" panose="020B0604020202020204" pitchFamily="34" charset="0"/>
-                <a:cs typeface="Arial" panose="020B0604020202020204" pitchFamily="34" charset="0"/>
-              </a:rPr>
-              <a:t>&lt;</a:t>
-            </a:r>
-            <a:r>
-              <a:rPr lang="nb-NO" sz="800" dirty="0" err="1">
-                <a:solidFill>
-                  <a:schemeClr val="tx1"/>
-                </a:solidFill>
-                <a:latin typeface="Arial" panose="020B0604020202020204" pitchFamily="34" charset="0"/>
-                <a:cs typeface="Arial" panose="020B0604020202020204" pitchFamily="34" charset="0"/>
-              </a:rPr>
-              <a:t>spec_cov_file</a:t>
-            </a:r>
-            <a:r>
-              <a:rPr lang="nb-NO" sz="800" dirty="0">
-                <a:solidFill>
-                  <a:schemeClr val="tx1"/>
-                </a:solidFill>
-                <a:latin typeface="Arial" panose="020B0604020202020204" pitchFamily="34" charset="0"/>
-                <a:cs typeface="Arial" panose="020B0604020202020204" pitchFamily="34" charset="0"/>
-              </a:rPr>
-              <a:t>&gt;.</a:t>
-            </a:r>
-            <a:r>
-              <a:rPr lang="nb-NO" sz="800" dirty="0" err="1">
-                <a:solidFill>
-                  <a:schemeClr val="tx1"/>
-                </a:solidFill>
-                <a:latin typeface="Arial" panose="020B0604020202020204" pitchFamily="34" charset="0"/>
-                <a:cs typeface="Arial" panose="020B0604020202020204" pitchFamily="34" charset="0"/>
-              </a:rPr>
-              <a:t>req_vs_single_tc.csv</a:t>
-            </a:r>
-            <a:endParaRPr lang="nb-NO" sz="800" dirty="0">
-              <a:solidFill>
-                <a:schemeClr val="tx1"/>
-              </a:solidFill>
-              <a:latin typeface="Arial" panose="020B0604020202020204" pitchFamily="34" charset="0"/>
-              <a:cs typeface="Arial" panose="020B0604020202020204" pitchFamily="34" charset="0"/>
-            </a:endParaRPr>
-          </a:p>
-          <a:p>
-            <a:r>
-              <a:rPr lang="nb-NO" sz="800" dirty="0">
-                <a:solidFill>
-                  <a:schemeClr val="tx1"/>
-                </a:solidFill>
-                <a:latin typeface="Arial" panose="020B0604020202020204" pitchFamily="34" charset="0"/>
-                <a:cs typeface="Arial" panose="020B0604020202020204" pitchFamily="34" charset="0"/>
-              </a:rPr>
-              <a:t>&lt;</a:t>
-            </a:r>
-            <a:r>
-              <a:rPr lang="nb-NO" sz="800" dirty="0" err="1">
-                <a:solidFill>
-                  <a:schemeClr val="tx1"/>
-                </a:solidFill>
-                <a:latin typeface="Arial" panose="020B0604020202020204" pitchFamily="34" charset="0"/>
-                <a:cs typeface="Arial" panose="020B0604020202020204" pitchFamily="34" charset="0"/>
-              </a:rPr>
-              <a:t>spec_cov_file</a:t>
-            </a:r>
-            <a:r>
-              <a:rPr lang="nb-NO" sz="800" dirty="0">
-                <a:solidFill>
-                  <a:schemeClr val="tx1"/>
-                </a:solidFill>
-                <a:latin typeface="Arial" panose="020B0604020202020204" pitchFamily="34" charset="0"/>
-                <a:cs typeface="Arial" panose="020B0604020202020204" pitchFamily="34" charset="0"/>
-              </a:rPr>
-              <a:t>&gt;.</a:t>
-            </a:r>
-            <a:r>
-              <a:rPr lang="nb-NO" sz="800" dirty="0" err="1">
-                <a:solidFill>
-                  <a:schemeClr val="tx1"/>
-                </a:solidFill>
-                <a:latin typeface="Arial" panose="020B0604020202020204" pitchFamily="34" charset="0"/>
-                <a:cs typeface="Arial" panose="020B0604020202020204" pitchFamily="34" charset="0"/>
-              </a:rPr>
-              <a:t>tc_vs_reqs.csv</a:t>
-            </a:r>
-            <a:endParaRPr lang="nb-NO" sz="800" dirty="0">
-              <a:solidFill>
-                <a:schemeClr val="tx1"/>
-              </a:solidFill>
-              <a:latin typeface="Arial" panose="020B0604020202020204" pitchFamily="34" charset="0"/>
-              <a:cs typeface="Arial" panose="020B0604020202020204" pitchFamily="34" charset="0"/>
-            </a:endParaRPr>
-          </a:p>
-          <a:p>
-            <a:r>
-              <a:rPr lang="nb-NO" sz="800" dirty="0">
-                <a:solidFill>
-                  <a:schemeClr val="tx1"/>
-                </a:solidFill>
-                <a:latin typeface="Arial" panose="020B0604020202020204" pitchFamily="34" charset="0"/>
-                <a:cs typeface="Arial" panose="020B0604020202020204" pitchFamily="34" charset="0"/>
-              </a:rPr>
-              <a:t>&lt;</a:t>
-            </a:r>
-            <a:r>
-              <a:rPr lang="nb-NO" sz="800" dirty="0" err="1">
-                <a:solidFill>
-                  <a:schemeClr val="tx1"/>
-                </a:solidFill>
-                <a:latin typeface="Arial" panose="020B0604020202020204" pitchFamily="34" charset="0"/>
-                <a:cs typeface="Arial" panose="020B0604020202020204" pitchFamily="34" charset="0"/>
-              </a:rPr>
-              <a:t>spec_cov_file</a:t>
-            </a:r>
-            <a:r>
-              <a:rPr lang="nb-NO" sz="800" dirty="0">
-                <a:solidFill>
-                  <a:schemeClr val="tx1"/>
-                </a:solidFill>
-                <a:latin typeface="Arial" panose="020B0604020202020204" pitchFamily="34" charset="0"/>
-                <a:cs typeface="Arial" panose="020B0604020202020204" pitchFamily="34" charset="0"/>
-              </a:rPr>
-              <a:t>&gt;.</a:t>
-            </a:r>
-            <a:r>
-              <a:rPr lang="nb-NO" sz="800" dirty="0" err="1">
-                <a:solidFill>
-                  <a:schemeClr val="tx1"/>
-                </a:solidFill>
-                <a:latin typeface="Arial" panose="020B0604020202020204" pitchFamily="34" charset="0"/>
-                <a:cs typeface="Arial" panose="020B0604020202020204" pitchFamily="34" charset="0"/>
-              </a:rPr>
-              <a:t>req_vs_tcs.csv</a:t>
-            </a:r>
-            <a:endParaRPr lang="nb-NO" sz="800" dirty="0">
-              <a:solidFill>
-                <a:schemeClr val="tx1"/>
-              </a:solidFill>
-              <a:latin typeface="Arial" panose="020B0604020202020204" pitchFamily="34" charset="0"/>
-              <a:cs typeface="Arial" panose="020B0604020202020204" pitchFamily="34" charset="0"/>
-            </a:endParaRPr>
-          </a:p>
-          <a:p>
-            <a:r>
-              <a:rPr lang="nb-NO" sz="800" dirty="0">
-                <a:solidFill>
-                  <a:schemeClr val="tx1"/>
-                </a:solidFill>
-                <a:latin typeface="Arial" panose="020B0604020202020204" pitchFamily="34" charset="0"/>
-                <a:cs typeface="Arial" panose="020B0604020202020204" pitchFamily="34" charset="0"/>
-              </a:rPr>
-              <a:t>- See </a:t>
-            </a:r>
-            <a:r>
-              <a:rPr lang="nb-NO" sz="800" dirty="0" err="1">
-                <a:solidFill>
-                  <a:schemeClr val="tx1"/>
-                </a:solidFill>
-                <a:latin typeface="Arial" panose="020B0604020202020204" pitchFamily="34" charset="0"/>
-                <a:cs typeface="Arial" panose="020B0604020202020204" pitchFamily="34" charset="0"/>
-              </a:rPr>
-              <a:t>Section</a:t>
-            </a:r>
-            <a:r>
-              <a:rPr lang="nb-NO" sz="800" dirty="0">
+              <a:rPr lang="nb-NO" sz="750" dirty="0">
+                <a:solidFill>
+                  <a:schemeClr val="tx1"/>
+                </a:solidFill>
+                <a:latin typeface="Arial" panose="020B0604020202020204" pitchFamily="34" charset="0"/>
+                <a:cs typeface="Arial" panose="020B0604020202020204" pitchFamily="34" charset="0"/>
+              </a:rPr>
+              <a:t>(</a:t>
+            </a:r>
+            <a:r>
+              <a:rPr lang="nb-NO" sz="750" dirty="0" err="1">
+                <a:solidFill>
+                  <a:schemeClr val="tx1"/>
+                </a:solidFill>
+                <a:latin typeface="Arial" panose="020B0604020202020204" pitchFamily="34" charset="0"/>
+                <a:cs typeface="Arial" panose="020B0604020202020204" pitchFamily="34" charset="0"/>
+              </a:rPr>
+              <a:t>Excerpts</a:t>
+            </a:r>
+            <a:r>
+              <a:rPr lang="nb-NO" sz="750" dirty="0">
+                <a:solidFill>
+                  <a:schemeClr val="tx1"/>
+                </a:solidFill>
+                <a:latin typeface="Arial" panose="020B0604020202020204" pitchFamily="34" charset="0"/>
+                <a:cs typeface="Arial" panose="020B0604020202020204" pitchFamily="34" charset="0"/>
+              </a:rPr>
+              <a:t> from '</a:t>
+            </a:r>
+            <a:r>
+              <a:rPr lang="nb-NO" sz="750" dirty="0" err="1">
+                <a:solidFill>
+                  <a:schemeClr val="tx1"/>
+                </a:solidFill>
+                <a:latin typeface="Arial" panose="020B0604020202020204" pitchFamily="34" charset="0"/>
+                <a:cs typeface="Arial" panose="020B0604020202020204" pitchFamily="34" charset="0"/>
+              </a:rPr>
+              <a:t>Reqs</a:t>
+            </a:r>
+            <a:r>
+              <a:rPr lang="nb-NO" sz="750" dirty="0">
+                <a:solidFill>
+                  <a:schemeClr val="tx1"/>
+                </a:solidFill>
+                <a:latin typeface="Arial" panose="020B0604020202020204" pitchFamily="34" charset="0"/>
+                <a:cs typeface="Arial" panose="020B0604020202020204" pitchFamily="34" charset="0"/>
+              </a:rPr>
+              <a:t> </a:t>
+            </a:r>
+            <a:r>
+              <a:rPr lang="nb-NO" sz="750" dirty="0" err="1">
+                <a:solidFill>
+                  <a:schemeClr val="tx1"/>
+                </a:solidFill>
+                <a:latin typeface="Arial" panose="020B0604020202020204" pitchFamily="34" charset="0"/>
+                <a:cs typeface="Arial" panose="020B0604020202020204" pitchFamily="34" charset="0"/>
+              </a:rPr>
+              <a:t>vs</a:t>
+            </a:r>
+            <a:r>
+              <a:rPr lang="nb-NO" sz="750" dirty="0">
+                <a:solidFill>
+                  <a:schemeClr val="tx1"/>
+                </a:solidFill>
+                <a:latin typeface="Arial" panose="020B0604020202020204" pitchFamily="34" charset="0"/>
+                <a:cs typeface="Arial" panose="020B0604020202020204" pitchFamily="34" charset="0"/>
+              </a:rPr>
+              <a:t> single </a:t>
+            </a:r>
+            <a:r>
+              <a:rPr lang="nb-NO" sz="750" dirty="0" err="1">
+                <a:solidFill>
+                  <a:schemeClr val="tx1"/>
+                </a:solidFill>
+                <a:latin typeface="Arial" panose="020B0604020202020204" pitchFamily="34" charset="0"/>
+                <a:cs typeface="Arial" panose="020B0604020202020204" pitchFamily="34" charset="0"/>
+              </a:rPr>
+              <a:t>testcase</a:t>
+            </a:r>
+            <a:r>
+              <a:rPr lang="nb-NO" sz="750" dirty="0">
+                <a:solidFill>
+                  <a:schemeClr val="tx1"/>
+                </a:solidFill>
+                <a:latin typeface="Arial" panose="020B0604020202020204" pitchFamily="34" charset="0"/>
+                <a:cs typeface="Arial" panose="020B0604020202020204" pitchFamily="34" charset="0"/>
+              </a:rPr>
+              <a:t>)</a:t>
+            </a:r>
+            <a:br>
+              <a:rPr lang="nb-NO" sz="750" dirty="0">
+                <a:solidFill>
+                  <a:schemeClr val="tx1"/>
+                </a:solidFill>
+                <a:latin typeface="Arial" panose="020B0604020202020204" pitchFamily="34" charset="0"/>
+                <a:cs typeface="Arial" panose="020B0604020202020204" pitchFamily="34" charset="0"/>
+              </a:rPr>
+            </a:br>
+            <a:r>
+              <a:rPr lang="nb-NO" sz="750" dirty="0">
+                <a:solidFill>
+                  <a:schemeClr val="tx1"/>
+                </a:solidFill>
+                <a:latin typeface="Arial" panose="020B0604020202020204" pitchFamily="34" charset="0"/>
+                <a:cs typeface="Arial" panose="020B0604020202020204" pitchFamily="34" charset="0"/>
+              </a:rPr>
+              <a:t>UART_REQ_1, </a:t>
+            </a:r>
+            <a:r>
+              <a:rPr lang="nb-NO" sz="750" dirty="0" err="1">
+                <a:solidFill>
+                  <a:schemeClr val="tx1"/>
+                </a:solidFill>
+                <a:latin typeface="Arial" panose="020B0604020202020204" pitchFamily="34" charset="0"/>
+                <a:cs typeface="Arial" panose="020B0604020202020204" pitchFamily="34" charset="0"/>
+              </a:rPr>
+              <a:t>tc_basic</a:t>
+            </a:r>
+            <a:r>
+              <a:rPr lang="nb-NO" sz="750" dirty="0">
+                <a:solidFill>
+                  <a:schemeClr val="tx1"/>
+                </a:solidFill>
+                <a:latin typeface="Arial" panose="020B0604020202020204" pitchFamily="34" charset="0"/>
+                <a:cs typeface="Arial" panose="020B0604020202020204" pitchFamily="34" charset="0"/>
+              </a:rPr>
+              <a:t>, COMPLIANT</a:t>
+            </a:r>
+            <a:br>
+              <a:rPr lang="nb-NO" sz="750" dirty="0">
+                <a:solidFill>
+                  <a:schemeClr val="tx1"/>
+                </a:solidFill>
+                <a:latin typeface="Arial" panose="020B0604020202020204" pitchFamily="34" charset="0"/>
+                <a:cs typeface="Arial" panose="020B0604020202020204" pitchFamily="34" charset="0"/>
+              </a:rPr>
+            </a:br>
+            <a:r>
+              <a:rPr lang="nb-NO" sz="750" dirty="0">
+                <a:solidFill>
+                  <a:schemeClr val="tx1"/>
+                </a:solidFill>
+                <a:latin typeface="Arial" panose="020B0604020202020204" pitchFamily="34" charset="0"/>
+                <a:cs typeface="Arial" panose="020B0604020202020204" pitchFamily="34" charset="0"/>
+              </a:rPr>
+              <a:t>UART_REQ_2, </a:t>
+            </a:r>
+            <a:r>
+              <a:rPr lang="nb-NO" sz="750" dirty="0" err="1">
+                <a:solidFill>
+                  <a:schemeClr val="tx1"/>
+                </a:solidFill>
+                <a:latin typeface="Arial" panose="020B0604020202020204" pitchFamily="34" charset="0"/>
+                <a:cs typeface="Arial" panose="020B0604020202020204" pitchFamily="34" charset="0"/>
+              </a:rPr>
+              <a:t>tc_basic</a:t>
+            </a:r>
+            <a:r>
+              <a:rPr lang="nb-NO" sz="750" dirty="0">
+                <a:solidFill>
+                  <a:schemeClr val="tx1"/>
+                </a:solidFill>
+                <a:latin typeface="Arial" panose="020B0604020202020204" pitchFamily="34" charset="0"/>
+                <a:cs typeface="Arial" panose="020B0604020202020204" pitchFamily="34" charset="0"/>
+              </a:rPr>
+              <a:t>, COMPLIANT</a:t>
+            </a:r>
+            <a:br>
+              <a:rPr lang="nb-NO" sz="750" dirty="0">
+                <a:solidFill>
+                  <a:schemeClr val="tx1"/>
+                </a:solidFill>
+                <a:latin typeface="Arial" panose="020B0604020202020204" pitchFamily="34" charset="0"/>
+                <a:cs typeface="Arial" panose="020B0604020202020204" pitchFamily="34" charset="0"/>
+              </a:rPr>
+            </a:br>
+            <a:r>
+              <a:rPr lang="nb-NO" sz="750" dirty="0">
+                <a:solidFill>
+                  <a:schemeClr val="tx1"/>
+                </a:solidFill>
+                <a:latin typeface="Arial" panose="020B0604020202020204" pitchFamily="34" charset="0"/>
+                <a:cs typeface="Arial" panose="020B0604020202020204" pitchFamily="34" charset="0"/>
+              </a:rPr>
+              <a:t>UART_REQ_3, </a:t>
+            </a:r>
+            <a:r>
+              <a:rPr lang="nb-NO" sz="750" dirty="0" err="1">
+                <a:solidFill>
+                  <a:schemeClr val="tx1"/>
+                </a:solidFill>
+                <a:latin typeface="Arial" panose="020B0604020202020204" pitchFamily="34" charset="0"/>
+                <a:cs typeface="Arial" panose="020B0604020202020204" pitchFamily="34" charset="0"/>
+              </a:rPr>
+              <a:t>tc_basic</a:t>
+            </a:r>
+            <a:r>
+              <a:rPr lang="nb-NO" sz="750" dirty="0">
+                <a:solidFill>
+                  <a:schemeClr val="tx1"/>
+                </a:solidFill>
+                <a:latin typeface="Arial" panose="020B0604020202020204" pitchFamily="34" charset="0"/>
+                <a:cs typeface="Arial" panose="020B0604020202020204" pitchFamily="34" charset="0"/>
+              </a:rPr>
+              <a:t>, NON_COMPLIANT</a:t>
+            </a:r>
+            <a:br>
+              <a:rPr lang="nb-NO" sz="750" dirty="0">
+                <a:solidFill>
+                  <a:schemeClr val="tx1"/>
+                </a:solidFill>
+                <a:latin typeface="Arial" panose="020B0604020202020204" pitchFamily="34" charset="0"/>
+                <a:cs typeface="Arial" panose="020B0604020202020204" pitchFamily="34" charset="0"/>
+              </a:rPr>
+            </a:br>
+            <a:r>
+              <a:rPr lang="nb-NO" sz="750" dirty="0">
+                <a:solidFill>
+                  <a:schemeClr val="tx1"/>
+                </a:solidFill>
+                <a:latin typeface="Arial" panose="020B0604020202020204" pitchFamily="34" charset="0"/>
+                <a:cs typeface="Arial" panose="020B0604020202020204" pitchFamily="34" charset="0"/>
+              </a:rPr>
+              <a:t>(</a:t>
+            </a:r>
+            <a:r>
+              <a:rPr lang="nb-NO" sz="750" b="1" dirty="0">
+                <a:solidFill>
+                  <a:schemeClr val="tx1"/>
+                </a:solidFill>
+                <a:latin typeface="Arial" panose="020B0604020202020204" pitchFamily="34" charset="0"/>
+                <a:cs typeface="Arial" panose="020B0604020202020204" pitchFamily="34" charset="0"/>
+              </a:rPr>
+              <a:t>See </a:t>
+            </a:r>
+            <a:r>
+              <a:rPr lang="nb-NO" sz="750" b="1" dirty="0" err="1">
+                <a:solidFill>
+                  <a:schemeClr val="tx1"/>
+                </a:solidFill>
+                <a:latin typeface="Arial" panose="020B0604020202020204" pitchFamily="34" charset="0"/>
+                <a:cs typeface="Arial" panose="020B0604020202020204" pitchFamily="34" charset="0"/>
+              </a:rPr>
+              <a:t>ch</a:t>
+            </a:r>
+            <a:r>
+              <a:rPr lang="nb-NO" sz="750" b="1" dirty="0">
+                <a:solidFill>
+                  <a:schemeClr val="tx1"/>
+                </a:solidFill>
+                <a:latin typeface="Arial" panose="020B0604020202020204" pitchFamily="34" charset="0"/>
+                <a:cs typeface="Arial" panose="020B0604020202020204" pitchFamily="34" charset="0"/>
+              </a:rPr>
+              <a:t>.</a:t>
+            </a:r>
+            <a:r>
+              <a:rPr lang="nb-NO" sz="700" b="1" dirty="0">
                 <a:solidFill>
                   <a:schemeClr val="tx1"/>
                 </a:solidFill>
@@ -5993,7 +6302,7 @@
               <a:t> 10.2 for </a:t>
             </a:r>
             <a:r>
-              <a:rPr lang="nb-NO" sz="800" dirty="0" err="1">
+              <a:rPr lang="nb-NO" sz="700" b="1" dirty="0" err="1">
                 <a:solidFill>
                   <a:schemeClr val="tx1"/>
                 </a:solidFill>
@@ -6002,7 +6311,27 @@
               </a:rPr>
               <a:t>details</a:t>
             </a:r>
-            <a:endParaRPr lang="nb-NO" sz="800" dirty="0">
+            <a:r>
+              <a:rPr lang="nb-NO" sz="700" b="1" dirty="0">
+                <a:solidFill>
+                  <a:schemeClr val="tx1"/>
+                </a:solidFill>
+                <a:latin typeface="Arial" panose="020B0604020202020204" pitchFamily="34" charset="0"/>
+                <a:cs typeface="Arial" panose="020B0604020202020204" pitchFamily="34" charset="0"/>
+              </a:rPr>
+              <a:t>)</a:t>
+            </a:r>
+            <a:r>
+              <a:rPr lang="nb-NO" sz="750" b="1" dirty="0">
+                <a:solidFill>
+                  <a:schemeClr val="tx1"/>
+                </a:solidFill>
+                <a:latin typeface="Arial" panose="020B0604020202020204" pitchFamily="34" charset="0"/>
+                <a:cs typeface="Arial" panose="020B0604020202020204" pitchFamily="34" charset="0"/>
+              </a:rPr>
+              <a:t> </a:t>
+            </a:r>
+            <a:endParaRPr lang="nb-NO" sz="750" dirty="0">
               <a:solidFill>
                 <a:schemeClr val="tx1"/>
               </a:solidFill>
@@ -6094,7 +6423,7 @@
         </p:nvSpPr>
         <p:spPr>
           <a:xfrm>
-            <a:off x="5280966" y="2309776"/>
+            <a:off x="5360590" y="2321798"/>
             <a:ext cx="278360" cy="150684"/>
           </a:xfrm>
           <a:prstGeom prst="ellipse">
@@ -6298,7 +6627,7 @@
         </p:nvSpPr>
         <p:spPr>
           <a:xfrm>
-            <a:off x="7238067" y="2177752"/>
+            <a:off x="7541081" y="2179210"/>
             <a:ext cx="278360" cy="150684"/>
           </a:xfrm>
           <a:prstGeom prst="ellipse">
@@ -10064,6 +10393,58 @@
           <a:chExt cx="0" cy="0"/>
         </a:xfrm>
       </p:grpSpPr>
+      <p:sp>
+        <p:nvSpPr>
+          <p:cNvPr id="8" name="Rektangel 7">
+            <a:extLst>
+              <a:ext uri="{FF2B5EF4-FFF2-40B4-BE49-F238E27FC236}">
+                <a16:creationId xmlns:a16="http://schemas.microsoft.com/office/drawing/2014/main" id="{FF5B5568-6F5A-4176-8E9B-55B153C4BD68}"/>
+              </a:ext>
+            </a:extLst>
+          </p:cNvPr>
+          <p:cNvSpPr/>
+          <p:nvPr/>
+        </p:nvSpPr>
+        <p:spPr>
+          <a:xfrm>
+            <a:off x="1317523" y="3018504"/>
+            <a:ext cx="4936062" cy="1165660"/>
+          </a:xfrm>
+          <a:prstGeom prst="rect">
+            <a:avLst/>
+          </a:prstGeom>
+          <a:solidFill>
+            <a:schemeClr val="accent5">
+              <a:lumMod val="40000"/>
+              <a:lumOff val="60000"/>
+            </a:schemeClr>
+          </a:solidFill>
+        </p:spPr>
+        <p:style>
+          <a:lnRef idx="2">
+            <a:schemeClr val="accent1">
+              <a:shade val="50000"/>
+            </a:schemeClr>
+          </a:lnRef>
+          <a:fillRef idx="1">
+            <a:schemeClr val="accent1"/>
+          </a:fillRef>
+          <a:effectRef idx="0">
+            <a:schemeClr val="accent1"/>
+          </a:effectRef>
+          <a:fontRef idx="minor">
+            <a:schemeClr val="lt1"/>
+          </a:fontRef>
+        </p:style>
+        <p:txBody>
+          <a:bodyPr rtlCol="0" anchor="ctr"/>
+          <a:lstStyle/>
+          <a:p>
+            <a:pPr algn="ctr"/>
+            <a:endParaRPr lang="en-GB"/>
+          </a:p>
+        </p:txBody>
+      </p:sp>
       <p:cxnSp>
         <p:nvCxnSpPr>
           <p:cNvPr id="28" name="Rett pilkobling 27">
@@ -11948,6 +12329,1851 @@
           <a:prstGeom prst="bentConnector3">
             <a:avLst>
               <a:gd name="adj1" fmla="val 241280"/>
+            </a:avLst>
+          </a:prstGeom>
+          <a:ln>
+            <a:tailEnd type="triangle"/>
+          </a:ln>
+        </p:spPr>
+        <p:style>
+          <a:lnRef idx="1">
+            <a:schemeClr val="dk1"/>
+          </a:lnRef>
+          <a:fillRef idx="0">
+            <a:schemeClr val="dk1"/>
+          </a:fillRef>
+          <a:effectRef idx="0">
+            <a:schemeClr val="dk1"/>
+          </a:effectRef>
+          <a:fontRef idx="minor">
+            <a:schemeClr val="tx1"/>
+          </a:fontRef>
+        </p:style>
+      </p:cxnSp>
+      <p:cxnSp>
+        <p:nvCxnSpPr>
+          <p:cNvPr id="35" name="Rett pilkobling 34">
+            <a:extLst>
+              <a:ext uri="{FF2B5EF4-FFF2-40B4-BE49-F238E27FC236}">
+                <a16:creationId xmlns:a16="http://schemas.microsoft.com/office/drawing/2014/main" id="{72E31A82-98BB-46CC-A389-A36B18898867}"/>
+              </a:ext>
+            </a:extLst>
+          </p:cNvPr>
+          <p:cNvCxnSpPr>
+            <a:cxnSpLocks/>
+          </p:cNvCxnSpPr>
+          <p:nvPr/>
+        </p:nvCxnSpPr>
+        <p:spPr>
+          <a:xfrm flipV="1">
+            <a:off x="4301066" y="3533641"/>
+            <a:ext cx="339091" cy="388"/>
+          </a:xfrm>
+          <a:prstGeom prst="straightConnector1">
+            <a:avLst/>
+          </a:prstGeom>
+          <a:ln w="12700">
+            <a:solidFill>
+              <a:schemeClr val="tx1"/>
+            </a:solidFill>
+            <a:tailEnd type="triangle"/>
+          </a:ln>
+        </p:spPr>
+        <p:style>
+          <a:lnRef idx="1">
+            <a:schemeClr val="accent1"/>
+          </a:lnRef>
+          <a:fillRef idx="0">
+            <a:schemeClr val="accent1"/>
+          </a:fillRef>
+          <a:effectRef idx="0">
+            <a:schemeClr val="accent1"/>
+          </a:effectRef>
+          <a:fontRef idx="minor">
+            <a:schemeClr val="tx1"/>
+          </a:fontRef>
+        </p:style>
+      </p:cxnSp>
+      <p:cxnSp>
+        <p:nvCxnSpPr>
+          <p:cNvPr id="36" name="Rett pilkobling 35">
+            <a:extLst>
+              <a:ext uri="{FF2B5EF4-FFF2-40B4-BE49-F238E27FC236}">
+                <a16:creationId xmlns:a16="http://schemas.microsoft.com/office/drawing/2014/main" id="{F2EFF23C-214A-437A-88EC-E802BC44A3D9}"/>
+              </a:ext>
+            </a:extLst>
+          </p:cNvPr>
+          <p:cNvCxnSpPr>
+            <a:cxnSpLocks/>
+          </p:cNvCxnSpPr>
+          <p:nvPr/>
+        </p:nvCxnSpPr>
+        <p:spPr>
+          <a:xfrm>
+            <a:off x="4301065" y="3586718"/>
+            <a:ext cx="352910" cy="0"/>
+          </a:xfrm>
+          <a:prstGeom prst="straightConnector1">
+            <a:avLst/>
+          </a:prstGeom>
+          <a:ln w="12700">
+            <a:solidFill>
+              <a:schemeClr val="tx1"/>
+            </a:solidFill>
+            <a:tailEnd type="triangle"/>
+          </a:ln>
+        </p:spPr>
+        <p:style>
+          <a:lnRef idx="1">
+            <a:schemeClr val="accent1"/>
+          </a:lnRef>
+          <a:fillRef idx="0">
+            <a:schemeClr val="accent1"/>
+          </a:fillRef>
+          <a:effectRef idx="0">
+            <a:schemeClr val="accent1"/>
+          </a:effectRef>
+          <a:fontRef idx="minor">
+            <a:schemeClr val="tx1"/>
+          </a:fontRef>
+        </p:style>
+      </p:cxnSp>
+      <p:cxnSp>
+        <p:nvCxnSpPr>
+          <p:cNvPr id="37" name="Rett pilkobling 36">
+            <a:extLst>
+              <a:ext uri="{FF2B5EF4-FFF2-40B4-BE49-F238E27FC236}">
+                <a16:creationId xmlns:a16="http://schemas.microsoft.com/office/drawing/2014/main" id="{7A996920-A83C-4CE2-BC8C-F6519A2FD8EE}"/>
+              </a:ext>
+            </a:extLst>
+          </p:cNvPr>
+          <p:cNvCxnSpPr>
+            <a:cxnSpLocks/>
+          </p:cNvCxnSpPr>
+          <p:nvPr/>
+        </p:nvCxnSpPr>
+        <p:spPr>
+          <a:xfrm>
+            <a:off x="4378814" y="3629049"/>
+            <a:ext cx="265146" cy="0"/>
+          </a:xfrm>
+          <a:prstGeom prst="straightConnector1">
+            <a:avLst/>
+          </a:prstGeom>
+          <a:ln w="12700">
+            <a:solidFill>
+              <a:schemeClr val="tx1"/>
+            </a:solidFill>
+            <a:tailEnd type="triangle"/>
+          </a:ln>
+        </p:spPr>
+        <p:style>
+          <a:lnRef idx="1">
+            <a:schemeClr val="accent1"/>
+          </a:lnRef>
+          <a:fillRef idx="0">
+            <a:schemeClr val="accent1"/>
+          </a:fillRef>
+          <a:effectRef idx="0">
+            <a:schemeClr val="accent1"/>
+          </a:effectRef>
+          <a:fontRef idx="minor">
+            <a:schemeClr val="tx1"/>
+          </a:fontRef>
+        </p:style>
+      </p:cxnSp>
+      <p:cxnSp>
+        <p:nvCxnSpPr>
+          <p:cNvPr id="40" name="Rett pilkobling 39">
+            <a:extLst>
+              <a:ext uri="{FF2B5EF4-FFF2-40B4-BE49-F238E27FC236}">
+                <a16:creationId xmlns:a16="http://schemas.microsoft.com/office/drawing/2014/main" id="{3ADA9DA9-4DA3-42E8-90A4-B8B4CE4EEFCD}"/>
+              </a:ext>
+            </a:extLst>
+          </p:cNvPr>
+          <p:cNvCxnSpPr>
+            <a:cxnSpLocks/>
+          </p:cNvCxnSpPr>
+          <p:nvPr/>
+        </p:nvCxnSpPr>
+        <p:spPr>
+          <a:xfrm>
+            <a:off x="4378811" y="3662911"/>
+            <a:ext cx="265146" cy="0"/>
+          </a:xfrm>
+          <a:prstGeom prst="straightConnector1">
+            <a:avLst/>
+          </a:prstGeom>
+          <a:ln w="12700">
+            <a:solidFill>
+              <a:schemeClr val="tx1"/>
+            </a:solidFill>
+            <a:tailEnd type="triangle"/>
+          </a:ln>
+        </p:spPr>
+        <p:style>
+          <a:lnRef idx="1">
+            <a:schemeClr val="accent1"/>
+          </a:lnRef>
+          <a:fillRef idx="0">
+            <a:schemeClr val="accent1"/>
+          </a:fillRef>
+          <a:effectRef idx="0">
+            <a:schemeClr val="accent1"/>
+          </a:effectRef>
+          <a:fontRef idx="minor">
+            <a:schemeClr val="tx1"/>
+          </a:fontRef>
+        </p:style>
+      </p:cxnSp>
+      <p:cxnSp>
+        <p:nvCxnSpPr>
+          <p:cNvPr id="42" name="Rett pilkobling 41">
+            <a:extLst>
+              <a:ext uri="{FF2B5EF4-FFF2-40B4-BE49-F238E27FC236}">
+                <a16:creationId xmlns:a16="http://schemas.microsoft.com/office/drawing/2014/main" id="{8014F974-C14E-4BFE-BBF1-DC0A29D5A5DD}"/>
+              </a:ext>
+            </a:extLst>
+          </p:cNvPr>
+          <p:cNvCxnSpPr>
+            <a:cxnSpLocks/>
+          </p:cNvCxnSpPr>
+          <p:nvPr/>
+        </p:nvCxnSpPr>
+        <p:spPr>
+          <a:xfrm>
+            <a:off x="4284540" y="3721776"/>
+            <a:ext cx="352910" cy="0"/>
+          </a:xfrm>
+          <a:prstGeom prst="straightConnector1">
+            <a:avLst/>
+          </a:prstGeom>
+          <a:ln w="12700">
+            <a:solidFill>
+              <a:schemeClr val="tx1"/>
+            </a:solidFill>
+            <a:tailEnd type="triangle"/>
+          </a:ln>
+        </p:spPr>
+        <p:style>
+          <a:lnRef idx="1">
+            <a:schemeClr val="accent1"/>
+          </a:lnRef>
+          <a:fillRef idx="0">
+            <a:schemeClr val="accent1"/>
+          </a:fillRef>
+          <a:effectRef idx="0">
+            <a:schemeClr val="accent1"/>
+          </a:effectRef>
+          <a:fontRef idx="minor">
+            <a:schemeClr val="tx1"/>
+          </a:fontRef>
+        </p:style>
+      </p:cxnSp>
+      <p:cxnSp>
+        <p:nvCxnSpPr>
+          <p:cNvPr id="44" name="Rett pilkobling 43">
+            <a:extLst>
+              <a:ext uri="{FF2B5EF4-FFF2-40B4-BE49-F238E27FC236}">
+                <a16:creationId xmlns:a16="http://schemas.microsoft.com/office/drawing/2014/main" id="{31885D06-FEAF-4C64-806F-F672E42B4B2F}"/>
+              </a:ext>
+            </a:extLst>
+          </p:cNvPr>
+          <p:cNvCxnSpPr>
+            <a:cxnSpLocks/>
+          </p:cNvCxnSpPr>
+          <p:nvPr/>
+        </p:nvCxnSpPr>
+        <p:spPr>
+          <a:xfrm>
+            <a:off x="4250680" y="3315771"/>
+            <a:ext cx="403296" cy="0"/>
+          </a:xfrm>
+          <a:prstGeom prst="straightConnector1">
+            <a:avLst/>
+          </a:prstGeom>
+          <a:ln w="12700">
+            <a:solidFill>
+              <a:schemeClr val="tx1"/>
+            </a:solidFill>
+            <a:tailEnd type="triangle"/>
+          </a:ln>
+        </p:spPr>
+        <p:style>
+          <a:lnRef idx="1">
+            <a:schemeClr val="accent1"/>
+          </a:lnRef>
+          <a:fillRef idx="0">
+            <a:schemeClr val="accent1"/>
+          </a:fillRef>
+          <a:effectRef idx="0">
+            <a:schemeClr val="accent1"/>
+          </a:effectRef>
+          <a:fontRef idx="minor">
+            <a:schemeClr val="tx1"/>
+          </a:fontRef>
+        </p:style>
+      </p:cxnSp>
+      <p:sp>
+        <p:nvSpPr>
+          <p:cNvPr id="45" name="Rektangel 44">
+            <a:extLst>
+              <a:ext uri="{FF2B5EF4-FFF2-40B4-BE49-F238E27FC236}">
+                <a16:creationId xmlns:a16="http://schemas.microsoft.com/office/drawing/2014/main" id="{0570A62E-8E90-4F03-A3D0-350314C18406}"/>
+              </a:ext>
+            </a:extLst>
+          </p:cNvPr>
+          <p:cNvSpPr/>
+          <p:nvPr/>
+        </p:nvSpPr>
+        <p:spPr>
+          <a:xfrm>
+            <a:off x="3277825" y="3229777"/>
+            <a:ext cx="980910" cy="576669"/>
+          </a:xfrm>
+          <a:prstGeom prst="rect">
+            <a:avLst/>
+          </a:prstGeom>
+          <a:solidFill>
+            <a:schemeClr val="bg1">
+              <a:lumMod val="85000"/>
+            </a:schemeClr>
+          </a:solidFill>
+          <a:ln>
+            <a:solidFill>
+              <a:schemeClr val="tx1"/>
+            </a:solidFill>
+          </a:ln>
+        </p:spPr>
+        <p:style>
+          <a:lnRef idx="2">
+            <a:schemeClr val="accent1">
+              <a:shade val="50000"/>
+            </a:schemeClr>
+          </a:lnRef>
+          <a:fillRef idx="1">
+            <a:schemeClr val="accent1"/>
+          </a:fillRef>
+          <a:effectRef idx="0">
+            <a:schemeClr val="accent1"/>
+          </a:effectRef>
+          <a:fontRef idx="minor">
+            <a:schemeClr val="lt1"/>
+          </a:fontRef>
+        </p:style>
+        <p:txBody>
+          <a:bodyPr lIns="36000" tIns="36000" rIns="36000" bIns="36000" rtlCol="0" anchor="t" anchorCtr="0"/>
+          <a:lstStyle/>
+          <a:p>
+            <a:pPr algn="ctr"/>
+            <a:r>
+              <a:rPr lang="nb-NO" sz="800" dirty="0" err="1">
+                <a:solidFill>
+                  <a:schemeClr val="tx1"/>
+                </a:solidFill>
+                <a:latin typeface="Arial" panose="020B0604020202020204" pitchFamily="34" charset="0"/>
+                <a:cs typeface="Arial" panose="020B0604020202020204" pitchFamily="34" charset="0"/>
+              </a:rPr>
+              <a:t>Partial</a:t>
+            </a:r>
+            <a:r>
+              <a:rPr lang="nb-NO" sz="800" dirty="0">
+                <a:solidFill>
+                  <a:schemeClr val="tx1"/>
+                </a:solidFill>
+                <a:latin typeface="Arial" panose="020B0604020202020204" pitchFamily="34" charset="0"/>
+                <a:cs typeface="Arial" panose="020B0604020202020204" pitchFamily="34" charset="0"/>
+              </a:rPr>
+              <a:t> </a:t>
+            </a:r>
+            <a:r>
+              <a:rPr lang="nb-NO" sz="800" dirty="0" err="1">
+                <a:solidFill>
+                  <a:schemeClr val="tx1"/>
+                </a:solidFill>
+                <a:latin typeface="Arial" panose="020B0604020202020204" pitchFamily="34" charset="0"/>
+                <a:cs typeface="Arial" panose="020B0604020202020204" pitchFamily="34" charset="0"/>
+              </a:rPr>
+              <a:t>coverage</a:t>
+            </a:r>
+            <a:r>
+              <a:rPr lang="nb-NO" sz="800" dirty="0">
+                <a:solidFill>
+                  <a:schemeClr val="tx1"/>
+                </a:solidFill>
+                <a:latin typeface="Arial" panose="020B0604020202020204" pitchFamily="34" charset="0"/>
+                <a:cs typeface="Arial" panose="020B0604020202020204" pitchFamily="34" charset="0"/>
+              </a:rPr>
+              <a:t> 1</a:t>
+            </a:r>
+          </a:p>
+        </p:txBody>
+      </p:sp>
+      <p:sp>
+        <p:nvSpPr>
+          <p:cNvPr id="46" name="Rektangel 45">
+            <a:extLst>
+              <a:ext uri="{FF2B5EF4-FFF2-40B4-BE49-F238E27FC236}">
+                <a16:creationId xmlns:a16="http://schemas.microsoft.com/office/drawing/2014/main" id="{4DFE0252-04EA-4419-8289-724BD6862BD2}"/>
+              </a:ext>
+            </a:extLst>
+          </p:cNvPr>
+          <p:cNvSpPr/>
+          <p:nvPr/>
+        </p:nvSpPr>
+        <p:spPr>
+          <a:xfrm>
+            <a:off x="3320156" y="3458379"/>
+            <a:ext cx="980910" cy="576669"/>
+          </a:xfrm>
+          <a:prstGeom prst="rect">
+            <a:avLst/>
+          </a:prstGeom>
+          <a:solidFill>
+            <a:schemeClr val="bg1">
+              <a:lumMod val="85000"/>
+            </a:schemeClr>
+          </a:solidFill>
+          <a:ln>
+            <a:solidFill>
+              <a:schemeClr val="tx1"/>
+            </a:solidFill>
+          </a:ln>
+        </p:spPr>
+        <p:style>
+          <a:lnRef idx="2">
+            <a:schemeClr val="accent1">
+              <a:shade val="50000"/>
+            </a:schemeClr>
+          </a:lnRef>
+          <a:fillRef idx="1">
+            <a:schemeClr val="accent1"/>
+          </a:fillRef>
+          <a:effectRef idx="0">
+            <a:schemeClr val="accent1"/>
+          </a:effectRef>
+          <a:fontRef idx="minor">
+            <a:schemeClr val="lt1"/>
+          </a:fontRef>
+        </p:style>
+        <p:txBody>
+          <a:bodyPr lIns="36000" tIns="36000" rIns="36000" bIns="36000" rtlCol="0" anchor="t" anchorCtr="0"/>
+          <a:lstStyle/>
+          <a:p>
+            <a:pPr algn="ctr"/>
+            <a:r>
+              <a:rPr lang="nb-NO" sz="800" dirty="0" err="1">
+                <a:solidFill>
+                  <a:schemeClr val="tx1"/>
+                </a:solidFill>
+                <a:latin typeface="Arial" panose="020B0604020202020204" pitchFamily="34" charset="0"/>
+                <a:cs typeface="Arial" panose="020B0604020202020204" pitchFamily="34" charset="0"/>
+              </a:rPr>
+              <a:t>Testcase</a:t>
+            </a:r>
+            <a:r>
+              <a:rPr lang="nb-NO" sz="800" dirty="0">
+                <a:solidFill>
+                  <a:schemeClr val="tx1"/>
+                </a:solidFill>
+                <a:latin typeface="Arial" panose="020B0604020202020204" pitchFamily="34" charset="0"/>
+                <a:cs typeface="Arial" panose="020B0604020202020204" pitchFamily="34" charset="0"/>
+              </a:rPr>
+              <a:t> 1</a:t>
+            </a:r>
+          </a:p>
+        </p:txBody>
+      </p:sp>
+      <p:sp>
+        <p:nvSpPr>
+          <p:cNvPr id="47" name="Rektangel 46">
+            <a:extLst>
+              <a:ext uri="{FF2B5EF4-FFF2-40B4-BE49-F238E27FC236}">
+                <a16:creationId xmlns:a16="http://schemas.microsoft.com/office/drawing/2014/main" id="{79D227D8-AB3D-47EB-866C-B1685D4DC9F8}"/>
+              </a:ext>
+            </a:extLst>
+          </p:cNvPr>
+          <p:cNvSpPr/>
+          <p:nvPr/>
+        </p:nvSpPr>
+        <p:spPr>
+          <a:xfrm>
+            <a:off x="3345556" y="3496010"/>
+            <a:ext cx="980910" cy="576669"/>
+          </a:xfrm>
+          <a:prstGeom prst="rect">
+            <a:avLst/>
+          </a:prstGeom>
+          <a:solidFill>
+            <a:schemeClr val="bg1">
+              <a:lumMod val="85000"/>
+            </a:schemeClr>
+          </a:solidFill>
+          <a:ln>
+            <a:solidFill>
+              <a:schemeClr val="tx1"/>
+            </a:solidFill>
+          </a:ln>
+        </p:spPr>
+        <p:style>
+          <a:lnRef idx="2">
+            <a:schemeClr val="accent1">
+              <a:shade val="50000"/>
+            </a:schemeClr>
+          </a:lnRef>
+          <a:fillRef idx="1">
+            <a:schemeClr val="accent1"/>
+          </a:fillRef>
+          <a:effectRef idx="0">
+            <a:schemeClr val="accent1"/>
+          </a:effectRef>
+          <a:fontRef idx="minor">
+            <a:schemeClr val="lt1"/>
+          </a:fontRef>
+        </p:style>
+        <p:txBody>
+          <a:bodyPr lIns="36000" tIns="36000" rIns="36000" bIns="36000" rtlCol="0" anchor="t" anchorCtr="0"/>
+          <a:lstStyle/>
+          <a:p>
+            <a:pPr algn="ctr"/>
+            <a:r>
+              <a:rPr lang="nb-NO" sz="800" dirty="0" err="1">
+                <a:solidFill>
+                  <a:schemeClr val="tx1"/>
+                </a:solidFill>
+                <a:latin typeface="Arial" panose="020B0604020202020204" pitchFamily="34" charset="0"/>
+                <a:cs typeface="Arial" panose="020B0604020202020204" pitchFamily="34" charset="0"/>
+              </a:rPr>
+              <a:t>Testcase</a:t>
+            </a:r>
+            <a:r>
+              <a:rPr lang="nb-NO" sz="800" dirty="0">
+                <a:solidFill>
+                  <a:schemeClr val="tx1"/>
+                </a:solidFill>
+                <a:latin typeface="Arial" panose="020B0604020202020204" pitchFamily="34" charset="0"/>
+                <a:cs typeface="Arial" panose="020B0604020202020204" pitchFamily="34" charset="0"/>
+              </a:rPr>
+              <a:t> 1</a:t>
+            </a:r>
+          </a:p>
+        </p:txBody>
+      </p:sp>
+      <p:sp>
+        <p:nvSpPr>
+          <p:cNvPr id="48" name="Rektangel 47">
+            <a:extLst>
+              <a:ext uri="{FF2B5EF4-FFF2-40B4-BE49-F238E27FC236}">
+                <a16:creationId xmlns:a16="http://schemas.microsoft.com/office/drawing/2014/main" id="{C597584B-D5DB-4B09-BFAA-8DF1964803B9}"/>
+              </a:ext>
+            </a:extLst>
+          </p:cNvPr>
+          <p:cNvSpPr/>
+          <p:nvPr/>
+        </p:nvSpPr>
+        <p:spPr>
+          <a:xfrm>
+            <a:off x="3370956" y="3533641"/>
+            <a:ext cx="980910" cy="576669"/>
+          </a:xfrm>
+          <a:prstGeom prst="rect">
+            <a:avLst/>
+          </a:prstGeom>
+          <a:solidFill>
+            <a:schemeClr val="bg1">
+              <a:lumMod val="85000"/>
+            </a:schemeClr>
+          </a:solidFill>
+          <a:ln>
+            <a:solidFill>
+              <a:schemeClr val="tx1"/>
+            </a:solidFill>
+          </a:ln>
+        </p:spPr>
+        <p:style>
+          <a:lnRef idx="2">
+            <a:schemeClr val="accent1">
+              <a:shade val="50000"/>
+            </a:schemeClr>
+          </a:lnRef>
+          <a:fillRef idx="1">
+            <a:schemeClr val="accent1"/>
+          </a:fillRef>
+          <a:effectRef idx="0">
+            <a:schemeClr val="accent1"/>
+          </a:effectRef>
+          <a:fontRef idx="minor">
+            <a:schemeClr val="lt1"/>
+          </a:fontRef>
+        </p:style>
+        <p:txBody>
+          <a:bodyPr lIns="36000" tIns="36000" rIns="36000" bIns="36000" rtlCol="0" anchor="t" anchorCtr="0"/>
+          <a:lstStyle/>
+          <a:p>
+            <a:pPr algn="ctr"/>
+            <a:r>
+              <a:rPr lang="nb-NO" sz="800" dirty="0" err="1">
+                <a:solidFill>
+                  <a:schemeClr val="tx1"/>
+                </a:solidFill>
+                <a:latin typeface="Arial" panose="020B0604020202020204" pitchFamily="34" charset="0"/>
+                <a:cs typeface="Arial" panose="020B0604020202020204" pitchFamily="34" charset="0"/>
+              </a:rPr>
+              <a:t>Testcase</a:t>
+            </a:r>
+            <a:r>
+              <a:rPr lang="nb-NO" sz="800" dirty="0">
+                <a:solidFill>
+                  <a:schemeClr val="tx1"/>
+                </a:solidFill>
+                <a:latin typeface="Arial" panose="020B0604020202020204" pitchFamily="34" charset="0"/>
+                <a:cs typeface="Arial" panose="020B0604020202020204" pitchFamily="34" charset="0"/>
+              </a:rPr>
+              <a:t> 1</a:t>
+            </a:r>
+          </a:p>
+        </p:txBody>
+      </p:sp>
+      <p:sp>
+        <p:nvSpPr>
+          <p:cNvPr id="49" name="Rektangel 48">
+            <a:extLst>
+              <a:ext uri="{FF2B5EF4-FFF2-40B4-BE49-F238E27FC236}">
+                <a16:creationId xmlns:a16="http://schemas.microsoft.com/office/drawing/2014/main" id="{59A76DA7-022E-4E44-929C-A58018B1FE0A}"/>
+              </a:ext>
+            </a:extLst>
+          </p:cNvPr>
+          <p:cNvSpPr/>
+          <p:nvPr/>
+        </p:nvSpPr>
+        <p:spPr>
+          <a:xfrm>
+            <a:off x="3413701" y="3571272"/>
+            <a:ext cx="980910" cy="576669"/>
+          </a:xfrm>
+          <a:prstGeom prst="rect">
+            <a:avLst/>
+          </a:prstGeom>
+          <a:solidFill>
+            <a:schemeClr val="bg1">
+              <a:lumMod val="85000"/>
+            </a:schemeClr>
+          </a:solidFill>
+          <a:ln>
+            <a:solidFill>
+              <a:schemeClr val="tx1"/>
+            </a:solidFill>
+          </a:ln>
+        </p:spPr>
+        <p:style>
+          <a:lnRef idx="2">
+            <a:schemeClr val="accent1">
+              <a:shade val="50000"/>
+            </a:schemeClr>
+          </a:lnRef>
+          <a:fillRef idx="1">
+            <a:schemeClr val="accent1"/>
+          </a:fillRef>
+          <a:effectRef idx="0">
+            <a:schemeClr val="accent1"/>
+          </a:effectRef>
+          <a:fontRef idx="minor">
+            <a:schemeClr val="lt1"/>
+          </a:fontRef>
+        </p:style>
+        <p:txBody>
+          <a:bodyPr lIns="36000" tIns="36000" rIns="36000" bIns="36000" rtlCol="0" anchor="t" anchorCtr="0"/>
+          <a:lstStyle/>
+          <a:p>
+            <a:pPr algn="ctr"/>
+            <a:r>
+              <a:rPr lang="nb-NO" sz="800" dirty="0" err="1">
+                <a:solidFill>
+                  <a:schemeClr val="tx1"/>
+                </a:solidFill>
+                <a:latin typeface="Arial" panose="020B0604020202020204" pitchFamily="34" charset="0"/>
+                <a:cs typeface="Arial" panose="020B0604020202020204" pitchFamily="34" charset="0"/>
+              </a:rPr>
+              <a:t>Partial</a:t>
+            </a:r>
+            <a:r>
+              <a:rPr lang="nb-NO" sz="800" dirty="0">
+                <a:solidFill>
+                  <a:schemeClr val="tx1"/>
+                </a:solidFill>
+                <a:latin typeface="Arial" panose="020B0604020202020204" pitchFamily="34" charset="0"/>
+                <a:cs typeface="Arial" panose="020B0604020202020204" pitchFamily="34" charset="0"/>
+              </a:rPr>
+              <a:t> </a:t>
+            </a:r>
+            <a:r>
+              <a:rPr lang="nb-NO" sz="800" dirty="0" err="1">
+                <a:solidFill>
+                  <a:schemeClr val="tx1"/>
+                </a:solidFill>
+                <a:latin typeface="Arial" panose="020B0604020202020204" pitchFamily="34" charset="0"/>
+                <a:cs typeface="Arial" panose="020B0604020202020204" pitchFamily="34" charset="0"/>
+              </a:rPr>
+              <a:t>coverage</a:t>
+            </a:r>
+            <a:r>
+              <a:rPr lang="nb-NO" sz="800" dirty="0">
+                <a:solidFill>
+                  <a:schemeClr val="tx1"/>
+                </a:solidFill>
+                <a:latin typeface="Arial" panose="020B0604020202020204" pitchFamily="34" charset="0"/>
+                <a:cs typeface="Arial" panose="020B0604020202020204" pitchFamily="34" charset="0"/>
+              </a:rPr>
+              <a:t> N</a:t>
+            </a:r>
+          </a:p>
+          <a:p>
+            <a:pPr algn="ctr"/>
+            <a:endParaRPr lang="nb-NO" sz="800" dirty="0">
+              <a:solidFill>
+                <a:schemeClr val="tx1"/>
+              </a:solidFill>
+              <a:latin typeface="Arial" panose="020B0604020202020204" pitchFamily="34" charset="0"/>
+              <a:cs typeface="Arial" panose="020B0604020202020204" pitchFamily="34" charset="0"/>
+            </a:endParaRPr>
+          </a:p>
+          <a:p>
+            <a:pPr algn="ctr"/>
+            <a:r>
+              <a:rPr lang="nb-NO" sz="800" dirty="0">
+                <a:solidFill>
+                  <a:schemeClr val="tx1"/>
+                </a:solidFill>
+                <a:latin typeface="Arial" panose="020B0604020202020204" pitchFamily="34" charset="0"/>
+                <a:cs typeface="Arial" panose="020B0604020202020204" pitchFamily="34" charset="0"/>
+              </a:rPr>
+              <a:t>(CSV)</a:t>
+            </a:r>
+          </a:p>
+        </p:txBody>
+      </p:sp>
+      <p:cxnSp>
+        <p:nvCxnSpPr>
+          <p:cNvPr id="50" name="Rett pilkobling 49">
+            <a:extLst>
+              <a:ext uri="{FF2B5EF4-FFF2-40B4-BE49-F238E27FC236}">
+                <a16:creationId xmlns:a16="http://schemas.microsoft.com/office/drawing/2014/main" id="{77F47572-7385-44C7-9F79-397413BD1D26}"/>
+              </a:ext>
+            </a:extLst>
+          </p:cNvPr>
+          <p:cNvCxnSpPr>
+            <a:cxnSpLocks/>
+          </p:cNvCxnSpPr>
+          <p:nvPr/>
+        </p:nvCxnSpPr>
+        <p:spPr>
+          <a:xfrm>
+            <a:off x="2971800" y="3534029"/>
+            <a:ext cx="352910" cy="0"/>
+          </a:xfrm>
+          <a:prstGeom prst="straightConnector1">
+            <a:avLst/>
+          </a:prstGeom>
+          <a:ln w="12700">
+            <a:solidFill>
+              <a:schemeClr val="tx1"/>
+            </a:solidFill>
+            <a:tailEnd type="triangle"/>
+          </a:ln>
+        </p:spPr>
+        <p:style>
+          <a:lnRef idx="1">
+            <a:schemeClr val="accent1"/>
+          </a:lnRef>
+          <a:fillRef idx="0">
+            <a:schemeClr val="accent1"/>
+          </a:fillRef>
+          <a:effectRef idx="0">
+            <a:schemeClr val="accent1"/>
+          </a:effectRef>
+          <a:fontRef idx="minor">
+            <a:schemeClr val="tx1"/>
+          </a:fontRef>
+        </p:style>
+      </p:cxnSp>
+      <p:cxnSp>
+        <p:nvCxnSpPr>
+          <p:cNvPr id="51" name="Rett pilkobling 50">
+            <a:extLst>
+              <a:ext uri="{FF2B5EF4-FFF2-40B4-BE49-F238E27FC236}">
+                <a16:creationId xmlns:a16="http://schemas.microsoft.com/office/drawing/2014/main" id="{01ABA348-FF45-4122-A4CB-7C19FE87A0B9}"/>
+              </a:ext>
+            </a:extLst>
+          </p:cNvPr>
+          <p:cNvCxnSpPr>
+            <a:cxnSpLocks/>
+          </p:cNvCxnSpPr>
+          <p:nvPr/>
+        </p:nvCxnSpPr>
+        <p:spPr>
+          <a:xfrm>
+            <a:off x="2997200" y="3586718"/>
+            <a:ext cx="352910" cy="0"/>
+          </a:xfrm>
+          <a:prstGeom prst="straightConnector1">
+            <a:avLst/>
+          </a:prstGeom>
+          <a:ln w="12700">
+            <a:solidFill>
+              <a:schemeClr val="tx1"/>
+            </a:solidFill>
+            <a:tailEnd type="triangle"/>
+          </a:ln>
+        </p:spPr>
+        <p:style>
+          <a:lnRef idx="1">
+            <a:schemeClr val="accent1"/>
+          </a:lnRef>
+          <a:fillRef idx="0">
+            <a:schemeClr val="accent1"/>
+          </a:fillRef>
+          <a:effectRef idx="0">
+            <a:schemeClr val="accent1"/>
+          </a:effectRef>
+          <a:fontRef idx="minor">
+            <a:schemeClr val="tx1"/>
+          </a:fontRef>
+        </p:style>
+      </p:cxnSp>
+      <p:cxnSp>
+        <p:nvCxnSpPr>
+          <p:cNvPr id="52" name="Rett pilkobling 51">
+            <a:extLst>
+              <a:ext uri="{FF2B5EF4-FFF2-40B4-BE49-F238E27FC236}">
+                <a16:creationId xmlns:a16="http://schemas.microsoft.com/office/drawing/2014/main" id="{5D9B74BD-F570-4396-8ABB-B95561C4E3CF}"/>
+              </a:ext>
+            </a:extLst>
+          </p:cNvPr>
+          <p:cNvCxnSpPr>
+            <a:cxnSpLocks/>
+          </p:cNvCxnSpPr>
+          <p:nvPr/>
+        </p:nvCxnSpPr>
+        <p:spPr>
+          <a:xfrm>
+            <a:off x="3022600" y="3629049"/>
+            <a:ext cx="352910" cy="0"/>
+          </a:xfrm>
+          <a:prstGeom prst="straightConnector1">
+            <a:avLst/>
+          </a:prstGeom>
+          <a:ln w="12700">
+            <a:solidFill>
+              <a:schemeClr val="tx1"/>
+            </a:solidFill>
+            <a:tailEnd type="triangle"/>
+          </a:ln>
+        </p:spPr>
+        <p:style>
+          <a:lnRef idx="1">
+            <a:schemeClr val="accent1"/>
+          </a:lnRef>
+          <a:fillRef idx="0">
+            <a:schemeClr val="accent1"/>
+          </a:fillRef>
+          <a:effectRef idx="0">
+            <a:schemeClr val="accent1"/>
+          </a:effectRef>
+          <a:fontRef idx="minor">
+            <a:schemeClr val="tx1"/>
+          </a:fontRef>
+        </p:style>
+      </p:cxnSp>
+      <p:cxnSp>
+        <p:nvCxnSpPr>
+          <p:cNvPr id="53" name="Rett pilkobling 52">
+            <a:extLst>
+              <a:ext uri="{FF2B5EF4-FFF2-40B4-BE49-F238E27FC236}">
+                <a16:creationId xmlns:a16="http://schemas.microsoft.com/office/drawing/2014/main" id="{E35C841F-A61F-4006-8029-C5AD02FB7B89}"/>
+              </a:ext>
+            </a:extLst>
+          </p:cNvPr>
+          <p:cNvCxnSpPr>
+            <a:cxnSpLocks/>
+          </p:cNvCxnSpPr>
+          <p:nvPr/>
+        </p:nvCxnSpPr>
+        <p:spPr>
+          <a:xfrm>
+            <a:off x="3047998" y="3662911"/>
+            <a:ext cx="352910" cy="0"/>
+          </a:xfrm>
+          <a:prstGeom prst="straightConnector1">
+            <a:avLst/>
+          </a:prstGeom>
+          <a:ln w="12700">
+            <a:solidFill>
+              <a:schemeClr val="tx1"/>
+            </a:solidFill>
+            <a:tailEnd type="triangle"/>
+          </a:ln>
+        </p:spPr>
+        <p:style>
+          <a:lnRef idx="1">
+            <a:schemeClr val="accent1"/>
+          </a:lnRef>
+          <a:fillRef idx="0">
+            <a:schemeClr val="accent1"/>
+          </a:fillRef>
+          <a:effectRef idx="0">
+            <a:schemeClr val="accent1"/>
+          </a:effectRef>
+          <a:fontRef idx="minor">
+            <a:schemeClr val="tx1"/>
+          </a:fontRef>
+        </p:style>
+      </p:cxnSp>
+      <p:cxnSp>
+        <p:nvCxnSpPr>
+          <p:cNvPr id="54" name="Rett pilkobling 53">
+            <a:extLst>
+              <a:ext uri="{FF2B5EF4-FFF2-40B4-BE49-F238E27FC236}">
+                <a16:creationId xmlns:a16="http://schemas.microsoft.com/office/drawing/2014/main" id="{5399CE7B-EAC7-4E3B-94C7-31FCA9FBC51C}"/>
+              </a:ext>
+            </a:extLst>
+          </p:cNvPr>
+          <p:cNvCxnSpPr>
+            <a:cxnSpLocks/>
+          </p:cNvCxnSpPr>
+          <p:nvPr/>
+        </p:nvCxnSpPr>
+        <p:spPr>
+          <a:xfrm>
+            <a:off x="3065345" y="3721776"/>
+            <a:ext cx="352910" cy="0"/>
+          </a:xfrm>
+          <a:prstGeom prst="straightConnector1">
+            <a:avLst/>
+          </a:prstGeom>
+          <a:ln w="12700">
+            <a:solidFill>
+              <a:schemeClr val="tx1"/>
+            </a:solidFill>
+            <a:tailEnd type="triangle"/>
+          </a:ln>
+        </p:spPr>
+        <p:style>
+          <a:lnRef idx="1">
+            <a:schemeClr val="accent1"/>
+          </a:lnRef>
+          <a:fillRef idx="0">
+            <a:schemeClr val="accent1"/>
+          </a:fillRef>
+          <a:effectRef idx="0">
+            <a:schemeClr val="accent1"/>
+          </a:effectRef>
+          <a:fontRef idx="minor">
+            <a:schemeClr val="tx1"/>
+          </a:fontRef>
+        </p:style>
+      </p:cxnSp>
+      <p:sp>
+        <p:nvSpPr>
+          <p:cNvPr id="55" name="Rektangel 54">
+            <a:extLst>
+              <a:ext uri="{FF2B5EF4-FFF2-40B4-BE49-F238E27FC236}">
+                <a16:creationId xmlns:a16="http://schemas.microsoft.com/office/drawing/2014/main" id="{A83D6596-E972-4043-9AAE-E0314280B99E}"/>
+              </a:ext>
+            </a:extLst>
+          </p:cNvPr>
+          <p:cNvSpPr/>
+          <p:nvPr/>
+        </p:nvSpPr>
+        <p:spPr>
+          <a:xfrm>
+            <a:off x="2244908" y="3229777"/>
+            <a:ext cx="684564" cy="576669"/>
+          </a:xfrm>
+          <a:prstGeom prst="rect">
+            <a:avLst/>
+          </a:prstGeom>
+          <a:solidFill>
+            <a:schemeClr val="bg1"/>
+          </a:solidFill>
+          <a:ln>
+            <a:solidFill>
+              <a:schemeClr val="tx1"/>
+            </a:solidFill>
+          </a:ln>
+        </p:spPr>
+        <p:style>
+          <a:lnRef idx="2">
+            <a:schemeClr val="accent1">
+              <a:shade val="50000"/>
+            </a:schemeClr>
+          </a:lnRef>
+          <a:fillRef idx="1">
+            <a:schemeClr val="accent1"/>
+          </a:fillRef>
+          <a:effectRef idx="0">
+            <a:schemeClr val="accent1"/>
+          </a:effectRef>
+          <a:fontRef idx="minor">
+            <a:schemeClr val="lt1"/>
+          </a:fontRef>
+        </p:style>
+        <p:txBody>
+          <a:bodyPr lIns="36000" tIns="36000" rIns="36000" bIns="36000" rtlCol="0" anchor="t" anchorCtr="0"/>
+          <a:lstStyle/>
+          <a:p>
+            <a:pPr algn="ctr"/>
+            <a:r>
+              <a:rPr lang="nb-NO" sz="800" dirty="0" err="1">
+                <a:solidFill>
+                  <a:schemeClr val="tx1"/>
+                </a:solidFill>
+                <a:latin typeface="Arial" panose="020B0604020202020204" pitchFamily="34" charset="0"/>
+                <a:cs typeface="Arial" panose="020B0604020202020204" pitchFamily="34" charset="0"/>
+              </a:rPr>
+              <a:t>Testcase</a:t>
+            </a:r>
+            <a:r>
+              <a:rPr lang="nb-NO" sz="800" dirty="0">
+                <a:solidFill>
+                  <a:schemeClr val="tx1"/>
+                </a:solidFill>
+                <a:latin typeface="Arial" panose="020B0604020202020204" pitchFamily="34" charset="0"/>
+                <a:cs typeface="Arial" panose="020B0604020202020204" pitchFamily="34" charset="0"/>
+              </a:rPr>
+              <a:t> 1</a:t>
+            </a:r>
+          </a:p>
+        </p:txBody>
+      </p:sp>
+      <p:sp>
+        <p:nvSpPr>
+          <p:cNvPr id="56" name="Rektangel 55">
+            <a:extLst>
+              <a:ext uri="{FF2B5EF4-FFF2-40B4-BE49-F238E27FC236}">
+                <a16:creationId xmlns:a16="http://schemas.microsoft.com/office/drawing/2014/main" id="{139E287C-B32A-412B-826A-FEBE2BBD0E3E}"/>
+              </a:ext>
+            </a:extLst>
+          </p:cNvPr>
+          <p:cNvSpPr/>
+          <p:nvPr/>
+        </p:nvSpPr>
+        <p:spPr>
+          <a:xfrm>
+            <a:off x="2287236" y="3458379"/>
+            <a:ext cx="684564" cy="576669"/>
+          </a:xfrm>
+          <a:prstGeom prst="rect">
+            <a:avLst/>
+          </a:prstGeom>
+          <a:solidFill>
+            <a:schemeClr val="bg1"/>
+          </a:solidFill>
+          <a:ln>
+            <a:solidFill>
+              <a:schemeClr val="tx1"/>
+            </a:solidFill>
+          </a:ln>
+        </p:spPr>
+        <p:style>
+          <a:lnRef idx="2">
+            <a:schemeClr val="accent1">
+              <a:shade val="50000"/>
+            </a:schemeClr>
+          </a:lnRef>
+          <a:fillRef idx="1">
+            <a:schemeClr val="accent1"/>
+          </a:fillRef>
+          <a:effectRef idx="0">
+            <a:schemeClr val="accent1"/>
+          </a:effectRef>
+          <a:fontRef idx="minor">
+            <a:schemeClr val="lt1"/>
+          </a:fontRef>
+        </p:style>
+        <p:txBody>
+          <a:bodyPr lIns="36000" tIns="36000" rIns="36000" bIns="36000" rtlCol="0" anchor="t" anchorCtr="0"/>
+          <a:lstStyle/>
+          <a:p>
+            <a:pPr algn="ctr"/>
+            <a:r>
+              <a:rPr lang="nb-NO" sz="800" dirty="0" err="1">
+                <a:solidFill>
+                  <a:schemeClr val="tx1"/>
+                </a:solidFill>
+                <a:latin typeface="Arial" panose="020B0604020202020204" pitchFamily="34" charset="0"/>
+                <a:cs typeface="Arial" panose="020B0604020202020204" pitchFamily="34" charset="0"/>
+              </a:rPr>
+              <a:t>Testcase</a:t>
+            </a:r>
+            <a:r>
+              <a:rPr lang="nb-NO" sz="800" dirty="0">
+                <a:solidFill>
+                  <a:schemeClr val="tx1"/>
+                </a:solidFill>
+                <a:latin typeface="Arial" panose="020B0604020202020204" pitchFamily="34" charset="0"/>
+                <a:cs typeface="Arial" panose="020B0604020202020204" pitchFamily="34" charset="0"/>
+              </a:rPr>
+              <a:t> 1</a:t>
+            </a:r>
+          </a:p>
+        </p:txBody>
+      </p:sp>
+      <p:sp>
+        <p:nvSpPr>
+          <p:cNvPr id="57" name="Rektangel 56">
+            <a:extLst>
+              <a:ext uri="{FF2B5EF4-FFF2-40B4-BE49-F238E27FC236}">
+                <a16:creationId xmlns:a16="http://schemas.microsoft.com/office/drawing/2014/main" id="{84F3E12B-6E2B-452E-B397-DBE8CEA3F9E4}"/>
+              </a:ext>
+            </a:extLst>
+          </p:cNvPr>
+          <p:cNvSpPr/>
+          <p:nvPr/>
+        </p:nvSpPr>
+        <p:spPr>
+          <a:xfrm>
+            <a:off x="2312636" y="3496010"/>
+            <a:ext cx="684564" cy="576669"/>
+          </a:xfrm>
+          <a:prstGeom prst="rect">
+            <a:avLst/>
+          </a:prstGeom>
+          <a:solidFill>
+            <a:schemeClr val="bg1"/>
+          </a:solidFill>
+          <a:ln>
+            <a:solidFill>
+              <a:schemeClr val="tx1"/>
+            </a:solidFill>
+          </a:ln>
+        </p:spPr>
+        <p:style>
+          <a:lnRef idx="2">
+            <a:schemeClr val="accent1">
+              <a:shade val="50000"/>
+            </a:schemeClr>
+          </a:lnRef>
+          <a:fillRef idx="1">
+            <a:schemeClr val="accent1"/>
+          </a:fillRef>
+          <a:effectRef idx="0">
+            <a:schemeClr val="accent1"/>
+          </a:effectRef>
+          <a:fontRef idx="minor">
+            <a:schemeClr val="lt1"/>
+          </a:fontRef>
+        </p:style>
+        <p:txBody>
+          <a:bodyPr lIns="36000" tIns="36000" rIns="36000" bIns="36000" rtlCol="0" anchor="t" anchorCtr="0"/>
+          <a:lstStyle/>
+          <a:p>
+            <a:pPr algn="ctr"/>
+            <a:r>
+              <a:rPr lang="nb-NO" sz="800" dirty="0" err="1">
+                <a:solidFill>
+                  <a:schemeClr val="tx1"/>
+                </a:solidFill>
+                <a:latin typeface="Arial" panose="020B0604020202020204" pitchFamily="34" charset="0"/>
+                <a:cs typeface="Arial" panose="020B0604020202020204" pitchFamily="34" charset="0"/>
+              </a:rPr>
+              <a:t>Testcase</a:t>
+            </a:r>
+            <a:r>
+              <a:rPr lang="nb-NO" sz="800" dirty="0">
+                <a:solidFill>
+                  <a:schemeClr val="tx1"/>
+                </a:solidFill>
+                <a:latin typeface="Arial" panose="020B0604020202020204" pitchFamily="34" charset="0"/>
+                <a:cs typeface="Arial" panose="020B0604020202020204" pitchFamily="34" charset="0"/>
+              </a:rPr>
+              <a:t> 1</a:t>
+            </a:r>
+          </a:p>
+        </p:txBody>
+      </p:sp>
+      <p:sp>
+        <p:nvSpPr>
+          <p:cNvPr id="58" name="Rektangel 57">
+            <a:extLst>
+              <a:ext uri="{FF2B5EF4-FFF2-40B4-BE49-F238E27FC236}">
+                <a16:creationId xmlns:a16="http://schemas.microsoft.com/office/drawing/2014/main" id="{4BF4A2E7-E3D6-4A33-912C-D8563DBF1B17}"/>
+              </a:ext>
+            </a:extLst>
+          </p:cNvPr>
+          <p:cNvSpPr/>
+          <p:nvPr/>
+        </p:nvSpPr>
+        <p:spPr>
+          <a:xfrm>
+            <a:off x="2338036" y="3533641"/>
+            <a:ext cx="684564" cy="576669"/>
+          </a:xfrm>
+          <a:prstGeom prst="rect">
+            <a:avLst/>
+          </a:prstGeom>
+          <a:solidFill>
+            <a:schemeClr val="bg1"/>
+          </a:solidFill>
+          <a:ln>
+            <a:solidFill>
+              <a:schemeClr val="tx1"/>
+            </a:solidFill>
+          </a:ln>
+        </p:spPr>
+        <p:style>
+          <a:lnRef idx="2">
+            <a:schemeClr val="accent1">
+              <a:shade val="50000"/>
+            </a:schemeClr>
+          </a:lnRef>
+          <a:fillRef idx="1">
+            <a:schemeClr val="accent1"/>
+          </a:fillRef>
+          <a:effectRef idx="0">
+            <a:schemeClr val="accent1"/>
+          </a:effectRef>
+          <a:fontRef idx="minor">
+            <a:schemeClr val="lt1"/>
+          </a:fontRef>
+        </p:style>
+        <p:txBody>
+          <a:bodyPr lIns="36000" tIns="36000" rIns="36000" bIns="36000" rtlCol="0" anchor="t" anchorCtr="0"/>
+          <a:lstStyle/>
+          <a:p>
+            <a:pPr algn="ctr"/>
+            <a:r>
+              <a:rPr lang="nb-NO" sz="800" dirty="0" err="1">
+                <a:solidFill>
+                  <a:schemeClr val="tx1"/>
+                </a:solidFill>
+                <a:latin typeface="Arial" panose="020B0604020202020204" pitchFamily="34" charset="0"/>
+                <a:cs typeface="Arial" panose="020B0604020202020204" pitchFamily="34" charset="0"/>
+              </a:rPr>
+              <a:t>Testcase</a:t>
+            </a:r>
+            <a:r>
+              <a:rPr lang="nb-NO" sz="800" dirty="0">
+                <a:solidFill>
+                  <a:schemeClr val="tx1"/>
+                </a:solidFill>
+                <a:latin typeface="Arial" panose="020B0604020202020204" pitchFamily="34" charset="0"/>
+                <a:cs typeface="Arial" panose="020B0604020202020204" pitchFamily="34" charset="0"/>
+              </a:rPr>
+              <a:t> 1</a:t>
+            </a:r>
+          </a:p>
+        </p:txBody>
+      </p:sp>
+      <p:sp>
+        <p:nvSpPr>
+          <p:cNvPr id="59" name="Rektangel 58">
+            <a:extLst>
+              <a:ext uri="{FF2B5EF4-FFF2-40B4-BE49-F238E27FC236}">
+                <a16:creationId xmlns:a16="http://schemas.microsoft.com/office/drawing/2014/main" id="{BF0896C5-9439-4FEF-AF8D-B747126B7D85}"/>
+              </a:ext>
+            </a:extLst>
+          </p:cNvPr>
+          <p:cNvSpPr/>
+          <p:nvPr/>
+        </p:nvSpPr>
+        <p:spPr>
+          <a:xfrm>
+            <a:off x="2380781" y="3571272"/>
+            <a:ext cx="684564" cy="576669"/>
+          </a:xfrm>
+          <a:prstGeom prst="rect">
+            <a:avLst/>
+          </a:prstGeom>
+          <a:solidFill>
+            <a:schemeClr val="bg1"/>
+          </a:solidFill>
+          <a:ln>
+            <a:solidFill>
+              <a:schemeClr val="tx1"/>
+            </a:solidFill>
+          </a:ln>
+        </p:spPr>
+        <p:style>
+          <a:lnRef idx="2">
+            <a:schemeClr val="accent1">
+              <a:shade val="50000"/>
+            </a:schemeClr>
+          </a:lnRef>
+          <a:fillRef idx="1">
+            <a:schemeClr val="accent1"/>
+          </a:fillRef>
+          <a:effectRef idx="0">
+            <a:schemeClr val="accent1"/>
+          </a:effectRef>
+          <a:fontRef idx="minor">
+            <a:schemeClr val="lt1"/>
+          </a:fontRef>
+        </p:style>
+        <p:txBody>
+          <a:bodyPr lIns="36000" tIns="36000" rIns="36000" bIns="36000" rtlCol="0" anchor="t" anchorCtr="0"/>
+          <a:lstStyle/>
+          <a:p>
+            <a:pPr algn="ctr"/>
+            <a:r>
+              <a:rPr lang="nb-NO" sz="800" dirty="0" err="1">
+                <a:solidFill>
+                  <a:schemeClr val="tx1"/>
+                </a:solidFill>
+                <a:latin typeface="Arial" panose="020B0604020202020204" pitchFamily="34" charset="0"/>
+                <a:cs typeface="Arial" panose="020B0604020202020204" pitchFamily="34" charset="0"/>
+              </a:rPr>
+              <a:t>Testcase</a:t>
+            </a:r>
+            <a:r>
+              <a:rPr lang="nb-NO" sz="800" dirty="0">
+                <a:solidFill>
+                  <a:schemeClr val="tx1"/>
+                </a:solidFill>
+                <a:latin typeface="Arial" panose="020B0604020202020204" pitchFamily="34" charset="0"/>
+                <a:cs typeface="Arial" panose="020B0604020202020204" pitchFamily="34" charset="0"/>
+              </a:rPr>
+              <a:t> N</a:t>
+            </a:r>
+          </a:p>
+          <a:p>
+            <a:pPr algn="ctr"/>
+            <a:endParaRPr lang="nb-NO" sz="800" dirty="0">
+              <a:solidFill>
+                <a:schemeClr val="tx1"/>
+              </a:solidFill>
+              <a:latin typeface="Arial" panose="020B0604020202020204" pitchFamily="34" charset="0"/>
+              <a:cs typeface="Arial" panose="020B0604020202020204" pitchFamily="34" charset="0"/>
+            </a:endParaRPr>
+          </a:p>
+          <a:p>
+            <a:pPr algn="ctr"/>
+            <a:r>
+              <a:rPr lang="nb-NO" sz="800" dirty="0">
+                <a:solidFill>
+                  <a:schemeClr val="tx1"/>
+                </a:solidFill>
+                <a:latin typeface="Arial" panose="020B0604020202020204" pitchFamily="34" charset="0"/>
+                <a:cs typeface="Arial" panose="020B0604020202020204" pitchFamily="34" charset="0"/>
+              </a:rPr>
+              <a:t>(VHDL)</a:t>
+            </a:r>
+          </a:p>
+        </p:txBody>
+      </p:sp>
+      <p:cxnSp>
+        <p:nvCxnSpPr>
+          <p:cNvPr id="60" name="Rett pilkobling 59">
+            <a:extLst>
+              <a:ext uri="{FF2B5EF4-FFF2-40B4-BE49-F238E27FC236}">
+                <a16:creationId xmlns:a16="http://schemas.microsoft.com/office/drawing/2014/main" id="{F429565B-10D9-415E-A31B-6EBCF163F3B0}"/>
+              </a:ext>
+            </a:extLst>
+          </p:cNvPr>
+          <p:cNvCxnSpPr>
+            <a:cxnSpLocks/>
+          </p:cNvCxnSpPr>
+          <p:nvPr/>
+        </p:nvCxnSpPr>
+        <p:spPr>
+          <a:xfrm>
+            <a:off x="2921414" y="3315771"/>
+            <a:ext cx="352910" cy="0"/>
+          </a:xfrm>
+          <a:prstGeom prst="straightConnector1">
+            <a:avLst/>
+          </a:prstGeom>
+          <a:ln w="12700">
+            <a:solidFill>
+              <a:schemeClr val="tx1"/>
+            </a:solidFill>
+            <a:tailEnd type="triangle"/>
+          </a:ln>
+        </p:spPr>
+        <p:style>
+          <a:lnRef idx="1">
+            <a:schemeClr val="accent1"/>
+          </a:lnRef>
+          <a:fillRef idx="0">
+            <a:schemeClr val="accent1"/>
+          </a:fillRef>
+          <a:effectRef idx="0">
+            <a:schemeClr val="accent1"/>
+          </a:effectRef>
+          <a:fontRef idx="minor">
+            <a:schemeClr val="tx1"/>
+          </a:fontRef>
+        </p:style>
+      </p:cxnSp>
+      <p:sp>
+        <p:nvSpPr>
+          <p:cNvPr id="61" name="Rektangel 60">
+            <a:extLst>
+              <a:ext uri="{FF2B5EF4-FFF2-40B4-BE49-F238E27FC236}">
+                <a16:creationId xmlns:a16="http://schemas.microsoft.com/office/drawing/2014/main" id="{DA744CA6-A860-4C80-853F-E8B4258FA2FF}"/>
+              </a:ext>
+            </a:extLst>
+          </p:cNvPr>
+          <p:cNvSpPr/>
+          <p:nvPr/>
+        </p:nvSpPr>
+        <p:spPr>
+          <a:xfrm>
+            <a:off x="5447532" y="3223802"/>
+            <a:ext cx="684564" cy="576669"/>
+          </a:xfrm>
+          <a:prstGeom prst="rect">
+            <a:avLst/>
+          </a:prstGeom>
+          <a:solidFill>
+            <a:schemeClr val="bg1">
+              <a:lumMod val="85000"/>
+            </a:schemeClr>
+          </a:solidFill>
+          <a:ln>
+            <a:solidFill>
+              <a:schemeClr val="tx1"/>
+            </a:solidFill>
+          </a:ln>
+        </p:spPr>
+        <p:style>
+          <a:lnRef idx="2">
+            <a:schemeClr val="accent1">
+              <a:shade val="50000"/>
+            </a:schemeClr>
+          </a:lnRef>
+          <a:fillRef idx="1">
+            <a:schemeClr val="accent1"/>
+          </a:fillRef>
+          <a:effectRef idx="0">
+            <a:schemeClr val="accent1"/>
+          </a:effectRef>
+          <a:fontRef idx="minor">
+            <a:schemeClr val="lt1"/>
+          </a:fontRef>
+        </p:style>
+        <p:txBody>
+          <a:bodyPr lIns="36000" tIns="36000" rIns="36000" bIns="36000" rtlCol="0" anchor="t" anchorCtr="0"/>
+          <a:lstStyle/>
+          <a:p>
+            <a:pPr algn="ctr"/>
+            <a:r>
+              <a:rPr lang="nb-NO" sz="800" dirty="0" err="1">
+                <a:solidFill>
+                  <a:schemeClr val="tx1"/>
+                </a:solidFill>
+                <a:latin typeface="Arial" panose="020B0604020202020204" pitchFamily="34" charset="0"/>
+                <a:cs typeface="Arial" panose="020B0604020202020204" pitchFamily="34" charset="0"/>
+              </a:rPr>
+              <a:t>Specification</a:t>
+            </a:r>
+            <a:r>
+              <a:rPr lang="nb-NO" sz="800" dirty="0">
+                <a:solidFill>
+                  <a:schemeClr val="tx1"/>
+                </a:solidFill>
+                <a:latin typeface="Arial" panose="020B0604020202020204" pitchFamily="34" charset="0"/>
+                <a:cs typeface="Arial" panose="020B0604020202020204" pitchFamily="34" charset="0"/>
+              </a:rPr>
+              <a:t> </a:t>
+            </a:r>
+            <a:r>
+              <a:rPr lang="nb-NO" sz="800" dirty="0" err="1">
+                <a:solidFill>
+                  <a:schemeClr val="tx1"/>
+                </a:solidFill>
+                <a:latin typeface="Arial" panose="020B0604020202020204" pitchFamily="34" charset="0"/>
+                <a:cs typeface="Arial" panose="020B0604020202020204" pitchFamily="34" charset="0"/>
+              </a:rPr>
+              <a:t>coverage</a:t>
+            </a:r>
+            <a:endParaRPr lang="nb-NO" sz="800" dirty="0">
+              <a:solidFill>
+                <a:schemeClr val="tx1"/>
+              </a:solidFill>
+              <a:latin typeface="Arial" panose="020B0604020202020204" pitchFamily="34" charset="0"/>
+              <a:cs typeface="Arial" panose="020B0604020202020204" pitchFamily="34" charset="0"/>
+            </a:endParaRPr>
+          </a:p>
+          <a:p>
+            <a:pPr algn="ctr"/>
+            <a:r>
+              <a:rPr lang="nb-NO" sz="800" dirty="0">
+                <a:solidFill>
+                  <a:schemeClr val="tx1"/>
+                </a:solidFill>
+                <a:latin typeface="Arial" panose="020B0604020202020204" pitchFamily="34" charset="0"/>
+                <a:cs typeface="Arial" panose="020B0604020202020204" pitchFamily="34" charset="0"/>
+              </a:rPr>
+              <a:t>files</a:t>
+            </a:r>
+          </a:p>
+          <a:p>
+            <a:pPr algn="ctr"/>
+            <a:r>
+              <a:rPr lang="nb-NO" sz="800" dirty="0">
+                <a:solidFill>
+                  <a:schemeClr val="tx1"/>
+                </a:solidFill>
+                <a:latin typeface="Arial" panose="020B0604020202020204" pitchFamily="34" charset="0"/>
+                <a:cs typeface="Arial" panose="020B0604020202020204" pitchFamily="34" charset="0"/>
+              </a:rPr>
+              <a:t>(CSV)</a:t>
+            </a:r>
+          </a:p>
+        </p:txBody>
+      </p:sp>
+      <p:cxnSp>
+        <p:nvCxnSpPr>
+          <p:cNvPr id="62" name="Rett pilkobling 61">
+            <a:extLst>
+              <a:ext uri="{FF2B5EF4-FFF2-40B4-BE49-F238E27FC236}">
+                <a16:creationId xmlns:a16="http://schemas.microsoft.com/office/drawing/2014/main" id="{B10C8F8B-3816-41F4-81CE-966200D158C7}"/>
+              </a:ext>
+            </a:extLst>
+          </p:cNvPr>
+          <p:cNvCxnSpPr>
+            <a:cxnSpLocks/>
+            <a:endCxn id="61" idx="1"/>
+          </p:cNvCxnSpPr>
+          <p:nvPr/>
+        </p:nvCxnSpPr>
+        <p:spPr>
+          <a:xfrm>
+            <a:off x="5251527" y="3512136"/>
+            <a:ext cx="196005" cy="1"/>
+          </a:xfrm>
+          <a:prstGeom prst="straightConnector1">
+            <a:avLst/>
+          </a:prstGeom>
+          <a:ln w="12700">
+            <a:solidFill>
+              <a:schemeClr val="tx1"/>
+            </a:solidFill>
+            <a:tailEnd type="triangle"/>
+          </a:ln>
+        </p:spPr>
+        <p:style>
+          <a:lnRef idx="1">
+            <a:schemeClr val="accent1"/>
+          </a:lnRef>
+          <a:fillRef idx="0">
+            <a:schemeClr val="accent1"/>
+          </a:fillRef>
+          <a:effectRef idx="0">
+            <a:schemeClr val="accent1"/>
+          </a:effectRef>
+          <a:fontRef idx="minor">
+            <a:schemeClr val="tx1"/>
+          </a:fontRef>
+        </p:style>
+      </p:cxnSp>
+      <p:sp>
+        <p:nvSpPr>
+          <p:cNvPr id="63" name="Rektangel 62">
+            <a:extLst>
+              <a:ext uri="{FF2B5EF4-FFF2-40B4-BE49-F238E27FC236}">
+                <a16:creationId xmlns:a16="http://schemas.microsoft.com/office/drawing/2014/main" id="{E7BC519C-3853-4380-AB0B-60010DCBF8C9}"/>
+              </a:ext>
+            </a:extLst>
+          </p:cNvPr>
+          <p:cNvSpPr/>
+          <p:nvPr/>
+        </p:nvSpPr>
+        <p:spPr>
+          <a:xfrm>
+            <a:off x="4640157" y="3229777"/>
+            <a:ext cx="603315" cy="918162"/>
+          </a:xfrm>
+          <a:prstGeom prst="rect">
+            <a:avLst/>
+          </a:prstGeom>
+          <a:solidFill>
+            <a:schemeClr val="bg1"/>
+          </a:solidFill>
+          <a:ln>
+            <a:solidFill>
+              <a:schemeClr val="tx1"/>
+            </a:solidFill>
+          </a:ln>
+        </p:spPr>
+        <p:style>
+          <a:lnRef idx="2">
+            <a:schemeClr val="accent1">
+              <a:shade val="50000"/>
+            </a:schemeClr>
+          </a:lnRef>
+          <a:fillRef idx="1">
+            <a:schemeClr val="accent1"/>
+          </a:fillRef>
+          <a:effectRef idx="0">
+            <a:schemeClr val="accent1"/>
+          </a:effectRef>
+          <a:fontRef idx="minor">
+            <a:schemeClr val="lt1"/>
+          </a:fontRef>
+        </p:style>
+        <p:txBody>
+          <a:bodyPr lIns="36000" tIns="36000" rIns="36000" bIns="36000" rtlCol="0" anchor="t" anchorCtr="0"/>
+          <a:lstStyle/>
+          <a:p>
+            <a:pPr algn="ctr"/>
+            <a:r>
+              <a:rPr lang="nb-NO" sz="800" dirty="0">
+                <a:solidFill>
+                  <a:schemeClr val="tx1"/>
+                </a:solidFill>
+                <a:latin typeface="Arial" panose="020B0604020202020204" pitchFamily="34" charset="0"/>
+                <a:cs typeface="Arial" panose="020B0604020202020204" pitchFamily="34" charset="0"/>
+              </a:rPr>
+              <a:t>Post </a:t>
+            </a:r>
+            <a:r>
+              <a:rPr lang="nb-NO" sz="800" dirty="0" err="1">
+                <a:solidFill>
+                  <a:schemeClr val="tx1"/>
+                </a:solidFill>
+                <a:latin typeface="Arial" panose="020B0604020202020204" pitchFamily="34" charset="0"/>
+                <a:cs typeface="Arial" panose="020B0604020202020204" pitchFamily="34" charset="0"/>
+              </a:rPr>
+              <a:t>processing</a:t>
+            </a:r>
+            <a:endParaRPr lang="nb-NO" sz="800" dirty="0">
+              <a:solidFill>
+                <a:schemeClr val="tx1"/>
+              </a:solidFill>
+              <a:latin typeface="Arial" panose="020B0604020202020204" pitchFamily="34" charset="0"/>
+              <a:cs typeface="Arial" panose="020B0604020202020204" pitchFamily="34" charset="0"/>
+            </a:endParaRPr>
+          </a:p>
+          <a:p>
+            <a:pPr algn="ctr"/>
+            <a:endParaRPr lang="nb-NO" sz="800" dirty="0">
+              <a:solidFill>
+                <a:schemeClr val="tx1"/>
+              </a:solidFill>
+              <a:latin typeface="Arial" panose="020B0604020202020204" pitchFamily="34" charset="0"/>
+              <a:cs typeface="Arial" panose="020B0604020202020204" pitchFamily="34" charset="0"/>
+            </a:endParaRPr>
+          </a:p>
+          <a:p>
+            <a:pPr algn="ctr"/>
+            <a:r>
+              <a:rPr lang="nb-NO" sz="800" dirty="0">
+                <a:solidFill>
+                  <a:schemeClr val="tx1"/>
+                </a:solidFill>
+                <a:latin typeface="Arial" panose="020B0604020202020204" pitchFamily="34" charset="0"/>
+                <a:cs typeface="Arial" panose="020B0604020202020204" pitchFamily="34" charset="0"/>
+              </a:rPr>
+              <a:t>(Python)</a:t>
+            </a:r>
+          </a:p>
+        </p:txBody>
+      </p:sp>
+      <p:sp>
+        <p:nvSpPr>
+          <p:cNvPr id="64" name="Rektangel 63">
+            <a:extLst>
+              <a:ext uri="{FF2B5EF4-FFF2-40B4-BE49-F238E27FC236}">
+                <a16:creationId xmlns:a16="http://schemas.microsoft.com/office/drawing/2014/main" id="{6ECC0C35-E449-4B5A-BD4C-97F419126D47}"/>
+              </a:ext>
+            </a:extLst>
+          </p:cNvPr>
+          <p:cNvSpPr/>
+          <p:nvPr/>
+        </p:nvSpPr>
+        <p:spPr>
+          <a:xfrm>
+            <a:off x="1399871" y="3391583"/>
+            <a:ext cx="657539" cy="413924"/>
+          </a:xfrm>
+          <a:prstGeom prst="rect">
+            <a:avLst/>
+          </a:prstGeom>
+          <a:solidFill>
+            <a:schemeClr val="bg1">
+              <a:lumMod val="85000"/>
+            </a:schemeClr>
+          </a:solidFill>
+          <a:ln>
+            <a:solidFill>
+              <a:schemeClr val="tx1"/>
+            </a:solidFill>
+          </a:ln>
+        </p:spPr>
+        <p:style>
+          <a:lnRef idx="2">
+            <a:schemeClr val="accent1">
+              <a:shade val="50000"/>
+            </a:schemeClr>
+          </a:lnRef>
+          <a:fillRef idx="1">
+            <a:schemeClr val="accent1"/>
+          </a:fillRef>
+          <a:effectRef idx="0">
+            <a:schemeClr val="accent1"/>
+          </a:effectRef>
+          <a:fontRef idx="minor">
+            <a:schemeClr val="lt1"/>
+          </a:fontRef>
+        </p:style>
+        <p:txBody>
+          <a:bodyPr lIns="36000" tIns="36000" rIns="36000" bIns="36000" rtlCol="0" anchor="t" anchorCtr="0"/>
+          <a:lstStyle/>
+          <a:p>
+            <a:pPr algn="ctr"/>
+            <a:r>
+              <a:rPr lang="nb-NO" sz="800" dirty="0" err="1">
+                <a:solidFill>
+                  <a:schemeClr val="tx1"/>
+                </a:solidFill>
+                <a:latin typeface="Arial" panose="020B0604020202020204" pitchFamily="34" charset="0"/>
+                <a:cs typeface="Arial" panose="020B0604020202020204" pitchFamily="34" charset="0"/>
+              </a:rPr>
+              <a:t>Requirement</a:t>
+            </a:r>
+            <a:r>
+              <a:rPr lang="nb-NO" sz="800" dirty="0">
+                <a:solidFill>
+                  <a:schemeClr val="tx1"/>
+                </a:solidFill>
+                <a:latin typeface="Arial" panose="020B0604020202020204" pitchFamily="34" charset="0"/>
+                <a:cs typeface="Arial" panose="020B0604020202020204" pitchFamily="34" charset="0"/>
+              </a:rPr>
+              <a:t> list</a:t>
+            </a:r>
+          </a:p>
+          <a:p>
+            <a:pPr algn="ctr"/>
+            <a:r>
+              <a:rPr lang="nb-NO" sz="800" dirty="0">
+                <a:solidFill>
+                  <a:schemeClr val="tx1"/>
+                </a:solidFill>
+                <a:latin typeface="Arial" panose="020B0604020202020204" pitchFamily="34" charset="0"/>
+                <a:cs typeface="Arial" panose="020B0604020202020204" pitchFamily="34" charset="0"/>
+              </a:rPr>
+              <a:t>(CSV)</a:t>
+            </a:r>
+          </a:p>
+        </p:txBody>
+      </p:sp>
+      <p:sp>
+        <p:nvSpPr>
+          <p:cNvPr id="65" name="Pil: høyre 64">
+            <a:extLst>
+              <a:ext uri="{FF2B5EF4-FFF2-40B4-BE49-F238E27FC236}">
+                <a16:creationId xmlns:a16="http://schemas.microsoft.com/office/drawing/2014/main" id="{8EDBE319-31F8-4110-BEFC-370D4940F518}"/>
+              </a:ext>
+            </a:extLst>
+          </p:cNvPr>
+          <p:cNvSpPr/>
+          <p:nvPr/>
+        </p:nvSpPr>
+        <p:spPr>
+          <a:xfrm>
+            <a:off x="2057410" y="3533641"/>
+            <a:ext cx="202878" cy="129270"/>
+          </a:xfrm>
+          <a:prstGeom prst="rightArrow">
+            <a:avLst/>
+          </a:prstGeom>
+        </p:spPr>
+        <p:style>
+          <a:lnRef idx="2">
+            <a:schemeClr val="accent1">
+              <a:shade val="50000"/>
+            </a:schemeClr>
+          </a:lnRef>
+          <a:fillRef idx="1">
+            <a:schemeClr val="accent1"/>
+          </a:fillRef>
+          <a:effectRef idx="0">
+            <a:schemeClr val="accent1"/>
+          </a:effectRef>
+          <a:fontRef idx="minor">
+            <a:schemeClr val="lt1"/>
+          </a:fontRef>
+        </p:style>
+        <p:txBody>
+          <a:bodyPr rtlCol="0" anchor="ctr"/>
+          <a:lstStyle/>
+          <a:p>
+            <a:pPr algn="ctr"/>
+            <a:endParaRPr lang="en-GB"/>
+          </a:p>
+        </p:txBody>
+      </p:sp>
+      <p:sp>
+        <p:nvSpPr>
+          <p:cNvPr id="66" name="Pil: høyre 65">
+            <a:extLst>
+              <a:ext uri="{FF2B5EF4-FFF2-40B4-BE49-F238E27FC236}">
+                <a16:creationId xmlns:a16="http://schemas.microsoft.com/office/drawing/2014/main" id="{07D16477-B054-4004-8A4B-200BC768873C}"/>
+              </a:ext>
+            </a:extLst>
+          </p:cNvPr>
+          <p:cNvSpPr/>
+          <p:nvPr/>
+        </p:nvSpPr>
+        <p:spPr>
+          <a:xfrm>
+            <a:off x="2074093" y="3572869"/>
+            <a:ext cx="297008" cy="90042"/>
+          </a:xfrm>
+          <a:prstGeom prst="rightArrow">
+            <a:avLst/>
+          </a:prstGeom>
+        </p:spPr>
+        <p:style>
+          <a:lnRef idx="2">
+            <a:schemeClr val="accent1">
+              <a:shade val="50000"/>
+            </a:schemeClr>
+          </a:lnRef>
+          <a:fillRef idx="1">
+            <a:schemeClr val="accent1"/>
+          </a:fillRef>
+          <a:effectRef idx="0">
+            <a:schemeClr val="accent1"/>
+          </a:effectRef>
+          <a:fontRef idx="minor">
+            <a:schemeClr val="lt1"/>
+          </a:fontRef>
+        </p:style>
+        <p:txBody>
+          <a:bodyPr rtlCol="0" anchor="ctr"/>
+          <a:lstStyle/>
+          <a:p>
+            <a:pPr algn="ctr"/>
+            <a:endParaRPr lang="en-GB"/>
+          </a:p>
+        </p:txBody>
+      </p:sp>
+      <p:cxnSp>
+        <p:nvCxnSpPr>
+          <p:cNvPr id="67" name="Vinkel 6">
+            <a:extLst>
+              <a:ext uri="{FF2B5EF4-FFF2-40B4-BE49-F238E27FC236}">
+                <a16:creationId xmlns:a16="http://schemas.microsoft.com/office/drawing/2014/main" id="{26509024-39EF-4D26-8FA8-34C15CC4C543}"/>
+              </a:ext>
+            </a:extLst>
+          </p:cNvPr>
+          <p:cNvCxnSpPr>
+            <a:cxnSpLocks/>
+            <a:stCxn id="64" idx="0"/>
+            <a:endCxn id="63" idx="0"/>
+          </p:cNvCxnSpPr>
+          <p:nvPr/>
+        </p:nvCxnSpPr>
+        <p:spPr>
+          <a:xfrm rot="5400000" flipH="1" flipV="1">
+            <a:off x="3254325" y="1704093"/>
+            <a:ext cx="161806" cy="3213174"/>
+          </a:xfrm>
+          <a:prstGeom prst="bentConnector3">
+            <a:avLst>
+              <a:gd name="adj1" fmla="val 180514"/>
             </a:avLst>
           </a:prstGeom>
           <a:ln>

</xml_diff>

<commit_message>
Minor fix on the previous
</commit_message>
<xml_diff>
--- a/bitvis_vip_spec_cov/doc/Figures.pptx
+++ b/bitvis_vip_spec_cov/doc/Figures.pptx
@@ -6201,7 +6201,7 @@
                 <a:latin typeface="Arial" panose="020B0604020202020204" pitchFamily="34" charset="0"/>
                 <a:cs typeface="Arial" panose="020B0604020202020204" pitchFamily="34" charset="0"/>
               </a:rPr>
-              <a:t>, COMPLIANT</a:t>
+              <a:t>, NON_COMPLIANT</a:t>
             </a:r>
             <a:br>
               <a:rPr lang="nb-NO" sz="750" dirty="0">
@@ -6240,7 +6240,7 @@
                 <a:latin typeface="Arial" panose="020B0604020202020204" pitchFamily="34" charset="0"/>
                 <a:cs typeface="Arial" panose="020B0604020202020204" pitchFamily="34" charset="0"/>
               </a:rPr>
-              <a:t>, NON_COMPLIANT</a:t>
+              <a:t>, COMPLIANT</a:t>
             </a:r>
             <a:br>
               <a:rPr lang="nb-NO" sz="750" dirty="0">

</xml_diff>